<commit_message>
add presentation intermediate submission
</commit_message>
<xml_diff>
--- a/notebooks/interrim_presentattion_poster.pptx
+++ b/notebooks/interrim_presentattion_poster.pptx
@@ -5035,7 +5035,7 @@
         </p:nvSpPr>
         <p:spPr>
           <a:xfrm>
-            <a:off x="1296672" y="18654563"/>
+            <a:off x="1296672" y="18606437"/>
             <a:ext cx="27643017" cy="16649227"/>
           </a:xfrm>
           <a:prstGeom prst="rect">
@@ -5356,7 +5356,7 @@
         <p:spPr>
           <a:xfrm>
             <a:off x="1990397" y="18992803"/>
-            <a:ext cx="18877668" cy="1155060"/>
+            <a:ext cx="20259905" cy="1155060"/>
           </a:xfrm>
           <a:prstGeom prst="rect">
             <a:avLst/>
@@ -5375,7 +5375,11 @@
             </a:r>
             <a:r>
               <a:rPr lang="en-US" altLang="ja-JP" dirty="0"/>
-              <a:t>HTML / JavaScript / Python / MySQL / ()</a:t>
+              <a:t>HTML / JavaScript / Python / MySQL / </a:t>
+            </a:r>
+            <a:r>
+              <a:rPr lang="en-US" altLang="ja-JP" dirty="0" err="1"/>
+              <a:t>Redis</a:t>
             </a:r>
             <a:endParaRPr kumimoji="1" lang="ja-JP" altLang="en-US"/>
           </a:p>
@@ -5403,7 +5407,7 @@
         </p:blipFill>
         <p:spPr>
           <a:xfrm>
-            <a:off x="4044818" y="22474189"/>
+            <a:off x="4044818" y="28165683"/>
             <a:ext cx="2167159" cy="1866635"/>
           </a:xfrm>
           <a:prstGeom prst="rect">
@@ -5433,7 +5437,7 @@
         </p:blipFill>
         <p:spPr>
           <a:xfrm>
-            <a:off x="2315147" y="24196441"/>
+            <a:off x="2315147" y="29887935"/>
             <a:ext cx="2173946" cy="1872481"/>
           </a:xfrm>
           <a:prstGeom prst="rect">
@@ -5463,7 +5467,7 @@
         </p:blipFill>
         <p:spPr>
           <a:xfrm>
-            <a:off x="16346214" y="22511625"/>
+            <a:off x="16346214" y="28203119"/>
             <a:ext cx="2356989" cy="2987075"/>
           </a:xfrm>
           <a:prstGeom prst="rect">
@@ -5493,7 +5497,7 @@
         </p:blipFill>
         <p:spPr>
           <a:xfrm>
-            <a:off x="16427438" y="29425531"/>
+            <a:off x="25868421" y="28203119"/>
             <a:ext cx="2356989" cy="2987075"/>
           </a:xfrm>
           <a:prstGeom prst="rect">
@@ -5515,8 +5519,8 @@
         </p:nvSpPr>
         <p:spPr>
           <a:xfrm>
-            <a:off x="6798368" y="23562292"/>
-            <a:ext cx="8778926" cy="965694"/>
+            <a:off x="6798368" y="29253786"/>
+            <a:ext cx="8778926" cy="936000"/>
           </a:xfrm>
           <a:prstGeom prst="rightArrow">
             <a:avLst/>
@@ -5572,9 +5576,9 @@
           <p:nvPr/>
         </p:nvSpPr>
         <p:spPr>
-          <a:xfrm rot="5400000">
-            <a:off x="16495858" y="26532852"/>
-            <a:ext cx="2070981" cy="965694"/>
+          <a:xfrm>
+            <a:off x="19571423" y="29214622"/>
+            <a:ext cx="5616000" cy="936000"/>
           </a:xfrm>
           <a:prstGeom prst="rightArrow">
             <a:avLst/>
@@ -5631,7 +5635,7 @@
         </p:nvSpPr>
         <p:spPr>
           <a:xfrm>
-            <a:off x="1718439" y="21597899"/>
+            <a:off x="1718439" y="27289393"/>
             <a:ext cx="5724644" cy="830997"/>
           </a:xfrm>
           <a:prstGeom prst="rect">
@@ -5666,7 +5670,7 @@
         </p:nvSpPr>
         <p:spPr>
           <a:xfrm>
-            <a:off x="15577294" y="21436700"/>
+            <a:off x="15577294" y="27128194"/>
             <a:ext cx="4493538" cy="830997"/>
           </a:xfrm>
           <a:prstGeom prst="rect">
@@ -5701,7 +5705,7 @@
         </p:nvSpPr>
         <p:spPr>
           <a:xfrm>
-            <a:off x="15893492" y="28403102"/>
+            <a:off x="25539371" y="27096920"/>
             <a:ext cx="3262432" cy="830997"/>
           </a:xfrm>
           <a:prstGeom prst="rect">
@@ -5748,8 +5752,8 @@
         </p:blipFill>
         <p:spPr>
           <a:xfrm>
-            <a:off x="24364401" y="25204509"/>
-            <a:ext cx="4061885" cy="4184477"/>
+            <a:off x="21117977" y="32447119"/>
+            <a:ext cx="2611759" cy="2690584"/>
           </a:xfrm>
           <a:prstGeom prst="rect">
             <a:avLst/>
@@ -5758,10 +5762,10 @@
       </p:pic>
       <p:sp>
         <p:nvSpPr>
-          <p:cNvPr id="56" name="左右矢印 55">
+          <p:cNvPr id="58" name="左右矢印 57">
             <a:extLst>
               <a:ext uri="{FF2B5EF4-FFF2-40B4-BE49-F238E27FC236}">
-                <a16:creationId xmlns:a16="http://schemas.microsoft.com/office/drawing/2014/main" id="{6E188A04-646E-1A4F-AC05-8EFB040AF0CE}"/>
+                <a16:creationId xmlns:a16="http://schemas.microsoft.com/office/drawing/2014/main" id="{C7716D8D-9E14-9441-A5D6-0825D409FF82}"/>
               </a:ext>
             </a:extLst>
           </p:cNvPr>
@@ -5769,9 +5773,9 @@
           <p:nvPr/>
         </p:nvSpPr>
         <p:spPr>
-          <a:xfrm rot="1829924">
-            <a:off x="19258809" y="24338501"/>
-            <a:ext cx="4709469" cy="964800"/>
+          <a:xfrm rot="7800000">
+            <a:off x="23436840" y="32609983"/>
+            <a:ext cx="3888000" cy="936000"/>
           </a:xfrm>
           <a:prstGeom prst="leftRightArrow">
             <a:avLst/>
@@ -5816,10 +5820,91 @@
       </p:sp>
       <p:sp>
         <p:nvSpPr>
-          <p:cNvPr id="58" name="左右矢印 57">
+          <p:cNvPr id="60" name="テキスト ボックス 59">
             <a:extLst>
               <a:ext uri="{FF2B5EF4-FFF2-40B4-BE49-F238E27FC236}">
-                <a16:creationId xmlns:a16="http://schemas.microsoft.com/office/drawing/2014/main" id="{C7716D8D-9E14-9441-A5D6-0825D409FF82}"/>
+                <a16:creationId xmlns:a16="http://schemas.microsoft.com/office/drawing/2014/main" id="{23C78AF1-14DF-B848-82B4-AEB14E06AF67}"/>
+              </a:ext>
+            </a:extLst>
+          </p:cNvPr>
+          <p:cNvSpPr txBox="1"/>
+          <p:nvPr/>
+        </p:nvSpPr>
+        <p:spPr>
+          <a:xfrm>
+            <a:off x="20820635" y="31344917"/>
+            <a:ext cx="3206840" cy="830997"/>
+          </a:xfrm>
+          <a:prstGeom prst="rect">
+            <a:avLst/>
+          </a:prstGeom>
+          <a:noFill/>
+        </p:spPr>
+        <p:txBody>
+          <a:bodyPr wrap="none" rtlCol="0">
+            <a:spAutoFit/>
+          </a:bodyPr>
+          <a:lstStyle/>
+          <a:p>
+            <a:r>
+              <a:rPr kumimoji="1" lang="en-US" altLang="ja-JP" sz="4800" b="1" dirty="0"/>
+              <a:t>Web</a:t>
+            </a:r>
+            <a:r>
+              <a:rPr kumimoji="1" lang="ja-JP" altLang="en-US" sz="4800" b="1"/>
+              <a:t>ページ</a:t>
+            </a:r>
+          </a:p>
+        </p:txBody>
+      </p:sp>
+      <p:sp>
+        <p:nvSpPr>
+          <p:cNvPr id="63" name="テキスト ボックス 62">
+            <a:extLst>
+              <a:ext uri="{FF2B5EF4-FFF2-40B4-BE49-F238E27FC236}">
+                <a16:creationId xmlns:a16="http://schemas.microsoft.com/office/drawing/2014/main" id="{231E23C3-31EC-9440-BA57-4B47311CE0D6}"/>
+              </a:ext>
+            </a:extLst>
+          </p:cNvPr>
+          <p:cNvSpPr txBox="1"/>
+          <p:nvPr/>
+        </p:nvSpPr>
+        <p:spPr>
+          <a:xfrm>
+            <a:off x="7260290" y="27881234"/>
+            <a:ext cx="7571303" cy="1569660"/>
+          </a:xfrm>
+          <a:prstGeom prst="rect">
+            <a:avLst/>
+          </a:prstGeom>
+          <a:noFill/>
+        </p:spPr>
+        <p:txBody>
+          <a:bodyPr wrap="none" rtlCol="0">
+            <a:spAutoFit/>
+          </a:bodyPr>
+          <a:lstStyle/>
+          <a:p>
+            <a:r>
+              <a:rPr kumimoji="1" lang="ja-JP" altLang="en-US" sz="4800"/>
+              <a:t>スポット情報・レビューの</a:t>
+            </a:r>
+            <a:endParaRPr kumimoji="1" lang="en-US" altLang="ja-JP" sz="4800" dirty="0"/>
+          </a:p>
+          <a:p>
+            <a:r>
+              <a:rPr kumimoji="1" lang="ja-JP" altLang="en-US" sz="4800"/>
+              <a:t>スクレイピング</a:t>
+            </a:r>
+          </a:p>
+        </p:txBody>
+      </p:sp>
+      <p:sp>
+        <p:nvSpPr>
+          <p:cNvPr id="65" name="正方形/長方形 64">
+            <a:extLst>
+              <a:ext uri="{FF2B5EF4-FFF2-40B4-BE49-F238E27FC236}">
+                <a16:creationId xmlns:a16="http://schemas.microsoft.com/office/drawing/2014/main" id="{E3EA6A7C-317A-EC4C-9231-45489BE7A718}"/>
               </a:ext>
             </a:extLst>
           </p:cNvPr>
@@ -5827,23 +5912,19 @@
           <p:nvPr/>
         </p:nvSpPr>
         <p:spPr>
-          <a:xfrm rot="19826058">
-            <a:off x="19411595" y="28991997"/>
-            <a:ext cx="4815155" cy="964800"/>
-          </a:xfrm>
-          <a:prstGeom prst="leftRightArrow">
+          <a:xfrm>
+            <a:off x="2657725" y="20519667"/>
+            <a:ext cx="6279820" cy="1021127"/>
+          </a:xfrm>
+          <a:prstGeom prst="rect">
             <a:avLst/>
           </a:prstGeom>
           <a:solidFill>
-            <a:schemeClr val="accent6">
-              <a:lumMod val="75000"/>
-            </a:schemeClr>
+            <a:srgbClr val="EF0023"/>
           </a:solidFill>
-          <a:ln>
+          <a:ln w="38100">
             <a:solidFill>
-              <a:schemeClr val="accent6">
-                <a:lumMod val="75000"/>
-              </a:schemeClr>
+              <a:srgbClr val="EF0023"/>
             </a:solidFill>
           </a:ln>
         </p:spPr>
@@ -5868,90 +5949,24 @@
           <a:lstStyle/>
           <a:p>
             <a:pPr algn="ctr"/>
-            <a:endParaRPr kumimoji="1" lang="ja-JP" altLang="en-US"/>
-          </a:p>
-        </p:txBody>
-      </p:sp>
-      <p:sp>
-        <p:nvSpPr>
-          <p:cNvPr id="60" name="テキスト ボックス 59">
+            <a:r>
+              <a:rPr lang="en-US" altLang="ja-JP" sz="4800" b="1" dirty="0"/>
+              <a:t>①</a:t>
+            </a:r>
+            <a:r>
+              <a:rPr lang="ja-JP" altLang="en-US" sz="4800" b="1"/>
+              <a:t>前処理</a:t>
+            </a:r>
+            <a:endParaRPr kumimoji="1" lang="ja-JP" altLang="en-US" sz="4800" b="1"/>
+          </a:p>
+        </p:txBody>
+      </p:sp>
+      <p:sp>
+        <p:nvSpPr>
+          <p:cNvPr id="66" name="正方形/長方形 65">
             <a:extLst>
               <a:ext uri="{FF2B5EF4-FFF2-40B4-BE49-F238E27FC236}">
-                <a16:creationId xmlns:a16="http://schemas.microsoft.com/office/drawing/2014/main" id="{23C78AF1-14DF-B848-82B4-AEB14E06AF67}"/>
-              </a:ext>
-            </a:extLst>
-          </p:cNvPr>
-          <p:cNvSpPr txBox="1"/>
-          <p:nvPr/>
-        </p:nvSpPr>
-        <p:spPr>
-          <a:xfrm>
-            <a:off x="24761515" y="24075379"/>
-            <a:ext cx="3206840" cy="830997"/>
-          </a:xfrm>
-          <a:prstGeom prst="rect">
-            <a:avLst/>
-          </a:prstGeom>
-          <a:noFill/>
-        </p:spPr>
-        <p:txBody>
-          <a:bodyPr wrap="none" rtlCol="0">
-            <a:spAutoFit/>
-          </a:bodyPr>
-          <a:lstStyle/>
-          <a:p>
-            <a:r>
-              <a:rPr kumimoji="1" lang="en-US" altLang="ja-JP" sz="4800" b="1" dirty="0"/>
-              <a:t>Web</a:t>
-            </a:r>
-            <a:r>
-              <a:rPr kumimoji="1" lang="ja-JP" altLang="en-US" sz="4800" b="1"/>
-              <a:t>ページ</a:t>
-            </a:r>
-          </a:p>
-        </p:txBody>
-      </p:sp>
-      <p:sp>
-        <p:nvSpPr>
-          <p:cNvPr id="63" name="テキスト ボックス 62">
-            <a:extLst>
-              <a:ext uri="{FF2B5EF4-FFF2-40B4-BE49-F238E27FC236}">
-                <a16:creationId xmlns:a16="http://schemas.microsoft.com/office/drawing/2014/main" id="{231E23C3-31EC-9440-BA57-4B47311CE0D6}"/>
-              </a:ext>
-            </a:extLst>
-          </p:cNvPr>
-          <p:cNvSpPr txBox="1"/>
-          <p:nvPr/>
-        </p:nvSpPr>
-        <p:spPr>
-          <a:xfrm>
-            <a:off x="8261413" y="22670314"/>
-            <a:ext cx="5570756" cy="1015663"/>
-          </a:xfrm>
-          <a:prstGeom prst="rect">
-            <a:avLst/>
-          </a:prstGeom>
-          <a:noFill/>
-        </p:spPr>
-        <p:txBody>
-          <a:bodyPr wrap="none" rtlCol="0">
-            <a:spAutoFit/>
-          </a:bodyPr>
-          <a:lstStyle/>
-          <a:p>
-            <a:r>
-              <a:rPr kumimoji="1" lang="ja-JP" altLang="en-US" sz="6000"/>
-              <a:t>スクレイピング</a:t>
-            </a:r>
-          </a:p>
-        </p:txBody>
-      </p:sp>
-      <p:sp>
-        <p:nvSpPr>
-          <p:cNvPr id="65" name="正方形/長方形 64">
-            <a:extLst>
-              <a:ext uri="{FF2B5EF4-FFF2-40B4-BE49-F238E27FC236}">
-                <a16:creationId xmlns:a16="http://schemas.microsoft.com/office/drawing/2014/main" id="{E3EA6A7C-317A-EC4C-9231-45489BE7A718}"/>
+                <a16:creationId xmlns:a16="http://schemas.microsoft.com/office/drawing/2014/main" id="{266703B5-64CA-3647-9614-BE2F5853B47C}"/>
               </a:ext>
             </a:extLst>
           </p:cNvPr>
@@ -5960,15 +5975,13 @@
         </p:nvSpPr>
         <p:spPr>
           <a:xfrm>
-            <a:off x="2016485" y="28779711"/>
-            <a:ext cx="6279820" cy="1021127"/>
+            <a:off x="2657725" y="21578122"/>
+            <a:ext cx="6279820" cy="4928918"/>
           </a:xfrm>
           <a:prstGeom prst="rect">
             <a:avLst/>
           </a:prstGeom>
-          <a:solidFill>
-            <a:srgbClr val="EF0023"/>
-          </a:solidFill>
+          <a:noFill/>
           <a:ln w="38100">
             <a:solidFill>
               <a:srgbClr val="EF0023"/>
@@ -5996,20 +6009,16 @@
           <a:lstStyle/>
           <a:p>
             <a:pPr algn="ctr"/>
-            <a:r>
-              <a:rPr lang="ja-JP" altLang="en-US" sz="4800" b="1"/>
-              <a:t>前処理</a:t>
-            </a:r>
-            <a:endParaRPr kumimoji="1" lang="ja-JP" altLang="en-US" sz="4800" b="1"/>
-          </a:p>
-        </p:txBody>
-      </p:sp>
-      <p:sp>
-        <p:nvSpPr>
-          <p:cNvPr id="66" name="正方形/長方形 65">
+            <a:endParaRPr kumimoji="1" lang="ja-JP" altLang="en-US"/>
+          </a:p>
+        </p:txBody>
+      </p:sp>
+      <p:sp>
+        <p:nvSpPr>
+          <p:cNvPr id="68" name="正方形/長方形 67">
             <a:extLst>
               <a:ext uri="{FF2B5EF4-FFF2-40B4-BE49-F238E27FC236}">
-                <a16:creationId xmlns:a16="http://schemas.microsoft.com/office/drawing/2014/main" id="{266703B5-64CA-3647-9614-BE2F5853B47C}"/>
+                <a16:creationId xmlns:a16="http://schemas.microsoft.com/office/drawing/2014/main" id="{7042CDF2-CC0B-6F48-878A-7DC8D4AF71D3}"/>
               </a:ext>
             </a:extLst>
           </p:cNvPr>
@@ -6018,13 +6027,15 @@
         </p:nvSpPr>
         <p:spPr>
           <a:xfrm>
-            <a:off x="2016485" y="29858044"/>
-            <a:ext cx="6279820" cy="4928918"/>
+            <a:off x="9422296" y="20512765"/>
+            <a:ext cx="11926960" cy="1021127"/>
           </a:xfrm>
           <a:prstGeom prst="rect">
             <a:avLst/>
           </a:prstGeom>
-          <a:noFill/>
+          <a:solidFill>
+            <a:srgbClr val="EF0023"/>
+          </a:solidFill>
           <a:ln w="38100">
             <a:solidFill>
               <a:srgbClr val="EF0023"/>
@@ -6052,16 +6063,23 @@
           <a:lstStyle/>
           <a:p>
             <a:pPr algn="ctr"/>
-            <a:endParaRPr kumimoji="1" lang="ja-JP" altLang="en-US"/>
-          </a:p>
-        </p:txBody>
-      </p:sp>
-      <p:sp>
-        <p:nvSpPr>
-          <p:cNvPr id="67" name="正方形/長方形 66">
+            <a:r>
+              <a:rPr kumimoji="1" lang="en-US" altLang="ja-JP" sz="4800" b="1" dirty="0"/>
+              <a:t>②</a:t>
+            </a:r>
+            <a:r>
+              <a:rPr kumimoji="1" lang="ja-JP" altLang="en-US" sz="4800" b="1"/>
+              <a:t>トピックモデルの構築</a:t>
+            </a:r>
+          </a:p>
+        </p:txBody>
+      </p:sp>
+      <p:sp>
+        <p:nvSpPr>
+          <p:cNvPr id="69" name="正方形/長方形 68">
             <a:extLst>
               <a:ext uri="{FF2B5EF4-FFF2-40B4-BE49-F238E27FC236}">
-                <a16:creationId xmlns:a16="http://schemas.microsoft.com/office/drawing/2014/main" id="{08579602-68A8-3D4C-956A-268C6CA8527E}"/>
+                <a16:creationId xmlns:a16="http://schemas.microsoft.com/office/drawing/2014/main" id="{4C104D7F-9ACB-BB4B-942B-FF25DA679C05}"/>
               </a:ext>
             </a:extLst>
           </p:cNvPr>
@@ -6070,8 +6088,8 @@
         </p:nvSpPr>
         <p:spPr>
           <a:xfrm>
-            <a:off x="30237511" y="22428896"/>
-            <a:ext cx="13962203" cy="6623765"/>
+            <a:off x="9422296" y="21511584"/>
+            <a:ext cx="11926960" cy="5015334"/>
           </a:xfrm>
           <a:prstGeom prst="rect">
             <a:avLst/>
@@ -6079,9 +6097,7 @@
           <a:noFill/>
           <a:ln w="38100">
             <a:solidFill>
-              <a:schemeClr val="accent6">
-                <a:lumMod val="75000"/>
-              </a:schemeClr>
+              <a:srgbClr val="EF0023"/>
             </a:solidFill>
           </a:ln>
         </p:spPr>
@@ -6112,10 +6128,63 @@
       </p:sp>
       <p:sp>
         <p:nvSpPr>
-          <p:cNvPr id="68" name="正方形/長方形 67">
+          <p:cNvPr id="71" name="テキスト ボックス 70">
             <a:extLst>
               <a:ext uri="{FF2B5EF4-FFF2-40B4-BE49-F238E27FC236}">
-                <a16:creationId xmlns:a16="http://schemas.microsoft.com/office/drawing/2014/main" id="{7042CDF2-CC0B-6F48-878A-7DC8D4AF71D3}"/>
+                <a16:creationId xmlns:a16="http://schemas.microsoft.com/office/drawing/2014/main" id="{FD9C18C3-CCD1-404A-8DA9-5D23B6AEF22B}"/>
+              </a:ext>
+            </a:extLst>
+          </p:cNvPr>
+          <p:cNvSpPr txBox="1"/>
+          <p:nvPr/>
+        </p:nvSpPr>
+        <p:spPr>
+          <a:xfrm>
+            <a:off x="2996618" y="22089836"/>
+            <a:ext cx="5832884" cy="4154984"/>
+          </a:xfrm>
+          <a:prstGeom prst="rect">
+            <a:avLst/>
+          </a:prstGeom>
+          <a:noFill/>
+        </p:spPr>
+        <p:txBody>
+          <a:bodyPr wrap="square" rtlCol="0">
+            <a:spAutoFit/>
+          </a:bodyPr>
+          <a:lstStyle/>
+          <a:p>
+            <a:r>
+              <a:rPr kumimoji="1" lang="ja-JP" altLang="en-US" sz="4400"/>
+              <a:t>形態素解析により</a:t>
+            </a:r>
+            <a:r>
+              <a:rPr lang="ja-JP" altLang="en-US" sz="4400"/>
+              <a:t>品詞の原形を抽出</a:t>
+            </a:r>
+            <a:endParaRPr lang="en-US" altLang="ja-JP" sz="4400" dirty="0"/>
+          </a:p>
+          <a:p>
+            <a:endParaRPr kumimoji="1" lang="en-US" altLang="ja-JP" sz="4400" dirty="0"/>
+          </a:p>
+          <a:p>
+            <a:endParaRPr kumimoji="1" lang="en-US" altLang="ja-JP" sz="4400" dirty="0"/>
+          </a:p>
+          <a:p>
+            <a:r>
+              <a:rPr lang="ja-JP" altLang="en-US" sz="4400"/>
+              <a:t>特徴語辞書、コーパスを作成</a:t>
+            </a:r>
+            <a:endParaRPr kumimoji="1" lang="ja-JP" altLang="en-US" sz="4400"/>
+          </a:p>
+        </p:txBody>
+      </p:sp>
+      <p:sp>
+        <p:nvSpPr>
+          <p:cNvPr id="72" name="右矢印 71">
+            <a:extLst>
+              <a:ext uri="{FF2B5EF4-FFF2-40B4-BE49-F238E27FC236}">
+                <a16:creationId xmlns:a16="http://schemas.microsoft.com/office/drawing/2014/main" id="{496D955C-30B8-AE42-8FEE-BA623806D973}"/>
               </a:ext>
             </a:extLst>
           </p:cNvPr>
@@ -6123,19 +6192,23 @@
           <p:nvPr/>
         </p:nvSpPr>
         <p:spPr>
-          <a:xfrm>
-            <a:off x="8964498" y="28772809"/>
-            <a:ext cx="6279820" cy="1021127"/>
-          </a:xfrm>
-          <a:prstGeom prst="rect">
+          <a:xfrm rot="5400000">
+            <a:off x="5260324" y="23637416"/>
+            <a:ext cx="1014154" cy="965694"/>
+          </a:xfrm>
+          <a:prstGeom prst="rightArrow">
             <a:avLst/>
           </a:prstGeom>
           <a:solidFill>
-            <a:srgbClr val="EF0023"/>
+            <a:schemeClr val="accent6">
+              <a:lumMod val="75000"/>
+            </a:schemeClr>
           </a:solidFill>
-          <a:ln w="38100">
+          <a:ln>
             <a:solidFill>
-              <a:srgbClr val="EF0023"/>
+              <a:schemeClr val="accent6">
+                <a:lumMod val="75000"/>
+              </a:schemeClr>
             </a:solidFill>
           </a:ln>
         </p:spPr>
@@ -6160,19 +6233,68 @@
           <a:lstStyle/>
           <a:p>
             <a:pPr algn="ctr"/>
-            <a:r>
-              <a:rPr kumimoji="1" lang="ja-JP" altLang="en-US" sz="4800" b="1"/>
-              <a:t>類似度算出</a:t>
-            </a:r>
-          </a:p>
-        </p:txBody>
-      </p:sp>
-      <p:sp>
-        <p:nvSpPr>
-          <p:cNvPr id="69" name="正方形/長方形 68">
+            <a:endParaRPr kumimoji="1" lang="ja-JP" altLang="en-US"/>
+          </a:p>
+        </p:txBody>
+      </p:sp>
+      <p:sp>
+        <p:nvSpPr>
+          <p:cNvPr id="73" name="テキスト ボックス 72">
             <a:extLst>
               <a:ext uri="{FF2B5EF4-FFF2-40B4-BE49-F238E27FC236}">
-                <a16:creationId xmlns:a16="http://schemas.microsoft.com/office/drawing/2014/main" id="{4C104D7F-9ACB-BB4B-942B-FF25DA679C05}"/>
+                <a16:creationId xmlns:a16="http://schemas.microsoft.com/office/drawing/2014/main" id="{91307268-782B-694E-9346-6785004AA8EB}"/>
+              </a:ext>
+            </a:extLst>
+          </p:cNvPr>
+          <p:cNvSpPr txBox="1"/>
+          <p:nvPr/>
+        </p:nvSpPr>
+        <p:spPr>
+          <a:xfrm>
+            <a:off x="9893813" y="21988010"/>
+            <a:ext cx="6109595" cy="4832092"/>
+          </a:xfrm>
+          <a:prstGeom prst="rect">
+            <a:avLst/>
+          </a:prstGeom>
+          <a:noFill/>
+        </p:spPr>
+        <p:txBody>
+          <a:bodyPr wrap="square" rtlCol="0">
+            <a:spAutoFit/>
+          </a:bodyPr>
+          <a:lstStyle/>
+          <a:p>
+            <a:r>
+              <a:rPr kumimoji="1" lang="ja-JP" altLang="en-US" sz="4400"/>
+              <a:t>ＬＤＡモデルを用いてトピックを分類</a:t>
+            </a:r>
+            <a:endParaRPr kumimoji="1" lang="en-US" altLang="ja-JP" sz="4400" dirty="0"/>
+          </a:p>
+          <a:p>
+            <a:endParaRPr lang="en-US" altLang="ja-JP" sz="4400" dirty="0"/>
+          </a:p>
+          <a:p>
+            <a:endParaRPr lang="en-US" altLang="ja-JP" sz="4400" dirty="0"/>
+          </a:p>
+          <a:p>
+            <a:r>
+              <a:rPr lang="ja-JP" altLang="en-US" sz="4400"/>
+              <a:t>各スポットの特徴ベクトルを作成</a:t>
+            </a:r>
+            <a:endParaRPr lang="en-US" altLang="ja-JP" sz="4400" dirty="0"/>
+          </a:p>
+          <a:p>
+            <a:endParaRPr kumimoji="1" lang="en-US" altLang="ja-JP" sz="4400" dirty="0"/>
+          </a:p>
+        </p:txBody>
+      </p:sp>
+      <p:sp>
+        <p:nvSpPr>
+          <p:cNvPr id="74" name="右矢印 73">
+            <a:extLst>
+              <a:ext uri="{FF2B5EF4-FFF2-40B4-BE49-F238E27FC236}">
+                <a16:creationId xmlns:a16="http://schemas.microsoft.com/office/drawing/2014/main" id="{B7C99B67-0FC5-3A4A-9595-A32EE9960550}"/>
               </a:ext>
             </a:extLst>
           </p:cNvPr>
@@ -6180,17 +6302,23 @@
           <p:nvPr/>
         </p:nvSpPr>
         <p:spPr>
-          <a:xfrm>
-            <a:off x="8964498" y="29771628"/>
-            <a:ext cx="6279820" cy="5015334"/>
-          </a:xfrm>
-          <a:prstGeom prst="rect">
+          <a:xfrm rot="5400000">
+            <a:off x="12161394" y="23643728"/>
+            <a:ext cx="1014154" cy="965694"/>
+          </a:xfrm>
+          <a:prstGeom prst="rightArrow">
             <a:avLst/>
           </a:prstGeom>
-          <a:noFill/>
-          <a:ln w="38100">
+          <a:solidFill>
+            <a:schemeClr val="accent6">
+              <a:lumMod val="75000"/>
+            </a:schemeClr>
+          </a:solidFill>
+          <a:ln>
             <a:solidFill>
-              <a:srgbClr val="EF0023"/>
+              <a:schemeClr val="accent6">
+                <a:lumMod val="75000"/>
+              </a:schemeClr>
             </a:solidFill>
           </a:ln>
         </p:spPr>
@@ -6221,10 +6349,10 @@
       </p:sp>
       <p:sp>
         <p:nvSpPr>
-          <p:cNvPr id="71" name="テキスト ボックス 70">
+          <p:cNvPr id="75" name="テキスト ボックス 74">
             <a:extLst>
               <a:ext uri="{FF2B5EF4-FFF2-40B4-BE49-F238E27FC236}">
-                <a16:creationId xmlns:a16="http://schemas.microsoft.com/office/drawing/2014/main" id="{FD9C18C3-CCD1-404A-8DA9-5D23B6AEF22B}"/>
+                <a16:creationId xmlns:a16="http://schemas.microsoft.com/office/drawing/2014/main" id="{D6B44E38-9F42-3542-9B22-8E5C2E496F1F}"/>
               </a:ext>
             </a:extLst>
           </p:cNvPr>
@@ -6233,8 +6361,8 @@
         </p:nvSpPr>
         <p:spPr>
           <a:xfrm>
-            <a:off x="2355378" y="30349880"/>
-            <a:ext cx="5832884" cy="4154984"/>
+            <a:off x="-9440018" y="26979176"/>
+            <a:ext cx="4801314" cy="1938992"/>
           </a:xfrm>
           <a:prstGeom prst="rect">
             <a:avLst/>
@@ -6242,42 +6370,32 @@
           <a:noFill/>
         </p:spPr>
         <p:txBody>
-          <a:bodyPr wrap="square" rtlCol="0">
+          <a:bodyPr wrap="none" rtlCol="0">
             <a:spAutoFit/>
           </a:bodyPr>
           <a:lstStyle/>
           <a:p>
             <a:r>
-              <a:rPr kumimoji="1" lang="ja-JP" altLang="en-US" sz="4400"/>
-              <a:t>形態素解析により</a:t>
-            </a:r>
-            <a:r>
-              <a:rPr lang="ja-JP" altLang="en-US" sz="4400"/>
-              <a:t>品詞の原形を抽出</a:t>
-            </a:r>
-            <a:endParaRPr lang="en-US" altLang="ja-JP" sz="4400" dirty="0"/>
-          </a:p>
-          <a:p>
-            <a:endParaRPr kumimoji="1" lang="en-US" altLang="ja-JP" sz="4400" dirty="0"/>
-          </a:p>
-          <a:p>
-            <a:endParaRPr kumimoji="1" lang="en-US" altLang="ja-JP" sz="4400" dirty="0"/>
-          </a:p>
-          <a:p>
-            <a:r>
-              <a:rPr lang="ja-JP" altLang="en-US" sz="4400"/>
-              <a:t>特徴語辞書、コーパスを作成</a:t>
-            </a:r>
-            <a:endParaRPr kumimoji="1" lang="ja-JP" altLang="en-US" sz="4400"/>
-          </a:p>
-        </p:txBody>
-      </p:sp>
-      <p:sp>
-        <p:nvSpPr>
-          <p:cNvPr id="72" name="右矢印 71">
+              <a:rPr kumimoji="1" lang="ja-JP" altLang="en-US" sz="6000"/>
+              <a:t>①前処理</a:t>
+            </a:r>
+            <a:endParaRPr kumimoji="1" lang="en-US" altLang="ja-JP" sz="6000" dirty="0"/>
+          </a:p>
+          <a:p>
+            <a:r>
+              <a:rPr lang="ja-JP" altLang="en-US" sz="6000"/>
+              <a:t>②類似度計算</a:t>
+            </a:r>
+            <a:endParaRPr kumimoji="1" lang="ja-JP" altLang="en-US" sz="6000"/>
+          </a:p>
+        </p:txBody>
+      </p:sp>
+      <p:sp>
+        <p:nvSpPr>
+          <p:cNvPr id="78" name="四角形吹き出し 77">
             <a:extLst>
               <a:ext uri="{FF2B5EF4-FFF2-40B4-BE49-F238E27FC236}">
-                <a16:creationId xmlns:a16="http://schemas.microsoft.com/office/drawing/2014/main" id="{496D955C-30B8-AE42-8FEE-BA623806D973}"/>
+                <a16:creationId xmlns:a16="http://schemas.microsoft.com/office/drawing/2014/main" id="{41FDE50F-0E16-0148-9FFF-4DFF81D3533D}"/>
               </a:ext>
             </a:extLst>
           </p:cNvPr>
@@ -6285,18 +6403,17 @@
           <p:nvPr/>
         </p:nvSpPr>
         <p:spPr>
-          <a:xfrm rot="5400000">
-            <a:off x="4619084" y="31897460"/>
-            <a:ext cx="1014154" cy="965694"/>
-          </a:xfrm>
-          <a:prstGeom prst="rightArrow">
-            <a:avLst/>
+          <a:xfrm>
+            <a:off x="2315147" y="20194750"/>
+            <a:ext cx="25802583" cy="6594889"/>
+          </a:xfrm>
+          <a:prstGeom prst="wedgeRectCallout">
+            <a:avLst>
+              <a:gd name="adj1" fmla="val 28487"/>
+              <a:gd name="adj2" fmla="val 88063"/>
+            </a:avLst>
           </a:prstGeom>
-          <a:solidFill>
-            <a:schemeClr val="accent6">
-              <a:lumMod val="75000"/>
-            </a:schemeClr>
-          </a:solidFill>
+          <a:noFill/>
           <a:ln>
             <a:solidFill>
               <a:schemeClr val="accent6">
@@ -6332,59 +6449,10 @@
       </p:sp>
       <p:sp>
         <p:nvSpPr>
-          <p:cNvPr id="73" name="テキスト ボックス 72">
+          <p:cNvPr id="80" name="正方形/長方形 79">
             <a:extLst>
               <a:ext uri="{FF2B5EF4-FFF2-40B4-BE49-F238E27FC236}">
-                <a16:creationId xmlns:a16="http://schemas.microsoft.com/office/drawing/2014/main" id="{91307268-782B-694E-9346-6785004AA8EB}"/>
-              </a:ext>
-            </a:extLst>
-          </p:cNvPr>
-          <p:cNvSpPr txBox="1"/>
-          <p:nvPr/>
-        </p:nvSpPr>
-        <p:spPr>
-          <a:xfrm>
-            <a:off x="9049610" y="30288793"/>
-            <a:ext cx="6109595" cy="4154984"/>
-          </a:xfrm>
-          <a:prstGeom prst="rect">
-            <a:avLst/>
-          </a:prstGeom>
-          <a:noFill/>
-        </p:spPr>
-        <p:txBody>
-          <a:bodyPr wrap="square" rtlCol="0">
-            <a:spAutoFit/>
-          </a:bodyPr>
-          <a:lstStyle/>
-          <a:p>
-            <a:r>
-              <a:rPr kumimoji="1" lang="ja-JP" altLang="en-US" sz="4400"/>
-              <a:t>ＬＤＡモデルを用いてトピックを分類</a:t>
-            </a:r>
-            <a:endParaRPr kumimoji="1" lang="en-US" altLang="ja-JP" sz="4400" dirty="0"/>
-          </a:p>
-          <a:p>
-            <a:endParaRPr lang="en-US" altLang="ja-JP" sz="4400" dirty="0"/>
-          </a:p>
-          <a:p>
-            <a:endParaRPr kumimoji="1" lang="en-US" altLang="ja-JP" sz="4400" dirty="0"/>
-          </a:p>
-          <a:p>
-            <a:r>
-              <a:rPr lang="ja-JP" altLang="en-US" sz="4400"/>
-              <a:t>特徴ベクトルのｃｏｓ類似度を計算</a:t>
-            </a:r>
-            <a:endParaRPr kumimoji="1" lang="ja-JP" altLang="en-US" sz="4400"/>
-          </a:p>
-        </p:txBody>
-      </p:sp>
-      <p:sp>
-        <p:nvSpPr>
-          <p:cNvPr id="74" name="右矢印 73">
-            <a:extLst>
-              <a:ext uri="{FF2B5EF4-FFF2-40B4-BE49-F238E27FC236}">
-                <a16:creationId xmlns:a16="http://schemas.microsoft.com/office/drawing/2014/main" id="{B7C99B67-0FC5-3A4A-9595-A32EE9960550}"/>
+                <a16:creationId xmlns:a16="http://schemas.microsoft.com/office/drawing/2014/main" id="{C211EC27-F508-FC49-BFC4-13F345E31746}"/>
               </a:ext>
             </a:extLst>
           </p:cNvPr>
@@ -6392,23 +6460,19 @@
           <p:nvPr/>
         </p:nvSpPr>
         <p:spPr>
-          <a:xfrm rot="5400000">
-            <a:off x="11491968" y="31906583"/>
-            <a:ext cx="1014154" cy="965694"/>
-          </a:xfrm>
-          <a:prstGeom prst="rightArrow">
+          <a:xfrm>
+            <a:off x="21689927" y="20490457"/>
+            <a:ext cx="6279820" cy="1021127"/>
+          </a:xfrm>
+          <a:prstGeom prst="rect">
             <a:avLst/>
           </a:prstGeom>
           <a:solidFill>
-            <a:schemeClr val="accent6">
-              <a:lumMod val="75000"/>
-            </a:schemeClr>
+            <a:srgbClr val="EF0023"/>
           </a:solidFill>
-          <a:ln>
+          <a:ln w="38100">
             <a:solidFill>
-              <a:schemeClr val="accent6">
-                <a:lumMod val="75000"/>
-              </a:schemeClr>
+              <a:srgbClr val="EF0023"/>
             </a:solidFill>
           </a:ln>
         </p:spPr>
@@ -6433,59 +6497,19 @@
           <a:lstStyle/>
           <a:p>
             <a:pPr algn="ctr"/>
-            <a:endParaRPr kumimoji="1" lang="ja-JP" altLang="en-US"/>
-          </a:p>
-        </p:txBody>
-      </p:sp>
-      <p:sp>
-        <p:nvSpPr>
-          <p:cNvPr id="75" name="テキスト ボックス 74">
+            <a:r>
+              <a:rPr kumimoji="1" lang="ja-JP" altLang="en-US" sz="4800" b="1"/>
+              <a:t>③類似度算出</a:t>
+            </a:r>
+          </a:p>
+        </p:txBody>
+      </p:sp>
+      <p:sp>
+        <p:nvSpPr>
+          <p:cNvPr id="81" name="正方形/長方形 80">
             <a:extLst>
               <a:ext uri="{FF2B5EF4-FFF2-40B4-BE49-F238E27FC236}">
-                <a16:creationId xmlns:a16="http://schemas.microsoft.com/office/drawing/2014/main" id="{D6B44E38-9F42-3542-9B22-8E5C2E496F1F}"/>
-              </a:ext>
-            </a:extLst>
-          </p:cNvPr>
-          <p:cNvSpPr txBox="1"/>
-          <p:nvPr/>
-        </p:nvSpPr>
-        <p:spPr>
-          <a:xfrm>
-            <a:off x="8188262" y="25759921"/>
-            <a:ext cx="4801314" cy="1938992"/>
-          </a:xfrm>
-          <a:prstGeom prst="rect">
-            <a:avLst/>
-          </a:prstGeom>
-          <a:noFill/>
-        </p:spPr>
-        <p:txBody>
-          <a:bodyPr wrap="none" rtlCol="0">
-            <a:spAutoFit/>
-          </a:bodyPr>
-          <a:lstStyle/>
-          <a:p>
-            <a:r>
-              <a:rPr kumimoji="1" lang="ja-JP" altLang="en-US" sz="6000"/>
-              <a:t>①前処理</a:t>
-            </a:r>
-            <a:endParaRPr kumimoji="1" lang="en-US" altLang="ja-JP" sz="6000" dirty="0"/>
-          </a:p>
-          <a:p>
-            <a:r>
-              <a:rPr lang="ja-JP" altLang="en-US" sz="6000"/>
-              <a:t>②類似度計算</a:t>
-            </a:r>
-            <a:endParaRPr kumimoji="1" lang="ja-JP" altLang="en-US" sz="6000"/>
-          </a:p>
-        </p:txBody>
-      </p:sp>
-      <p:sp>
-        <p:nvSpPr>
-          <p:cNvPr id="78" name="四角形吹き出し 77">
-            <a:extLst>
-              <a:ext uri="{FF2B5EF4-FFF2-40B4-BE49-F238E27FC236}">
-                <a16:creationId xmlns:a16="http://schemas.microsoft.com/office/drawing/2014/main" id="{41FDE50F-0E16-0148-9FFF-4DFF81D3533D}"/>
+                <a16:creationId xmlns:a16="http://schemas.microsoft.com/office/drawing/2014/main" id="{844A3F01-F401-DA48-BFB9-041CCE13A668}"/>
               </a:ext>
             </a:extLst>
           </p:cNvPr>
@@ -6494,21 +6518,16 @@
         </p:nvSpPr>
         <p:spPr>
           <a:xfrm>
-            <a:off x="1679040" y="28444638"/>
-            <a:ext cx="13767970" cy="6594889"/>
-          </a:xfrm>
-          <a:prstGeom prst="wedgeRectCallout">
-            <a:avLst>
-              <a:gd name="adj1" fmla="val 59328"/>
-              <a:gd name="adj2" fmla="val -70977"/>
-            </a:avLst>
+            <a:off x="21689927" y="21489276"/>
+            <a:ext cx="6279820" cy="5015334"/>
+          </a:xfrm>
+          <a:prstGeom prst="rect">
+            <a:avLst/>
           </a:prstGeom>
           <a:noFill/>
-          <a:ln>
+          <a:ln w="38100">
             <a:solidFill>
-              <a:schemeClr val="accent6">
-                <a:lumMod val="75000"/>
-              </a:schemeClr>
+              <a:srgbClr val="EF0023"/>
             </a:solidFill>
           </a:ln>
         </p:spPr>
@@ -6537,6 +6556,379 @@
           </a:p>
         </p:txBody>
       </p:sp>
+      <p:sp>
+        <p:nvSpPr>
+          <p:cNvPr id="82" name="テキスト ボックス 81">
+            <a:extLst>
+              <a:ext uri="{FF2B5EF4-FFF2-40B4-BE49-F238E27FC236}">
+                <a16:creationId xmlns:a16="http://schemas.microsoft.com/office/drawing/2014/main" id="{5DED6EDB-FBD1-B44D-B9EF-7A8E24D289ED}"/>
+              </a:ext>
+            </a:extLst>
+          </p:cNvPr>
+          <p:cNvSpPr txBox="1"/>
+          <p:nvPr/>
+        </p:nvSpPr>
+        <p:spPr>
+          <a:xfrm>
+            <a:off x="21860152" y="22937240"/>
+            <a:ext cx="6109595" cy="2123658"/>
+          </a:xfrm>
+          <a:prstGeom prst="rect">
+            <a:avLst/>
+          </a:prstGeom>
+          <a:noFill/>
+        </p:spPr>
+        <p:txBody>
+          <a:bodyPr wrap="square" rtlCol="0">
+            <a:spAutoFit/>
+          </a:bodyPr>
+          <a:lstStyle/>
+          <a:p>
+            <a:r>
+              <a:rPr kumimoji="1" lang="ja-JP" altLang="en-US" sz="4400"/>
+              <a:t>各スポットのトピックに対する</a:t>
+            </a:r>
+            <a:r>
+              <a:rPr lang="ja-JP" altLang="en-US" sz="4400"/>
+              <a:t>特徴ベクトルのｃｏｓ類似度を計算</a:t>
+            </a:r>
+            <a:endParaRPr kumimoji="1" lang="ja-JP" altLang="en-US" sz="4400"/>
+          </a:p>
+        </p:txBody>
+      </p:sp>
+      <p:sp>
+        <p:nvSpPr>
+          <p:cNvPr id="85" name="左右矢印 84">
+            <a:extLst>
+              <a:ext uri="{FF2B5EF4-FFF2-40B4-BE49-F238E27FC236}">
+                <a16:creationId xmlns:a16="http://schemas.microsoft.com/office/drawing/2014/main" id="{7F359F01-5473-2C44-916D-32A76B05A527}"/>
+              </a:ext>
+            </a:extLst>
+          </p:cNvPr>
+          <p:cNvSpPr/>
+          <p:nvPr/>
+        </p:nvSpPr>
+        <p:spPr>
+          <a:xfrm rot="3000000">
+            <a:off x="17152946" y="32570680"/>
+            <a:ext cx="3888000" cy="936000"/>
+          </a:xfrm>
+          <a:prstGeom prst="leftRightArrow">
+            <a:avLst/>
+          </a:prstGeom>
+          <a:solidFill>
+            <a:schemeClr val="accent6">
+              <a:lumMod val="75000"/>
+            </a:schemeClr>
+          </a:solidFill>
+          <a:ln>
+            <a:solidFill>
+              <a:schemeClr val="accent6">
+                <a:lumMod val="75000"/>
+              </a:schemeClr>
+            </a:solidFill>
+          </a:ln>
+        </p:spPr>
+        <p:style>
+          <a:lnRef idx="2">
+            <a:schemeClr val="accent1">
+              <a:shade val="50000"/>
+            </a:schemeClr>
+          </a:lnRef>
+          <a:fillRef idx="1">
+            <a:schemeClr val="accent1"/>
+          </a:fillRef>
+          <a:effectRef idx="0">
+            <a:schemeClr val="accent1"/>
+          </a:effectRef>
+          <a:fontRef idx="minor">
+            <a:schemeClr val="lt1"/>
+          </a:fontRef>
+        </p:style>
+        <p:txBody>
+          <a:bodyPr rtlCol="0" anchor="ctr"/>
+          <a:lstStyle/>
+          <a:p>
+            <a:pPr algn="ctr"/>
+            <a:endParaRPr kumimoji="1" lang="ja-JP" altLang="en-US"/>
+          </a:p>
+        </p:txBody>
+      </p:sp>
+      <p:sp>
+        <p:nvSpPr>
+          <p:cNvPr id="89" name="正方形/長方形 88">
+            <a:extLst>
+              <a:ext uri="{FF2B5EF4-FFF2-40B4-BE49-F238E27FC236}">
+                <a16:creationId xmlns:a16="http://schemas.microsoft.com/office/drawing/2014/main" id="{05E941E6-68E0-4A4D-BF24-5142A057DB7E}"/>
+              </a:ext>
+            </a:extLst>
+          </p:cNvPr>
+          <p:cNvSpPr/>
+          <p:nvPr/>
+        </p:nvSpPr>
+        <p:spPr>
+          <a:xfrm>
+            <a:off x="5917446" y="30750046"/>
+            <a:ext cx="10080000" cy="1021127"/>
+          </a:xfrm>
+          <a:prstGeom prst="rect">
+            <a:avLst/>
+          </a:prstGeom>
+          <a:solidFill>
+            <a:srgbClr val="EF0023"/>
+          </a:solidFill>
+          <a:ln w="38100">
+            <a:solidFill>
+              <a:srgbClr val="EF0023"/>
+            </a:solidFill>
+          </a:ln>
+        </p:spPr>
+        <p:style>
+          <a:lnRef idx="2">
+            <a:schemeClr val="accent1">
+              <a:shade val="50000"/>
+            </a:schemeClr>
+          </a:lnRef>
+          <a:fillRef idx="1">
+            <a:schemeClr val="accent1"/>
+          </a:fillRef>
+          <a:effectRef idx="0">
+            <a:schemeClr val="accent1"/>
+          </a:effectRef>
+          <a:fontRef idx="minor">
+            <a:schemeClr val="lt1"/>
+          </a:fontRef>
+        </p:style>
+        <p:txBody>
+          <a:bodyPr rtlCol="0" anchor="ctr"/>
+          <a:lstStyle/>
+          <a:p>
+            <a:pPr algn="ctr"/>
+            <a:r>
+              <a:rPr kumimoji="1" lang="en-US" altLang="ja-JP" sz="4800" b="1" dirty="0"/>
+              <a:t>Web</a:t>
+            </a:r>
+            <a:r>
+              <a:rPr kumimoji="1" lang="ja-JP" altLang="en-US" sz="4800" b="1"/>
+              <a:t>ページ</a:t>
+            </a:r>
+          </a:p>
+        </p:txBody>
+      </p:sp>
+      <p:grpSp>
+        <p:nvGrpSpPr>
+          <p:cNvPr id="92" name="グループ化 91">
+            <a:extLst>
+              <a:ext uri="{FF2B5EF4-FFF2-40B4-BE49-F238E27FC236}">
+                <a16:creationId xmlns:a16="http://schemas.microsoft.com/office/drawing/2014/main" id="{674EFF42-9CC3-434B-B40E-92EDDF65A1FE}"/>
+              </a:ext>
+            </a:extLst>
+          </p:cNvPr>
+          <p:cNvGrpSpPr/>
+          <p:nvPr/>
+        </p:nvGrpSpPr>
+        <p:grpSpPr>
+          <a:xfrm>
+            <a:off x="4938138" y="32148851"/>
+            <a:ext cx="12141807" cy="2800767"/>
+            <a:chOff x="4500514" y="32027928"/>
+            <a:chExt cx="12141807" cy="2800767"/>
+          </a:xfrm>
+        </p:grpSpPr>
+        <p:sp>
+          <p:nvSpPr>
+            <p:cNvPr id="86" name="テキスト ボックス 85">
+              <a:extLst>
+                <a:ext uri="{FF2B5EF4-FFF2-40B4-BE49-F238E27FC236}">
+                  <a16:creationId xmlns:a16="http://schemas.microsoft.com/office/drawing/2014/main" id="{9E365BE7-EED7-EC48-9CA7-4F40D567C3AA}"/>
+                </a:ext>
+              </a:extLst>
+            </p:cNvPr>
+            <p:cNvSpPr txBox="1"/>
+            <p:nvPr/>
+          </p:nvSpPr>
+          <p:spPr>
+            <a:xfrm>
+              <a:off x="4500514" y="32027928"/>
+              <a:ext cx="12141807" cy="2800767"/>
+            </a:xfrm>
+            <a:prstGeom prst="rect">
+              <a:avLst/>
+            </a:prstGeom>
+            <a:noFill/>
+          </p:spPr>
+          <p:txBody>
+            <a:bodyPr wrap="square" rtlCol="0">
+              <a:spAutoFit/>
+            </a:bodyPr>
+            <a:lstStyle/>
+            <a:p>
+              <a:pPr algn="ctr"/>
+              <a:r>
+                <a:rPr kumimoji="1" lang="ja-JP" altLang="en-US" sz="4400"/>
+                <a:t>お気に入りのスポット情報の入力</a:t>
+              </a:r>
+              <a:endParaRPr kumimoji="1" lang="en-US" altLang="ja-JP" sz="4400" dirty="0"/>
+            </a:p>
+            <a:p>
+              <a:pPr algn="ctr"/>
+              <a:endParaRPr lang="en-US" altLang="ja-JP" sz="4400" dirty="0"/>
+            </a:p>
+            <a:p>
+              <a:pPr algn="ctr"/>
+              <a:endParaRPr kumimoji="1" lang="en-US" altLang="ja-JP" sz="4400" dirty="0"/>
+            </a:p>
+            <a:p>
+              <a:pPr algn="ctr"/>
+              <a:r>
+                <a:rPr lang="ja-JP" altLang="en-US" sz="4400"/>
+                <a:t>高好感度な観光地を提案</a:t>
+              </a:r>
+              <a:endParaRPr kumimoji="1" lang="ja-JP" altLang="en-US" sz="4400"/>
+            </a:p>
+          </p:txBody>
+        </p:sp>
+        <p:sp>
+          <p:nvSpPr>
+            <p:cNvPr id="87" name="右矢印 86">
+              <a:extLst>
+                <a:ext uri="{FF2B5EF4-FFF2-40B4-BE49-F238E27FC236}">
+                  <a16:creationId xmlns:a16="http://schemas.microsoft.com/office/drawing/2014/main" id="{5D5C2B09-C164-8246-97ED-223140B8C4E1}"/>
+                </a:ext>
+              </a:extLst>
+            </p:cNvPr>
+            <p:cNvSpPr/>
+            <p:nvPr/>
+          </p:nvSpPr>
+          <p:spPr>
+            <a:xfrm rot="5400000">
+              <a:off x="9972579" y="32867109"/>
+              <a:ext cx="1014154" cy="965694"/>
+            </a:xfrm>
+            <a:prstGeom prst="rightArrow">
+              <a:avLst/>
+            </a:prstGeom>
+            <a:solidFill>
+              <a:schemeClr val="accent6">
+                <a:lumMod val="75000"/>
+              </a:schemeClr>
+            </a:solidFill>
+            <a:ln>
+              <a:solidFill>
+                <a:schemeClr val="accent6">
+                  <a:lumMod val="75000"/>
+                </a:schemeClr>
+              </a:solidFill>
+            </a:ln>
+          </p:spPr>
+          <p:style>
+            <a:lnRef idx="2">
+              <a:schemeClr val="accent1">
+                <a:shade val="50000"/>
+              </a:schemeClr>
+            </a:lnRef>
+            <a:fillRef idx="1">
+              <a:schemeClr val="accent1"/>
+            </a:fillRef>
+            <a:effectRef idx="0">
+              <a:schemeClr val="accent1"/>
+            </a:effectRef>
+            <a:fontRef idx="minor">
+              <a:schemeClr val="lt1"/>
+            </a:fontRef>
+          </p:style>
+          <p:txBody>
+            <a:bodyPr rtlCol="0" anchor="ctr"/>
+            <a:lstStyle/>
+            <a:p>
+              <a:pPr algn="ctr"/>
+              <a:endParaRPr kumimoji="1" lang="ja-JP" altLang="en-US"/>
+            </a:p>
+          </p:txBody>
+        </p:sp>
+      </p:grpSp>
+      <p:sp>
+        <p:nvSpPr>
+          <p:cNvPr id="90" name="正方形/長方形 89">
+            <a:extLst>
+              <a:ext uri="{FF2B5EF4-FFF2-40B4-BE49-F238E27FC236}">
+                <a16:creationId xmlns:a16="http://schemas.microsoft.com/office/drawing/2014/main" id="{1FE92D94-DAD9-D34D-8D0D-D7A80EFCC639}"/>
+              </a:ext>
+            </a:extLst>
+          </p:cNvPr>
+          <p:cNvSpPr/>
+          <p:nvPr/>
+        </p:nvSpPr>
+        <p:spPr>
+          <a:xfrm>
+            <a:off x="5923983" y="31812181"/>
+            <a:ext cx="10080000" cy="3275163"/>
+          </a:xfrm>
+          <a:prstGeom prst="rect">
+            <a:avLst/>
+          </a:prstGeom>
+          <a:noFill/>
+          <a:ln w="38100">
+            <a:solidFill>
+              <a:srgbClr val="EF0023"/>
+            </a:solidFill>
+          </a:ln>
+        </p:spPr>
+        <p:style>
+          <a:lnRef idx="2">
+            <a:schemeClr val="accent1">
+              <a:shade val="50000"/>
+            </a:schemeClr>
+          </a:lnRef>
+          <a:fillRef idx="1">
+            <a:schemeClr val="accent1"/>
+          </a:fillRef>
+          <a:effectRef idx="0">
+            <a:schemeClr val="accent1"/>
+          </a:effectRef>
+          <a:fontRef idx="minor">
+            <a:schemeClr val="lt1"/>
+          </a:fontRef>
+        </p:style>
+        <p:txBody>
+          <a:bodyPr rtlCol="0" anchor="ctr"/>
+          <a:lstStyle/>
+          <a:p>
+            <a:pPr algn="ctr"/>
+            <a:endParaRPr kumimoji="1" lang="ja-JP" altLang="en-US"/>
+          </a:p>
+        </p:txBody>
+      </p:sp>
+      <p:pic>
+        <p:nvPicPr>
+          <p:cNvPr id="95" name="図 94">
+            <a:extLst>
+              <a:ext uri="{FF2B5EF4-FFF2-40B4-BE49-F238E27FC236}">
+                <a16:creationId xmlns:a16="http://schemas.microsoft.com/office/drawing/2014/main" id="{6DCDEB7A-9450-F640-A739-FBA1D1F64EEC}"/>
+              </a:ext>
+            </a:extLst>
+          </p:cNvPr>
+          <p:cNvPicPr>
+            <a:picLocks noChangeAspect="1"/>
+          </p:cNvPicPr>
+          <p:nvPr/>
+        </p:nvPicPr>
+        <p:blipFill>
+          <a:blip r:embed="rId6"/>
+          <a:stretch>
+            <a:fillRect/>
+          </a:stretch>
+        </p:blipFill>
+        <p:spPr>
+          <a:xfrm>
+            <a:off x="16174937" y="22492549"/>
+            <a:ext cx="4244495" cy="2993319"/>
+          </a:xfrm>
+          <a:prstGeom prst="rect">
+            <a:avLst/>
+          </a:prstGeom>
+        </p:spPr>
+      </p:pic>
     </p:spTree>
     <p:extLst>
       <p:ext uri="{BB962C8B-B14F-4D97-AF65-F5344CB8AC3E}">

</xml_diff>

<commit_message>
fix stand out color
</commit_message>
<xml_diff>
--- a/notebooks/interrim_presentattion_poster.pptx
+++ b/notebooks/interrim_presentattion_poster.pptx
@@ -130,7 +130,7 @@
 <file path=ppt/comments/comment1.xml><?xml version="1.0" encoding="utf-8"?>
 <p:cmLst xmlns:a="http://schemas.openxmlformats.org/drawingml/2006/main" xmlns:r="http://schemas.openxmlformats.org/officeDocument/2006/relationships" xmlns:p="http://schemas.openxmlformats.org/presentationml/2006/main">
   <p:cm authorId="1" dt="2018-07-17T17:09:35.276" idx="1">
-    <p:pos x="11197" y="6133"/>
+    <p:pos x="11320" y="6462"/>
     <p:text>コンテンツベース、協調フィルタリングの説明も入れたほうがいい</p:text>
     <p:extLst>
       <p:ext uri="{C676402C-5697-4E1C-873F-D02D1690AC5C}">
@@ -139,7 +139,7 @@
     </p:extLst>
   </p:cm>
   <p:cm authorId="1" dt="2018-07-17T17:44:47.824" idx="3">
-    <p:pos x="13568" y="7381"/>
+    <p:pos x="14720" y="6723"/>
     <p:text>普通の文字の方が良い</p:text>
     <p:extLst>
       <p:ext uri="{C676402C-5697-4E1C-873F-D02D1690AC5C}">
@@ -175,7 +175,7 @@
     </p:extLst>
   </p:cm>
   <p:cm authorId="1" dt="2018-07-17T17:51:08.779" idx="7">
-    <p:pos x="14106" y="20935"/>
+    <p:pos x="11024" y="21050"/>
     <p:text>Webページ関連が見えるようにする</p:text>
     <p:extLst>
       <p:ext uri="{C676402C-5697-4E1C-873F-D02D1690AC5C}">
@@ -4304,12 +4304,12 @@
           <a:prstGeom prst="rect">
             <a:avLst/>
           </a:prstGeom>
-          <a:solidFill>
-            <a:srgbClr val="EF0023"/>
-          </a:solidFill>
+          <a:noFill/>
           <a:ln w="38100">
             <a:solidFill>
-              <a:srgbClr val="EF0023"/>
+              <a:schemeClr val="accent6">
+                <a:lumMod val="75000"/>
+              </a:schemeClr>
             </a:solidFill>
           </a:ln>
         </p:spPr>
@@ -4335,7 +4335,13 @@
           <a:p>
             <a:pPr algn="ctr"/>
             <a:r>
-              <a:rPr kumimoji="1" lang="ja-JP" altLang="en-US" sz="4800" b="1"/>
+              <a:rPr kumimoji="1" lang="ja-JP" altLang="en-US" sz="4800" b="1">
+                <a:solidFill>
+                  <a:schemeClr val="accent6">
+                    <a:lumMod val="75000"/>
+                  </a:schemeClr>
+                </a:solidFill>
+              </a:rPr>
               <a:t>背景</a:t>
             </a:r>
           </a:p>
@@ -4361,12 +4367,12 @@
           <a:prstGeom prst="rect">
             <a:avLst/>
           </a:prstGeom>
-          <a:solidFill>
-            <a:srgbClr val="EF0023"/>
-          </a:solidFill>
+          <a:noFill/>
           <a:ln w="38100">
             <a:solidFill>
-              <a:srgbClr val="EF0023"/>
+              <a:schemeClr val="accent6">
+                <a:lumMod val="75000"/>
+              </a:schemeClr>
             </a:solidFill>
           </a:ln>
         </p:spPr>
@@ -4392,11 +4398,23 @@
           <a:p>
             <a:pPr algn="ctr"/>
             <a:r>
-              <a:rPr lang="ja-JP" altLang="en-US" sz="4800" b="1"/>
+              <a:rPr lang="ja-JP" altLang="en-US" sz="4800" b="1">
+                <a:solidFill>
+                  <a:schemeClr val="accent6">
+                    <a:lumMod val="75000"/>
+                  </a:schemeClr>
+                </a:solidFill>
+              </a:rPr>
               <a:t>レ</a:t>
             </a:r>
             <a:r>
-              <a:rPr kumimoji="1" lang="ja-JP" altLang="en-US" sz="4800" b="1"/>
+              <a:rPr kumimoji="1" lang="ja-JP" altLang="en-US" sz="4800" b="1">
+                <a:solidFill>
+                  <a:schemeClr val="accent6">
+                    <a:lumMod val="75000"/>
+                  </a:schemeClr>
+                </a:solidFill>
+              </a:rPr>
               <a:t>コメンドの現状</a:t>
             </a:r>
           </a:p>
@@ -4422,12 +4440,12 @@
           <a:prstGeom prst="rect">
             <a:avLst/>
           </a:prstGeom>
-          <a:solidFill>
-            <a:srgbClr val="EF0023"/>
-          </a:solidFill>
+          <a:noFill/>
           <a:ln w="38100">
             <a:solidFill>
-              <a:srgbClr val="EF0023"/>
+              <a:schemeClr val="accent6">
+                <a:lumMod val="75000"/>
+              </a:schemeClr>
             </a:solidFill>
           </a:ln>
         </p:spPr>
@@ -4453,10 +4471,22 @@
           <a:p>
             <a:pPr algn="ctr"/>
             <a:r>
-              <a:rPr lang="ja-JP" altLang="en-US" sz="4800" b="1"/>
+              <a:rPr lang="ja-JP" altLang="en-US" sz="4800" b="1">
+                <a:solidFill>
+                  <a:schemeClr val="accent6">
+                    <a:lumMod val="75000"/>
+                  </a:schemeClr>
+                </a:solidFill>
+              </a:rPr>
               <a:t>レビューを利用したレコメンド</a:t>
             </a:r>
-            <a:endParaRPr kumimoji="1" lang="ja-JP" altLang="en-US" sz="4800" b="1"/>
+            <a:endParaRPr kumimoji="1" lang="ja-JP" altLang="en-US" sz="4800" b="1">
+              <a:solidFill>
+                <a:schemeClr val="accent6">
+                  <a:lumMod val="75000"/>
+                </a:schemeClr>
+              </a:solidFill>
+            </a:endParaRPr>
           </a:p>
         </p:txBody>
       </p:sp>
@@ -4483,7 +4513,9 @@
           <a:noFill/>
           <a:ln w="38100">
             <a:solidFill>
-              <a:srgbClr val="EF0023"/>
+              <a:schemeClr val="accent6">
+                <a:lumMod val="75000"/>
+              </a:schemeClr>
             </a:solidFill>
           </a:ln>
         </p:spPr>
@@ -4535,7 +4567,9 @@
           <a:noFill/>
           <a:ln w="38100">
             <a:solidFill>
-              <a:srgbClr val="EF0023"/>
+              <a:schemeClr val="accent6">
+                <a:lumMod val="75000"/>
+              </a:schemeClr>
             </a:solidFill>
           </a:ln>
         </p:spPr>
@@ -4578,7 +4612,7 @@
         </p:nvSpPr>
         <p:spPr>
           <a:xfrm>
-            <a:off x="19927686" y="11063155"/>
+            <a:off x="19927686" y="11082749"/>
             <a:ext cx="8748000" cy="4332787"/>
           </a:xfrm>
           <a:prstGeom prst="rect">
@@ -4587,7 +4621,9 @@
           <a:noFill/>
           <a:ln w="38100">
             <a:solidFill>
-              <a:srgbClr val="EF0023"/>
+              <a:schemeClr val="accent6">
+                <a:lumMod val="75000"/>
+              </a:schemeClr>
             </a:solidFill>
           </a:ln>
         </p:spPr>
@@ -4630,8 +4666,8 @@
         </p:nvSpPr>
         <p:spPr>
           <a:xfrm>
-            <a:off x="1981198" y="13193978"/>
-            <a:ext cx="7952153" cy="2123658"/>
+            <a:off x="2046512" y="11365812"/>
+            <a:ext cx="7952153" cy="3785652"/>
           </a:xfrm>
           <a:prstGeom prst="rect">
             <a:avLst/>
@@ -4644,44 +4680,24 @@
           </a:bodyPr>
           <a:lstStyle/>
           <a:p>
-            <a:r>
-              <a:rPr kumimoji="1" lang="ja-JP" altLang="en-US" sz="4400"/>
+            <a:pPr marL="571500" indent="-571500">
+              <a:buFont typeface="Arial" panose="020B0604020202020204" pitchFamily="34" charset="0"/>
+              <a:buChar char="•"/>
+            </a:pPr>
+            <a:r>
+              <a:rPr lang="ja-JP" altLang="en-US" sz="4800"/>
+              <a:t>地方の魅力を適切に伝えるのは困難</a:t>
+            </a:r>
+            <a:endParaRPr kumimoji="1" lang="en-US" altLang="ja-JP" sz="4800" dirty="0"/>
+          </a:p>
+          <a:p>
+            <a:pPr marL="571500" indent="-571500">
+              <a:buFont typeface="Arial" panose="020B0604020202020204" pitchFamily="34" charset="0"/>
+              <a:buChar char="•"/>
+            </a:pPr>
+            <a:r>
+              <a:rPr kumimoji="1" lang="ja-JP" altLang="en-US" sz="4800"/>
               <a:t>訪日客のほとんどが黄金ルートと呼ばれる東京・大阪・京都に宿泊</a:t>
-            </a:r>
-          </a:p>
-        </p:txBody>
-      </p:sp>
-      <p:sp>
-        <p:nvSpPr>
-          <p:cNvPr id="19" name="テキスト ボックス 18">
-            <a:extLst>
-              <a:ext uri="{FF2B5EF4-FFF2-40B4-BE49-F238E27FC236}">
-                <a16:creationId xmlns:a16="http://schemas.microsoft.com/office/drawing/2014/main" id="{17EE6499-A060-934E-AAD1-175AC89C8D94}"/>
-              </a:ext>
-            </a:extLst>
-          </p:cNvPr>
-          <p:cNvSpPr txBox="1"/>
-          <p:nvPr/>
-        </p:nvSpPr>
-        <p:spPr>
-          <a:xfrm>
-            <a:off x="1981199" y="11291066"/>
-            <a:ext cx="7952153" cy="1446550"/>
-          </a:xfrm>
-          <a:prstGeom prst="rect">
-            <a:avLst/>
-          </a:prstGeom>
-          <a:noFill/>
-        </p:spPr>
-        <p:txBody>
-          <a:bodyPr wrap="square" rtlCol="0">
-            <a:spAutoFit/>
-          </a:bodyPr>
-          <a:lstStyle/>
-          <a:p>
-            <a:r>
-              <a:rPr kumimoji="1" lang="ja-JP" altLang="en-US" sz="4400"/>
-              <a:t>地方の魅力を適切に伝えるのは困難</a:t>
             </a:r>
           </a:p>
         </p:txBody>
@@ -4911,8 +4927,8 @@
         </p:nvSpPr>
         <p:spPr>
           <a:xfrm>
-            <a:off x="20075092" y="11710254"/>
-            <a:ext cx="3927908" cy="3046988"/>
+            <a:off x="20013359" y="12166557"/>
+            <a:ext cx="3927908" cy="2308324"/>
           </a:xfrm>
           <a:prstGeom prst="rect">
             <a:avLst/>
@@ -4934,10 +4950,10 @@
           </a:p>
           <a:p>
             <a:pPr algn="ctr"/>
-            <a:endParaRPr lang="en-US" altLang="ja-JP" sz="4800" dirty="0"/>
-          </a:p>
-          <a:p>
-            <a:pPr algn="ctr"/>
+            <a:r>
+              <a:rPr lang="ja-JP" altLang="en-US" sz="4800"/>
+              <a:t>＋</a:t>
+            </a:r>
             <a:endParaRPr lang="en-US" altLang="ja-JP" sz="4800" dirty="0"/>
           </a:p>
           <a:p>
@@ -4951,10 +4967,10 @@
       </p:sp>
       <p:sp>
         <p:nvSpPr>
-          <p:cNvPr id="26" name="加算記号 25">
+          <p:cNvPr id="27" name="右矢印 26">
             <a:extLst>
               <a:ext uri="{FF2B5EF4-FFF2-40B4-BE49-F238E27FC236}">
-                <a16:creationId xmlns:a16="http://schemas.microsoft.com/office/drawing/2014/main" id="{06541863-BCE3-334D-B6C7-29EAA2E3698E}"/>
+                <a16:creationId xmlns:a16="http://schemas.microsoft.com/office/drawing/2014/main" id="{C1A68AFA-E2AB-5F4B-AA1A-44D3198B2DF9}"/>
               </a:ext>
             </a:extLst>
           </p:cNvPr>
@@ -4963,10 +4979,10 @@
         </p:nvSpPr>
         <p:spPr>
           <a:xfrm>
-            <a:off x="21375966" y="12566414"/>
-            <a:ext cx="1337867" cy="1199379"/>
-          </a:xfrm>
-          <a:prstGeom prst="mathPlus">
+            <a:off x="23611291" y="12805511"/>
+            <a:ext cx="1150224" cy="810865"/>
+          </a:xfrm>
+          <a:prstGeom prst="rightArrow">
             <a:avLst/>
           </a:prstGeom>
           <a:solidFill>
@@ -5003,40 +5019,81 @@
           <a:lstStyle/>
           <a:p>
             <a:pPr algn="ctr"/>
-            <a:endParaRPr kumimoji="1" lang="ja-JP" altLang="en-US">
-              <a:solidFill>
-                <a:srgbClr val="FF0000"/>
-              </a:solidFill>
-            </a:endParaRPr>
-          </a:p>
-        </p:txBody>
-      </p:sp>
-      <p:sp>
-        <p:nvSpPr>
-          <p:cNvPr id="27" name="右矢印 26">
+            <a:endParaRPr kumimoji="1" lang="ja-JP" altLang="en-US"/>
+          </a:p>
+        </p:txBody>
+      </p:sp>
+      <p:sp>
+        <p:nvSpPr>
+          <p:cNvPr id="28" name="テキスト ボックス 27">
             <a:extLst>
               <a:ext uri="{FF2B5EF4-FFF2-40B4-BE49-F238E27FC236}">
-                <a16:creationId xmlns:a16="http://schemas.microsoft.com/office/drawing/2014/main" id="{C1A68AFA-E2AB-5F4B-AA1A-44D3198B2DF9}"/>
+                <a16:creationId xmlns:a16="http://schemas.microsoft.com/office/drawing/2014/main" id="{CB096CCA-D997-1742-A18B-33591CE5EE80}"/>
               </a:ext>
             </a:extLst>
           </p:cNvPr>
-          <p:cNvSpPr/>
+          <p:cNvSpPr txBox="1"/>
           <p:nvPr/>
         </p:nvSpPr>
         <p:spPr>
           <a:xfrm>
-            <a:off x="23611291" y="12805511"/>
-            <a:ext cx="1150224" cy="810865"/>
-          </a:xfrm>
-          <a:prstGeom prst="rightArrow">
+            <a:off x="24828268" y="12508143"/>
+            <a:ext cx="3877985" cy="1569660"/>
+          </a:xfrm>
+          <a:prstGeom prst="rect">
             <a:avLst/>
           </a:prstGeom>
-          <a:solidFill>
-            <a:srgbClr val="EF0023"/>
-          </a:solidFill>
-          <a:ln>
+          <a:noFill/>
+        </p:spPr>
+        <p:txBody>
+          <a:bodyPr wrap="none" rtlCol="0">
+            <a:spAutoFit/>
+          </a:bodyPr>
+          <a:lstStyle/>
+          <a:p>
+            <a:r>
+              <a:rPr kumimoji="1" lang="ja-JP" altLang="en-US" sz="4800"/>
+              <a:t>多様性のある</a:t>
+            </a:r>
+            <a:endParaRPr kumimoji="1" lang="en-US" altLang="ja-JP" sz="4800" dirty="0"/>
+          </a:p>
+          <a:p>
+            <a:pPr algn="ctr"/>
+            <a:r>
+              <a:rPr kumimoji="1" lang="ja-JP" altLang="en-US" sz="4800"/>
+              <a:t>レコメンド</a:t>
+            </a:r>
+          </a:p>
+        </p:txBody>
+      </p:sp>
+      <p:sp>
+        <p:nvSpPr>
+          <p:cNvPr id="30" name="正方形/長方形 29">
+            <a:extLst>
+              <a:ext uri="{FF2B5EF4-FFF2-40B4-BE49-F238E27FC236}">
+                <a16:creationId xmlns:a16="http://schemas.microsoft.com/office/drawing/2014/main" id="{2775E092-8D0F-0C46-B3D0-4C6AA7AC6713}"/>
+              </a:ext>
+            </a:extLst>
+          </p:cNvPr>
+          <p:cNvSpPr>
+            <a:spLocks/>
+          </p:cNvSpPr>
+          <p:nvPr/>
+        </p:nvSpPr>
+        <p:spPr>
+          <a:xfrm>
+            <a:off x="1296672" y="18606437"/>
+            <a:ext cx="27643017" cy="16649227"/>
+          </a:xfrm>
+          <a:prstGeom prst="rect">
+            <a:avLst/>
+          </a:prstGeom>
+          <a:noFill/>
+          <a:ln w="44450">
             <a:solidFill>
-              <a:srgbClr val="EF0023"/>
+              <a:schemeClr val="accent6">
+                <a:lumMod val="75000"/>
+              </a:schemeClr>
             </a:solidFill>
           </a:ln>
         </p:spPr>
@@ -5061,76 +5118,37 @@
           <a:lstStyle/>
           <a:p>
             <a:pPr algn="ctr"/>
-            <a:endParaRPr kumimoji="1" lang="ja-JP" altLang="en-US"/>
-          </a:p>
-        </p:txBody>
-      </p:sp>
-      <p:sp>
-        <p:nvSpPr>
-          <p:cNvPr id="28" name="テキスト ボックス 27">
+            <a:endParaRPr kumimoji="1" lang="ja-JP" altLang="en-US" sz="11500" b="1"/>
+          </a:p>
+        </p:txBody>
+      </p:sp>
+      <p:sp>
+        <p:nvSpPr>
+          <p:cNvPr id="31" name="正方形/長方形 30">
             <a:extLst>
               <a:ext uri="{FF2B5EF4-FFF2-40B4-BE49-F238E27FC236}">
-                <a16:creationId xmlns:a16="http://schemas.microsoft.com/office/drawing/2014/main" id="{CB096CCA-D997-1742-A18B-33591CE5EE80}"/>
+                <a16:creationId xmlns:a16="http://schemas.microsoft.com/office/drawing/2014/main" id="{79F19AF1-3B1F-A94B-91F8-5661E0DF196B}"/>
               </a:ext>
             </a:extLst>
           </p:cNvPr>
-          <p:cNvSpPr txBox="1"/>
+          <p:cNvSpPr>
+            <a:spLocks/>
+          </p:cNvSpPr>
           <p:nvPr/>
         </p:nvSpPr>
         <p:spPr>
           <a:xfrm>
-            <a:off x="24958896" y="12442829"/>
-            <a:ext cx="3570208" cy="1446550"/>
+            <a:off x="1311028" y="17198378"/>
+            <a:ext cx="27643015" cy="1398979"/>
           </a:xfrm>
           <a:prstGeom prst="rect">
             <a:avLst/>
           </a:prstGeom>
-          <a:noFill/>
-        </p:spPr>
-        <p:txBody>
-          <a:bodyPr wrap="none" rtlCol="0">
-            <a:spAutoFit/>
-          </a:bodyPr>
-          <a:lstStyle/>
-          <a:p>
-            <a:r>
-              <a:rPr kumimoji="1" lang="ja-JP" altLang="en-US" sz="4400"/>
-              <a:t>多様性のある</a:t>
-            </a:r>
-            <a:endParaRPr kumimoji="1" lang="en-US" altLang="ja-JP" sz="4400" dirty="0"/>
-          </a:p>
-          <a:p>
-            <a:pPr algn="ctr"/>
-            <a:r>
-              <a:rPr kumimoji="1" lang="ja-JP" altLang="en-US" sz="4400"/>
-              <a:t>レコメンド</a:t>
-            </a:r>
-          </a:p>
-        </p:txBody>
-      </p:sp>
-      <p:sp>
-        <p:nvSpPr>
-          <p:cNvPr id="30" name="正方形/長方形 29">
-            <a:extLst>
-              <a:ext uri="{FF2B5EF4-FFF2-40B4-BE49-F238E27FC236}">
-                <a16:creationId xmlns:a16="http://schemas.microsoft.com/office/drawing/2014/main" id="{2775E092-8D0F-0C46-B3D0-4C6AA7AC6713}"/>
-              </a:ext>
-            </a:extLst>
-          </p:cNvPr>
-          <p:cNvSpPr>
-            <a:spLocks/>
-          </p:cNvSpPr>
-          <p:nvPr/>
-        </p:nvSpPr>
-        <p:spPr>
-          <a:xfrm>
-            <a:off x="1296672" y="18606437"/>
-            <a:ext cx="27643017" cy="16649227"/>
-          </a:xfrm>
-          <a:prstGeom prst="rect">
-            <a:avLst/>
-          </a:prstGeom>
-          <a:noFill/>
+          <a:solidFill>
+            <a:schemeClr val="accent6">
+              <a:lumMod val="75000"/>
+            </a:schemeClr>
+          </a:solidFill>
           <a:ln w="44450">
             <a:solidFill>
               <a:schemeClr val="accent6">
@@ -5159,17 +5177,24 @@
           <a:bodyPr rtlCol="0" anchor="ctr"/>
           <a:lstStyle/>
           <a:p>
-            <a:pPr algn="ctr"/>
-            <a:endParaRPr kumimoji="1" lang="ja-JP" altLang="en-US" sz="11500" b="1"/>
-          </a:p>
-        </p:txBody>
-      </p:sp>
-      <p:sp>
-        <p:nvSpPr>
-          <p:cNvPr id="31" name="正方形/長方形 30">
+            <a:r>
+              <a:rPr kumimoji="1" lang="en-US" altLang="ja-JP" sz="7200" b="1" dirty="0"/>
+              <a:t>  </a:t>
+            </a:r>
+            <a:r>
+              <a:rPr lang="ja-JP" altLang="en-US" sz="7200" b="1"/>
+              <a:t>システム概要</a:t>
+            </a:r>
+            <a:endParaRPr kumimoji="1" lang="ja-JP" altLang="en-US" sz="7200" b="1"/>
+          </a:p>
+        </p:txBody>
+      </p:sp>
+      <p:sp>
+        <p:nvSpPr>
+          <p:cNvPr id="33" name="正方形/長方形 32">
             <a:extLst>
               <a:ext uri="{FF2B5EF4-FFF2-40B4-BE49-F238E27FC236}">
-                <a16:creationId xmlns:a16="http://schemas.microsoft.com/office/drawing/2014/main" id="{79F19AF1-3B1F-A94B-91F8-5661E0DF196B}"/>
+                <a16:creationId xmlns:a16="http://schemas.microsoft.com/office/drawing/2014/main" id="{F571C9C4-CE23-814C-A3D2-8F9A7B3F68DB}"/>
               </a:ext>
             </a:extLst>
           </p:cNvPr>
@@ -5180,7 +5205,7 @@
         </p:nvSpPr>
         <p:spPr>
           <a:xfrm>
-            <a:off x="1311028" y="17198378"/>
+            <a:off x="1293387" y="35701423"/>
             <a:ext cx="27643015" cy="1398979"/>
           </a:xfrm>
           <a:prstGeom prst="rect">
@@ -5224,19 +5249,18 @@
               <a:t>  </a:t>
             </a:r>
             <a:r>
-              <a:rPr lang="ja-JP" altLang="en-US" sz="7200" b="1"/>
-              <a:t>システム概要</a:t>
-            </a:r>
-            <a:endParaRPr kumimoji="1" lang="ja-JP" altLang="en-US" sz="7200" b="1"/>
-          </a:p>
-        </p:txBody>
-      </p:sp>
-      <p:sp>
-        <p:nvSpPr>
-          <p:cNvPr id="33" name="正方形/長方形 32">
+              <a:rPr kumimoji="1" lang="ja-JP" altLang="en-US" sz="7200" b="1"/>
+              <a:t>今後の予定</a:t>
+            </a:r>
+          </a:p>
+        </p:txBody>
+      </p:sp>
+      <p:sp>
+        <p:nvSpPr>
+          <p:cNvPr id="34" name="正方形/長方形 33">
             <a:extLst>
               <a:ext uri="{FF2B5EF4-FFF2-40B4-BE49-F238E27FC236}">
-                <a16:creationId xmlns:a16="http://schemas.microsoft.com/office/drawing/2014/main" id="{F571C9C4-CE23-814C-A3D2-8F9A7B3F68DB}"/>
+                <a16:creationId xmlns:a16="http://schemas.microsoft.com/office/drawing/2014/main" id="{249E1FBF-DBB1-CA43-949C-4DEF9BC998F4}"/>
               </a:ext>
             </a:extLst>
           </p:cNvPr>
@@ -5247,17 +5271,13 @@
         </p:nvSpPr>
         <p:spPr>
           <a:xfrm>
-            <a:off x="1293387" y="35655703"/>
-            <a:ext cx="27643015" cy="1398979"/>
+            <a:off x="1293385" y="37140875"/>
+            <a:ext cx="27643017" cy="3496257"/>
           </a:xfrm>
           <a:prstGeom prst="rect">
             <a:avLst/>
           </a:prstGeom>
-          <a:solidFill>
-            <a:schemeClr val="accent6">
-              <a:lumMod val="75000"/>
-            </a:schemeClr>
-          </a:solidFill>
+          <a:noFill/>
           <a:ln w="44450">
             <a:solidFill>
               <a:schemeClr val="accent6">
@@ -5286,68 +5306,6 @@
           <a:bodyPr rtlCol="0" anchor="ctr"/>
           <a:lstStyle/>
           <a:p>
-            <a:r>
-              <a:rPr kumimoji="1" lang="en-US" altLang="ja-JP" sz="7200" b="1" dirty="0"/>
-              <a:t>  </a:t>
-            </a:r>
-            <a:r>
-              <a:rPr kumimoji="1" lang="ja-JP" altLang="en-US" sz="7200" b="1"/>
-              <a:t>今後の予定</a:t>
-            </a:r>
-          </a:p>
-        </p:txBody>
-      </p:sp>
-      <p:sp>
-        <p:nvSpPr>
-          <p:cNvPr id="34" name="正方形/長方形 33">
-            <a:extLst>
-              <a:ext uri="{FF2B5EF4-FFF2-40B4-BE49-F238E27FC236}">
-                <a16:creationId xmlns:a16="http://schemas.microsoft.com/office/drawing/2014/main" id="{249E1FBF-DBB1-CA43-949C-4DEF9BC998F4}"/>
-              </a:ext>
-            </a:extLst>
-          </p:cNvPr>
-          <p:cNvSpPr>
-            <a:spLocks/>
-          </p:cNvSpPr>
-          <p:nvPr/>
-        </p:nvSpPr>
-        <p:spPr>
-          <a:xfrm>
-            <a:off x="1293385" y="37095155"/>
-            <a:ext cx="27643017" cy="3496257"/>
-          </a:xfrm>
-          <a:prstGeom prst="rect">
-            <a:avLst/>
-          </a:prstGeom>
-          <a:noFill/>
-          <a:ln w="44450">
-            <a:solidFill>
-              <a:schemeClr val="accent6">
-                <a:lumMod val="75000"/>
-              </a:schemeClr>
-            </a:solidFill>
-          </a:ln>
-        </p:spPr>
-        <p:style>
-          <a:lnRef idx="2">
-            <a:schemeClr val="accent1">
-              <a:shade val="50000"/>
-            </a:schemeClr>
-          </a:lnRef>
-          <a:fillRef idx="1">
-            <a:schemeClr val="accent1"/>
-          </a:fillRef>
-          <a:effectRef idx="0">
-            <a:schemeClr val="accent1"/>
-          </a:effectRef>
-          <a:fontRef idx="minor">
-            <a:schemeClr val="lt1"/>
-          </a:fontRef>
-        </p:style>
-        <p:txBody>
-          <a:bodyPr rtlCol="0" anchor="ctr"/>
-          <a:lstStyle/>
-          <a:p>
             <a:pPr algn="ctr"/>
             <a:endParaRPr kumimoji="1" lang="ja-JP" altLang="en-US" sz="11500" b="1"/>
           </a:p>
@@ -5367,7 +5325,7 @@
         </p:nvSpPr>
         <p:spPr>
           <a:xfrm>
-            <a:off x="1990397" y="37483590"/>
+            <a:off x="1990397" y="37529310"/>
             <a:ext cx="16978519" cy="3046988"/>
           </a:xfrm>
           <a:prstGeom prst="rect">
@@ -6008,12 +5966,12 @@
           <a:prstGeom prst="rect">
             <a:avLst/>
           </a:prstGeom>
-          <a:solidFill>
-            <a:srgbClr val="EF0023"/>
-          </a:solidFill>
+          <a:noFill/>
           <a:ln w="38100">
             <a:solidFill>
-              <a:srgbClr val="EF0023"/>
+              <a:schemeClr val="accent6">
+                <a:lumMod val="75000"/>
+              </a:schemeClr>
             </a:solidFill>
           </a:ln>
         </p:spPr>
@@ -6039,14 +5997,32 @@
           <a:p>
             <a:pPr algn="ctr"/>
             <a:r>
-              <a:rPr lang="en-US" altLang="ja-JP" sz="4800" b="1" dirty="0"/>
+              <a:rPr lang="en-US" altLang="ja-JP" sz="4800" b="1" dirty="0">
+                <a:solidFill>
+                  <a:schemeClr val="accent6">
+                    <a:lumMod val="75000"/>
+                  </a:schemeClr>
+                </a:solidFill>
+              </a:rPr>
               <a:t>①</a:t>
             </a:r>
             <a:r>
-              <a:rPr lang="ja-JP" altLang="en-US" sz="4800" b="1"/>
+              <a:rPr lang="ja-JP" altLang="en-US" sz="4800" b="1">
+                <a:solidFill>
+                  <a:schemeClr val="accent6">
+                    <a:lumMod val="75000"/>
+                  </a:schemeClr>
+                </a:solidFill>
+              </a:rPr>
               <a:t>前処理</a:t>
             </a:r>
-            <a:endParaRPr kumimoji="1" lang="ja-JP" altLang="en-US" sz="4800" b="1"/>
+            <a:endParaRPr kumimoji="1" lang="ja-JP" altLang="en-US" sz="4800" b="1">
+              <a:solidFill>
+                <a:schemeClr val="accent6">
+                  <a:lumMod val="75000"/>
+                </a:schemeClr>
+              </a:solidFill>
+            </a:endParaRPr>
           </a:p>
         </p:txBody>
       </p:sp>
@@ -6064,7 +6040,7 @@
         </p:nvSpPr>
         <p:spPr>
           <a:xfrm>
-            <a:off x="2657725" y="21578122"/>
+            <a:off x="2657725" y="21532402"/>
             <a:ext cx="6279820" cy="4928918"/>
           </a:xfrm>
           <a:prstGeom prst="rect">
@@ -6073,7 +6049,9 @@
           <a:noFill/>
           <a:ln w="38100">
             <a:solidFill>
-              <a:srgbClr val="EF0023"/>
+              <a:schemeClr val="accent6">
+                <a:lumMod val="75000"/>
+              </a:schemeClr>
             </a:solidFill>
           </a:ln>
         </p:spPr>
@@ -6122,12 +6100,12 @@
           <a:prstGeom prst="rect">
             <a:avLst/>
           </a:prstGeom>
-          <a:solidFill>
-            <a:srgbClr val="EF0023"/>
-          </a:solidFill>
+          <a:noFill/>
           <a:ln w="38100">
             <a:solidFill>
-              <a:srgbClr val="EF0023"/>
+              <a:schemeClr val="accent6">
+                <a:lumMod val="75000"/>
+              </a:schemeClr>
             </a:solidFill>
           </a:ln>
         </p:spPr>
@@ -6153,11 +6131,23 @@
           <a:p>
             <a:pPr algn="ctr"/>
             <a:r>
-              <a:rPr kumimoji="1" lang="en-US" altLang="ja-JP" sz="4800" b="1" dirty="0"/>
+              <a:rPr kumimoji="1" lang="en-US" altLang="ja-JP" sz="4800" b="1" dirty="0">
+                <a:solidFill>
+                  <a:schemeClr val="accent6">
+                    <a:lumMod val="75000"/>
+                  </a:schemeClr>
+                </a:solidFill>
+              </a:rPr>
               <a:t>②</a:t>
             </a:r>
             <a:r>
-              <a:rPr kumimoji="1" lang="ja-JP" altLang="en-US" sz="4800" b="1"/>
+              <a:rPr kumimoji="1" lang="ja-JP" altLang="en-US" sz="4800" b="1">
+                <a:solidFill>
+                  <a:schemeClr val="accent6">
+                    <a:lumMod val="75000"/>
+                  </a:schemeClr>
+                </a:solidFill>
+              </a:rPr>
               <a:t>トピックモデルの構築</a:t>
             </a:r>
           </a:p>
@@ -6186,7 +6176,9 @@
           <a:noFill/>
           <a:ln w="38100">
             <a:solidFill>
-              <a:srgbClr val="EF0023"/>
+              <a:schemeClr val="accent6">
+                <a:lumMod val="75000"/>
+              </a:schemeClr>
             </a:solidFill>
           </a:ln>
         </p:spPr>
@@ -6513,12 +6505,12 @@
           <a:prstGeom prst="rect">
             <a:avLst/>
           </a:prstGeom>
-          <a:solidFill>
-            <a:srgbClr val="EF0023"/>
-          </a:solidFill>
+          <a:noFill/>
           <a:ln w="38100">
             <a:solidFill>
-              <a:srgbClr val="EF0023"/>
+              <a:schemeClr val="accent6">
+                <a:lumMod val="75000"/>
+              </a:schemeClr>
             </a:solidFill>
           </a:ln>
         </p:spPr>
@@ -6544,7 +6536,13 @@
           <a:p>
             <a:pPr algn="ctr"/>
             <a:r>
-              <a:rPr kumimoji="1" lang="ja-JP" altLang="en-US" sz="4800" b="1"/>
+              <a:rPr kumimoji="1" lang="ja-JP" altLang="en-US" sz="4800" b="1">
+                <a:solidFill>
+                  <a:schemeClr val="accent6">
+                    <a:lumMod val="75000"/>
+                  </a:schemeClr>
+                </a:solidFill>
+              </a:rPr>
               <a:t>③類似度算出</a:t>
             </a:r>
           </a:p>
@@ -6564,7 +6562,7 @@
         </p:nvSpPr>
         <p:spPr>
           <a:xfrm>
-            <a:off x="21689927" y="21489276"/>
+            <a:off x="21689927" y="21534996"/>
             <a:ext cx="6279820" cy="5015334"/>
           </a:xfrm>
           <a:prstGeom prst="rect">
@@ -6573,7 +6571,9 @@
           <a:noFill/>
           <a:ln w="38100">
             <a:solidFill>
-              <a:srgbClr val="EF0023"/>
+              <a:schemeClr val="accent6">
+                <a:lumMod val="75000"/>
+              </a:schemeClr>
             </a:solidFill>
           </a:ln>
         </p:spPr>

</xml_diff>

<commit_message>
wip fix for interrim presentation rehearsal
</commit_message>
<xml_diff>
--- a/notebooks/interrim_presentattion_poster.pptx
+++ b/notebooks/interrim_presentattion_poster.pptx
@@ -175,7 +175,7 @@
     </p:extLst>
   </p:cm>
   <p:cm authorId="1" dt="2018-07-17T17:51:08.779" idx="7">
-    <p:pos x="11024" y="21050"/>
+    <p:pos x="7374" y="21398"/>
     <p:text>Webページ関連が見えるようにする</p:text>
     <p:extLst>
       <p:ext uri="{C676402C-5697-4E1C-873F-D02D1690AC5C}">
@@ -4017,32 +4017,280 @@
       </p:grpSpPr>
       <p:sp>
         <p:nvSpPr>
-          <p:cNvPr id="2" name="正方形/長方形 1">
+          <p:cNvPr id="98" name="四角形吹き出し 97">
             <a:extLst>
               <a:ext uri="{FF2B5EF4-FFF2-40B4-BE49-F238E27FC236}">
-                <a16:creationId xmlns:a16="http://schemas.microsoft.com/office/drawing/2014/main" id="{914A04A2-7EB3-0D4F-9417-8FF6D8826C27}"/>
+                <a16:creationId xmlns:a16="http://schemas.microsoft.com/office/drawing/2014/main" id="{294EF5BC-8CDC-2142-8108-9B4BFCF08ECD}"/>
               </a:ext>
             </a:extLst>
           </p:cNvPr>
-          <p:cNvSpPr>
-            <a:spLocks/>
-          </p:cNvSpPr>
+          <p:cNvSpPr/>
           <p:nvPr/>
         </p:nvSpPr>
         <p:spPr>
           <a:xfrm>
-            <a:off x="1316099" y="2958891"/>
-            <a:ext cx="27643015" cy="3821118"/>
-          </a:xfrm>
-          <a:prstGeom prst="rect">
+            <a:off x="18753083" y="32941090"/>
+            <a:ext cx="9770203" cy="3265234"/>
+          </a:xfrm>
+          <a:custGeom>
             <a:avLst/>
-          </a:prstGeom>
+            <a:gdLst>
+              <a:gd name="connsiteX0" fmla="*/ 0 w 9765539"/>
+              <a:gd name="connsiteY0" fmla="*/ 0 h 2843313"/>
+              <a:gd name="connsiteX1" fmla="*/ 1627590 w 9765539"/>
+              <a:gd name="connsiteY1" fmla="*/ 0 h 2843313"/>
+              <a:gd name="connsiteX2" fmla="*/ 3686491 w 9765539"/>
+              <a:gd name="connsiteY2" fmla="*/ -496044 h 2843313"/>
+              <a:gd name="connsiteX3" fmla="*/ 4068975 w 9765539"/>
+              <a:gd name="connsiteY3" fmla="*/ 0 h 2843313"/>
+              <a:gd name="connsiteX4" fmla="*/ 9765539 w 9765539"/>
+              <a:gd name="connsiteY4" fmla="*/ 0 h 2843313"/>
+              <a:gd name="connsiteX5" fmla="*/ 9765539 w 9765539"/>
+              <a:gd name="connsiteY5" fmla="*/ 473886 h 2843313"/>
+              <a:gd name="connsiteX6" fmla="*/ 9765539 w 9765539"/>
+              <a:gd name="connsiteY6" fmla="*/ 473886 h 2843313"/>
+              <a:gd name="connsiteX7" fmla="*/ 9765539 w 9765539"/>
+              <a:gd name="connsiteY7" fmla="*/ 1184714 h 2843313"/>
+              <a:gd name="connsiteX8" fmla="*/ 9765539 w 9765539"/>
+              <a:gd name="connsiteY8" fmla="*/ 2843313 h 2843313"/>
+              <a:gd name="connsiteX9" fmla="*/ 4068975 w 9765539"/>
+              <a:gd name="connsiteY9" fmla="*/ 2843313 h 2843313"/>
+              <a:gd name="connsiteX10" fmla="*/ 1627590 w 9765539"/>
+              <a:gd name="connsiteY10" fmla="*/ 2843313 h 2843313"/>
+              <a:gd name="connsiteX11" fmla="*/ 1627590 w 9765539"/>
+              <a:gd name="connsiteY11" fmla="*/ 2843313 h 2843313"/>
+              <a:gd name="connsiteX12" fmla="*/ 0 w 9765539"/>
+              <a:gd name="connsiteY12" fmla="*/ 2843313 h 2843313"/>
+              <a:gd name="connsiteX13" fmla="*/ 0 w 9765539"/>
+              <a:gd name="connsiteY13" fmla="*/ 1184714 h 2843313"/>
+              <a:gd name="connsiteX14" fmla="*/ 0 w 9765539"/>
+              <a:gd name="connsiteY14" fmla="*/ 473886 h 2843313"/>
+              <a:gd name="connsiteX15" fmla="*/ 0 w 9765539"/>
+              <a:gd name="connsiteY15" fmla="*/ 473886 h 2843313"/>
+              <a:gd name="connsiteX16" fmla="*/ 0 w 9765539"/>
+              <a:gd name="connsiteY16" fmla="*/ 0 h 2843313"/>
+              <a:gd name="connsiteX0" fmla="*/ 0 w 9765539"/>
+              <a:gd name="connsiteY0" fmla="*/ 496044 h 3339357"/>
+              <a:gd name="connsiteX1" fmla="*/ 3202390 w 9765539"/>
+              <a:gd name="connsiteY1" fmla="*/ 496044 h 3339357"/>
+              <a:gd name="connsiteX2" fmla="*/ 3686491 w 9765539"/>
+              <a:gd name="connsiteY2" fmla="*/ 0 h 3339357"/>
+              <a:gd name="connsiteX3" fmla="*/ 4068975 w 9765539"/>
+              <a:gd name="connsiteY3" fmla="*/ 496044 h 3339357"/>
+              <a:gd name="connsiteX4" fmla="*/ 9765539 w 9765539"/>
+              <a:gd name="connsiteY4" fmla="*/ 496044 h 3339357"/>
+              <a:gd name="connsiteX5" fmla="*/ 9765539 w 9765539"/>
+              <a:gd name="connsiteY5" fmla="*/ 969930 h 3339357"/>
+              <a:gd name="connsiteX6" fmla="*/ 9765539 w 9765539"/>
+              <a:gd name="connsiteY6" fmla="*/ 969930 h 3339357"/>
+              <a:gd name="connsiteX7" fmla="*/ 9765539 w 9765539"/>
+              <a:gd name="connsiteY7" fmla="*/ 1680758 h 3339357"/>
+              <a:gd name="connsiteX8" fmla="*/ 9765539 w 9765539"/>
+              <a:gd name="connsiteY8" fmla="*/ 3339357 h 3339357"/>
+              <a:gd name="connsiteX9" fmla="*/ 4068975 w 9765539"/>
+              <a:gd name="connsiteY9" fmla="*/ 3339357 h 3339357"/>
+              <a:gd name="connsiteX10" fmla="*/ 1627590 w 9765539"/>
+              <a:gd name="connsiteY10" fmla="*/ 3339357 h 3339357"/>
+              <a:gd name="connsiteX11" fmla="*/ 1627590 w 9765539"/>
+              <a:gd name="connsiteY11" fmla="*/ 3339357 h 3339357"/>
+              <a:gd name="connsiteX12" fmla="*/ 0 w 9765539"/>
+              <a:gd name="connsiteY12" fmla="*/ 3339357 h 3339357"/>
+              <a:gd name="connsiteX13" fmla="*/ 0 w 9765539"/>
+              <a:gd name="connsiteY13" fmla="*/ 1680758 h 3339357"/>
+              <a:gd name="connsiteX14" fmla="*/ 0 w 9765539"/>
+              <a:gd name="connsiteY14" fmla="*/ 969930 h 3339357"/>
+              <a:gd name="connsiteX15" fmla="*/ 0 w 9765539"/>
+              <a:gd name="connsiteY15" fmla="*/ 969930 h 3339357"/>
+              <a:gd name="connsiteX16" fmla="*/ 0 w 9765539"/>
+              <a:gd name="connsiteY16" fmla="*/ 496044 h 3339357"/>
+              <a:gd name="connsiteX0" fmla="*/ 0 w 9765539"/>
+              <a:gd name="connsiteY0" fmla="*/ 1220990 h 4064303"/>
+              <a:gd name="connsiteX1" fmla="*/ 3202390 w 9765539"/>
+              <a:gd name="connsiteY1" fmla="*/ 1220990 h 4064303"/>
+              <a:gd name="connsiteX2" fmla="*/ 3686491 w 9765539"/>
+              <a:gd name="connsiteY2" fmla="*/ 0 h 4064303"/>
+              <a:gd name="connsiteX3" fmla="*/ 4068975 w 9765539"/>
+              <a:gd name="connsiteY3" fmla="*/ 1220990 h 4064303"/>
+              <a:gd name="connsiteX4" fmla="*/ 9765539 w 9765539"/>
+              <a:gd name="connsiteY4" fmla="*/ 1220990 h 4064303"/>
+              <a:gd name="connsiteX5" fmla="*/ 9765539 w 9765539"/>
+              <a:gd name="connsiteY5" fmla="*/ 1694876 h 4064303"/>
+              <a:gd name="connsiteX6" fmla="*/ 9765539 w 9765539"/>
+              <a:gd name="connsiteY6" fmla="*/ 1694876 h 4064303"/>
+              <a:gd name="connsiteX7" fmla="*/ 9765539 w 9765539"/>
+              <a:gd name="connsiteY7" fmla="*/ 2405704 h 4064303"/>
+              <a:gd name="connsiteX8" fmla="*/ 9765539 w 9765539"/>
+              <a:gd name="connsiteY8" fmla="*/ 4064303 h 4064303"/>
+              <a:gd name="connsiteX9" fmla="*/ 4068975 w 9765539"/>
+              <a:gd name="connsiteY9" fmla="*/ 4064303 h 4064303"/>
+              <a:gd name="connsiteX10" fmla="*/ 1627590 w 9765539"/>
+              <a:gd name="connsiteY10" fmla="*/ 4064303 h 4064303"/>
+              <a:gd name="connsiteX11" fmla="*/ 1627590 w 9765539"/>
+              <a:gd name="connsiteY11" fmla="*/ 4064303 h 4064303"/>
+              <a:gd name="connsiteX12" fmla="*/ 0 w 9765539"/>
+              <a:gd name="connsiteY12" fmla="*/ 4064303 h 4064303"/>
+              <a:gd name="connsiteX13" fmla="*/ 0 w 9765539"/>
+              <a:gd name="connsiteY13" fmla="*/ 2405704 h 4064303"/>
+              <a:gd name="connsiteX14" fmla="*/ 0 w 9765539"/>
+              <a:gd name="connsiteY14" fmla="*/ 1694876 h 4064303"/>
+              <a:gd name="connsiteX15" fmla="*/ 0 w 9765539"/>
+              <a:gd name="connsiteY15" fmla="*/ 1694876 h 4064303"/>
+              <a:gd name="connsiteX16" fmla="*/ 0 w 9765539"/>
+              <a:gd name="connsiteY16" fmla="*/ 1220990 h 4064303"/>
+              <a:gd name="connsiteX0" fmla="*/ 0 w 9765539"/>
+              <a:gd name="connsiteY0" fmla="*/ 1039754 h 3883067"/>
+              <a:gd name="connsiteX1" fmla="*/ 3202390 w 9765539"/>
+              <a:gd name="connsiteY1" fmla="*/ 1039754 h 3883067"/>
+              <a:gd name="connsiteX2" fmla="*/ 3661103 w 9765539"/>
+              <a:gd name="connsiteY2" fmla="*/ 0 h 3883067"/>
+              <a:gd name="connsiteX3" fmla="*/ 4068975 w 9765539"/>
+              <a:gd name="connsiteY3" fmla="*/ 1039754 h 3883067"/>
+              <a:gd name="connsiteX4" fmla="*/ 9765539 w 9765539"/>
+              <a:gd name="connsiteY4" fmla="*/ 1039754 h 3883067"/>
+              <a:gd name="connsiteX5" fmla="*/ 9765539 w 9765539"/>
+              <a:gd name="connsiteY5" fmla="*/ 1513640 h 3883067"/>
+              <a:gd name="connsiteX6" fmla="*/ 9765539 w 9765539"/>
+              <a:gd name="connsiteY6" fmla="*/ 1513640 h 3883067"/>
+              <a:gd name="connsiteX7" fmla="*/ 9765539 w 9765539"/>
+              <a:gd name="connsiteY7" fmla="*/ 2224468 h 3883067"/>
+              <a:gd name="connsiteX8" fmla="*/ 9765539 w 9765539"/>
+              <a:gd name="connsiteY8" fmla="*/ 3883067 h 3883067"/>
+              <a:gd name="connsiteX9" fmla="*/ 4068975 w 9765539"/>
+              <a:gd name="connsiteY9" fmla="*/ 3883067 h 3883067"/>
+              <a:gd name="connsiteX10" fmla="*/ 1627590 w 9765539"/>
+              <a:gd name="connsiteY10" fmla="*/ 3883067 h 3883067"/>
+              <a:gd name="connsiteX11" fmla="*/ 1627590 w 9765539"/>
+              <a:gd name="connsiteY11" fmla="*/ 3883067 h 3883067"/>
+              <a:gd name="connsiteX12" fmla="*/ 0 w 9765539"/>
+              <a:gd name="connsiteY12" fmla="*/ 3883067 h 3883067"/>
+              <a:gd name="connsiteX13" fmla="*/ 0 w 9765539"/>
+              <a:gd name="connsiteY13" fmla="*/ 2224468 h 3883067"/>
+              <a:gd name="connsiteX14" fmla="*/ 0 w 9765539"/>
+              <a:gd name="connsiteY14" fmla="*/ 1513640 h 3883067"/>
+              <a:gd name="connsiteX15" fmla="*/ 0 w 9765539"/>
+              <a:gd name="connsiteY15" fmla="*/ 1513640 h 3883067"/>
+              <a:gd name="connsiteX16" fmla="*/ 0 w 9765539"/>
+              <a:gd name="connsiteY16" fmla="*/ 1039754 h 3883067"/>
+            </a:gdLst>
+            <a:ahLst/>
+            <a:cxnLst>
+              <a:cxn ang="0">
+                <a:pos x="connsiteX0" y="connsiteY0"/>
+              </a:cxn>
+              <a:cxn ang="0">
+                <a:pos x="connsiteX1" y="connsiteY1"/>
+              </a:cxn>
+              <a:cxn ang="0">
+                <a:pos x="connsiteX2" y="connsiteY2"/>
+              </a:cxn>
+              <a:cxn ang="0">
+                <a:pos x="connsiteX3" y="connsiteY3"/>
+              </a:cxn>
+              <a:cxn ang="0">
+                <a:pos x="connsiteX4" y="connsiteY4"/>
+              </a:cxn>
+              <a:cxn ang="0">
+                <a:pos x="connsiteX5" y="connsiteY5"/>
+              </a:cxn>
+              <a:cxn ang="0">
+                <a:pos x="connsiteX6" y="connsiteY6"/>
+              </a:cxn>
+              <a:cxn ang="0">
+                <a:pos x="connsiteX7" y="connsiteY7"/>
+              </a:cxn>
+              <a:cxn ang="0">
+                <a:pos x="connsiteX8" y="connsiteY8"/>
+              </a:cxn>
+              <a:cxn ang="0">
+                <a:pos x="connsiteX9" y="connsiteY9"/>
+              </a:cxn>
+              <a:cxn ang="0">
+                <a:pos x="connsiteX10" y="connsiteY10"/>
+              </a:cxn>
+              <a:cxn ang="0">
+                <a:pos x="connsiteX11" y="connsiteY11"/>
+              </a:cxn>
+              <a:cxn ang="0">
+                <a:pos x="connsiteX12" y="connsiteY12"/>
+              </a:cxn>
+              <a:cxn ang="0">
+                <a:pos x="connsiteX13" y="connsiteY13"/>
+              </a:cxn>
+              <a:cxn ang="0">
+                <a:pos x="connsiteX14" y="connsiteY14"/>
+              </a:cxn>
+              <a:cxn ang="0">
+                <a:pos x="connsiteX15" y="connsiteY15"/>
+              </a:cxn>
+              <a:cxn ang="0">
+                <a:pos x="connsiteX16" y="connsiteY16"/>
+              </a:cxn>
+            </a:cxnLst>
+            <a:rect l="l" t="t" r="r" b="b"/>
+            <a:pathLst>
+              <a:path w="9765539" h="3883067">
+                <a:moveTo>
+                  <a:pt x="0" y="1039754"/>
+                </a:moveTo>
+                <a:lnTo>
+                  <a:pt x="3202390" y="1039754"/>
+                </a:lnTo>
+                <a:lnTo>
+                  <a:pt x="3661103" y="0"/>
+                </a:lnTo>
+                <a:lnTo>
+                  <a:pt x="4068975" y="1039754"/>
+                </a:lnTo>
+                <a:lnTo>
+                  <a:pt x="9765539" y="1039754"/>
+                </a:lnTo>
+                <a:lnTo>
+                  <a:pt x="9765539" y="1513640"/>
+                </a:lnTo>
+                <a:lnTo>
+                  <a:pt x="9765539" y="1513640"/>
+                </a:lnTo>
+                <a:lnTo>
+                  <a:pt x="9765539" y="2224468"/>
+                </a:lnTo>
+                <a:lnTo>
+                  <a:pt x="9765539" y="3883067"/>
+                </a:lnTo>
+                <a:lnTo>
+                  <a:pt x="4068975" y="3883067"/>
+                </a:lnTo>
+                <a:lnTo>
+                  <a:pt x="1627590" y="3883067"/>
+                </a:lnTo>
+                <a:lnTo>
+                  <a:pt x="1627590" y="3883067"/>
+                </a:lnTo>
+                <a:lnTo>
+                  <a:pt x="0" y="3883067"/>
+                </a:lnTo>
+                <a:lnTo>
+                  <a:pt x="0" y="2224468"/>
+                </a:lnTo>
+                <a:lnTo>
+                  <a:pt x="0" y="1513640"/>
+                </a:lnTo>
+                <a:lnTo>
+                  <a:pt x="0" y="1513640"/>
+                </a:lnTo>
+                <a:lnTo>
+                  <a:pt x="0" y="1039754"/>
+                </a:lnTo>
+                <a:close/>
+              </a:path>
+            </a:pathLst>
+          </a:custGeom>
           <a:solidFill>
             <a:schemeClr val="accent6">
-              <a:lumMod val="75000"/>
+              <a:lumMod val="20000"/>
+              <a:lumOff val="80000"/>
             </a:schemeClr>
           </a:solidFill>
-          <a:ln w="44450">
+          <a:ln>
             <a:solidFill>
               <a:schemeClr val="accent6">
                 <a:lumMod val="75000"/>
@@ -4071,125 +4319,252 @@
           <a:lstStyle/>
           <a:p>
             <a:pPr algn="ctr"/>
-            <a:r>
-              <a:rPr lang="ja-JP" altLang="en-US" sz="11500" b="1"/>
-              <a:t>観光レビューを利用した高好感度観光地レコメンデーションシステムの構築</a:t>
-            </a:r>
-            <a:endParaRPr kumimoji="1" lang="ja-JP" altLang="en-US" sz="11500" b="1"/>
-          </a:p>
-        </p:txBody>
-      </p:sp>
-      <p:sp>
-        <p:nvSpPr>
-          <p:cNvPr id="3" name="テキスト ボックス 2">
+            <a:endParaRPr kumimoji="1" lang="ja-JP" altLang="en-US"/>
+          </a:p>
+        </p:txBody>
+      </p:sp>
+      <p:sp>
+        <p:nvSpPr>
+          <p:cNvPr id="78" name="四角形吹き出し 77">
             <a:extLst>
               <a:ext uri="{FF2B5EF4-FFF2-40B4-BE49-F238E27FC236}">
-                <a16:creationId xmlns:a16="http://schemas.microsoft.com/office/drawing/2014/main" id="{200B221A-5ABE-BB47-AD3C-6BC543E03A74}"/>
+                <a16:creationId xmlns:a16="http://schemas.microsoft.com/office/drawing/2014/main" id="{41FDE50F-0E16-0148-9FFF-4DFF81D3533D}"/>
               </a:ext>
             </a:extLst>
           </p:cNvPr>
-          <p:cNvSpPr txBox="1"/>
+          <p:cNvSpPr/>
           <p:nvPr/>
         </p:nvSpPr>
         <p:spPr>
           <a:xfrm>
-            <a:off x="3116527" y="7055941"/>
-            <a:ext cx="24042159" cy="1107996"/>
-          </a:xfrm>
-          <a:prstGeom prst="rect">
+            <a:off x="2150268" y="18327703"/>
+            <a:ext cx="25802583" cy="9020177"/>
+          </a:xfrm>
+          <a:custGeom>
             <a:avLst/>
-          </a:prstGeom>
-          <a:noFill/>
-        </p:spPr>
-        <p:txBody>
-          <a:bodyPr wrap="none" rtlCol="0">
-            <a:spAutoFit/>
-          </a:bodyPr>
-          <a:lstStyle/>
-          <a:p>
-            <a:r>
-              <a:rPr kumimoji="1" lang="en-US" altLang="ja-JP" sz="6600" dirty="0"/>
-              <a:t>18115233 </a:t>
-            </a:r>
-            <a:r>
-              <a:rPr kumimoji="1" lang="ja-JP" altLang="en-US" sz="6600"/>
-              <a:t>社会情報学部</a:t>
-            </a:r>
-            <a:r>
-              <a:rPr kumimoji="1" lang="en-US" altLang="ja-JP" sz="6600" dirty="0"/>
-              <a:t> </a:t>
-            </a:r>
-            <a:r>
-              <a:rPr lang="ja-JP" altLang="en-US" sz="6600"/>
-              <a:t>４</a:t>
-            </a:r>
-            <a:r>
-              <a:rPr kumimoji="1" lang="ja-JP" altLang="en-US" sz="6600"/>
-              <a:t>年Ｅ組</a:t>
-            </a:r>
-            <a:r>
-              <a:rPr kumimoji="1" lang="en-US" altLang="ja-JP" sz="6600" dirty="0"/>
-              <a:t> </a:t>
-            </a:r>
-            <a:r>
-              <a:rPr kumimoji="1" lang="ja-JP" altLang="en-US" sz="6600"/>
-              <a:t>和田</a:t>
-            </a:r>
-            <a:r>
-              <a:rPr kumimoji="1" lang="en-US" altLang="ja-JP" sz="6600" dirty="0"/>
-              <a:t> </a:t>
-            </a:r>
-            <a:r>
-              <a:rPr kumimoji="1" lang="ja-JP" altLang="en-US" sz="6600"/>
-              <a:t>龍樹</a:t>
-            </a:r>
-            <a:r>
-              <a:rPr lang="ja-JP" altLang="en-US" sz="6600" dirty="0"/>
-              <a:t>　</a:t>
-            </a:r>
-            <a:r>
-              <a:rPr kumimoji="1" lang="ja-JP" altLang="en-US" sz="6600"/>
-              <a:t>担当教員：宮治</a:t>
-            </a:r>
-            <a:r>
-              <a:rPr kumimoji="1" lang="en-US" altLang="ja-JP" sz="6600" dirty="0"/>
-              <a:t> </a:t>
-            </a:r>
-            <a:r>
-              <a:rPr kumimoji="1" lang="ja-JP" altLang="en-US" sz="6600"/>
-              <a:t>裕</a:t>
-            </a:r>
-          </a:p>
-        </p:txBody>
-      </p:sp>
-      <p:sp>
-        <p:nvSpPr>
-          <p:cNvPr id="4" name="正方形/長方形 3">
-            <a:extLst>
-              <a:ext uri="{FF2B5EF4-FFF2-40B4-BE49-F238E27FC236}">
-                <a16:creationId xmlns:a16="http://schemas.microsoft.com/office/drawing/2014/main" id="{5BACF97E-75CA-9F4E-A4CE-69AFD8552B25}"/>
-              </a:ext>
-            </a:extLst>
-          </p:cNvPr>
-          <p:cNvSpPr>
-            <a:spLocks/>
-          </p:cNvSpPr>
-          <p:nvPr/>
-        </p:nvSpPr>
-        <p:spPr>
-          <a:xfrm>
-            <a:off x="1336429" y="8316022"/>
-            <a:ext cx="27643015" cy="1398979"/>
-          </a:xfrm>
-          <a:prstGeom prst="rect">
-            <a:avLst/>
-          </a:prstGeom>
+            <a:gdLst>
+              <a:gd name="connsiteX0" fmla="*/ 0 w 25802583"/>
+              <a:gd name="connsiteY0" fmla="*/ 0 h 6594889"/>
+              <a:gd name="connsiteX1" fmla="*/ 15051507 w 25802583"/>
+              <a:gd name="connsiteY1" fmla="*/ 0 h 6594889"/>
+              <a:gd name="connsiteX2" fmla="*/ 15051507 w 25802583"/>
+              <a:gd name="connsiteY2" fmla="*/ 0 h 6594889"/>
+              <a:gd name="connsiteX3" fmla="*/ 21502153 w 25802583"/>
+              <a:gd name="connsiteY3" fmla="*/ 0 h 6594889"/>
+              <a:gd name="connsiteX4" fmla="*/ 25802583 w 25802583"/>
+              <a:gd name="connsiteY4" fmla="*/ 0 h 6594889"/>
+              <a:gd name="connsiteX5" fmla="*/ 25802583 w 25802583"/>
+              <a:gd name="connsiteY5" fmla="*/ 3847019 h 6594889"/>
+              <a:gd name="connsiteX6" fmla="*/ 25802583 w 25802583"/>
+              <a:gd name="connsiteY6" fmla="*/ 3847019 h 6594889"/>
+              <a:gd name="connsiteX7" fmla="*/ 25802583 w 25802583"/>
+              <a:gd name="connsiteY7" fmla="*/ 5495741 h 6594889"/>
+              <a:gd name="connsiteX8" fmla="*/ 25802583 w 25802583"/>
+              <a:gd name="connsiteY8" fmla="*/ 6594889 h 6594889"/>
+              <a:gd name="connsiteX9" fmla="*/ 21502153 w 25802583"/>
+              <a:gd name="connsiteY9" fmla="*/ 6594889 h 6594889"/>
+              <a:gd name="connsiteX10" fmla="*/ 18684166 w 25802583"/>
+              <a:gd name="connsiteY10" fmla="*/ 8974457 h 6594889"/>
+              <a:gd name="connsiteX11" fmla="*/ 15051507 w 25802583"/>
+              <a:gd name="connsiteY11" fmla="*/ 6594889 h 6594889"/>
+              <a:gd name="connsiteX12" fmla="*/ 0 w 25802583"/>
+              <a:gd name="connsiteY12" fmla="*/ 6594889 h 6594889"/>
+              <a:gd name="connsiteX13" fmla="*/ 0 w 25802583"/>
+              <a:gd name="connsiteY13" fmla="*/ 5495741 h 6594889"/>
+              <a:gd name="connsiteX14" fmla="*/ 0 w 25802583"/>
+              <a:gd name="connsiteY14" fmla="*/ 3847019 h 6594889"/>
+              <a:gd name="connsiteX15" fmla="*/ 0 w 25802583"/>
+              <a:gd name="connsiteY15" fmla="*/ 3847019 h 6594889"/>
+              <a:gd name="connsiteX16" fmla="*/ 0 w 25802583"/>
+              <a:gd name="connsiteY16" fmla="*/ 0 h 6594889"/>
+              <a:gd name="connsiteX0" fmla="*/ 0 w 25802583"/>
+              <a:gd name="connsiteY0" fmla="*/ 0 h 8974457"/>
+              <a:gd name="connsiteX1" fmla="*/ 15051507 w 25802583"/>
+              <a:gd name="connsiteY1" fmla="*/ 0 h 8974457"/>
+              <a:gd name="connsiteX2" fmla="*/ 15051507 w 25802583"/>
+              <a:gd name="connsiteY2" fmla="*/ 0 h 8974457"/>
+              <a:gd name="connsiteX3" fmla="*/ 21502153 w 25802583"/>
+              <a:gd name="connsiteY3" fmla="*/ 0 h 8974457"/>
+              <a:gd name="connsiteX4" fmla="*/ 25802583 w 25802583"/>
+              <a:gd name="connsiteY4" fmla="*/ 0 h 8974457"/>
+              <a:gd name="connsiteX5" fmla="*/ 25802583 w 25802583"/>
+              <a:gd name="connsiteY5" fmla="*/ 3847019 h 8974457"/>
+              <a:gd name="connsiteX6" fmla="*/ 25802583 w 25802583"/>
+              <a:gd name="connsiteY6" fmla="*/ 3847019 h 8974457"/>
+              <a:gd name="connsiteX7" fmla="*/ 25802583 w 25802583"/>
+              <a:gd name="connsiteY7" fmla="*/ 5495741 h 8974457"/>
+              <a:gd name="connsiteX8" fmla="*/ 25802583 w 25802583"/>
+              <a:gd name="connsiteY8" fmla="*/ 6594889 h 8974457"/>
+              <a:gd name="connsiteX9" fmla="*/ 21502153 w 25802583"/>
+              <a:gd name="connsiteY9" fmla="*/ 6594889 h 8974457"/>
+              <a:gd name="connsiteX10" fmla="*/ 18684166 w 25802583"/>
+              <a:gd name="connsiteY10" fmla="*/ 8974457 h 8974457"/>
+              <a:gd name="connsiteX11" fmla="*/ 19212027 w 25802583"/>
+              <a:gd name="connsiteY11" fmla="*/ 6594889 h 8974457"/>
+              <a:gd name="connsiteX12" fmla="*/ 0 w 25802583"/>
+              <a:gd name="connsiteY12" fmla="*/ 6594889 h 8974457"/>
+              <a:gd name="connsiteX13" fmla="*/ 0 w 25802583"/>
+              <a:gd name="connsiteY13" fmla="*/ 5495741 h 8974457"/>
+              <a:gd name="connsiteX14" fmla="*/ 0 w 25802583"/>
+              <a:gd name="connsiteY14" fmla="*/ 3847019 h 8974457"/>
+              <a:gd name="connsiteX15" fmla="*/ 0 w 25802583"/>
+              <a:gd name="connsiteY15" fmla="*/ 3847019 h 8974457"/>
+              <a:gd name="connsiteX16" fmla="*/ 0 w 25802583"/>
+              <a:gd name="connsiteY16" fmla="*/ 0 h 8974457"/>
+              <a:gd name="connsiteX0" fmla="*/ 0 w 25802583"/>
+              <a:gd name="connsiteY0" fmla="*/ 0 h 9020177"/>
+              <a:gd name="connsiteX1" fmla="*/ 15051507 w 25802583"/>
+              <a:gd name="connsiteY1" fmla="*/ 0 h 9020177"/>
+              <a:gd name="connsiteX2" fmla="*/ 15051507 w 25802583"/>
+              <a:gd name="connsiteY2" fmla="*/ 0 h 9020177"/>
+              <a:gd name="connsiteX3" fmla="*/ 21502153 w 25802583"/>
+              <a:gd name="connsiteY3" fmla="*/ 0 h 9020177"/>
+              <a:gd name="connsiteX4" fmla="*/ 25802583 w 25802583"/>
+              <a:gd name="connsiteY4" fmla="*/ 0 h 9020177"/>
+              <a:gd name="connsiteX5" fmla="*/ 25802583 w 25802583"/>
+              <a:gd name="connsiteY5" fmla="*/ 3847019 h 9020177"/>
+              <a:gd name="connsiteX6" fmla="*/ 25802583 w 25802583"/>
+              <a:gd name="connsiteY6" fmla="*/ 3847019 h 9020177"/>
+              <a:gd name="connsiteX7" fmla="*/ 25802583 w 25802583"/>
+              <a:gd name="connsiteY7" fmla="*/ 5495741 h 9020177"/>
+              <a:gd name="connsiteX8" fmla="*/ 25802583 w 25802583"/>
+              <a:gd name="connsiteY8" fmla="*/ 6594889 h 9020177"/>
+              <a:gd name="connsiteX9" fmla="*/ 21502153 w 25802583"/>
+              <a:gd name="connsiteY9" fmla="*/ 6594889 h 9020177"/>
+              <a:gd name="connsiteX10" fmla="*/ 20330086 w 25802583"/>
+              <a:gd name="connsiteY10" fmla="*/ 9020177 h 9020177"/>
+              <a:gd name="connsiteX11" fmla="*/ 19212027 w 25802583"/>
+              <a:gd name="connsiteY11" fmla="*/ 6594889 h 9020177"/>
+              <a:gd name="connsiteX12" fmla="*/ 0 w 25802583"/>
+              <a:gd name="connsiteY12" fmla="*/ 6594889 h 9020177"/>
+              <a:gd name="connsiteX13" fmla="*/ 0 w 25802583"/>
+              <a:gd name="connsiteY13" fmla="*/ 5495741 h 9020177"/>
+              <a:gd name="connsiteX14" fmla="*/ 0 w 25802583"/>
+              <a:gd name="connsiteY14" fmla="*/ 3847019 h 9020177"/>
+              <a:gd name="connsiteX15" fmla="*/ 0 w 25802583"/>
+              <a:gd name="connsiteY15" fmla="*/ 3847019 h 9020177"/>
+              <a:gd name="connsiteX16" fmla="*/ 0 w 25802583"/>
+              <a:gd name="connsiteY16" fmla="*/ 0 h 9020177"/>
+            </a:gdLst>
+            <a:ahLst/>
+            <a:cxnLst>
+              <a:cxn ang="0">
+                <a:pos x="connsiteX0" y="connsiteY0"/>
+              </a:cxn>
+              <a:cxn ang="0">
+                <a:pos x="connsiteX1" y="connsiteY1"/>
+              </a:cxn>
+              <a:cxn ang="0">
+                <a:pos x="connsiteX2" y="connsiteY2"/>
+              </a:cxn>
+              <a:cxn ang="0">
+                <a:pos x="connsiteX3" y="connsiteY3"/>
+              </a:cxn>
+              <a:cxn ang="0">
+                <a:pos x="connsiteX4" y="connsiteY4"/>
+              </a:cxn>
+              <a:cxn ang="0">
+                <a:pos x="connsiteX5" y="connsiteY5"/>
+              </a:cxn>
+              <a:cxn ang="0">
+                <a:pos x="connsiteX6" y="connsiteY6"/>
+              </a:cxn>
+              <a:cxn ang="0">
+                <a:pos x="connsiteX7" y="connsiteY7"/>
+              </a:cxn>
+              <a:cxn ang="0">
+                <a:pos x="connsiteX8" y="connsiteY8"/>
+              </a:cxn>
+              <a:cxn ang="0">
+                <a:pos x="connsiteX9" y="connsiteY9"/>
+              </a:cxn>
+              <a:cxn ang="0">
+                <a:pos x="connsiteX10" y="connsiteY10"/>
+              </a:cxn>
+              <a:cxn ang="0">
+                <a:pos x="connsiteX11" y="connsiteY11"/>
+              </a:cxn>
+              <a:cxn ang="0">
+                <a:pos x="connsiteX12" y="connsiteY12"/>
+              </a:cxn>
+              <a:cxn ang="0">
+                <a:pos x="connsiteX13" y="connsiteY13"/>
+              </a:cxn>
+              <a:cxn ang="0">
+                <a:pos x="connsiteX14" y="connsiteY14"/>
+              </a:cxn>
+              <a:cxn ang="0">
+                <a:pos x="connsiteX15" y="connsiteY15"/>
+              </a:cxn>
+              <a:cxn ang="0">
+                <a:pos x="connsiteX16" y="connsiteY16"/>
+              </a:cxn>
+            </a:cxnLst>
+            <a:rect l="l" t="t" r="r" b="b"/>
+            <a:pathLst>
+              <a:path w="25802583" h="9020177">
+                <a:moveTo>
+                  <a:pt x="0" y="0"/>
+                </a:moveTo>
+                <a:lnTo>
+                  <a:pt x="15051507" y="0"/>
+                </a:lnTo>
+                <a:lnTo>
+                  <a:pt x="15051507" y="0"/>
+                </a:lnTo>
+                <a:lnTo>
+                  <a:pt x="21502153" y="0"/>
+                </a:lnTo>
+                <a:lnTo>
+                  <a:pt x="25802583" y="0"/>
+                </a:lnTo>
+                <a:lnTo>
+                  <a:pt x="25802583" y="3847019"/>
+                </a:lnTo>
+                <a:lnTo>
+                  <a:pt x="25802583" y="3847019"/>
+                </a:lnTo>
+                <a:lnTo>
+                  <a:pt x="25802583" y="5495741"/>
+                </a:lnTo>
+                <a:lnTo>
+                  <a:pt x="25802583" y="6594889"/>
+                </a:lnTo>
+                <a:lnTo>
+                  <a:pt x="21502153" y="6594889"/>
+                </a:lnTo>
+                <a:lnTo>
+                  <a:pt x="20330086" y="9020177"/>
+                </a:lnTo>
+                <a:lnTo>
+                  <a:pt x="19212027" y="6594889"/>
+                </a:lnTo>
+                <a:lnTo>
+                  <a:pt x="0" y="6594889"/>
+                </a:lnTo>
+                <a:lnTo>
+                  <a:pt x="0" y="5495741"/>
+                </a:lnTo>
+                <a:lnTo>
+                  <a:pt x="0" y="3847019"/>
+                </a:lnTo>
+                <a:lnTo>
+                  <a:pt x="0" y="3847019"/>
+                </a:lnTo>
+                <a:lnTo>
+                  <a:pt x="0" y="0"/>
+                </a:lnTo>
+                <a:close/>
+              </a:path>
+            </a:pathLst>
+          </a:custGeom>
           <a:solidFill>
             <a:schemeClr val="accent6">
-              <a:lumMod val="75000"/>
+              <a:lumMod val="20000"/>
+              <a:lumOff val="80000"/>
             </a:schemeClr>
           </a:solidFill>
-          <a:ln w="44450">
+          <a:ln>
             <a:solidFill>
               <a:schemeClr val="accent6">
                 <a:lumMod val="75000"/>
@@ -4217,23 +4592,17 @@
           <a:bodyPr rtlCol="0" anchor="ctr"/>
           <a:lstStyle/>
           <a:p>
-            <a:r>
-              <a:rPr kumimoji="1" lang="en-US" altLang="ja-JP" sz="7200" b="1" dirty="0"/>
-              <a:t>  </a:t>
-            </a:r>
-            <a:r>
-              <a:rPr kumimoji="1" lang="ja-JP" altLang="en-US" sz="7200" b="1"/>
-              <a:t>背景・目的</a:t>
-            </a:r>
-          </a:p>
-        </p:txBody>
-      </p:sp>
-      <p:sp>
-        <p:nvSpPr>
-          <p:cNvPr id="5" name="正方形/長方形 4">
+            <a:pPr algn="ctr"/>
+            <a:endParaRPr kumimoji="1" lang="ja-JP" altLang="en-US"/>
+          </a:p>
+        </p:txBody>
+      </p:sp>
+      <p:sp>
+        <p:nvSpPr>
+          <p:cNvPr id="2" name="正方形/長方形 1">
             <a:extLst>
               <a:ext uri="{FF2B5EF4-FFF2-40B4-BE49-F238E27FC236}">
-                <a16:creationId xmlns:a16="http://schemas.microsoft.com/office/drawing/2014/main" id="{C486BC48-6D8F-FB46-9275-EA9D7F6852A0}"/>
+                <a16:creationId xmlns:a16="http://schemas.microsoft.com/office/drawing/2014/main" id="{914A04A2-7EB3-0D4F-9417-8FF6D8826C27}"/>
               </a:ext>
             </a:extLst>
           </p:cNvPr>
@@ -4244,13 +4613,17 @@
         </p:nvSpPr>
         <p:spPr>
           <a:xfrm>
-            <a:off x="1336429" y="9595729"/>
-            <a:ext cx="27643017" cy="7196973"/>
+            <a:off x="1316099" y="825291"/>
+            <a:ext cx="27643015" cy="3821118"/>
           </a:xfrm>
           <a:prstGeom prst="rect">
             <a:avLst/>
           </a:prstGeom>
-          <a:noFill/>
+          <a:solidFill>
+            <a:schemeClr val="accent6">
+              <a:lumMod val="75000"/>
+            </a:schemeClr>
+          </a:solidFill>
           <a:ln w="44450">
             <a:solidFill>
               <a:schemeClr val="accent6">
@@ -4280,32 +4653,133 @@
           <a:lstStyle/>
           <a:p>
             <a:pPr algn="ctr"/>
-            <a:endParaRPr kumimoji="1" lang="ja-JP" altLang="en-US" sz="11500" b="1"/>
-          </a:p>
-        </p:txBody>
-      </p:sp>
-      <p:sp>
-        <p:nvSpPr>
-          <p:cNvPr id="7" name="正方形/長方形 6">
+            <a:r>
+              <a:rPr lang="ja-JP" altLang="en-US" sz="9600" b="1"/>
+              <a:t>観光レビューを利用した高好感度観光地</a:t>
+            </a:r>
+            <a:endParaRPr lang="en-US" altLang="ja-JP" sz="9600" b="1" dirty="0"/>
+          </a:p>
+          <a:p>
+            <a:pPr algn="ctr"/>
+            <a:r>
+              <a:rPr lang="ja-JP" altLang="en-US" sz="9600" b="1"/>
+              <a:t>レコメンデーションシステムの構築</a:t>
+            </a:r>
+            <a:endParaRPr kumimoji="1" lang="ja-JP" altLang="en-US" sz="9600" b="1"/>
+          </a:p>
+        </p:txBody>
+      </p:sp>
+      <p:sp>
+        <p:nvSpPr>
+          <p:cNvPr id="3" name="テキスト ボックス 2">
             <a:extLst>
               <a:ext uri="{FF2B5EF4-FFF2-40B4-BE49-F238E27FC236}">
-                <a16:creationId xmlns:a16="http://schemas.microsoft.com/office/drawing/2014/main" id="{F03F8124-AF3B-DF47-B0FB-7111A8917CAF}"/>
+                <a16:creationId xmlns:a16="http://schemas.microsoft.com/office/drawing/2014/main" id="{200B221A-5ABE-BB47-AD3C-6BC543E03A74}"/>
               </a:ext>
             </a:extLst>
           </p:cNvPr>
-          <p:cNvSpPr/>
+          <p:cNvSpPr txBox="1"/>
           <p:nvPr/>
         </p:nvSpPr>
         <p:spPr>
           <a:xfrm>
-            <a:off x="1679040" y="10024553"/>
-            <a:ext cx="8748000" cy="1038604"/>
+            <a:off x="3116527" y="4922341"/>
+            <a:ext cx="24042159" cy="1107996"/>
           </a:xfrm>
           <a:prstGeom prst="rect">
             <a:avLst/>
           </a:prstGeom>
           <a:noFill/>
-          <a:ln w="38100">
+        </p:spPr>
+        <p:txBody>
+          <a:bodyPr wrap="none" rtlCol="0">
+            <a:spAutoFit/>
+          </a:bodyPr>
+          <a:lstStyle/>
+          <a:p>
+            <a:r>
+              <a:rPr kumimoji="1" lang="en-US" altLang="ja-JP" sz="6600" dirty="0"/>
+              <a:t>18115233 </a:t>
+            </a:r>
+            <a:r>
+              <a:rPr kumimoji="1" lang="ja-JP" altLang="en-US" sz="6600"/>
+              <a:t>社会情報学部</a:t>
+            </a:r>
+            <a:r>
+              <a:rPr kumimoji="1" lang="en-US" altLang="ja-JP" sz="6600" dirty="0"/>
+              <a:t> </a:t>
+            </a:r>
+            <a:r>
+              <a:rPr lang="ja-JP" altLang="en-US" sz="6600"/>
+              <a:t>４</a:t>
+            </a:r>
+            <a:r>
+              <a:rPr kumimoji="1" lang="ja-JP" altLang="en-US" sz="6600"/>
+              <a:t>年Ｅ組</a:t>
+            </a:r>
+            <a:r>
+              <a:rPr kumimoji="1" lang="en-US" altLang="ja-JP" sz="6600" dirty="0"/>
+              <a:t> </a:t>
+            </a:r>
+            <a:r>
+              <a:rPr kumimoji="1" lang="ja-JP" altLang="en-US" sz="6600"/>
+              <a:t>和田</a:t>
+            </a:r>
+            <a:r>
+              <a:rPr kumimoji="1" lang="en-US" altLang="ja-JP" sz="6600" dirty="0"/>
+              <a:t> </a:t>
+            </a:r>
+            <a:r>
+              <a:rPr kumimoji="1" lang="ja-JP" altLang="en-US" sz="6600"/>
+              <a:t>龍樹</a:t>
+            </a:r>
+            <a:r>
+              <a:rPr lang="ja-JP" altLang="en-US" sz="6600" dirty="0"/>
+              <a:t>　</a:t>
+            </a:r>
+            <a:r>
+              <a:rPr kumimoji="1" lang="ja-JP" altLang="en-US" sz="6600"/>
+              <a:t>担当教員：宮治</a:t>
+            </a:r>
+            <a:r>
+              <a:rPr kumimoji="1" lang="en-US" altLang="ja-JP" sz="6600" dirty="0"/>
+              <a:t> </a:t>
+            </a:r>
+            <a:r>
+              <a:rPr kumimoji="1" lang="ja-JP" altLang="en-US" sz="6600"/>
+              <a:t>裕</a:t>
+            </a:r>
+          </a:p>
+        </p:txBody>
+      </p:sp>
+      <p:sp>
+        <p:nvSpPr>
+          <p:cNvPr id="4" name="正方形/長方形 3">
+            <a:extLst>
+              <a:ext uri="{FF2B5EF4-FFF2-40B4-BE49-F238E27FC236}">
+                <a16:creationId xmlns:a16="http://schemas.microsoft.com/office/drawing/2014/main" id="{5BACF97E-75CA-9F4E-A4CE-69AFD8552B25}"/>
+              </a:ext>
+            </a:extLst>
+          </p:cNvPr>
+          <p:cNvSpPr>
+            <a:spLocks/>
+          </p:cNvSpPr>
+          <p:nvPr/>
+        </p:nvSpPr>
+        <p:spPr>
+          <a:xfrm>
+            <a:off x="1336429" y="6182422"/>
+            <a:ext cx="27643015" cy="1398979"/>
+          </a:xfrm>
+          <a:prstGeom prst="rect">
+            <a:avLst/>
+          </a:prstGeom>
+          <a:solidFill>
+            <a:schemeClr val="accent6">
+              <a:lumMod val="75000"/>
+            </a:schemeClr>
+          </a:solidFill>
+          <a:ln w="44450">
             <a:solidFill>
               <a:schemeClr val="accent6">
                 <a:lumMod val="75000"/>
@@ -4333,42 +4807,41 @@
           <a:bodyPr rtlCol="0" anchor="ctr"/>
           <a:lstStyle/>
           <a:p>
-            <a:pPr algn="ctr"/>
-            <a:r>
-              <a:rPr kumimoji="1" lang="ja-JP" altLang="en-US" sz="4800" b="1">
-                <a:solidFill>
-                  <a:schemeClr val="accent6">
-                    <a:lumMod val="75000"/>
-                  </a:schemeClr>
-                </a:solidFill>
-              </a:rPr>
-              <a:t>背景</a:t>
-            </a:r>
-          </a:p>
-        </p:txBody>
-      </p:sp>
-      <p:sp>
-        <p:nvSpPr>
-          <p:cNvPr id="12" name="正方形/長方形 11">
+            <a:r>
+              <a:rPr kumimoji="1" lang="en-US" altLang="ja-JP" sz="7200" b="1" dirty="0"/>
+              <a:t>  </a:t>
+            </a:r>
+            <a:r>
+              <a:rPr kumimoji="1" lang="ja-JP" altLang="en-US" sz="7200" b="1"/>
+              <a:t>背景・目的</a:t>
+            </a:r>
+          </a:p>
+        </p:txBody>
+      </p:sp>
+      <p:sp>
+        <p:nvSpPr>
+          <p:cNvPr id="5" name="正方形/長方形 4">
             <a:extLst>
               <a:ext uri="{FF2B5EF4-FFF2-40B4-BE49-F238E27FC236}">
-                <a16:creationId xmlns:a16="http://schemas.microsoft.com/office/drawing/2014/main" id="{A2447F28-9897-B947-A82C-F35701B55F9F}"/>
+                <a16:creationId xmlns:a16="http://schemas.microsoft.com/office/drawing/2014/main" id="{C486BC48-6D8F-FB46-9275-EA9D7F6852A0}"/>
               </a:ext>
             </a:extLst>
           </p:cNvPr>
-          <p:cNvSpPr/>
+          <p:cNvSpPr>
+            <a:spLocks/>
+          </p:cNvSpPr>
           <p:nvPr/>
         </p:nvSpPr>
         <p:spPr>
           <a:xfrm>
-            <a:off x="10763606" y="10024553"/>
-            <a:ext cx="8748000" cy="1038604"/>
+            <a:off x="1336429" y="7462129"/>
+            <a:ext cx="27643017" cy="7296603"/>
           </a:xfrm>
           <a:prstGeom prst="rect">
             <a:avLst/>
           </a:prstGeom>
           <a:noFill/>
-          <a:ln w="38100">
+          <a:ln w="44450">
             <a:solidFill>
               <a:schemeClr val="accent6">
                 <a:lumMod val="75000"/>
@@ -4397,35 +4870,16 @@
           <a:lstStyle/>
           <a:p>
             <a:pPr algn="ctr"/>
-            <a:r>
-              <a:rPr lang="ja-JP" altLang="en-US" sz="4800" b="1">
-                <a:solidFill>
-                  <a:schemeClr val="accent6">
-                    <a:lumMod val="75000"/>
-                  </a:schemeClr>
-                </a:solidFill>
-              </a:rPr>
-              <a:t>レ</a:t>
-            </a:r>
-            <a:r>
-              <a:rPr kumimoji="1" lang="ja-JP" altLang="en-US" sz="4800" b="1">
-                <a:solidFill>
-                  <a:schemeClr val="accent6">
-                    <a:lumMod val="75000"/>
-                  </a:schemeClr>
-                </a:solidFill>
-              </a:rPr>
-              <a:t>コメンドの現状</a:t>
-            </a:r>
-          </a:p>
-        </p:txBody>
-      </p:sp>
-      <p:sp>
-        <p:nvSpPr>
-          <p:cNvPr id="13" name="正方形/長方形 12">
+            <a:endParaRPr kumimoji="1" lang="ja-JP" altLang="en-US" sz="11500" b="1"/>
+          </a:p>
+        </p:txBody>
+      </p:sp>
+      <p:sp>
+        <p:nvSpPr>
+          <p:cNvPr id="7" name="正方形/長方形 6">
             <a:extLst>
               <a:ext uri="{FF2B5EF4-FFF2-40B4-BE49-F238E27FC236}">
-                <a16:creationId xmlns:a16="http://schemas.microsoft.com/office/drawing/2014/main" id="{13441FB1-F2D4-AC48-943A-544F778B0D8D}"/>
+                <a16:creationId xmlns:a16="http://schemas.microsoft.com/office/drawing/2014/main" id="{F03F8124-AF3B-DF47-B0FB-7111A8917CAF}"/>
               </a:ext>
             </a:extLst>
           </p:cNvPr>
@@ -4434,7 +4888,7 @@
         </p:nvSpPr>
         <p:spPr>
           <a:xfrm>
-            <a:off x="19927686" y="10032951"/>
+            <a:off x="1679040" y="7890953"/>
             <a:ext cx="8748000" cy="1038604"/>
           </a:xfrm>
           <a:prstGeom prst="rect">
@@ -4471,31 +4925,24 @@
           <a:p>
             <a:pPr algn="ctr"/>
             <a:r>
-              <a:rPr lang="ja-JP" altLang="en-US" sz="4800" b="1">
+              <a:rPr kumimoji="1" lang="ja-JP" altLang="en-US" sz="4800" b="1">
                 <a:solidFill>
                   <a:schemeClr val="accent6">
                     <a:lumMod val="75000"/>
                   </a:schemeClr>
                 </a:solidFill>
               </a:rPr>
-              <a:t>レビューを利用したレコメンド</a:t>
-            </a:r>
-            <a:endParaRPr kumimoji="1" lang="ja-JP" altLang="en-US" sz="4800" b="1">
-              <a:solidFill>
-                <a:schemeClr val="accent6">
-                  <a:lumMod val="75000"/>
-                </a:schemeClr>
-              </a:solidFill>
-            </a:endParaRPr>
-          </a:p>
-        </p:txBody>
-      </p:sp>
-      <p:sp>
-        <p:nvSpPr>
-          <p:cNvPr id="14" name="正方形/長方形 13">
+              <a:t>背景</a:t>
+            </a:r>
+          </a:p>
+        </p:txBody>
+      </p:sp>
+      <p:sp>
+        <p:nvSpPr>
+          <p:cNvPr id="12" name="正方形/長方形 11">
             <a:extLst>
               <a:ext uri="{FF2B5EF4-FFF2-40B4-BE49-F238E27FC236}">
-                <a16:creationId xmlns:a16="http://schemas.microsoft.com/office/drawing/2014/main" id="{8540EC16-A732-E042-B367-F88C8FE3FEB3}"/>
+                <a16:creationId xmlns:a16="http://schemas.microsoft.com/office/drawing/2014/main" id="{A2447F28-9897-B947-A82C-F35701B55F9F}"/>
               </a:ext>
             </a:extLst>
           </p:cNvPr>
@@ -4504,8 +4951,8 @@
         </p:nvSpPr>
         <p:spPr>
           <a:xfrm>
-            <a:off x="1686507" y="11063157"/>
-            <a:ext cx="8748000" cy="4332785"/>
+            <a:off x="10763606" y="7890953"/>
+            <a:ext cx="8748000" cy="1038604"/>
           </a:xfrm>
           <a:prstGeom prst="rect">
             <a:avLst/>
@@ -4540,16 +4987,35 @@
           <a:lstStyle/>
           <a:p>
             <a:pPr algn="ctr"/>
-            <a:endParaRPr kumimoji="1" lang="ja-JP" altLang="en-US"/>
-          </a:p>
-        </p:txBody>
-      </p:sp>
-      <p:sp>
-        <p:nvSpPr>
-          <p:cNvPr id="15" name="正方形/長方形 14">
+            <a:r>
+              <a:rPr lang="ja-JP" altLang="en-US" sz="4800" b="1">
+                <a:solidFill>
+                  <a:schemeClr val="accent6">
+                    <a:lumMod val="75000"/>
+                  </a:schemeClr>
+                </a:solidFill>
+              </a:rPr>
+              <a:t>レ</a:t>
+            </a:r>
+            <a:r>
+              <a:rPr kumimoji="1" lang="ja-JP" altLang="en-US" sz="4800" b="1">
+                <a:solidFill>
+                  <a:schemeClr val="accent6">
+                    <a:lumMod val="75000"/>
+                  </a:schemeClr>
+                </a:solidFill>
+              </a:rPr>
+              <a:t>コメンドの現状</a:t>
+            </a:r>
+          </a:p>
+        </p:txBody>
+      </p:sp>
+      <p:sp>
+        <p:nvSpPr>
+          <p:cNvPr id="13" name="正方形/長方形 12">
             <a:extLst>
               <a:ext uri="{FF2B5EF4-FFF2-40B4-BE49-F238E27FC236}">
-                <a16:creationId xmlns:a16="http://schemas.microsoft.com/office/drawing/2014/main" id="{A574993B-6957-7E44-9D04-C5F4627315B8}"/>
+                <a16:creationId xmlns:a16="http://schemas.microsoft.com/office/drawing/2014/main" id="{13441FB1-F2D4-AC48-943A-544F778B0D8D}"/>
               </a:ext>
             </a:extLst>
           </p:cNvPr>
@@ -4558,8 +5024,8 @@
         </p:nvSpPr>
         <p:spPr>
           <a:xfrm>
-            <a:off x="10758536" y="11063157"/>
-            <a:ext cx="8748000" cy="4332786"/>
+            <a:off x="19927686" y="7899351"/>
+            <a:ext cx="8748000" cy="1038604"/>
           </a:xfrm>
           <a:prstGeom prst="rect">
             <a:avLst/>
@@ -4594,16 +5060,32 @@
           <a:lstStyle/>
           <a:p>
             <a:pPr algn="ctr"/>
-            <a:endParaRPr kumimoji="1" lang="ja-JP" altLang="en-US"/>
-          </a:p>
-        </p:txBody>
-      </p:sp>
-      <p:sp>
-        <p:nvSpPr>
-          <p:cNvPr id="16" name="正方形/長方形 15">
+            <a:r>
+              <a:rPr lang="ja-JP" altLang="en-US" sz="4800" b="1">
+                <a:solidFill>
+                  <a:schemeClr val="accent6">
+                    <a:lumMod val="75000"/>
+                  </a:schemeClr>
+                </a:solidFill>
+              </a:rPr>
+              <a:t>レビューを利用したレコメンド</a:t>
+            </a:r>
+            <a:endParaRPr kumimoji="1" lang="ja-JP" altLang="en-US" sz="4800" b="1">
+              <a:solidFill>
+                <a:schemeClr val="accent6">
+                  <a:lumMod val="75000"/>
+                </a:schemeClr>
+              </a:solidFill>
+            </a:endParaRPr>
+          </a:p>
+        </p:txBody>
+      </p:sp>
+      <p:sp>
+        <p:nvSpPr>
+          <p:cNvPr id="14" name="正方形/長方形 13">
             <a:extLst>
               <a:ext uri="{FF2B5EF4-FFF2-40B4-BE49-F238E27FC236}">
-                <a16:creationId xmlns:a16="http://schemas.microsoft.com/office/drawing/2014/main" id="{23FBFBB7-15B7-984E-BA1E-4C56F3A5EB83}"/>
+                <a16:creationId xmlns:a16="http://schemas.microsoft.com/office/drawing/2014/main" id="{8540EC16-A732-E042-B367-F88C8FE3FEB3}"/>
               </a:ext>
             </a:extLst>
           </p:cNvPr>
@@ -4612,8 +5094,8 @@
         </p:nvSpPr>
         <p:spPr>
           <a:xfrm>
-            <a:off x="19927686" y="11082749"/>
-            <a:ext cx="8748000" cy="4332787"/>
+            <a:off x="1686507" y="8929557"/>
+            <a:ext cx="8748000" cy="4332785"/>
           </a:xfrm>
           <a:prstGeom prst="rect">
             <a:avLst/>
@@ -4654,323 +5136,10 @@
       </p:sp>
       <p:sp>
         <p:nvSpPr>
-          <p:cNvPr id="17" name="テキスト ボックス 16">
+          <p:cNvPr id="15" name="正方形/長方形 14">
             <a:extLst>
               <a:ext uri="{FF2B5EF4-FFF2-40B4-BE49-F238E27FC236}">
-                <a16:creationId xmlns:a16="http://schemas.microsoft.com/office/drawing/2014/main" id="{4D3728AF-35DF-8E4B-9240-1F5333651A8B}"/>
-              </a:ext>
-            </a:extLst>
-          </p:cNvPr>
-          <p:cNvSpPr txBox="1"/>
-          <p:nvPr/>
-        </p:nvSpPr>
-        <p:spPr>
-          <a:xfrm>
-            <a:off x="2046512" y="11365812"/>
-            <a:ext cx="7952153" cy="3785652"/>
-          </a:xfrm>
-          <a:prstGeom prst="rect">
-            <a:avLst/>
-          </a:prstGeom>
-          <a:noFill/>
-        </p:spPr>
-        <p:txBody>
-          <a:bodyPr wrap="square" rtlCol="0">
-            <a:spAutoFit/>
-          </a:bodyPr>
-          <a:lstStyle/>
-          <a:p>
-            <a:pPr marL="571500" indent="-571500">
-              <a:buFont typeface="Arial" panose="020B0604020202020204" pitchFamily="34" charset="0"/>
-              <a:buChar char="•"/>
-            </a:pPr>
-            <a:r>
-              <a:rPr lang="ja-JP" altLang="en-US" sz="4800"/>
-              <a:t>地方の魅力を適切に伝えるのは困難</a:t>
-            </a:r>
-            <a:endParaRPr kumimoji="1" lang="en-US" altLang="ja-JP" sz="4800" dirty="0"/>
-          </a:p>
-          <a:p>
-            <a:pPr marL="571500" indent="-571500">
-              <a:buFont typeface="Arial" panose="020B0604020202020204" pitchFamily="34" charset="0"/>
-              <a:buChar char="•"/>
-            </a:pPr>
-            <a:r>
-              <a:rPr kumimoji="1" lang="ja-JP" altLang="en-US" sz="4800"/>
-              <a:t>訪日客のほとんどが黄金ルートと呼ばれる東京・大阪・京都に宿泊</a:t>
-            </a:r>
-          </a:p>
-        </p:txBody>
-      </p:sp>
-      <p:sp>
-        <p:nvSpPr>
-          <p:cNvPr id="20" name="テキスト ボックス 19">
-            <a:extLst>
-              <a:ext uri="{FF2B5EF4-FFF2-40B4-BE49-F238E27FC236}">
-                <a16:creationId xmlns:a16="http://schemas.microsoft.com/office/drawing/2014/main" id="{F28904FE-C633-F84F-BACC-4E65B21B061B}"/>
-              </a:ext>
-            </a:extLst>
-          </p:cNvPr>
-          <p:cNvSpPr txBox="1"/>
-          <p:nvPr/>
-        </p:nvSpPr>
-        <p:spPr>
-          <a:xfrm>
-            <a:off x="10723586" y="11191431"/>
-            <a:ext cx="8655949" cy="830997"/>
-          </a:xfrm>
-          <a:prstGeom prst="rect">
-            <a:avLst/>
-          </a:prstGeom>
-          <a:noFill/>
-        </p:spPr>
-        <p:txBody>
-          <a:bodyPr wrap="square" rtlCol="0">
-            <a:spAutoFit/>
-          </a:bodyPr>
-          <a:lstStyle/>
-          <a:p>
-            <a:r>
-              <a:rPr kumimoji="1" lang="ja-JP" altLang="en-US" sz="4800"/>
-              <a:t>・コンテンツベース</a:t>
-            </a:r>
-            <a:endParaRPr kumimoji="1" lang="en-US" altLang="ja-JP" sz="4800" dirty="0"/>
-          </a:p>
-        </p:txBody>
-      </p:sp>
-      <p:sp>
-        <p:nvSpPr>
-          <p:cNvPr id="21" name="テキスト ボックス 20">
-            <a:extLst>
-              <a:ext uri="{FF2B5EF4-FFF2-40B4-BE49-F238E27FC236}">
-                <a16:creationId xmlns:a16="http://schemas.microsoft.com/office/drawing/2014/main" id="{1888D7C8-1063-C846-B60A-348E5C81F852}"/>
-              </a:ext>
-            </a:extLst>
-          </p:cNvPr>
-          <p:cNvSpPr txBox="1"/>
-          <p:nvPr/>
-        </p:nvSpPr>
-        <p:spPr>
-          <a:xfrm>
-            <a:off x="10728066" y="12929034"/>
-            <a:ext cx="8655949" cy="830997"/>
-          </a:xfrm>
-          <a:prstGeom prst="rect">
-            <a:avLst/>
-          </a:prstGeom>
-          <a:noFill/>
-        </p:spPr>
-        <p:txBody>
-          <a:bodyPr wrap="square" rtlCol="0">
-            <a:spAutoFit/>
-          </a:bodyPr>
-          <a:lstStyle/>
-          <a:p>
-            <a:r>
-              <a:rPr kumimoji="1" lang="ja-JP" altLang="en-US" sz="4800"/>
-              <a:t>・協調フィルタリング</a:t>
-            </a:r>
-            <a:endParaRPr kumimoji="1" lang="en-US" altLang="ja-JP" sz="4800" dirty="0"/>
-          </a:p>
-        </p:txBody>
-      </p:sp>
-      <p:sp>
-        <p:nvSpPr>
-          <p:cNvPr id="22" name="テキスト ボックス 21">
-            <a:extLst>
-              <a:ext uri="{FF2B5EF4-FFF2-40B4-BE49-F238E27FC236}">
-                <a16:creationId xmlns:a16="http://schemas.microsoft.com/office/drawing/2014/main" id="{E50841C8-B4C7-504D-BA7F-1112A435E6CC}"/>
-              </a:ext>
-            </a:extLst>
-          </p:cNvPr>
-          <p:cNvSpPr txBox="1"/>
-          <p:nvPr/>
-        </p:nvSpPr>
-        <p:spPr>
-          <a:xfrm>
-            <a:off x="11315308" y="13843117"/>
-            <a:ext cx="8271907" cy="1323439"/>
-          </a:xfrm>
-          <a:prstGeom prst="rect">
-            <a:avLst/>
-          </a:prstGeom>
-          <a:noFill/>
-        </p:spPr>
-        <p:txBody>
-          <a:bodyPr wrap="square" rtlCol="0">
-            <a:spAutoFit/>
-          </a:bodyPr>
-          <a:lstStyle/>
-          <a:p>
-            <a:r>
-              <a:rPr lang="ja-JP" altLang="en-US" sz="3600">
-                <a:solidFill>
-                  <a:srgbClr val="FF0000"/>
-                </a:solidFill>
-              </a:rPr>
-              <a:t>履歴</a:t>
-            </a:r>
-            <a:r>
-              <a:rPr lang="ja-JP" altLang="en-US" sz="3600"/>
-              <a:t>を元にしているので、人気のないスポットはレコメンドされにくい</a:t>
-            </a:r>
-            <a:r>
-              <a:rPr lang="ja-JP" altLang="en-US" sz="4400"/>
-              <a:t>　</a:t>
-            </a:r>
-            <a:endParaRPr lang="en-US" altLang="ja-JP" sz="4400" dirty="0"/>
-          </a:p>
-        </p:txBody>
-      </p:sp>
-      <p:sp>
-        <p:nvSpPr>
-          <p:cNvPr id="23" name="テキスト ボックス 22">
-            <a:extLst>
-              <a:ext uri="{FF2B5EF4-FFF2-40B4-BE49-F238E27FC236}">
-                <a16:creationId xmlns:a16="http://schemas.microsoft.com/office/drawing/2014/main" id="{64F10DA5-EB81-7E47-AB96-248AC48090FC}"/>
-              </a:ext>
-            </a:extLst>
-          </p:cNvPr>
-          <p:cNvSpPr txBox="1"/>
-          <p:nvPr/>
-        </p:nvSpPr>
-        <p:spPr>
-          <a:xfrm>
-            <a:off x="11339808" y="11916243"/>
-            <a:ext cx="8271907" cy="769441"/>
-          </a:xfrm>
-          <a:prstGeom prst="rect">
-            <a:avLst/>
-          </a:prstGeom>
-          <a:noFill/>
-        </p:spPr>
-        <p:txBody>
-          <a:bodyPr wrap="square" rtlCol="0">
-            <a:spAutoFit/>
-          </a:bodyPr>
-          <a:lstStyle/>
-          <a:p>
-            <a:r>
-              <a:rPr lang="ja-JP" altLang="en-US" sz="3600"/>
-              <a:t>レコメンドの結果に</a:t>
-            </a:r>
-            <a:r>
-              <a:rPr lang="ja-JP" altLang="en-US" sz="3600">
-                <a:solidFill>
-                  <a:srgbClr val="FF0000"/>
-                </a:solidFill>
-              </a:rPr>
-              <a:t>多様性</a:t>
-            </a:r>
-            <a:r>
-              <a:rPr lang="ja-JP" altLang="en-US" sz="3600"/>
-              <a:t>がない</a:t>
-            </a:r>
-            <a:r>
-              <a:rPr lang="ja-JP" altLang="en-US" sz="4400"/>
-              <a:t>　</a:t>
-            </a:r>
-            <a:endParaRPr lang="en-US" altLang="ja-JP" sz="4400" dirty="0"/>
-          </a:p>
-        </p:txBody>
-      </p:sp>
-      <p:sp>
-        <p:nvSpPr>
-          <p:cNvPr id="24" name="テキスト ボックス 23">
-            <a:extLst>
-              <a:ext uri="{FF2B5EF4-FFF2-40B4-BE49-F238E27FC236}">
-                <a16:creationId xmlns:a16="http://schemas.microsoft.com/office/drawing/2014/main" id="{898DA034-7E82-3E49-B445-270761A1D4CA}"/>
-              </a:ext>
-            </a:extLst>
-          </p:cNvPr>
-          <p:cNvSpPr txBox="1"/>
-          <p:nvPr/>
-        </p:nvSpPr>
-        <p:spPr>
-          <a:xfrm>
-            <a:off x="5126161" y="15558128"/>
-            <a:ext cx="20650200" cy="1155060"/>
-          </a:xfrm>
-          <a:prstGeom prst="rect">
-            <a:avLst/>
-          </a:prstGeom>
-          <a:noFill/>
-        </p:spPr>
-        <p:txBody>
-          <a:bodyPr wrap="square" rtlCol="0">
-            <a:spAutoFit/>
-          </a:bodyPr>
-          <a:lstStyle/>
-          <a:p>
-            <a:r>
-              <a:rPr kumimoji="1" lang="ja-JP" altLang="en-US" sz="4800" b="1"/>
-              <a:t>目的：ユーザの入力とレビューを元に高好感度な観光地をレコメンドする</a:t>
-            </a:r>
-            <a:r>
-              <a:rPr kumimoji="1" lang="ja-JP" altLang="en-US"/>
-              <a:t>　　　　　</a:t>
-            </a:r>
-          </a:p>
-        </p:txBody>
-      </p:sp>
-      <p:sp>
-        <p:nvSpPr>
-          <p:cNvPr id="25" name="テキスト ボックス 24">
-            <a:extLst>
-              <a:ext uri="{FF2B5EF4-FFF2-40B4-BE49-F238E27FC236}">
-                <a16:creationId xmlns:a16="http://schemas.microsoft.com/office/drawing/2014/main" id="{F95B069B-AA67-F144-9525-B8CC65EBFEF3}"/>
-              </a:ext>
-            </a:extLst>
-          </p:cNvPr>
-          <p:cNvSpPr txBox="1"/>
-          <p:nvPr/>
-        </p:nvSpPr>
-        <p:spPr>
-          <a:xfrm>
-            <a:off x="20013359" y="12166557"/>
-            <a:ext cx="3927908" cy="2308324"/>
-          </a:xfrm>
-          <a:prstGeom prst="rect">
-            <a:avLst/>
-          </a:prstGeom>
-          <a:noFill/>
-        </p:spPr>
-        <p:txBody>
-          <a:bodyPr wrap="square" rtlCol="0">
-            <a:spAutoFit/>
-          </a:bodyPr>
-          <a:lstStyle/>
-          <a:p>
-            <a:pPr algn="ctr"/>
-            <a:r>
-              <a:rPr lang="ja-JP" altLang="en-US" sz="4800"/>
-              <a:t>コンテンツ</a:t>
-            </a:r>
-            <a:endParaRPr lang="en-US" altLang="ja-JP" sz="4800" dirty="0"/>
-          </a:p>
-          <a:p>
-            <a:pPr algn="ctr"/>
-            <a:r>
-              <a:rPr lang="ja-JP" altLang="en-US" sz="4800"/>
-              <a:t>＋</a:t>
-            </a:r>
-            <a:endParaRPr lang="en-US" altLang="ja-JP" sz="4800" dirty="0"/>
-          </a:p>
-          <a:p>
-            <a:pPr algn="ctr"/>
-            <a:r>
-              <a:rPr kumimoji="1" lang="ja-JP" altLang="en-US" sz="4800"/>
-              <a:t>潜在的な感情</a:t>
-            </a:r>
-          </a:p>
-        </p:txBody>
-      </p:sp>
-      <p:sp>
-        <p:nvSpPr>
-          <p:cNvPr id="27" name="右矢印 26">
-            <a:extLst>
-              <a:ext uri="{FF2B5EF4-FFF2-40B4-BE49-F238E27FC236}">
-                <a16:creationId xmlns:a16="http://schemas.microsoft.com/office/drawing/2014/main" id="{C1A68AFA-E2AB-5F4B-AA1A-44D3198B2DF9}"/>
+                <a16:creationId xmlns:a16="http://schemas.microsoft.com/office/drawing/2014/main" id="{A574993B-6957-7E44-9D04-C5F4627315B8}"/>
               </a:ext>
             </a:extLst>
           </p:cNvPr>
@@ -4979,18 +5148,14 @@
         </p:nvSpPr>
         <p:spPr>
           <a:xfrm>
-            <a:off x="23611291" y="12805511"/>
-            <a:ext cx="1150224" cy="810865"/>
-          </a:xfrm>
-          <a:prstGeom prst="rightArrow">
+            <a:off x="10758536" y="8929557"/>
+            <a:ext cx="8748000" cy="4332786"/>
+          </a:xfrm>
+          <a:prstGeom prst="rect">
             <a:avLst/>
           </a:prstGeom>
-          <a:solidFill>
-            <a:schemeClr val="accent6">
-              <a:lumMod val="75000"/>
-            </a:schemeClr>
-          </a:solidFill>
-          <a:ln>
+          <a:noFill/>
+          <a:ln w="38100">
             <a:solidFill>
               <a:schemeClr val="accent6">
                 <a:lumMod val="75000"/>
@@ -5025,71 +5190,26 @@
       </p:sp>
       <p:sp>
         <p:nvSpPr>
-          <p:cNvPr id="28" name="テキスト ボックス 27">
+          <p:cNvPr id="16" name="正方形/長方形 15">
             <a:extLst>
               <a:ext uri="{FF2B5EF4-FFF2-40B4-BE49-F238E27FC236}">
-                <a16:creationId xmlns:a16="http://schemas.microsoft.com/office/drawing/2014/main" id="{CB096CCA-D997-1742-A18B-33591CE5EE80}"/>
+                <a16:creationId xmlns:a16="http://schemas.microsoft.com/office/drawing/2014/main" id="{23FBFBB7-15B7-984E-BA1E-4C56F3A5EB83}"/>
               </a:ext>
             </a:extLst>
           </p:cNvPr>
-          <p:cNvSpPr txBox="1"/>
+          <p:cNvSpPr/>
           <p:nvPr/>
         </p:nvSpPr>
         <p:spPr>
           <a:xfrm>
-            <a:off x="24828268" y="12508143"/>
-            <a:ext cx="3877985" cy="1569660"/>
+            <a:off x="19927686" y="8944069"/>
+            <a:ext cx="8748000" cy="4332787"/>
           </a:xfrm>
           <a:prstGeom prst="rect">
             <a:avLst/>
           </a:prstGeom>
           <a:noFill/>
-        </p:spPr>
-        <p:txBody>
-          <a:bodyPr wrap="none" rtlCol="0">
-            <a:spAutoFit/>
-          </a:bodyPr>
-          <a:lstStyle/>
-          <a:p>
-            <a:r>
-              <a:rPr kumimoji="1" lang="ja-JP" altLang="en-US" sz="4800"/>
-              <a:t>多様性のある</a:t>
-            </a:r>
-            <a:endParaRPr kumimoji="1" lang="en-US" altLang="ja-JP" sz="4800" dirty="0"/>
-          </a:p>
-          <a:p>
-            <a:pPr algn="ctr"/>
-            <a:r>
-              <a:rPr kumimoji="1" lang="ja-JP" altLang="en-US" sz="4800"/>
-              <a:t>レコメンド</a:t>
-            </a:r>
-          </a:p>
-        </p:txBody>
-      </p:sp>
-      <p:sp>
-        <p:nvSpPr>
-          <p:cNvPr id="30" name="正方形/長方形 29">
-            <a:extLst>
-              <a:ext uri="{FF2B5EF4-FFF2-40B4-BE49-F238E27FC236}">
-                <a16:creationId xmlns:a16="http://schemas.microsoft.com/office/drawing/2014/main" id="{2775E092-8D0F-0C46-B3D0-4C6AA7AC6713}"/>
-              </a:ext>
-            </a:extLst>
-          </p:cNvPr>
-          <p:cNvSpPr>
-            <a:spLocks/>
-          </p:cNvSpPr>
-          <p:nvPr/>
-        </p:nvSpPr>
-        <p:spPr>
-          <a:xfrm>
-            <a:off x="1296672" y="18606437"/>
-            <a:ext cx="27643017" cy="16649227"/>
-          </a:xfrm>
-          <a:prstGeom prst="rect">
-            <a:avLst/>
-          </a:prstGeom>
-          <a:noFill/>
-          <a:ln w="44450">
+          <a:ln w="38100">
             <a:solidFill>
               <a:schemeClr val="accent6">
                 <a:lumMod val="75000"/>
@@ -5118,38 +5238,346 @@
           <a:lstStyle/>
           <a:p>
             <a:pPr algn="ctr"/>
-            <a:endParaRPr kumimoji="1" lang="ja-JP" altLang="en-US" sz="11500" b="1"/>
-          </a:p>
-        </p:txBody>
-      </p:sp>
-      <p:sp>
-        <p:nvSpPr>
-          <p:cNvPr id="31" name="正方形/長方形 30">
+            <a:endParaRPr kumimoji="1" lang="ja-JP" altLang="en-US"/>
+          </a:p>
+        </p:txBody>
+      </p:sp>
+      <p:sp>
+        <p:nvSpPr>
+          <p:cNvPr id="17" name="テキスト ボックス 16">
             <a:extLst>
               <a:ext uri="{FF2B5EF4-FFF2-40B4-BE49-F238E27FC236}">
-                <a16:creationId xmlns:a16="http://schemas.microsoft.com/office/drawing/2014/main" id="{79F19AF1-3B1F-A94B-91F8-5661E0DF196B}"/>
+                <a16:creationId xmlns:a16="http://schemas.microsoft.com/office/drawing/2014/main" id="{4D3728AF-35DF-8E4B-9240-1F5333651A8B}"/>
               </a:ext>
             </a:extLst>
           </p:cNvPr>
-          <p:cNvSpPr>
-            <a:spLocks/>
-          </p:cNvSpPr>
+          <p:cNvSpPr txBox="1"/>
           <p:nvPr/>
         </p:nvSpPr>
         <p:spPr>
           <a:xfrm>
-            <a:off x="1311028" y="17198378"/>
-            <a:ext cx="27643015" cy="1398979"/>
+            <a:off x="1972140" y="9142784"/>
+            <a:ext cx="7952153" cy="3477875"/>
           </a:xfrm>
           <a:prstGeom prst="rect">
             <a:avLst/>
           </a:prstGeom>
-          <a:solidFill>
-            <a:schemeClr val="accent6">
-              <a:lumMod val="75000"/>
-            </a:schemeClr>
-          </a:solidFill>
-          <a:ln w="44450">
+          <a:noFill/>
+        </p:spPr>
+        <p:txBody>
+          <a:bodyPr wrap="square" rtlCol="0">
+            <a:spAutoFit/>
+          </a:bodyPr>
+          <a:lstStyle/>
+          <a:p>
+            <a:pPr marL="571500" indent="-571500">
+              <a:buFont typeface="Arial" panose="020B0604020202020204" pitchFamily="34" charset="0"/>
+              <a:buChar char="•"/>
+            </a:pPr>
+            <a:r>
+              <a:rPr lang="ja-JP" altLang="en-US" sz="4400"/>
+              <a:t>訪日客のほとんどが黄金ルートと呼ばれる東京・大阪・京都に宿泊</a:t>
+            </a:r>
+            <a:endParaRPr lang="en-US" altLang="ja-JP" sz="4400" dirty="0"/>
+          </a:p>
+          <a:p>
+            <a:pPr marL="571500" indent="-571500">
+              <a:buFont typeface="Arial" panose="020B0604020202020204" pitchFamily="34" charset="0"/>
+              <a:buChar char="•"/>
+            </a:pPr>
+            <a:r>
+              <a:rPr lang="ja-JP" altLang="en-US" sz="4400"/>
+              <a:t>地方の魅力を適切に伝えるのは困難</a:t>
+            </a:r>
+            <a:endParaRPr kumimoji="1" lang="en-US" altLang="ja-JP" sz="4400" dirty="0"/>
+          </a:p>
+        </p:txBody>
+      </p:sp>
+      <p:sp>
+        <p:nvSpPr>
+          <p:cNvPr id="20" name="テキスト ボックス 19">
+            <a:extLst>
+              <a:ext uri="{FF2B5EF4-FFF2-40B4-BE49-F238E27FC236}">
+                <a16:creationId xmlns:a16="http://schemas.microsoft.com/office/drawing/2014/main" id="{F28904FE-C633-F84F-BACC-4E65B21B061B}"/>
+              </a:ext>
+            </a:extLst>
+          </p:cNvPr>
+          <p:cNvSpPr txBox="1"/>
+          <p:nvPr/>
+        </p:nvSpPr>
+        <p:spPr>
+          <a:xfrm>
+            <a:off x="10723586" y="9057831"/>
+            <a:ext cx="8655949" cy="830997"/>
+          </a:xfrm>
+          <a:prstGeom prst="rect">
+            <a:avLst/>
+          </a:prstGeom>
+          <a:noFill/>
+        </p:spPr>
+        <p:txBody>
+          <a:bodyPr wrap="square" rtlCol="0">
+            <a:spAutoFit/>
+          </a:bodyPr>
+          <a:lstStyle/>
+          <a:p>
+            <a:r>
+              <a:rPr kumimoji="1" lang="ja-JP" altLang="en-US" sz="4800"/>
+              <a:t>・コンテンツベース</a:t>
+            </a:r>
+            <a:endParaRPr kumimoji="1" lang="en-US" altLang="ja-JP" sz="4800" dirty="0"/>
+          </a:p>
+        </p:txBody>
+      </p:sp>
+      <p:sp>
+        <p:nvSpPr>
+          <p:cNvPr id="21" name="テキスト ボックス 20">
+            <a:extLst>
+              <a:ext uri="{FF2B5EF4-FFF2-40B4-BE49-F238E27FC236}">
+                <a16:creationId xmlns:a16="http://schemas.microsoft.com/office/drawing/2014/main" id="{1888D7C8-1063-C846-B60A-348E5C81F852}"/>
+              </a:ext>
+            </a:extLst>
+          </p:cNvPr>
+          <p:cNvSpPr txBox="1"/>
+          <p:nvPr/>
+        </p:nvSpPr>
+        <p:spPr>
+          <a:xfrm>
+            <a:off x="10728066" y="10795434"/>
+            <a:ext cx="8655949" cy="830997"/>
+          </a:xfrm>
+          <a:prstGeom prst="rect">
+            <a:avLst/>
+          </a:prstGeom>
+          <a:noFill/>
+        </p:spPr>
+        <p:txBody>
+          <a:bodyPr wrap="square" rtlCol="0">
+            <a:spAutoFit/>
+          </a:bodyPr>
+          <a:lstStyle/>
+          <a:p>
+            <a:r>
+              <a:rPr kumimoji="1" lang="ja-JP" altLang="en-US" sz="4800"/>
+              <a:t>・協調フィルタリング</a:t>
+            </a:r>
+            <a:endParaRPr kumimoji="1" lang="en-US" altLang="ja-JP" sz="4800" dirty="0"/>
+          </a:p>
+        </p:txBody>
+      </p:sp>
+      <p:sp>
+        <p:nvSpPr>
+          <p:cNvPr id="22" name="テキスト ボックス 21">
+            <a:extLst>
+              <a:ext uri="{FF2B5EF4-FFF2-40B4-BE49-F238E27FC236}">
+                <a16:creationId xmlns:a16="http://schemas.microsoft.com/office/drawing/2014/main" id="{E50841C8-B4C7-504D-BA7F-1112A435E6CC}"/>
+              </a:ext>
+            </a:extLst>
+          </p:cNvPr>
+          <p:cNvSpPr txBox="1"/>
+          <p:nvPr/>
+        </p:nvSpPr>
+        <p:spPr>
+          <a:xfrm>
+            <a:off x="11315308" y="11709517"/>
+            <a:ext cx="8271907" cy="1323439"/>
+          </a:xfrm>
+          <a:prstGeom prst="rect">
+            <a:avLst/>
+          </a:prstGeom>
+          <a:noFill/>
+        </p:spPr>
+        <p:txBody>
+          <a:bodyPr wrap="square" rtlCol="0">
+            <a:spAutoFit/>
+          </a:bodyPr>
+          <a:lstStyle/>
+          <a:p>
+            <a:r>
+              <a:rPr lang="ja-JP" altLang="en-US" sz="3600">
+                <a:solidFill>
+                  <a:srgbClr val="FF0000"/>
+                </a:solidFill>
+              </a:rPr>
+              <a:t>履歴</a:t>
+            </a:r>
+            <a:r>
+              <a:rPr lang="ja-JP" altLang="en-US" sz="3600"/>
+              <a:t>を元にしているので、人気のないスポットはレコメンドされにくい</a:t>
+            </a:r>
+            <a:r>
+              <a:rPr lang="ja-JP" altLang="en-US" sz="4400"/>
+              <a:t>　</a:t>
+            </a:r>
+            <a:endParaRPr lang="en-US" altLang="ja-JP" sz="4400" dirty="0"/>
+          </a:p>
+        </p:txBody>
+      </p:sp>
+      <p:sp>
+        <p:nvSpPr>
+          <p:cNvPr id="23" name="テキスト ボックス 22">
+            <a:extLst>
+              <a:ext uri="{FF2B5EF4-FFF2-40B4-BE49-F238E27FC236}">
+                <a16:creationId xmlns:a16="http://schemas.microsoft.com/office/drawing/2014/main" id="{64F10DA5-EB81-7E47-AB96-248AC48090FC}"/>
+              </a:ext>
+            </a:extLst>
+          </p:cNvPr>
+          <p:cNvSpPr txBox="1"/>
+          <p:nvPr/>
+        </p:nvSpPr>
+        <p:spPr>
+          <a:xfrm>
+            <a:off x="11339808" y="9782643"/>
+            <a:ext cx="8271907" cy="769441"/>
+          </a:xfrm>
+          <a:prstGeom prst="rect">
+            <a:avLst/>
+          </a:prstGeom>
+          <a:noFill/>
+        </p:spPr>
+        <p:txBody>
+          <a:bodyPr wrap="square" rtlCol="0">
+            <a:spAutoFit/>
+          </a:bodyPr>
+          <a:lstStyle/>
+          <a:p>
+            <a:r>
+              <a:rPr lang="ja-JP" altLang="en-US" sz="3600"/>
+              <a:t>レコメンドの結果に</a:t>
+            </a:r>
+            <a:r>
+              <a:rPr lang="ja-JP" altLang="en-US" sz="3600">
+                <a:solidFill>
+                  <a:srgbClr val="FF0000"/>
+                </a:solidFill>
+              </a:rPr>
+              <a:t>多様性</a:t>
+            </a:r>
+            <a:r>
+              <a:rPr lang="ja-JP" altLang="en-US" sz="3600"/>
+              <a:t>がない</a:t>
+            </a:r>
+            <a:r>
+              <a:rPr lang="ja-JP" altLang="en-US" sz="4400"/>
+              <a:t>　</a:t>
+            </a:r>
+            <a:endParaRPr lang="en-US" altLang="ja-JP" sz="4400" dirty="0"/>
+          </a:p>
+        </p:txBody>
+      </p:sp>
+      <p:sp>
+        <p:nvSpPr>
+          <p:cNvPr id="24" name="テキスト ボックス 23">
+            <a:extLst>
+              <a:ext uri="{FF2B5EF4-FFF2-40B4-BE49-F238E27FC236}">
+                <a16:creationId xmlns:a16="http://schemas.microsoft.com/office/drawing/2014/main" id="{898DA034-7E82-3E49-B445-270761A1D4CA}"/>
+              </a:ext>
+            </a:extLst>
+          </p:cNvPr>
+          <p:cNvSpPr txBox="1"/>
+          <p:nvPr/>
+        </p:nvSpPr>
+        <p:spPr>
+          <a:xfrm>
+            <a:off x="6116761" y="13424308"/>
+            <a:ext cx="20650200" cy="1080000"/>
+          </a:xfrm>
+          <a:prstGeom prst="rect">
+            <a:avLst/>
+          </a:prstGeom>
+          <a:noFill/>
+        </p:spPr>
+        <p:txBody>
+          <a:bodyPr wrap="square" rtlCol="0">
+            <a:spAutoFit/>
+          </a:bodyPr>
+          <a:lstStyle/>
+          <a:p>
+            <a:r>
+              <a:rPr kumimoji="1" lang="ja-JP" altLang="en-US" sz="4800" b="1"/>
+              <a:t>目的：ユーザの入力とレビューを元に高好感度な観光地をレコメンドする</a:t>
+            </a:r>
+            <a:r>
+              <a:rPr kumimoji="1" lang="ja-JP" altLang="en-US"/>
+              <a:t>　　　　　</a:t>
+            </a:r>
+          </a:p>
+        </p:txBody>
+      </p:sp>
+      <p:sp>
+        <p:nvSpPr>
+          <p:cNvPr id="25" name="テキスト ボックス 24">
+            <a:extLst>
+              <a:ext uri="{FF2B5EF4-FFF2-40B4-BE49-F238E27FC236}">
+                <a16:creationId xmlns:a16="http://schemas.microsoft.com/office/drawing/2014/main" id="{F95B069B-AA67-F144-9525-B8CC65EBFEF3}"/>
+              </a:ext>
+            </a:extLst>
+          </p:cNvPr>
+          <p:cNvSpPr txBox="1"/>
+          <p:nvPr/>
+        </p:nvSpPr>
+        <p:spPr>
+          <a:xfrm>
+            <a:off x="20013359" y="10032957"/>
+            <a:ext cx="3927908" cy="2308324"/>
+          </a:xfrm>
+          <a:prstGeom prst="rect">
+            <a:avLst/>
+          </a:prstGeom>
+          <a:noFill/>
+        </p:spPr>
+        <p:txBody>
+          <a:bodyPr wrap="square" rtlCol="0">
+            <a:spAutoFit/>
+          </a:bodyPr>
+          <a:lstStyle/>
+          <a:p>
+            <a:pPr algn="ctr"/>
+            <a:r>
+              <a:rPr lang="ja-JP" altLang="en-US" sz="4800"/>
+              <a:t>コンテンツ</a:t>
+            </a:r>
+            <a:endParaRPr lang="en-US" altLang="ja-JP" sz="4800" dirty="0"/>
+          </a:p>
+          <a:p>
+            <a:pPr algn="ctr"/>
+            <a:r>
+              <a:rPr lang="ja-JP" altLang="en-US" sz="4800"/>
+              <a:t>＋</a:t>
+            </a:r>
+            <a:endParaRPr lang="en-US" altLang="ja-JP" sz="4800" dirty="0"/>
+          </a:p>
+          <a:p>
+            <a:pPr algn="ctr"/>
+            <a:r>
+              <a:rPr kumimoji="1" lang="ja-JP" altLang="en-US" sz="4800"/>
+              <a:t>潜在的な感情</a:t>
+            </a:r>
+          </a:p>
+        </p:txBody>
+      </p:sp>
+      <p:sp>
+        <p:nvSpPr>
+          <p:cNvPr id="27" name="右矢印 26">
+            <a:extLst>
+              <a:ext uri="{FF2B5EF4-FFF2-40B4-BE49-F238E27FC236}">
+                <a16:creationId xmlns:a16="http://schemas.microsoft.com/office/drawing/2014/main" id="{C1A68AFA-E2AB-5F4B-AA1A-44D3198B2DF9}"/>
+              </a:ext>
+            </a:extLst>
+          </p:cNvPr>
+          <p:cNvSpPr/>
+          <p:nvPr/>
+        </p:nvSpPr>
+        <p:spPr>
+          <a:xfrm>
+            <a:off x="23729735" y="10566449"/>
+            <a:ext cx="1031779" cy="916327"/>
+          </a:xfrm>
+          <a:prstGeom prst="rightArrow">
+            <a:avLst/>
+          </a:prstGeom>
+          <a:noFill/>
+          <a:ln w="38100">
             <a:solidFill>
               <a:schemeClr val="accent6">
                 <a:lumMod val="75000"/>
@@ -5177,24 +5605,60 @@
           <a:bodyPr rtlCol="0" anchor="ctr"/>
           <a:lstStyle/>
           <a:p>
-            <a:r>
-              <a:rPr kumimoji="1" lang="en-US" altLang="ja-JP" sz="7200" b="1" dirty="0"/>
-              <a:t>  </a:t>
-            </a:r>
-            <a:r>
-              <a:rPr lang="ja-JP" altLang="en-US" sz="7200" b="1"/>
-              <a:t>システム概要</a:t>
-            </a:r>
-            <a:endParaRPr kumimoji="1" lang="ja-JP" altLang="en-US" sz="7200" b="1"/>
-          </a:p>
-        </p:txBody>
-      </p:sp>
-      <p:sp>
-        <p:nvSpPr>
-          <p:cNvPr id="33" name="正方形/長方形 32">
+            <a:pPr algn="ctr"/>
+            <a:endParaRPr kumimoji="1" lang="ja-JP" altLang="en-US"/>
+          </a:p>
+        </p:txBody>
+      </p:sp>
+      <p:sp>
+        <p:nvSpPr>
+          <p:cNvPr id="28" name="テキスト ボックス 27">
             <a:extLst>
               <a:ext uri="{FF2B5EF4-FFF2-40B4-BE49-F238E27FC236}">
-                <a16:creationId xmlns:a16="http://schemas.microsoft.com/office/drawing/2014/main" id="{F571C9C4-CE23-814C-A3D2-8F9A7B3F68DB}"/>
+                <a16:creationId xmlns:a16="http://schemas.microsoft.com/office/drawing/2014/main" id="{CB096CCA-D997-1742-A18B-33591CE5EE80}"/>
+              </a:ext>
+            </a:extLst>
+          </p:cNvPr>
+          <p:cNvSpPr txBox="1"/>
+          <p:nvPr/>
+        </p:nvSpPr>
+        <p:spPr>
+          <a:xfrm>
+            <a:off x="24828268" y="10374543"/>
+            <a:ext cx="3877985" cy="1569660"/>
+          </a:xfrm>
+          <a:prstGeom prst="rect">
+            <a:avLst/>
+          </a:prstGeom>
+          <a:noFill/>
+        </p:spPr>
+        <p:txBody>
+          <a:bodyPr wrap="none" rtlCol="0">
+            <a:spAutoFit/>
+          </a:bodyPr>
+          <a:lstStyle/>
+          <a:p>
+            <a:r>
+              <a:rPr kumimoji="1" lang="ja-JP" altLang="en-US" sz="4800"/>
+              <a:t>多様性のある</a:t>
+            </a:r>
+            <a:endParaRPr kumimoji="1" lang="en-US" altLang="ja-JP" sz="4800" dirty="0"/>
+          </a:p>
+          <a:p>
+            <a:pPr algn="ctr"/>
+            <a:r>
+              <a:rPr kumimoji="1" lang="ja-JP" altLang="en-US" sz="4800"/>
+              <a:t>レコメンド</a:t>
+            </a:r>
+          </a:p>
+        </p:txBody>
+      </p:sp>
+      <p:sp>
+        <p:nvSpPr>
+          <p:cNvPr id="30" name="正方形/長方形 29">
+            <a:extLst>
+              <a:ext uri="{FF2B5EF4-FFF2-40B4-BE49-F238E27FC236}">
+                <a16:creationId xmlns:a16="http://schemas.microsoft.com/office/drawing/2014/main" id="{2775E092-8D0F-0C46-B3D0-4C6AA7AC6713}"/>
               </a:ext>
             </a:extLst>
           </p:cNvPr>
@@ -5205,17 +5669,13 @@
         </p:nvSpPr>
         <p:spPr>
           <a:xfrm>
-            <a:off x="1293387" y="35701423"/>
-            <a:ext cx="27643015" cy="1398979"/>
+            <a:off x="1296672" y="16712331"/>
+            <a:ext cx="27643017" cy="19798355"/>
           </a:xfrm>
           <a:prstGeom prst="rect">
             <a:avLst/>
           </a:prstGeom>
-          <a:solidFill>
-            <a:schemeClr val="accent6">
-              <a:lumMod val="75000"/>
-            </a:schemeClr>
-          </a:solidFill>
+          <a:noFill/>
           <a:ln w="44450">
             <a:solidFill>
               <a:schemeClr val="accent6">
@@ -5244,23 +5704,17 @@
           <a:bodyPr rtlCol="0" anchor="ctr"/>
           <a:lstStyle/>
           <a:p>
-            <a:r>
-              <a:rPr kumimoji="1" lang="en-US" altLang="ja-JP" sz="7200" b="1" dirty="0"/>
-              <a:t>  </a:t>
-            </a:r>
-            <a:r>
-              <a:rPr kumimoji="1" lang="ja-JP" altLang="en-US" sz="7200" b="1"/>
-              <a:t>今後の予定</a:t>
-            </a:r>
-          </a:p>
-        </p:txBody>
-      </p:sp>
-      <p:sp>
-        <p:nvSpPr>
-          <p:cNvPr id="34" name="正方形/長方形 33">
+            <a:pPr algn="ctr"/>
+            <a:endParaRPr kumimoji="1" lang="ja-JP" altLang="en-US" sz="11500" b="1"/>
+          </a:p>
+        </p:txBody>
+      </p:sp>
+      <p:sp>
+        <p:nvSpPr>
+          <p:cNvPr id="31" name="正方形/長方形 30">
             <a:extLst>
               <a:ext uri="{FF2B5EF4-FFF2-40B4-BE49-F238E27FC236}">
-                <a16:creationId xmlns:a16="http://schemas.microsoft.com/office/drawing/2014/main" id="{249E1FBF-DBB1-CA43-949C-4DEF9BC998F4}"/>
+                <a16:creationId xmlns:a16="http://schemas.microsoft.com/office/drawing/2014/main" id="{79F19AF1-3B1F-A94B-91F8-5661E0DF196B}"/>
               </a:ext>
             </a:extLst>
           </p:cNvPr>
@@ -5271,13 +5725,17 @@
         </p:nvSpPr>
         <p:spPr>
           <a:xfrm>
-            <a:off x="1293385" y="37140875"/>
-            <a:ext cx="27643017" cy="3496257"/>
+            <a:off x="1311028" y="15238953"/>
+            <a:ext cx="27643015" cy="1398979"/>
           </a:xfrm>
           <a:prstGeom prst="rect">
             <a:avLst/>
           </a:prstGeom>
-          <a:noFill/>
+          <a:solidFill>
+            <a:schemeClr val="accent6">
+              <a:lumMod val="75000"/>
+            </a:schemeClr>
+          </a:solidFill>
           <a:ln w="44450">
             <a:solidFill>
               <a:schemeClr val="accent6">
@@ -5306,6 +5764,135 @@
           <a:bodyPr rtlCol="0" anchor="ctr"/>
           <a:lstStyle/>
           <a:p>
+            <a:r>
+              <a:rPr kumimoji="1" lang="en-US" altLang="ja-JP" sz="7200" b="1" dirty="0"/>
+              <a:t>  </a:t>
+            </a:r>
+            <a:r>
+              <a:rPr lang="ja-JP" altLang="en-US" sz="7200" b="1"/>
+              <a:t>システム概要</a:t>
+            </a:r>
+            <a:endParaRPr kumimoji="1" lang="ja-JP" altLang="en-US" sz="7200" b="1"/>
+          </a:p>
+        </p:txBody>
+      </p:sp>
+      <p:sp>
+        <p:nvSpPr>
+          <p:cNvPr id="33" name="正方形/長方形 32">
+            <a:extLst>
+              <a:ext uri="{FF2B5EF4-FFF2-40B4-BE49-F238E27FC236}">
+                <a16:creationId xmlns:a16="http://schemas.microsoft.com/office/drawing/2014/main" id="{F571C9C4-CE23-814C-A3D2-8F9A7B3F68DB}"/>
+              </a:ext>
+            </a:extLst>
+          </p:cNvPr>
+          <p:cNvSpPr>
+            <a:spLocks/>
+          </p:cNvSpPr>
+          <p:nvPr/>
+        </p:nvSpPr>
+        <p:spPr>
+          <a:xfrm>
+            <a:off x="1293387" y="37014967"/>
+            <a:ext cx="27643015" cy="1398979"/>
+          </a:xfrm>
+          <a:prstGeom prst="rect">
+            <a:avLst/>
+          </a:prstGeom>
+          <a:solidFill>
+            <a:schemeClr val="accent6">
+              <a:lumMod val="75000"/>
+            </a:schemeClr>
+          </a:solidFill>
+          <a:ln w="44450">
+            <a:solidFill>
+              <a:schemeClr val="accent6">
+                <a:lumMod val="75000"/>
+              </a:schemeClr>
+            </a:solidFill>
+          </a:ln>
+        </p:spPr>
+        <p:style>
+          <a:lnRef idx="2">
+            <a:schemeClr val="accent1">
+              <a:shade val="50000"/>
+            </a:schemeClr>
+          </a:lnRef>
+          <a:fillRef idx="1">
+            <a:schemeClr val="accent1"/>
+          </a:fillRef>
+          <a:effectRef idx="0">
+            <a:schemeClr val="accent1"/>
+          </a:effectRef>
+          <a:fontRef idx="minor">
+            <a:schemeClr val="lt1"/>
+          </a:fontRef>
+        </p:style>
+        <p:txBody>
+          <a:bodyPr rtlCol="0" anchor="ctr"/>
+          <a:lstStyle/>
+          <a:p>
+            <a:r>
+              <a:rPr kumimoji="1" lang="en-US" altLang="ja-JP" sz="7200" b="1" dirty="0"/>
+              <a:t>  </a:t>
+            </a:r>
+            <a:r>
+              <a:rPr kumimoji="1" lang="ja-JP" altLang="en-US" sz="7200" b="1"/>
+              <a:t>今後の予定</a:t>
+            </a:r>
+          </a:p>
+        </p:txBody>
+      </p:sp>
+      <p:sp>
+        <p:nvSpPr>
+          <p:cNvPr id="34" name="正方形/長方形 33">
+            <a:extLst>
+              <a:ext uri="{FF2B5EF4-FFF2-40B4-BE49-F238E27FC236}">
+                <a16:creationId xmlns:a16="http://schemas.microsoft.com/office/drawing/2014/main" id="{249E1FBF-DBB1-CA43-949C-4DEF9BC998F4}"/>
+              </a:ext>
+            </a:extLst>
+          </p:cNvPr>
+          <p:cNvSpPr>
+            <a:spLocks/>
+          </p:cNvSpPr>
+          <p:nvPr/>
+        </p:nvSpPr>
+        <p:spPr>
+          <a:xfrm>
+            <a:off x="1293385" y="38454419"/>
+            <a:ext cx="27643017" cy="3496257"/>
+          </a:xfrm>
+          <a:prstGeom prst="rect">
+            <a:avLst/>
+          </a:prstGeom>
+          <a:noFill/>
+          <a:ln w="44450">
+            <a:solidFill>
+              <a:schemeClr val="accent6">
+                <a:lumMod val="75000"/>
+              </a:schemeClr>
+            </a:solidFill>
+          </a:ln>
+        </p:spPr>
+        <p:style>
+          <a:lnRef idx="2">
+            <a:schemeClr val="accent1">
+              <a:shade val="50000"/>
+            </a:schemeClr>
+          </a:lnRef>
+          <a:fillRef idx="1">
+            <a:schemeClr val="accent1"/>
+          </a:fillRef>
+          <a:effectRef idx="0">
+            <a:schemeClr val="accent1"/>
+          </a:effectRef>
+          <a:fontRef idx="minor">
+            <a:schemeClr val="lt1"/>
+          </a:fontRef>
+        </p:style>
+        <p:txBody>
+          <a:bodyPr rtlCol="0" anchor="ctr"/>
+          <a:lstStyle/>
+          <a:p>
             <a:pPr algn="ctr"/>
             <a:endParaRPr kumimoji="1" lang="ja-JP" altLang="en-US" sz="11500" b="1"/>
           </a:p>
@@ -5325,7 +5912,7 @@
         </p:nvSpPr>
         <p:spPr>
           <a:xfrm>
-            <a:off x="1990397" y="37529310"/>
+            <a:off x="1990397" y="38842854"/>
             <a:ext cx="16978519" cy="3046988"/>
           </a:xfrm>
           <a:prstGeom prst="rect">
@@ -5402,7 +5989,7 @@
         </p:nvSpPr>
         <p:spPr>
           <a:xfrm>
-            <a:off x="1990397" y="18992803"/>
+            <a:off x="1990397" y="17037737"/>
             <a:ext cx="20259905" cy="1155060"/>
           </a:xfrm>
           <a:prstGeom prst="rect">
@@ -5454,7 +6041,7 @@
         </p:blipFill>
         <p:spPr>
           <a:xfrm>
-            <a:off x="4044818" y="28165683"/>
+            <a:off x="4044818" y="26271577"/>
             <a:ext cx="2167159" cy="1866635"/>
           </a:xfrm>
           <a:prstGeom prst="rect">
@@ -5484,7 +6071,7 @@
         </p:blipFill>
         <p:spPr>
           <a:xfrm>
-            <a:off x="2315147" y="29887935"/>
+            <a:off x="2315147" y="27993829"/>
             <a:ext cx="2173946" cy="1872481"/>
           </a:xfrm>
           <a:prstGeom prst="rect">
@@ -5514,7 +6101,7 @@
         </p:blipFill>
         <p:spPr>
           <a:xfrm>
-            <a:off x="16346214" y="28203119"/>
+            <a:off x="16346214" y="26309013"/>
             <a:ext cx="2356989" cy="2987075"/>
           </a:xfrm>
           <a:prstGeom prst="rect">
@@ -5544,7 +6131,7 @@
         </p:blipFill>
         <p:spPr>
           <a:xfrm>
-            <a:off x="25868421" y="28203119"/>
+            <a:off x="25868421" y="26309013"/>
             <a:ext cx="2356989" cy="2987075"/>
           </a:xfrm>
           <a:prstGeom prst="rect">
@@ -5566,7 +6153,7 @@
         </p:nvSpPr>
         <p:spPr>
           <a:xfrm>
-            <a:off x="6798368" y="29253786"/>
+            <a:off x="6798368" y="27359680"/>
             <a:ext cx="8778926" cy="936000"/>
           </a:xfrm>
           <a:prstGeom prst="rightArrow">
@@ -5624,7 +6211,7 @@
         </p:nvSpPr>
         <p:spPr>
           <a:xfrm>
-            <a:off x="19571423" y="29214622"/>
+            <a:off x="19571423" y="27320516"/>
             <a:ext cx="5616000" cy="936000"/>
           </a:xfrm>
           <a:prstGeom prst="rightArrow">
@@ -5682,7 +6269,7 @@
         </p:nvSpPr>
         <p:spPr>
           <a:xfrm>
-            <a:off x="1718439" y="27289393"/>
+            <a:off x="1718439" y="25395287"/>
             <a:ext cx="5724644" cy="830997"/>
           </a:xfrm>
           <a:prstGeom prst="rect">
@@ -5717,7 +6304,7 @@
         </p:nvSpPr>
         <p:spPr>
           <a:xfrm>
-            <a:off x="15577294" y="27128194"/>
+            <a:off x="15577294" y="25234088"/>
             <a:ext cx="4493538" cy="830997"/>
           </a:xfrm>
           <a:prstGeom prst="rect">
@@ -5752,7 +6339,7 @@
         </p:nvSpPr>
         <p:spPr>
           <a:xfrm>
-            <a:off x="25539371" y="27096920"/>
+            <a:off x="25539371" y="25202814"/>
             <a:ext cx="3262432" cy="830997"/>
           </a:xfrm>
           <a:prstGeom prst="rect">
@@ -5799,7 +6386,7 @@
         </p:blipFill>
         <p:spPr>
           <a:xfrm>
-            <a:off x="21117977" y="32447119"/>
+            <a:off x="21117977" y="30115268"/>
             <a:ext cx="2611759" cy="2690584"/>
           </a:xfrm>
           <a:prstGeom prst="rect">
@@ -5820,9 +6407,9 @@
           <p:nvPr/>
         </p:nvSpPr>
         <p:spPr>
-          <a:xfrm rot="7800000">
-            <a:off x="23436840" y="32609983"/>
-            <a:ext cx="3888000" cy="936000"/>
+          <a:xfrm rot="8100000">
+            <a:off x="24110838" y="30125612"/>
+            <a:ext cx="2575737" cy="936000"/>
           </a:xfrm>
           <a:prstGeom prst="leftRightArrow">
             <a:avLst/>
@@ -5879,7 +6466,7 @@
         </p:nvSpPr>
         <p:spPr>
           <a:xfrm>
-            <a:off x="20820635" y="31344917"/>
+            <a:off x="20820635" y="29013066"/>
             <a:ext cx="3206840" cy="830997"/>
           </a:xfrm>
           <a:prstGeom prst="rect">
@@ -5918,7 +6505,7 @@
         </p:nvSpPr>
         <p:spPr>
           <a:xfrm>
-            <a:off x="7260290" y="27881234"/>
+            <a:off x="7260290" y="25987128"/>
             <a:ext cx="7571303" cy="1569660"/>
           </a:xfrm>
           <a:prstGeom prst="rect">
@@ -5960,13 +6547,15 @@
         </p:nvSpPr>
         <p:spPr>
           <a:xfrm>
-            <a:off x="2657725" y="20519667"/>
+            <a:off x="2454525" y="18661121"/>
             <a:ext cx="6279820" cy="1021127"/>
           </a:xfrm>
           <a:prstGeom prst="rect">
             <a:avLst/>
           </a:prstGeom>
-          <a:noFill/>
+          <a:solidFill>
+            <a:schemeClr val="bg1"/>
+          </a:solidFill>
           <a:ln w="38100">
             <a:solidFill>
               <a:schemeClr val="accent6">
@@ -6040,13 +6629,15 @@
         </p:nvSpPr>
         <p:spPr>
           <a:xfrm>
-            <a:off x="2657725" y="21532402"/>
+            <a:off x="2454525" y="19673856"/>
             <a:ext cx="6279820" cy="4928918"/>
           </a:xfrm>
           <a:prstGeom prst="rect">
             <a:avLst/>
           </a:prstGeom>
-          <a:noFill/>
+          <a:solidFill>
+            <a:schemeClr val="bg1"/>
+          </a:solidFill>
           <a:ln w="38100">
             <a:solidFill>
               <a:schemeClr val="accent6">
@@ -6094,13 +6685,15 @@
         </p:nvSpPr>
         <p:spPr>
           <a:xfrm>
-            <a:off x="9422296" y="20512765"/>
+            <a:off x="9097176" y="18654219"/>
             <a:ext cx="11926960" cy="1021127"/>
           </a:xfrm>
           <a:prstGeom prst="rect">
             <a:avLst/>
           </a:prstGeom>
-          <a:noFill/>
+          <a:solidFill>
+            <a:schemeClr val="bg1"/>
+          </a:solidFill>
           <a:ln w="38100">
             <a:solidFill>
               <a:schemeClr val="accent6">
@@ -6167,13 +6760,15 @@
         </p:nvSpPr>
         <p:spPr>
           <a:xfrm>
-            <a:off x="9422296" y="21511584"/>
+            <a:off x="9097176" y="19653038"/>
             <a:ext cx="11926960" cy="5015334"/>
           </a:xfrm>
           <a:prstGeom prst="rect">
             <a:avLst/>
           </a:prstGeom>
-          <a:noFill/>
+          <a:solidFill>
+            <a:schemeClr val="bg1"/>
+          </a:solidFill>
           <a:ln w="38100">
             <a:solidFill>
               <a:schemeClr val="accent6">
@@ -6221,7 +6816,7 @@
         </p:nvSpPr>
         <p:spPr>
           <a:xfrm>
-            <a:off x="2996618" y="22089836"/>
+            <a:off x="2488618" y="20322730"/>
             <a:ext cx="5832884" cy="4154984"/>
           </a:xfrm>
           <a:prstGeom prst="rect">
@@ -6274,7 +6869,7 @@
         </p:nvSpPr>
         <p:spPr>
           <a:xfrm rot="5400000">
-            <a:off x="5260324" y="23637416"/>
+            <a:off x="4752324" y="21870310"/>
             <a:ext cx="1014154" cy="965694"/>
           </a:xfrm>
           <a:prstGeom prst="rightArrow">
@@ -6332,7 +6927,7 @@
         </p:nvSpPr>
         <p:spPr>
           <a:xfrm>
-            <a:off x="9893813" y="21988010"/>
+            <a:off x="9467699" y="20159255"/>
             <a:ext cx="6109595" cy="4832092"/>
           </a:xfrm>
           <a:prstGeom prst="rect">
@@ -6384,7 +6979,7 @@
         </p:nvSpPr>
         <p:spPr>
           <a:xfrm rot="5400000">
-            <a:off x="12161394" y="23643728"/>
+            <a:off x="11613272" y="21736128"/>
             <a:ext cx="1014154" cy="965694"/>
           </a:xfrm>
           <a:prstGeom prst="rightArrow">
@@ -6430,10 +7025,10 @@
       </p:sp>
       <p:sp>
         <p:nvSpPr>
-          <p:cNvPr id="78" name="四角形吹き出し 77">
+          <p:cNvPr id="80" name="正方形/長方形 79">
             <a:extLst>
               <a:ext uri="{FF2B5EF4-FFF2-40B4-BE49-F238E27FC236}">
-                <a16:creationId xmlns:a16="http://schemas.microsoft.com/office/drawing/2014/main" id="{41FDE50F-0E16-0148-9FFF-4DFF81D3533D}"/>
+                <a16:creationId xmlns:a16="http://schemas.microsoft.com/office/drawing/2014/main" id="{C211EC27-F508-FC49-BFC4-13F345E31746}"/>
               </a:ext>
             </a:extLst>
           </p:cNvPr>
@@ -6442,17 +7037,16 @@
         </p:nvSpPr>
         <p:spPr>
           <a:xfrm>
-            <a:off x="2315147" y="20194750"/>
-            <a:ext cx="25802583" cy="6594889"/>
-          </a:xfrm>
-          <a:prstGeom prst="wedgeRectCallout">
-            <a:avLst>
-              <a:gd name="adj1" fmla="val 22412"/>
-              <a:gd name="adj2" fmla="val 86082"/>
-            </a:avLst>
+            <a:off x="21334327" y="18631911"/>
+            <a:ext cx="6279820" cy="1021127"/>
+          </a:xfrm>
+          <a:prstGeom prst="rect">
+            <a:avLst/>
           </a:prstGeom>
-          <a:noFill/>
-          <a:ln>
+          <a:solidFill>
+            <a:schemeClr val="bg1"/>
+          </a:solidFill>
+          <a:ln w="38100">
             <a:solidFill>
               <a:schemeClr val="accent6">
                 <a:lumMod val="75000"/>
@@ -6481,16 +7075,25 @@
           <a:lstStyle/>
           <a:p>
             <a:pPr algn="ctr"/>
-            <a:endParaRPr kumimoji="1" lang="ja-JP" altLang="en-US"/>
-          </a:p>
-        </p:txBody>
-      </p:sp>
-      <p:sp>
-        <p:nvSpPr>
-          <p:cNvPr id="80" name="正方形/長方形 79">
+            <a:r>
+              <a:rPr kumimoji="1" lang="ja-JP" altLang="en-US" sz="4800" b="1">
+                <a:solidFill>
+                  <a:schemeClr val="accent6">
+                    <a:lumMod val="75000"/>
+                  </a:schemeClr>
+                </a:solidFill>
+              </a:rPr>
+              <a:t>③類似度算出</a:t>
+            </a:r>
+          </a:p>
+        </p:txBody>
+      </p:sp>
+      <p:sp>
+        <p:nvSpPr>
+          <p:cNvPr id="81" name="正方形/長方形 80">
             <a:extLst>
               <a:ext uri="{FF2B5EF4-FFF2-40B4-BE49-F238E27FC236}">
-                <a16:creationId xmlns:a16="http://schemas.microsoft.com/office/drawing/2014/main" id="{C211EC27-F508-FC49-BFC4-13F345E31746}"/>
+                <a16:creationId xmlns:a16="http://schemas.microsoft.com/office/drawing/2014/main" id="{844A3F01-F401-DA48-BFB9-041CCE13A668}"/>
               </a:ext>
             </a:extLst>
           </p:cNvPr>
@@ -6499,13 +7102,15 @@
         </p:nvSpPr>
         <p:spPr>
           <a:xfrm>
-            <a:off x="21689927" y="20490457"/>
-            <a:ext cx="6279820" cy="1021127"/>
+            <a:off x="21334327" y="19645970"/>
+            <a:ext cx="6279820" cy="5015334"/>
           </a:xfrm>
           <a:prstGeom prst="rect">
             <a:avLst/>
           </a:prstGeom>
-          <a:noFill/>
+          <a:solidFill>
+            <a:schemeClr val="bg1"/>
+          </a:solidFill>
           <a:ln w="38100">
             <a:solidFill>
               <a:schemeClr val="accent6">
@@ -6535,25 +7140,56 @@
           <a:lstStyle/>
           <a:p>
             <a:pPr algn="ctr"/>
-            <a:r>
-              <a:rPr kumimoji="1" lang="ja-JP" altLang="en-US" sz="4800" b="1">
-                <a:solidFill>
-                  <a:schemeClr val="accent6">
-                    <a:lumMod val="75000"/>
-                  </a:schemeClr>
-                </a:solidFill>
-              </a:rPr>
-              <a:t>③類似度算出</a:t>
-            </a:r>
-          </a:p>
-        </p:txBody>
-      </p:sp>
-      <p:sp>
-        <p:nvSpPr>
-          <p:cNvPr id="81" name="正方形/長方形 80">
+            <a:endParaRPr kumimoji="1" lang="ja-JP" altLang="en-US"/>
+          </a:p>
+        </p:txBody>
+      </p:sp>
+      <p:sp>
+        <p:nvSpPr>
+          <p:cNvPr id="82" name="テキスト ボックス 81">
             <a:extLst>
               <a:ext uri="{FF2B5EF4-FFF2-40B4-BE49-F238E27FC236}">
-                <a16:creationId xmlns:a16="http://schemas.microsoft.com/office/drawing/2014/main" id="{844A3F01-F401-DA48-BFB9-041CCE13A668}"/>
+                <a16:creationId xmlns:a16="http://schemas.microsoft.com/office/drawing/2014/main" id="{5DED6EDB-FBD1-B44D-B9EF-7A8E24D289ED}"/>
+              </a:ext>
+            </a:extLst>
+          </p:cNvPr>
+          <p:cNvSpPr txBox="1"/>
+          <p:nvPr/>
+        </p:nvSpPr>
+        <p:spPr>
+          <a:xfrm>
+            <a:off x="21504552" y="21078694"/>
+            <a:ext cx="6109595" cy="2123658"/>
+          </a:xfrm>
+          <a:prstGeom prst="rect">
+            <a:avLst/>
+          </a:prstGeom>
+          <a:noFill/>
+        </p:spPr>
+        <p:txBody>
+          <a:bodyPr wrap="square" rtlCol="0">
+            <a:spAutoFit/>
+          </a:bodyPr>
+          <a:lstStyle/>
+          <a:p>
+            <a:r>
+              <a:rPr kumimoji="1" lang="ja-JP" altLang="en-US" sz="4400"/>
+              <a:t>各スポットのトピックに対する</a:t>
+            </a:r>
+            <a:r>
+              <a:rPr lang="ja-JP" altLang="en-US" sz="4400"/>
+              <a:t>特徴ベクトルの類似度を計算</a:t>
+            </a:r>
+            <a:endParaRPr kumimoji="1" lang="ja-JP" altLang="en-US" sz="4400"/>
+          </a:p>
+        </p:txBody>
+      </p:sp>
+      <p:sp>
+        <p:nvSpPr>
+          <p:cNvPr id="85" name="左右矢印 84">
+            <a:extLst>
+              <a:ext uri="{FF2B5EF4-FFF2-40B4-BE49-F238E27FC236}">
+                <a16:creationId xmlns:a16="http://schemas.microsoft.com/office/drawing/2014/main" id="{7F359F01-5473-2C44-916D-32A76B05A527}"/>
               </a:ext>
             </a:extLst>
           </p:cNvPr>
@@ -6561,15 +7197,19 @@
           <p:nvPr/>
         </p:nvSpPr>
         <p:spPr>
-          <a:xfrm>
-            <a:off x="21689927" y="21534996"/>
-            <a:ext cx="6279820" cy="5015334"/>
-          </a:xfrm>
-          <a:prstGeom prst="rect">
+          <a:xfrm rot="2700000">
+            <a:off x="18208712" y="30145318"/>
+            <a:ext cx="2520000" cy="936000"/>
+          </a:xfrm>
+          <a:prstGeom prst="leftRightArrow">
             <a:avLst/>
           </a:prstGeom>
-          <a:noFill/>
-          <a:ln w="38100">
+          <a:solidFill>
+            <a:schemeClr val="accent6">
+              <a:lumMod val="75000"/>
+            </a:schemeClr>
+          </a:solidFill>
+          <a:ln>
             <a:solidFill>
               <a:schemeClr val="accent6">
                 <a:lumMod val="75000"/>
@@ -6604,10 +7244,10 @@
       </p:sp>
       <p:sp>
         <p:nvSpPr>
-          <p:cNvPr id="82" name="テキスト ボックス 81">
+          <p:cNvPr id="86" name="テキスト ボックス 85">
             <a:extLst>
               <a:ext uri="{FF2B5EF4-FFF2-40B4-BE49-F238E27FC236}">
-                <a16:creationId xmlns:a16="http://schemas.microsoft.com/office/drawing/2014/main" id="{5DED6EDB-FBD1-B44D-B9EF-7A8E24D289ED}"/>
+                <a16:creationId xmlns:a16="http://schemas.microsoft.com/office/drawing/2014/main" id="{9E365BE7-EED7-EC48-9CA7-4F40D567C3AA}"/>
               </a:ext>
             </a:extLst>
           </p:cNvPr>
@@ -6616,8 +7256,8 @@
         </p:nvSpPr>
         <p:spPr>
           <a:xfrm>
-            <a:off x="21860152" y="22937240"/>
-            <a:ext cx="6109595" cy="2123658"/>
+            <a:off x="18796960" y="33783387"/>
+            <a:ext cx="9726326" cy="2202206"/>
           </a:xfrm>
           <a:prstGeom prst="rect">
             <a:avLst/>
@@ -6630,24 +7270,37 @@
           </a:bodyPr>
           <a:lstStyle/>
           <a:p>
-            <a:r>
-              <a:rPr kumimoji="1" lang="ja-JP" altLang="en-US" sz="4400"/>
-              <a:t>各スポットのトピックに対する</a:t>
-            </a:r>
-            <a:r>
-              <a:rPr lang="ja-JP" altLang="en-US" sz="4400"/>
-              <a:t>特徴ベクトルのｃｏｓ類似度を計算</a:t>
-            </a:r>
-            <a:endParaRPr kumimoji="1" lang="ja-JP" altLang="en-US" sz="4400"/>
-          </a:p>
-        </p:txBody>
-      </p:sp>
-      <p:sp>
-        <p:nvSpPr>
-          <p:cNvPr id="85" name="左右矢印 84">
+            <a:pPr algn="ctr">
+              <a:lnSpc>
+                <a:spcPct val="150000"/>
+              </a:lnSpc>
+            </a:pPr>
+            <a:r>
+              <a:rPr kumimoji="1" lang="ja-JP" altLang="en-US" sz="4800"/>
+              <a:t>お気に入りのスポット情報の入力</a:t>
+            </a:r>
+            <a:endParaRPr kumimoji="1" lang="en-US" altLang="ja-JP" sz="4800" dirty="0"/>
+          </a:p>
+          <a:p>
+            <a:pPr algn="ctr">
+              <a:lnSpc>
+                <a:spcPct val="150000"/>
+              </a:lnSpc>
+            </a:pPr>
+            <a:r>
+              <a:rPr lang="ja-JP" altLang="en-US" sz="4800"/>
+              <a:t>高好感度な観光地を提案</a:t>
+            </a:r>
+            <a:endParaRPr kumimoji="1" lang="ja-JP" altLang="en-US" sz="4800"/>
+          </a:p>
+        </p:txBody>
+      </p:sp>
+      <p:sp>
+        <p:nvSpPr>
+          <p:cNvPr id="87" name="右矢印 86">
             <a:extLst>
               <a:ext uri="{FF2B5EF4-FFF2-40B4-BE49-F238E27FC236}">
-                <a16:creationId xmlns:a16="http://schemas.microsoft.com/office/drawing/2014/main" id="{7F359F01-5473-2C44-916D-32A76B05A527}"/>
+                <a16:creationId xmlns:a16="http://schemas.microsoft.com/office/drawing/2014/main" id="{5D5C2B09-C164-8246-97ED-223140B8C4E1}"/>
               </a:ext>
             </a:extLst>
           </p:cNvPr>
@@ -6655,11 +7308,11 @@
           <p:nvPr/>
         </p:nvSpPr>
         <p:spPr>
-          <a:xfrm rot="3000000">
-            <a:off x="17152946" y="32570680"/>
-            <a:ext cx="3888000" cy="936000"/>
-          </a:xfrm>
-          <a:prstGeom prst="leftRightArrow">
+          <a:xfrm>
+            <a:off x="19398303" y="35204456"/>
+            <a:ext cx="675444" cy="719538"/>
+          </a:xfrm>
+          <a:prstGeom prst="rightArrow">
             <a:avLst/>
           </a:prstGeom>
           <a:solidFill>
@@ -6702,199 +7355,6 @@
       </p:sp>
       <p:sp>
         <p:nvSpPr>
-          <p:cNvPr id="89" name="正方形/長方形 88">
-            <a:extLst>
-              <a:ext uri="{FF2B5EF4-FFF2-40B4-BE49-F238E27FC236}">
-                <a16:creationId xmlns:a16="http://schemas.microsoft.com/office/drawing/2014/main" id="{05E941E6-68E0-4A4D-BF24-5142A057DB7E}"/>
-              </a:ext>
-            </a:extLst>
-          </p:cNvPr>
-          <p:cNvSpPr/>
-          <p:nvPr/>
-        </p:nvSpPr>
-        <p:spPr>
-          <a:xfrm>
-            <a:off x="5917446" y="30750046"/>
-            <a:ext cx="10080000" cy="1021127"/>
-          </a:xfrm>
-          <a:prstGeom prst="rect">
-            <a:avLst/>
-          </a:prstGeom>
-          <a:solidFill>
-            <a:srgbClr val="EF0023"/>
-          </a:solidFill>
-          <a:ln w="38100">
-            <a:solidFill>
-              <a:srgbClr val="EF0023"/>
-            </a:solidFill>
-          </a:ln>
-        </p:spPr>
-        <p:style>
-          <a:lnRef idx="2">
-            <a:schemeClr val="accent1">
-              <a:shade val="50000"/>
-            </a:schemeClr>
-          </a:lnRef>
-          <a:fillRef idx="1">
-            <a:schemeClr val="accent1"/>
-          </a:fillRef>
-          <a:effectRef idx="0">
-            <a:schemeClr val="accent1"/>
-          </a:effectRef>
-          <a:fontRef idx="minor">
-            <a:schemeClr val="lt1"/>
-          </a:fontRef>
-        </p:style>
-        <p:txBody>
-          <a:bodyPr rtlCol="0" anchor="ctr"/>
-          <a:lstStyle/>
-          <a:p>
-            <a:pPr algn="ctr"/>
-            <a:r>
-              <a:rPr kumimoji="1" lang="en-US" altLang="ja-JP" sz="4800" b="1" dirty="0"/>
-              <a:t>Web</a:t>
-            </a:r>
-            <a:r>
-              <a:rPr kumimoji="1" lang="ja-JP" altLang="en-US" sz="4800" b="1"/>
-              <a:t>ページ</a:t>
-            </a:r>
-          </a:p>
-        </p:txBody>
-      </p:sp>
-      <p:grpSp>
-        <p:nvGrpSpPr>
-          <p:cNvPr id="92" name="グループ化 91">
-            <a:extLst>
-              <a:ext uri="{FF2B5EF4-FFF2-40B4-BE49-F238E27FC236}">
-                <a16:creationId xmlns:a16="http://schemas.microsoft.com/office/drawing/2014/main" id="{674EFF42-9CC3-434B-B40E-92EDDF65A1FE}"/>
-              </a:ext>
-            </a:extLst>
-          </p:cNvPr>
-          <p:cNvGrpSpPr/>
-          <p:nvPr/>
-        </p:nvGrpSpPr>
-        <p:grpSpPr>
-          <a:xfrm>
-            <a:off x="4938138" y="32148851"/>
-            <a:ext cx="12141807" cy="2800767"/>
-            <a:chOff x="4500514" y="32027928"/>
-            <a:chExt cx="12141807" cy="2800767"/>
-          </a:xfrm>
-        </p:grpSpPr>
-        <p:sp>
-          <p:nvSpPr>
-            <p:cNvPr id="86" name="テキスト ボックス 85">
-              <a:extLst>
-                <a:ext uri="{FF2B5EF4-FFF2-40B4-BE49-F238E27FC236}">
-                  <a16:creationId xmlns:a16="http://schemas.microsoft.com/office/drawing/2014/main" id="{9E365BE7-EED7-EC48-9CA7-4F40D567C3AA}"/>
-                </a:ext>
-              </a:extLst>
-            </p:cNvPr>
-            <p:cNvSpPr txBox="1"/>
-            <p:nvPr/>
-          </p:nvSpPr>
-          <p:spPr>
-            <a:xfrm>
-              <a:off x="4500514" y="32027928"/>
-              <a:ext cx="12141807" cy="2800767"/>
-            </a:xfrm>
-            <a:prstGeom prst="rect">
-              <a:avLst/>
-            </a:prstGeom>
-            <a:noFill/>
-          </p:spPr>
-          <p:txBody>
-            <a:bodyPr wrap="square" rtlCol="0">
-              <a:spAutoFit/>
-            </a:bodyPr>
-            <a:lstStyle/>
-            <a:p>
-              <a:pPr algn="ctr"/>
-              <a:r>
-                <a:rPr kumimoji="1" lang="ja-JP" altLang="en-US" sz="4400"/>
-                <a:t>お気に入りのスポット情報の入力</a:t>
-              </a:r>
-              <a:endParaRPr kumimoji="1" lang="en-US" altLang="ja-JP" sz="4400" dirty="0"/>
-            </a:p>
-            <a:p>
-              <a:pPr algn="ctr"/>
-              <a:endParaRPr lang="en-US" altLang="ja-JP" sz="4400" dirty="0"/>
-            </a:p>
-            <a:p>
-              <a:pPr algn="ctr"/>
-              <a:endParaRPr kumimoji="1" lang="en-US" altLang="ja-JP" sz="4400" dirty="0"/>
-            </a:p>
-            <a:p>
-              <a:pPr algn="ctr"/>
-              <a:r>
-                <a:rPr lang="ja-JP" altLang="en-US" sz="4400"/>
-                <a:t>高好感度な観光地を提案</a:t>
-              </a:r>
-              <a:endParaRPr kumimoji="1" lang="ja-JP" altLang="en-US" sz="4400"/>
-            </a:p>
-          </p:txBody>
-        </p:sp>
-        <p:sp>
-          <p:nvSpPr>
-            <p:cNvPr id="87" name="右矢印 86">
-              <a:extLst>
-                <a:ext uri="{FF2B5EF4-FFF2-40B4-BE49-F238E27FC236}">
-                  <a16:creationId xmlns:a16="http://schemas.microsoft.com/office/drawing/2014/main" id="{5D5C2B09-C164-8246-97ED-223140B8C4E1}"/>
-                </a:ext>
-              </a:extLst>
-            </p:cNvPr>
-            <p:cNvSpPr/>
-            <p:nvPr/>
-          </p:nvSpPr>
-          <p:spPr>
-            <a:xfrm rot="5400000">
-              <a:off x="9972579" y="32867109"/>
-              <a:ext cx="1014154" cy="965694"/>
-            </a:xfrm>
-            <a:prstGeom prst="rightArrow">
-              <a:avLst/>
-            </a:prstGeom>
-            <a:solidFill>
-              <a:schemeClr val="accent6">
-                <a:lumMod val="75000"/>
-              </a:schemeClr>
-            </a:solidFill>
-            <a:ln>
-              <a:solidFill>
-                <a:schemeClr val="accent6">
-                  <a:lumMod val="75000"/>
-                </a:schemeClr>
-              </a:solidFill>
-            </a:ln>
-          </p:spPr>
-          <p:style>
-            <a:lnRef idx="2">
-              <a:schemeClr val="accent1">
-                <a:shade val="50000"/>
-              </a:schemeClr>
-            </a:lnRef>
-            <a:fillRef idx="1">
-              <a:schemeClr val="accent1"/>
-            </a:fillRef>
-            <a:effectRef idx="0">
-              <a:schemeClr val="accent1"/>
-            </a:effectRef>
-            <a:fontRef idx="minor">
-              <a:schemeClr val="lt1"/>
-            </a:fontRef>
-          </p:style>
-          <p:txBody>
-            <a:bodyPr rtlCol="0" anchor="ctr"/>
-            <a:lstStyle/>
-            <a:p>
-              <a:pPr algn="ctr"/>
-              <a:endParaRPr kumimoji="1" lang="ja-JP" altLang="en-US"/>
-            </a:p>
-          </p:txBody>
-        </p:sp>
-      </p:grpSp>
-      <p:sp>
-        <p:nvSpPr>
           <p:cNvPr id="90" name="正方形/長方形 89">
             <a:extLst>
               <a:ext uri="{FF2B5EF4-FFF2-40B4-BE49-F238E27FC236}">
@@ -6907,8 +7367,8 @@
         </p:nvSpPr>
         <p:spPr>
           <a:xfrm>
-            <a:off x="5923983" y="31812181"/>
-            <a:ext cx="10080000" cy="3275163"/>
+            <a:off x="7763567" y="13511885"/>
+            <a:ext cx="18741003" cy="1021495"/>
           </a:xfrm>
           <a:prstGeom prst="rect">
             <a:avLst/>
@@ -6967,7 +7427,7 @@
         </p:blipFill>
         <p:spPr>
           <a:xfrm>
-            <a:off x="16174937" y="22492549"/>
+            <a:off x="15697417" y="20634003"/>
             <a:ext cx="4244495" cy="2993319"/>
           </a:xfrm>
           <a:prstGeom prst="rect">
@@ -6975,6 +7435,63 @@
           </a:prstGeom>
         </p:spPr>
       </p:pic>
+      <p:sp>
+        <p:nvSpPr>
+          <p:cNvPr id="96" name="正方形/長方形 95">
+            <a:extLst>
+              <a:ext uri="{FF2B5EF4-FFF2-40B4-BE49-F238E27FC236}">
+                <a16:creationId xmlns:a16="http://schemas.microsoft.com/office/drawing/2014/main" id="{96B81114-412D-694D-9900-153AB87B8DB0}"/>
+              </a:ext>
+            </a:extLst>
+          </p:cNvPr>
+          <p:cNvSpPr/>
+          <p:nvPr/>
+        </p:nvSpPr>
+        <p:spPr>
+          <a:xfrm>
+            <a:off x="5617617" y="13513715"/>
+            <a:ext cx="2160000" cy="1020820"/>
+          </a:xfrm>
+          <a:prstGeom prst="rect">
+            <a:avLst/>
+          </a:prstGeom>
+          <a:solidFill>
+            <a:srgbClr val="EF0023"/>
+          </a:solidFill>
+          <a:ln w="38100">
+            <a:solidFill>
+              <a:srgbClr val="EF0023"/>
+            </a:solidFill>
+          </a:ln>
+        </p:spPr>
+        <p:style>
+          <a:lnRef idx="2">
+            <a:schemeClr val="accent1">
+              <a:shade val="50000"/>
+            </a:schemeClr>
+          </a:lnRef>
+          <a:fillRef idx="1">
+            <a:schemeClr val="accent1"/>
+          </a:fillRef>
+          <a:effectRef idx="0">
+            <a:schemeClr val="accent1"/>
+          </a:effectRef>
+          <a:fontRef idx="minor">
+            <a:schemeClr val="lt1"/>
+          </a:fontRef>
+        </p:style>
+        <p:txBody>
+          <a:bodyPr rtlCol="0" anchor="ctr"/>
+          <a:lstStyle/>
+          <a:p>
+            <a:pPr algn="ctr"/>
+            <a:r>
+              <a:rPr kumimoji="1" lang="ja-JP" altLang="en-US" sz="4800" b="1"/>
+              <a:t>目的</a:t>
+            </a:r>
+          </a:p>
+        </p:txBody>
+      </p:sp>
     </p:spTree>
     <p:extLst>
       <p:ext uri="{BB962C8B-B14F-4D97-AF65-F5344CB8AC3E}">

</xml_diff>

<commit_message>
write down should be fixed
</commit_message>
<xml_diff>
--- a/notebooks/interrim_presentattion_poster.pptx
+++ b/notebooks/interrim_presentattion_poster.pptx
@@ -117,7 +117,7 @@
 
 <file path=ppt/commentAuthors.xml><?xml version="1.0" encoding="utf-8"?>
 <p:cmAuthorLst xmlns:a="http://schemas.openxmlformats.org/drawingml/2006/main" xmlns:r="http://schemas.openxmlformats.org/officeDocument/2006/relationships" xmlns:p="http://schemas.openxmlformats.org/presentationml/2006/main">
-  <p:cmAuthor id="1" name="和田　龍樹" initials="和田　龍樹" lastIdx="9" clrIdx="0">
+  <p:cmAuthor id="1" name="和田　龍樹" initials="和田　龍樹" lastIdx="10" clrIdx="0">
     <p:extLst>
       <p:ext uri="{19B8F6BF-5375-455C-9EA6-DF929625EA0E}">
         <p15:presenceInfo xmlns:p15="http://schemas.microsoft.com/office/powerpoint/2012/main" userId="27693e61-15af-4e20-97bf-0105e335e4cc" providerId="Windows Live"/>
@@ -195,6 +195,15 @@
   <p:cm authorId="1" dt="2018-07-17T17:54:04.204" idx="9">
     <p:pos x="10" y="10"/>
     <p:text>色目が強い</p:text>
+    <p:extLst>
+      <p:ext uri="{C676402C-5697-4E1C-873F-D02D1690AC5C}">
+        <p15:threadingInfo xmlns:p15="http://schemas.microsoft.com/office/powerpoint/2012/main" timeZoneBias="-540"/>
+      </p:ext>
+    </p:extLst>
+  </p:cm>
+  <p:cm authorId="1" dt="2018-07-24T19:47:02.869" idx="10">
+    <p:pos x="14892" y="10936"/>
+    <p:text>レコメンド対象を説明する(広くとるような説明をする)</p:text>
     <p:extLst>
       <p:ext uri="{C676402C-5697-4E1C-873F-D02D1690AC5C}">
         <p15:threadingInfo xmlns:p15="http://schemas.microsoft.com/office/powerpoint/2012/main" timeZoneBias="-540"/>
@@ -12705,13 +12714,13 @@
           <p:nvPr>
             <p:extLst>
               <p:ext uri="{D42A27DB-BD31-4B8C-83A1-F6EECF244321}">
-                <p14:modId xmlns:p14="http://schemas.microsoft.com/office/powerpoint/2010/main" val="4283496678"/>
+                <p14:modId xmlns:p14="http://schemas.microsoft.com/office/powerpoint/2010/main" val="426356299"/>
               </p:ext>
             </p:extLst>
           </p:nvPr>
         </p:nvGraphicFramePr>
         <p:xfrm>
-          <a:off x="2326308" y="32136860"/>
+          <a:off x="2326308" y="31862540"/>
           <a:ext cx="3972761" cy="3330052"/>
         </p:xfrm>
         <a:graphic>
@@ -13149,7 +13158,7 @@
         </p:nvSpPr>
         <p:spPr>
           <a:xfrm>
-            <a:off x="2146734" y="31312671"/>
+            <a:off x="2740397" y="31038351"/>
             <a:ext cx="2954655" cy="646331"/>
           </a:xfrm>
           <a:prstGeom prst="rect">
@@ -13167,7 +13176,7 @@
               <a:rPr kumimoji="1" lang="ja-JP" altLang="en-US" sz="3600"/>
               <a:t>トピック＃０</a:t>
             </a:r>
-            <a:endParaRPr kumimoji="1" lang="en-US" altLang="ja-JP" sz="3600"/>
+            <a:endParaRPr kumimoji="1" lang="en-US" altLang="ja-JP" sz="3600" dirty="0"/>
           </a:p>
         </p:txBody>
       </p:sp>
@@ -13185,8 +13194,8 @@
         </p:nvSpPr>
         <p:spPr>
           <a:xfrm>
-            <a:off x="6464677" y="31299204"/>
-            <a:ext cx="4339650" cy="646331"/>
+            <a:off x="6997946" y="31059694"/>
+            <a:ext cx="2954655" cy="646331"/>
           </a:xfrm>
           <a:prstGeom prst="rect">
             <a:avLst/>
@@ -13201,7 +13210,7 @@
           <a:p>
             <a:r>
               <a:rPr kumimoji="1" lang="ja-JP" altLang="en-US" sz="3600"/>
-              <a:t>トピック＃１の分布</a:t>
+              <a:t>トピック＃１</a:t>
             </a:r>
           </a:p>
         </p:txBody>
@@ -13221,13 +13230,13 @@
           <p:nvPr>
             <p:extLst>
               <p:ext uri="{D42A27DB-BD31-4B8C-83A1-F6EECF244321}">
-                <p14:modId xmlns:p14="http://schemas.microsoft.com/office/powerpoint/2010/main" val="1487283262"/>
+                <p14:modId xmlns:p14="http://schemas.microsoft.com/office/powerpoint/2010/main" val="2670357649"/>
               </p:ext>
             </p:extLst>
           </p:nvPr>
         </p:nvGraphicFramePr>
         <p:xfrm>
-          <a:off x="6634157" y="32117581"/>
+          <a:off x="6634157" y="31843261"/>
           <a:ext cx="3984772" cy="3330052"/>
         </p:xfrm>
         <a:graphic>
@@ -13442,7 +13451,7 @@
         </p:nvSpPr>
         <p:spPr>
           <a:xfrm>
-            <a:off x="15200270" y="31346585"/>
+            <a:off x="15200270" y="31072265"/>
             <a:ext cx="1569660" cy="646331"/>
           </a:xfrm>
           <a:prstGeom prst="rect">
@@ -13477,7 +13486,7 @@
         </p:nvSpPr>
         <p:spPr>
           <a:xfrm>
-            <a:off x="15275667" y="33587328"/>
+            <a:off x="15275667" y="33313008"/>
             <a:ext cx="1569660" cy="646331"/>
           </a:xfrm>
           <a:prstGeom prst="rect">
@@ -13512,8 +13521,8 @@
         </p:nvSpPr>
         <p:spPr>
           <a:xfrm>
-            <a:off x="19550152" y="31334015"/>
-            <a:ext cx="8494633" cy="646331"/>
+            <a:off x="20555992" y="31059695"/>
+            <a:ext cx="7109639" cy="646331"/>
           </a:xfrm>
           <a:prstGeom prst="rect">
             <a:avLst/>
@@ -13527,8 +13536,20 @@
           <a:lstStyle/>
           <a:p>
             <a:r>
+              <a:rPr lang="en-US" altLang="ja-JP" sz="3600" dirty="0"/>
+              <a:t>『</a:t>
+            </a:r>
+            <a:r>
               <a:rPr lang="ja-JP" altLang="en-US" sz="3600"/>
-              <a:t>「横浜赤レンガ倉庫」のトピックの分布</a:t>
+              <a:t>横浜赤レンガ倉庫</a:t>
+            </a:r>
+            <a:r>
+              <a:rPr lang="en-US" altLang="ja-JP" sz="3600" dirty="0"/>
+              <a:t>』</a:t>
+            </a:r>
+            <a:r>
+              <a:rPr lang="ja-JP" altLang="en-US" sz="3600"/>
+              <a:t>のトピック</a:t>
             </a:r>
           </a:p>
         </p:txBody>
@@ -13548,13 +13569,13 @@
           <p:nvPr>
             <p:extLst>
               <p:ext uri="{D42A27DB-BD31-4B8C-83A1-F6EECF244321}">
-                <p14:modId xmlns:p14="http://schemas.microsoft.com/office/powerpoint/2010/main" val="1990620695"/>
+                <p14:modId xmlns:p14="http://schemas.microsoft.com/office/powerpoint/2010/main" val="103959385"/>
               </p:ext>
             </p:extLst>
           </p:nvPr>
         </p:nvGraphicFramePr>
         <p:xfrm>
-          <a:off x="21153176" y="32136860"/>
+          <a:off x="21153176" y="31862540"/>
           <a:ext cx="6073244" cy="3330052"/>
         </p:xfrm>
         <a:graphic>
@@ -13778,8 +13799,8 @@
         </p:nvSpPr>
         <p:spPr>
           <a:xfrm>
-            <a:off x="10786034" y="31312671"/>
-            <a:ext cx="4339650" cy="646331"/>
+            <a:off x="11485994" y="31038351"/>
+            <a:ext cx="2954655" cy="646331"/>
           </a:xfrm>
           <a:prstGeom prst="rect">
             <a:avLst/>
@@ -13800,10 +13821,7 @@
               <a:rPr lang="ja-JP" altLang="en-US" sz="3600"/>
               <a:t>２</a:t>
             </a:r>
-            <a:r>
-              <a:rPr kumimoji="1" lang="ja-JP" altLang="en-US" sz="3600"/>
-              <a:t>の分布</a:t>
-            </a:r>
+            <a:endParaRPr kumimoji="1" lang="ja-JP" altLang="en-US" sz="3600"/>
           </a:p>
         </p:txBody>
       </p:sp>
@@ -13822,13 +13840,13 @@
           <p:nvPr>
             <p:extLst>
               <p:ext uri="{D42A27DB-BD31-4B8C-83A1-F6EECF244321}">
-                <p14:modId xmlns:p14="http://schemas.microsoft.com/office/powerpoint/2010/main" val="3821792087"/>
+                <p14:modId xmlns:p14="http://schemas.microsoft.com/office/powerpoint/2010/main" val="2843742382"/>
               </p:ext>
             </p:extLst>
           </p:nvPr>
         </p:nvGraphicFramePr>
         <p:xfrm>
-          <a:off x="11020270" y="32136860"/>
+          <a:off x="11020270" y="31862540"/>
           <a:ext cx="3984772" cy="3330052"/>
         </p:xfrm>
         <a:graphic>
@@ -14043,7 +14061,7 @@
         </p:nvSpPr>
         <p:spPr>
           <a:xfrm>
-            <a:off x="17732500" y="33451873"/>
+            <a:off x="17732500" y="33177553"/>
             <a:ext cx="1871880" cy="843133"/>
           </a:xfrm>
           <a:prstGeom prst="rightArrow">

</xml_diff>

<commit_message>
fix for poster presentation
</commit_message>
<xml_diff>
--- a/notebooks/interrim_presentattion_poster.pptx
+++ b/notebooks/interrim_presentattion_poster.pptx
@@ -1319,6 +1319,33 @@
               <a:rPr kumimoji="1" lang="ja-JP" altLang="en-US"/>
               <a:t>・展トピック番号じゃなくて</a:t>
             </a:r>
+            <a:endParaRPr kumimoji="1" lang="en-US" altLang="ja-JP" dirty="0"/>
+          </a:p>
+          <a:p>
+            <a:r>
+              <a:rPr kumimoji="1" lang="ja-JP" altLang="en-US"/>
+              <a:t>・黄金ルートに偏ってない？</a:t>
+            </a:r>
+            <a:endParaRPr kumimoji="1" lang="en-US" altLang="ja-JP" dirty="0"/>
+          </a:p>
+          <a:p>
+            <a:r>
+              <a:rPr kumimoji="1" lang="ja-JP" altLang="en-US"/>
+              <a:t>・レビューが少ない場所のトピックが偏りそう</a:t>
+            </a:r>
+            <a:endParaRPr kumimoji="1" lang="en-US" altLang="ja-JP" dirty="0"/>
+          </a:p>
+          <a:p>
+            <a:r>
+              <a:rPr kumimoji="1" lang="ja-JP" altLang="en-US"/>
+              <a:t>・季節を反映</a:t>
+            </a:r>
+            <a:endParaRPr kumimoji="1" lang="en-US" altLang="ja-JP" dirty="0"/>
+          </a:p>
+          <a:p>
+            <a:endParaRPr kumimoji="1" lang="en-US" altLang="ja-JP" dirty="0"/>
+          </a:p>
+          <a:p>
             <a:endParaRPr kumimoji="1" lang="en-US" altLang="ja-JP" dirty="0"/>
           </a:p>
         </p:txBody>
@@ -11279,7 +11306,7 @@
         </p:nvSpPr>
         <p:spPr>
           <a:xfrm>
-            <a:off x="2099709" y="24086268"/>
+            <a:off x="2099709" y="24247632"/>
             <a:ext cx="6279820" cy="1021127"/>
           </a:xfrm>
           <a:prstGeom prst="rect">
@@ -11367,7 +11394,7 @@
         </p:nvSpPr>
         <p:spPr>
           <a:xfrm>
-            <a:off x="2099709" y="25099003"/>
+            <a:off x="2099709" y="25260367"/>
             <a:ext cx="6279820" cy="4928918"/>
           </a:xfrm>
           <a:prstGeom prst="rect">
@@ -11426,8 +11453,8 @@
         </p:nvSpPr>
         <p:spPr>
           <a:xfrm>
-            <a:off x="2323176" y="25711736"/>
-            <a:ext cx="5832884" cy="3785652"/>
+            <a:off x="2323177" y="26944945"/>
+            <a:ext cx="5832884" cy="1323439"/>
           </a:xfrm>
           <a:prstGeom prst="rect">
             <a:avLst/>
@@ -11455,92 +11482,6 @@
               <a:t>品詞の原形を抽出</a:t>
             </a:r>
             <a:endParaRPr lang="en-US" altLang="ja-JP" sz="4000" dirty="0">
-              <a:latin typeface="Hiragino Sans W4" panose="020B0400000000000000" pitchFamily="34" charset="-128"/>
-              <a:ea typeface="Hiragino Sans W4" panose="020B0400000000000000" pitchFamily="34" charset="-128"/>
-            </a:endParaRPr>
-          </a:p>
-          <a:p>
-            <a:endParaRPr kumimoji="1" lang="en-US" altLang="ja-JP" sz="4000" dirty="0">
-              <a:latin typeface="Hiragino Sans W4" panose="020B0400000000000000" pitchFamily="34" charset="-128"/>
-              <a:ea typeface="Hiragino Sans W4" panose="020B0400000000000000" pitchFamily="34" charset="-128"/>
-            </a:endParaRPr>
-          </a:p>
-          <a:p>
-            <a:endParaRPr kumimoji="1" lang="en-US" altLang="ja-JP" sz="4000" dirty="0">
-              <a:latin typeface="Hiragino Sans W4" panose="020B0400000000000000" pitchFamily="34" charset="-128"/>
-              <a:ea typeface="Hiragino Sans W4" panose="020B0400000000000000" pitchFamily="34" charset="-128"/>
-            </a:endParaRPr>
-          </a:p>
-          <a:p>
-            <a:r>
-              <a:rPr lang="ja-JP" altLang="en-US" sz="4000">
-                <a:latin typeface="Hiragino Sans W4" panose="020B0400000000000000" pitchFamily="34" charset="-128"/>
-                <a:ea typeface="Hiragino Sans W4" panose="020B0400000000000000" pitchFamily="34" charset="-128"/>
-              </a:rPr>
-              <a:t>特徴語辞書、コーパスを作成</a:t>
-            </a:r>
-            <a:endParaRPr kumimoji="1" lang="ja-JP" altLang="en-US" sz="4000">
-              <a:latin typeface="Hiragino Sans W4" panose="020B0400000000000000" pitchFamily="34" charset="-128"/>
-              <a:ea typeface="Hiragino Sans W4" panose="020B0400000000000000" pitchFamily="34" charset="-128"/>
-            </a:endParaRPr>
-          </a:p>
-        </p:txBody>
-      </p:sp>
-      <p:sp>
-        <p:nvSpPr>
-          <p:cNvPr id="113" name="右矢印 112">
-            <a:extLst>
-              <a:ext uri="{FF2B5EF4-FFF2-40B4-BE49-F238E27FC236}">
-                <a16:creationId xmlns:a16="http://schemas.microsoft.com/office/drawing/2014/main" id="{C8DDB770-96C6-8A4D-A900-6B7021ECCDF7}"/>
-              </a:ext>
-            </a:extLst>
-          </p:cNvPr>
-          <p:cNvSpPr/>
-          <p:nvPr/>
-        </p:nvSpPr>
-        <p:spPr>
-          <a:xfrm rot="5400000">
-            <a:off x="4803362" y="27093985"/>
-            <a:ext cx="940246" cy="843133"/>
-          </a:xfrm>
-          <a:prstGeom prst="rightArrow">
-            <a:avLst/>
-          </a:prstGeom>
-          <a:solidFill>
-            <a:schemeClr val="accent6">
-              <a:lumMod val="75000"/>
-            </a:schemeClr>
-          </a:solidFill>
-          <a:ln>
-            <a:solidFill>
-              <a:schemeClr val="accent6">
-                <a:lumMod val="75000"/>
-              </a:schemeClr>
-            </a:solidFill>
-          </a:ln>
-        </p:spPr>
-        <p:style>
-          <a:lnRef idx="2">
-            <a:schemeClr val="accent1">
-              <a:shade val="50000"/>
-            </a:schemeClr>
-          </a:lnRef>
-          <a:fillRef idx="1">
-            <a:schemeClr val="accent1"/>
-          </a:fillRef>
-          <a:effectRef idx="0">
-            <a:schemeClr val="accent1"/>
-          </a:effectRef>
-          <a:fontRef idx="minor">
-            <a:schemeClr val="lt1"/>
-          </a:fontRef>
-        </p:style>
-        <p:txBody>
-          <a:bodyPr rtlCol="0" anchor="ctr"/>
-          <a:lstStyle/>
-          <a:p>
-            <a:pPr algn="ctr"/>
-            <a:endParaRPr kumimoji="1" lang="ja-JP" altLang="en-US">
               <a:latin typeface="Hiragino Sans W4" panose="020B0400000000000000" pitchFamily="34" charset="-128"/>
               <a:ea typeface="Hiragino Sans W4" panose="020B0400000000000000" pitchFamily="34" charset="-128"/>
             </a:endParaRPr>
@@ -11561,7 +11502,7 @@
         </p:nvSpPr>
         <p:spPr>
           <a:xfrm rot="5400000">
-            <a:off x="11258456" y="27161275"/>
+            <a:off x="11258456" y="27322639"/>
             <a:ext cx="1014154" cy="965694"/>
           </a:xfrm>
           <a:prstGeom prst="rightArrow">
@@ -11622,7 +11563,7 @@
         </p:nvSpPr>
         <p:spPr>
           <a:xfrm>
-            <a:off x="8734006" y="24103058"/>
+            <a:off x="8734006" y="24264422"/>
             <a:ext cx="12600000" cy="1021127"/>
           </a:xfrm>
           <a:prstGeom prst="rect">
@@ -11720,7 +11661,7 @@
         </p:nvSpPr>
         <p:spPr>
           <a:xfrm>
-            <a:off x="8734006" y="25120741"/>
+            <a:off x="8734006" y="25282105"/>
             <a:ext cx="12600000" cy="4928918"/>
           </a:xfrm>
           <a:prstGeom prst="rect">
@@ -11779,7 +11720,7 @@
         </p:nvSpPr>
         <p:spPr>
           <a:xfrm>
-            <a:off x="9183233" y="25692374"/>
+            <a:off x="9183233" y="25853738"/>
             <a:ext cx="11577033" cy="3785652"/>
           </a:xfrm>
           <a:prstGeom prst="rect">
@@ -12081,7 +12022,7 @@
         </p:nvSpPr>
         <p:spPr>
           <a:xfrm rot="5400000">
-            <a:off x="14707330" y="27713648"/>
+            <a:off x="14707330" y="27875012"/>
             <a:ext cx="940246" cy="843133"/>
           </a:xfrm>
           <a:prstGeom prst="rightArrow">
@@ -12554,7 +12495,7 @@
         </p:nvSpPr>
         <p:spPr>
           <a:xfrm>
-            <a:off x="21728813" y="24099614"/>
+            <a:off x="21728813" y="24260978"/>
             <a:ext cx="6279820" cy="1021127"/>
           </a:xfrm>
           <a:prstGeom prst="rect">
@@ -12633,7 +12574,7 @@
         </p:nvSpPr>
         <p:spPr>
           <a:xfrm>
-            <a:off x="21728813" y="25121096"/>
+            <a:off x="21728813" y="25282460"/>
             <a:ext cx="6279820" cy="4928918"/>
           </a:xfrm>
           <a:prstGeom prst="rect">
@@ -12692,7 +12633,7 @@
         </p:nvSpPr>
         <p:spPr>
           <a:xfrm>
-            <a:off x="21902592" y="26481296"/>
+            <a:off x="21902592" y="26642660"/>
             <a:ext cx="5946979" cy="1938992"/>
           </a:xfrm>
           <a:prstGeom prst="rect">
@@ -12711,7 +12652,7 @@
                 <a:latin typeface="Hiragino Sans W4" panose="020B0400000000000000" pitchFamily="34" charset="-128"/>
                 <a:ea typeface="Hiragino Sans W4" panose="020B0400000000000000" pitchFamily="34" charset="-128"/>
               </a:rPr>
-              <a:t>各レビュー文書の</a:t>
+              <a:t>各スポットの</a:t>
             </a:r>
             <a:endParaRPr lang="en-US" altLang="ja-JP" sz="4000" dirty="0">
               <a:latin typeface="Hiragino Sans W4" panose="020B0400000000000000" pitchFamily="34" charset="-128"/>
@@ -13179,13 +13120,13 @@
           <p:nvPr>
             <p:extLst>
               <p:ext uri="{D42A27DB-BD31-4B8C-83A1-F6EECF244321}">
-                <p14:modId xmlns:p14="http://schemas.microsoft.com/office/powerpoint/2010/main" val="1810530699"/>
+                <p14:modId xmlns:p14="http://schemas.microsoft.com/office/powerpoint/2010/main" val="4251162657"/>
               </p:ext>
             </p:extLst>
           </p:nvPr>
         </p:nvGraphicFramePr>
         <p:xfrm>
-          <a:off x="2122580" y="31872493"/>
+          <a:off x="2122580" y="32033857"/>
           <a:ext cx="4479690" cy="3391652"/>
         </p:xfrm>
         <a:graphic>
@@ -13671,7 +13612,7 @@
         </p:nvSpPr>
         <p:spPr>
           <a:xfrm>
-            <a:off x="2898026" y="31072264"/>
+            <a:off x="2898026" y="31233628"/>
             <a:ext cx="2954655" cy="646331"/>
           </a:xfrm>
           <a:prstGeom prst="rect">
@@ -13713,7 +13654,7 @@
         </p:nvSpPr>
         <p:spPr>
           <a:xfrm>
-            <a:off x="7743385" y="31089856"/>
+            <a:off x="7743385" y="31251220"/>
             <a:ext cx="2954655" cy="646331"/>
           </a:xfrm>
           <a:prstGeom prst="rect">
@@ -13752,13 +13693,13 @@
           <p:nvPr>
             <p:extLst>
               <p:ext uri="{D42A27DB-BD31-4B8C-83A1-F6EECF244321}">
-                <p14:modId xmlns:p14="http://schemas.microsoft.com/office/powerpoint/2010/main" val="3974778773"/>
+                <p14:modId xmlns:p14="http://schemas.microsoft.com/office/powerpoint/2010/main" val="710657566"/>
               </p:ext>
             </p:extLst>
           </p:nvPr>
         </p:nvGraphicFramePr>
         <p:xfrm>
-          <a:off x="7024490" y="31872493"/>
+          <a:off x="7024490" y="32033857"/>
           <a:ext cx="4392446" cy="3376688"/>
         </p:xfrm>
         <a:graphic>
@@ -14018,7 +13959,7 @@
         </p:nvSpPr>
         <p:spPr>
           <a:xfrm>
-            <a:off x="16907150" y="31072265"/>
+            <a:off x="16907150" y="31233629"/>
             <a:ext cx="1569660" cy="646331"/>
           </a:xfrm>
           <a:prstGeom prst="rect">
@@ -14056,7 +13997,7 @@
         </p:nvSpPr>
         <p:spPr>
           <a:xfrm>
-            <a:off x="16901147" y="33306753"/>
+            <a:off x="16901147" y="33468117"/>
             <a:ext cx="1569660" cy="646331"/>
           </a:xfrm>
           <a:prstGeom prst="rect">
@@ -14094,7 +14035,7 @@
         </p:nvSpPr>
         <p:spPr>
           <a:xfrm>
-            <a:off x="20555992" y="31059695"/>
+            <a:off x="20555992" y="31221059"/>
             <a:ext cx="7109639" cy="646331"/>
           </a:xfrm>
           <a:prstGeom prst="rect">
@@ -14154,13 +14095,13 @@
           <p:nvPr>
             <p:extLst>
               <p:ext uri="{D42A27DB-BD31-4B8C-83A1-F6EECF244321}">
-                <p14:modId xmlns:p14="http://schemas.microsoft.com/office/powerpoint/2010/main" val="91052304"/>
+                <p14:modId xmlns:p14="http://schemas.microsoft.com/office/powerpoint/2010/main" val="637599253"/>
               </p:ext>
             </p:extLst>
           </p:nvPr>
         </p:nvGraphicFramePr>
         <p:xfrm>
-          <a:off x="21354843" y="31872493"/>
+          <a:off x="21354843" y="32033857"/>
           <a:ext cx="5829862" cy="3376686"/>
         </p:xfrm>
         <a:graphic>
@@ -14438,7 +14379,7 @@
         </p:nvSpPr>
         <p:spPr>
           <a:xfrm>
-            <a:off x="12685782" y="31101164"/>
+            <a:off x="12685782" y="31262528"/>
             <a:ext cx="2954655" cy="646331"/>
           </a:xfrm>
           <a:prstGeom prst="rect">
@@ -14488,13 +14429,13 @@
           <p:nvPr>
             <p:extLst>
               <p:ext uri="{D42A27DB-BD31-4B8C-83A1-F6EECF244321}">
-                <p14:modId xmlns:p14="http://schemas.microsoft.com/office/powerpoint/2010/main" val="3217440112"/>
+                <p14:modId xmlns:p14="http://schemas.microsoft.com/office/powerpoint/2010/main" val="3996096006"/>
               </p:ext>
             </p:extLst>
           </p:nvPr>
         </p:nvGraphicFramePr>
         <p:xfrm>
-          <a:off x="11911343" y="31902255"/>
+          <a:off x="11911343" y="32063619"/>
           <a:ext cx="4411931" cy="3347464"/>
         </p:xfrm>
         <a:graphic>
@@ -14754,7 +14695,7 @@
         </p:nvSpPr>
         <p:spPr>
           <a:xfrm>
-            <a:off x="18738340" y="33177553"/>
+            <a:off x="18738340" y="33338917"/>
             <a:ext cx="1871880" cy="843133"/>
           </a:xfrm>
           <a:prstGeom prst="rightArrow">

</xml_diff>

<commit_message>
making interrim presentation poster
</commit_message>
<xml_diff>
--- a/notebooks/interrim_presentattion_poster.pptx
+++ b/notebooks/interrim_presentattion_poster.pptx
@@ -306,7 +306,7 @@
           <a:p>
             <a:fld id="{0AFE82F3-11D5-F944-89E9-B99917A57139}" type="datetimeFigureOut">
               <a:rPr kumimoji="1" lang="ja-JP" altLang="en-US" smtClean="0"/>
-              <a:t>2018/7/26</a:t>
+              <a:t>2018/7/31</a:t>
             </a:fld>
             <a:endParaRPr kumimoji="1" lang="ja-JP" altLang="en-US"/>
           </a:p>
@@ -1517,7 +1517,7 @@
           <a:p>
             <a:fld id="{70296414-D4AB-0445-AC9A-286031D4AA46}" type="datetimeFigureOut">
               <a:rPr kumimoji="1" lang="ja-JP" altLang="en-US" smtClean="0"/>
-              <a:t>2018/7/26</a:t>
+              <a:t>2018/7/31</a:t>
             </a:fld>
             <a:endParaRPr kumimoji="1" lang="ja-JP" altLang="en-US"/>
           </a:p>
@@ -1719,7 +1719,7 @@
           <a:p>
             <a:fld id="{70296414-D4AB-0445-AC9A-286031D4AA46}" type="datetimeFigureOut">
               <a:rPr kumimoji="1" lang="ja-JP" altLang="en-US" smtClean="0"/>
-              <a:t>2018/7/26</a:t>
+              <a:t>2018/7/31</a:t>
             </a:fld>
             <a:endParaRPr kumimoji="1" lang="ja-JP" altLang="en-US"/>
           </a:p>
@@ -1931,7 +1931,7 @@
           <a:p>
             <a:fld id="{70296414-D4AB-0445-AC9A-286031D4AA46}" type="datetimeFigureOut">
               <a:rPr kumimoji="1" lang="ja-JP" altLang="en-US" smtClean="0"/>
-              <a:t>2018/7/26</a:t>
+              <a:t>2018/7/31</a:t>
             </a:fld>
             <a:endParaRPr kumimoji="1" lang="ja-JP" altLang="en-US"/>
           </a:p>
@@ -2133,7 +2133,7 @@
           <a:p>
             <a:fld id="{70296414-D4AB-0445-AC9A-286031D4AA46}" type="datetimeFigureOut">
               <a:rPr kumimoji="1" lang="ja-JP" altLang="en-US" smtClean="0"/>
-              <a:t>2018/7/26</a:t>
+              <a:t>2018/7/31</a:t>
             </a:fld>
             <a:endParaRPr kumimoji="1" lang="ja-JP" altLang="en-US"/>
           </a:p>
@@ -2377,7 +2377,7 @@
           <a:p>
             <a:fld id="{70296414-D4AB-0445-AC9A-286031D4AA46}" type="datetimeFigureOut">
               <a:rPr kumimoji="1" lang="ja-JP" altLang="en-US" smtClean="0"/>
-              <a:t>2018/7/26</a:t>
+              <a:t>2018/7/31</a:t>
             </a:fld>
             <a:endParaRPr kumimoji="1" lang="ja-JP" altLang="en-US"/>
           </a:p>
@@ -2673,7 +2673,7 @@
           <a:p>
             <a:fld id="{70296414-D4AB-0445-AC9A-286031D4AA46}" type="datetimeFigureOut">
               <a:rPr kumimoji="1" lang="ja-JP" altLang="en-US" smtClean="0"/>
-              <a:t>2018/7/26</a:t>
+              <a:t>2018/7/31</a:t>
             </a:fld>
             <a:endParaRPr kumimoji="1" lang="ja-JP" altLang="en-US"/>
           </a:p>
@@ -3104,7 +3104,7 @@
           <a:p>
             <a:fld id="{70296414-D4AB-0445-AC9A-286031D4AA46}" type="datetimeFigureOut">
               <a:rPr kumimoji="1" lang="ja-JP" altLang="en-US" smtClean="0"/>
-              <a:t>2018/7/26</a:t>
+              <a:t>2018/7/31</a:t>
             </a:fld>
             <a:endParaRPr kumimoji="1" lang="ja-JP" altLang="en-US"/>
           </a:p>
@@ -3222,7 +3222,7 @@
           <a:p>
             <a:fld id="{70296414-D4AB-0445-AC9A-286031D4AA46}" type="datetimeFigureOut">
               <a:rPr kumimoji="1" lang="ja-JP" altLang="en-US" smtClean="0"/>
-              <a:t>2018/7/26</a:t>
+              <a:t>2018/7/31</a:t>
             </a:fld>
             <a:endParaRPr kumimoji="1" lang="ja-JP" altLang="en-US"/>
           </a:p>
@@ -3317,7 +3317,7 @@
           <a:p>
             <a:fld id="{70296414-D4AB-0445-AC9A-286031D4AA46}" type="datetimeFigureOut">
               <a:rPr kumimoji="1" lang="ja-JP" altLang="en-US" smtClean="0"/>
-              <a:t>2018/7/26</a:t>
+              <a:t>2018/7/31</a:t>
             </a:fld>
             <a:endParaRPr kumimoji="1" lang="ja-JP" altLang="en-US"/>
           </a:p>
@@ -3626,7 +3626,7 @@
           <a:p>
             <a:fld id="{70296414-D4AB-0445-AC9A-286031D4AA46}" type="datetimeFigureOut">
               <a:rPr kumimoji="1" lang="ja-JP" altLang="en-US" smtClean="0"/>
-              <a:t>2018/7/26</a:t>
+              <a:t>2018/7/31</a:t>
             </a:fld>
             <a:endParaRPr kumimoji="1" lang="ja-JP" altLang="en-US"/>
           </a:p>
@@ -3883,7 +3883,7 @@
           <a:p>
             <a:fld id="{70296414-D4AB-0445-AC9A-286031D4AA46}" type="datetimeFigureOut">
               <a:rPr kumimoji="1" lang="ja-JP" altLang="en-US" smtClean="0"/>
-              <a:t>2018/7/26</a:t>
+              <a:t>2018/7/31</a:t>
             </a:fld>
             <a:endParaRPr kumimoji="1" lang="ja-JP" altLang="en-US"/>
           </a:p>
@@ -4128,7 +4128,7 @@
           <a:p>
             <a:fld id="{70296414-D4AB-0445-AC9A-286031D4AA46}" type="datetimeFigureOut">
               <a:rPr kumimoji="1" lang="ja-JP" altLang="en-US" smtClean="0"/>
-              <a:t>2018/7/26</a:t>
+              <a:t>2018/7/31</a:t>
             </a:fld>
             <a:endParaRPr kumimoji="1" lang="ja-JP" altLang="en-US"/>
           </a:p>
@@ -6553,20 +6553,10 @@
           <a:p>
             <a:r>
               <a:rPr lang="ja-JP" altLang="en-US" sz="3600">
-                <a:solidFill>
-                  <a:srgbClr val="FF0000"/>
-                </a:solidFill>
                 <a:latin typeface="Hiragino Sans W4" panose="020B0400000000000000" pitchFamily="34" charset="-128"/>
                 <a:ea typeface="Hiragino Sans W4" panose="020B0400000000000000" pitchFamily="34" charset="-128"/>
               </a:rPr>
-              <a:t>履歴</a:t>
-            </a:r>
-            <a:r>
-              <a:rPr lang="ja-JP" altLang="en-US" sz="3600">
-                <a:latin typeface="Hiragino Sans W4" panose="020B0400000000000000" pitchFamily="34" charset="-128"/>
-                <a:ea typeface="Hiragino Sans W4" panose="020B0400000000000000" pitchFamily="34" charset="-128"/>
-              </a:rPr>
-              <a:t>を元にしているので、人気のないスポットはレコメンドされにくい</a:t>
+              <a:t>レコメンドの結果に対して理由づけがなされない</a:t>
             </a:r>
             <a:r>
               <a:rPr lang="ja-JP" altLang="en-US" sz="4400">
@@ -11306,8 +11296,8 @@
         </p:nvSpPr>
         <p:spPr>
           <a:xfrm>
-            <a:off x="2099709" y="24247632"/>
-            <a:ext cx="6279820" cy="1021127"/>
+            <a:off x="2185161" y="25101905"/>
+            <a:ext cx="12600000" cy="1021127"/>
           </a:xfrm>
           <a:prstGeom prst="rect">
             <a:avLst/>
@@ -11394,8 +11384,8 @@
         </p:nvSpPr>
         <p:spPr>
           <a:xfrm>
-            <a:off x="2099709" y="25260367"/>
-            <a:ext cx="6279820" cy="4928918"/>
+            <a:off x="2185161" y="26114639"/>
+            <a:ext cx="12600000" cy="1152000"/>
           </a:xfrm>
           <a:prstGeom prst="rect">
             <a:avLst/>
@@ -11453,8 +11443,8 @@
         </p:nvSpPr>
         <p:spPr>
           <a:xfrm>
-            <a:off x="2323177" y="26944945"/>
-            <a:ext cx="5832884" cy="1323439"/>
+            <a:off x="4238055" y="26390210"/>
+            <a:ext cx="8781106" cy="734059"/>
           </a:xfrm>
           <a:prstGeom prst="rect">
             <a:avLst/>
@@ -11502,7 +11492,7 @@
         </p:nvSpPr>
         <p:spPr>
           <a:xfrm rot="5400000">
-            <a:off x="11258456" y="27322639"/>
+            <a:off x="4709611" y="30695194"/>
             <a:ext cx="1014154" cy="965694"/>
           </a:xfrm>
           <a:prstGeom prst="rightArrow">
@@ -11563,7 +11553,7 @@
         </p:nvSpPr>
         <p:spPr>
           <a:xfrm>
-            <a:off x="8734006" y="24264422"/>
+            <a:off x="2185161" y="27636977"/>
             <a:ext cx="12600000" cy="1021127"/>
           </a:xfrm>
           <a:prstGeom prst="rect">
@@ -11661,8 +11651,8 @@
         </p:nvSpPr>
         <p:spPr>
           <a:xfrm>
-            <a:off x="8734006" y="25282105"/>
-            <a:ext cx="12600000" cy="4928918"/>
+            <a:off x="2185161" y="28654660"/>
+            <a:ext cx="12600000" cy="4448192"/>
           </a:xfrm>
           <a:prstGeom prst="rect">
             <a:avLst/>
@@ -11720,7 +11710,7 @@
         </p:nvSpPr>
         <p:spPr>
           <a:xfrm>
-            <a:off x="9183233" y="25853738"/>
+            <a:off x="2788525" y="28955438"/>
             <a:ext cx="11577033" cy="3785652"/>
           </a:xfrm>
           <a:prstGeom prst="rect">
@@ -12022,7 +12012,7 @@
         </p:nvSpPr>
         <p:spPr>
           <a:xfrm rot="5400000">
-            <a:off x="14707330" y="27875012"/>
+            <a:off x="8158485" y="31247567"/>
             <a:ext cx="940246" cy="843133"/>
           </a:xfrm>
           <a:prstGeom prst="rightArrow">
@@ -12495,8 +12485,8 @@
         </p:nvSpPr>
         <p:spPr>
           <a:xfrm>
-            <a:off x="21728813" y="24260978"/>
-            <a:ext cx="6279820" cy="1021127"/>
+            <a:off x="2185161" y="33514125"/>
+            <a:ext cx="12600000" cy="1021127"/>
           </a:xfrm>
           <a:prstGeom prst="rect">
             <a:avLst/>
@@ -12574,8 +12564,8 @@
         </p:nvSpPr>
         <p:spPr>
           <a:xfrm>
-            <a:off x="21728813" y="25282460"/>
-            <a:ext cx="6279820" cy="4928918"/>
+            <a:off x="2185161" y="34535607"/>
+            <a:ext cx="12600000" cy="1152000"/>
           </a:xfrm>
           <a:prstGeom prst="rect">
             <a:avLst/>
@@ -12633,8 +12623,8 @@
         </p:nvSpPr>
         <p:spPr>
           <a:xfrm>
-            <a:off x="21902592" y="26642660"/>
-            <a:ext cx="5946979" cy="1938992"/>
+            <a:off x="3208789" y="34852124"/>
+            <a:ext cx="10660221" cy="707886"/>
           </a:xfrm>
           <a:prstGeom prst="rect">
             <a:avLst/>
@@ -12652,20 +12642,7 @@
                 <a:latin typeface="Hiragino Sans W4" panose="020B0400000000000000" pitchFamily="34" charset="-128"/>
                 <a:ea typeface="Hiragino Sans W4" panose="020B0400000000000000" pitchFamily="34" charset="-128"/>
               </a:rPr>
-              <a:t>各スポットの</a:t>
-            </a:r>
-            <a:endParaRPr lang="en-US" altLang="ja-JP" sz="4000" dirty="0">
-              <a:latin typeface="Hiragino Sans W4" panose="020B0400000000000000" pitchFamily="34" charset="-128"/>
-              <a:ea typeface="Hiragino Sans W4" panose="020B0400000000000000" pitchFamily="34" charset="-128"/>
-            </a:endParaRPr>
-          </a:p>
-          <a:p>
-            <a:r>
-              <a:rPr lang="ja-JP" altLang="en-US" sz="4000">
-                <a:latin typeface="Hiragino Sans W4" panose="020B0400000000000000" pitchFamily="34" charset="-128"/>
-                <a:ea typeface="Hiragino Sans W4" panose="020B0400000000000000" pitchFamily="34" charset="-128"/>
-              </a:rPr>
-              <a:t>トピックの分布の類似度を算出</a:t>
+              <a:t>各スポットのトピックの分布の類似度を算出</a:t>
             </a:r>
             <a:endParaRPr kumimoji="1" lang="en-US" altLang="ja-JP" sz="4000" dirty="0">
               <a:latin typeface="Hiragino Sans W4" panose="020B0400000000000000" pitchFamily="34" charset="-128"/>
@@ -13120,13 +13097,13 @@
           <p:nvPr>
             <p:extLst>
               <p:ext uri="{D42A27DB-BD31-4B8C-83A1-F6EECF244321}">
-                <p14:modId xmlns:p14="http://schemas.microsoft.com/office/powerpoint/2010/main" val="4251162657"/>
+                <p14:modId xmlns:p14="http://schemas.microsoft.com/office/powerpoint/2010/main" val="3094860152"/>
               </p:ext>
             </p:extLst>
           </p:nvPr>
         </p:nvGraphicFramePr>
         <p:xfrm>
-          <a:off x="2122580" y="32033857"/>
+          <a:off x="-58409406" y="24210876"/>
           <a:ext cx="4479690" cy="3391652"/>
         </p:xfrm>
         <a:graphic>
@@ -13612,7 +13589,7 @@
         </p:nvSpPr>
         <p:spPr>
           <a:xfrm>
-            <a:off x="2898026" y="31233628"/>
+            <a:off x="-57633960" y="23410647"/>
             <a:ext cx="2954655" cy="646331"/>
           </a:xfrm>
           <a:prstGeom prst="rect">
@@ -13654,7 +13631,7 @@
         </p:nvSpPr>
         <p:spPr>
           <a:xfrm>
-            <a:off x="7743385" y="31251220"/>
+            <a:off x="-52788601" y="23428239"/>
             <a:ext cx="2954655" cy="646331"/>
           </a:xfrm>
           <a:prstGeom prst="rect">
@@ -13693,13 +13670,13 @@
           <p:nvPr>
             <p:extLst>
               <p:ext uri="{D42A27DB-BD31-4B8C-83A1-F6EECF244321}">
-                <p14:modId xmlns:p14="http://schemas.microsoft.com/office/powerpoint/2010/main" val="710657566"/>
+                <p14:modId xmlns:p14="http://schemas.microsoft.com/office/powerpoint/2010/main" val="2332432679"/>
               </p:ext>
             </p:extLst>
           </p:nvPr>
         </p:nvGraphicFramePr>
         <p:xfrm>
-          <a:off x="7024490" y="32033857"/>
+          <a:off x="-53507496" y="24210876"/>
           <a:ext cx="4392446" cy="3376688"/>
         </p:xfrm>
         <a:graphic>
@@ -13959,7 +13936,7 @@
         </p:nvSpPr>
         <p:spPr>
           <a:xfrm>
-            <a:off x="16907150" y="31233629"/>
+            <a:off x="-43624836" y="23410648"/>
             <a:ext cx="1569660" cy="646331"/>
           </a:xfrm>
           <a:prstGeom prst="rect">
@@ -13997,7 +13974,7 @@
         </p:nvSpPr>
         <p:spPr>
           <a:xfrm>
-            <a:off x="16901147" y="33468117"/>
+            <a:off x="-43630839" y="25645136"/>
             <a:ext cx="1569660" cy="646331"/>
           </a:xfrm>
           <a:prstGeom prst="rect">
@@ -14035,7 +14012,7 @@
         </p:nvSpPr>
         <p:spPr>
           <a:xfrm>
-            <a:off x="20555992" y="31221059"/>
+            <a:off x="-39975994" y="23398078"/>
             <a:ext cx="7109639" cy="646331"/>
           </a:xfrm>
           <a:prstGeom prst="rect">
@@ -14095,13 +14072,13 @@
           <p:nvPr>
             <p:extLst>
               <p:ext uri="{D42A27DB-BD31-4B8C-83A1-F6EECF244321}">
-                <p14:modId xmlns:p14="http://schemas.microsoft.com/office/powerpoint/2010/main" val="637599253"/>
+                <p14:modId xmlns:p14="http://schemas.microsoft.com/office/powerpoint/2010/main" val="2477452845"/>
               </p:ext>
             </p:extLst>
           </p:nvPr>
         </p:nvGraphicFramePr>
         <p:xfrm>
-          <a:off x="21354843" y="32033857"/>
+          <a:off x="-39177143" y="24210876"/>
           <a:ext cx="5829862" cy="3376686"/>
         </p:xfrm>
         <a:graphic>
@@ -14379,7 +14356,7 @@
         </p:nvSpPr>
         <p:spPr>
           <a:xfrm>
-            <a:off x="12685782" y="31262528"/>
+            <a:off x="-47846204" y="23439547"/>
             <a:ext cx="2954655" cy="646331"/>
           </a:xfrm>
           <a:prstGeom prst="rect">
@@ -14429,13 +14406,13 @@
           <p:nvPr>
             <p:extLst>
               <p:ext uri="{D42A27DB-BD31-4B8C-83A1-F6EECF244321}">
-                <p14:modId xmlns:p14="http://schemas.microsoft.com/office/powerpoint/2010/main" val="3996096006"/>
+                <p14:modId xmlns:p14="http://schemas.microsoft.com/office/powerpoint/2010/main" val="3890842882"/>
               </p:ext>
             </p:extLst>
           </p:nvPr>
         </p:nvGraphicFramePr>
         <p:xfrm>
-          <a:off x="11911343" y="32063619"/>
+          <a:off x="-48620643" y="24240638"/>
           <a:ext cx="4411931" cy="3347464"/>
         </p:xfrm>
         <a:graphic>
@@ -14695,7 +14672,7 @@
         </p:nvSpPr>
         <p:spPr>
           <a:xfrm>
-            <a:off x="18738340" y="33338917"/>
+            <a:off x="-41793646" y="25515936"/>
             <a:ext cx="1871880" cy="843133"/>
           </a:xfrm>
           <a:prstGeom prst="rightArrow">
@@ -14739,6 +14716,525 @@
               <a:latin typeface="Hiragino Sans W4" panose="020B0400000000000000" pitchFamily="34" charset="-128"/>
               <a:ea typeface="Hiragino Sans W4" panose="020B0400000000000000" pitchFamily="34" charset="-128"/>
             </a:endParaRPr>
+          </a:p>
+        </p:txBody>
+      </p:sp>
+      <p:sp>
+        <p:nvSpPr>
+          <p:cNvPr id="131" name="正方形/長方形 130">
+            <a:extLst>
+              <a:ext uri="{FF2B5EF4-FFF2-40B4-BE49-F238E27FC236}">
+                <a16:creationId xmlns:a16="http://schemas.microsoft.com/office/drawing/2014/main" id="{3075F35A-DE06-4D4B-A69D-CB785433EA6F}"/>
+              </a:ext>
+            </a:extLst>
+          </p:cNvPr>
+          <p:cNvSpPr>
+            <a:spLocks/>
+          </p:cNvSpPr>
+          <p:nvPr/>
+        </p:nvSpPr>
+        <p:spPr>
+          <a:xfrm>
+            <a:off x="1846082" y="23870008"/>
+            <a:ext cx="26423736" cy="953082"/>
+          </a:xfrm>
+          <a:prstGeom prst="rect">
+            <a:avLst/>
+          </a:prstGeom>
+          <a:solidFill>
+            <a:schemeClr val="accent6">
+              <a:lumMod val="75000"/>
+            </a:schemeClr>
+          </a:solidFill>
+          <a:ln w="44450">
+            <a:solidFill>
+              <a:schemeClr val="accent6">
+                <a:lumMod val="75000"/>
+              </a:schemeClr>
+            </a:solidFill>
+          </a:ln>
+        </p:spPr>
+        <p:style>
+          <a:lnRef idx="2">
+            <a:schemeClr val="accent1">
+              <a:shade val="50000"/>
+            </a:schemeClr>
+          </a:lnRef>
+          <a:fillRef idx="1">
+            <a:schemeClr val="accent1"/>
+          </a:fillRef>
+          <a:effectRef idx="0">
+            <a:schemeClr val="accent1"/>
+          </a:effectRef>
+          <a:fontRef idx="minor">
+            <a:schemeClr val="lt1"/>
+          </a:fontRef>
+        </p:style>
+        <p:txBody>
+          <a:bodyPr rtlCol="0" anchor="ctr"/>
+          <a:lstStyle/>
+          <a:p>
+            <a:r>
+              <a:rPr kumimoji="1" lang="en-US" altLang="ja-JP" sz="6600" b="1" dirty="0">
+                <a:latin typeface="Hiragino Sans W4" panose="020B0400000000000000" pitchFamily="34" charset="-128"/>
+                <a:ea typeface="Hiragino Sans W4" panose="020B0400000000000000" pitchFamily="34" charset="-128"/>
+              </a:rPr>
+              <a:t>  </a:t>
+            </a:r>
+            <a:r>
+              <a:rPr lang="ja-JP" altLang="en-US" sz="4800" b="1">
+                <a:latin typeface="Hiragino Sans W4" panose="020B0400000000000000" pitchFamily="34" charset="-128"/>
+                <a:ea typeface="Hiragino Sans W4" panose="020B0400000000000000" pitchFamily="34" charset="-128"/>
+              </a:rPr>
+              <a:t>類似度算出</a:t>
+            </a:r>
+            <a:endParaRPr kumimoji="1" lang="ja-JP" altLang="en-US" sz="6600" b="1">
+              <a:latin typeface="Hiragino Sans W4" panose="020B0400000000000000" pitchFamily="34" charset="-128"/>
+              <a:ea typeface="Hiragino Sans W4" panose="020B0400000000000000" pitchFamily="34" charset="-128"/>
+            </a:endParaRPr>
+          </a:p>
+        </p:txBody>
+      </p:sp>
+      <p:sp>
+        <p:nvSpPr>
+          <p:cNvPr id="10" name="テキスト ボックス 9">
+            <a:extLst>
+              <a:ext uri="{FF2B5EF4-FFF2-40B4-BE49-F238E27FC236}">
+                <a16:creationId xmlns:a16="http://schemas.microsoft.com/office/drawing/2014/main" id="{15B8E1DC-4077-5D42-B75D-2ED4208D6BD8}"/>
+              </a:ext>
+            </a:extLst>
+          </p:cNvPr>
+          <p:cNvSpPr txBox="1"/>
+          <p:nvPr/>
+        </p:nvSpPr>
+        <p:spPr>
+          <a:xfrm>
+            <a:off x="15478660" y="25283642"/>
+            <a:ext cx="2085007" cy="830997"/>
+          </a:xfrm>
+          <a:prstGeom prst="rect">
+            <a:avLst/>
+          </a:prstGeom>
+          <a:noFill/>
+        </p:spPr>
+        <p:txBody>
+          <a:bodyPr wrap="square" rtlCol="0">
+            <a:spAutoFit/>
+          </a:bodyPr>
+          <a:lstStyle/>
+          <a:p>
+            <a:r>
+              <a:rPr lang="en-US" altLang="ja-JP" sz="4800" b="1" dirty="0">
+                <a:solidFill>
+                  <a:schemeClr val="accent6">
+                    <a:lumMod val="75000"/>
+                  </a:schemeClr>
+                </a:solidFill>
+                <a:latin typeface="Hiragino Sans W4" panose="020B0400000000000000" pitchFamily="34" charset="-128"/>
+                <a:ea typeface="Hiragino Sans W4" panose="020B0400000000000000" pitchFamily="34" charset="-128"/>
+              </a:rPr>
+              <a:t>②</a:t>
+            </a:r>
+            <a:endParaRPr kumimoji="1" lang="ja-JP" altLang="en-US" sz="4800" b="1">
+              <a:solidFill>
+                <a:schemeClr val="accent6">
+                  <a:lumMod val="75000"/>
+                </a:schemeClr>
+              </a:solidFill>
+              <a:latin typeface="Hiragino Sans W4" panose="020B0400000000000000" pitchFamily="34" charset="-128"/>
+              <a:ea typeface="Hiragino Sans W4" panose="020B0400000000000000" pitchFamily="34" charset="-128"/>
+            </a:endParaRPr>
+          </a:p>
+        </p:txBody>
+      </p:sp>
+      <p:cxnSp>
+        <p:nvCxnSpPr>
+          <p:cNvPr id="29" name="直線コネクタ 28">
+            <a:extLst>
+              <a:ext uri="{FF2B5EF4-FFF2-40B4-BE49-F238E27FC236}">
+                <a16:creationId xmlns:a16="http://schemas.microsoft.com/office/drawing/2014/main" id="{D2451818-06FA-B24D-90E3-8A02FBB36308}"/>
+              </a:ext>
+            </a:extLst>
+          </p:cNvPr>
+          <p:cNvCxnSpPr/>
+          <p:nvPr/>
+        </p:nvCxnSpPr>
+        <p:spPr>
+          <a:xfrm>
+            <a:off x="15136813" y="24823090"/>
+            <a:ext cx="0" cy="11143309"/>
+          </a:xfrm>
+          <a:prstGeom prst="line">
+            <a:avLst/>
+          </a:prstGeom>
+          <a:ln w="44450">
+            <a:solidFill>
+              <a:schemeClr val="accent6">
+                <a:lumMod val="75000"/>
+              </a:schemeClr>
+            </a:solidFill>
+          </a:ln>
+        </p:spPr>
+        <p:style>
+          <a:lnRef idx="1">
+            <a:schemeClr val="accent1"/>
+          </a:lnRef>
+          <a:fillRef idx="0">
+            <a:schemeClr val="accent1"/>
+          </a:fillRef>
+          <a:effectRef idx="0">
+            <a:schemeClr val="accent1"/>
+          </a:effectRef>
+          <a:fontRef idx="minor">
+            <a:schemeClr val="tx1"/>
+          </a:fontRef>
+        </p:style>
+      </p:cxnSp>
+      <p:sp>
+        <p:nvSpPr>
+          <p:cNvPr id="32" name="正方形/長方形 31">
+            <a:extLst>
+              <a:ext uri="{FF2B5EF4-FFF2-40B4-BE49-F238E27FC236}">
+                <a16:creationId xmlns:a16="http://schemas.microsoft.com/office/drawing/2014/main" id="{DCD4D1F2-8961-9F42-AF53-D4C910651392}"/>
+              </a:ext>
+            </a:extLst>
+          </p:cNvPr>
+          <p:cNvSpPr/>
+          <p:nvPr/>
+        </p:nvSpPr>
+        <p:spPr>
+          <a:xfrm>
+            <a:off x="16696435" y="26461066"/>
+            <a:ext cx="1036192" cy="1865171"/>
+          </a:xfrm>
+          <a:prstGeom prst="rect">
+            <a:avLst/>
+          </a:prstGeom>
+          <a:solidFill>
+            <a:schemeClr val="bg1"/>
+          </a:solidFill>
+          <a:ln>
+            <a:solidFill>
+              <a:schemeClr val="bg2">
+                <a:lumMod val="75000"/>
+              </a:schemeClr>
+            </a:solidFill>
+          </a:ln>
+        </p:spPr>
+        <p:style>
+          <a:lnRef idx="2">
+            <a:schemeClr val="accent1">
+              <a:shade val="50000"/>
+            </a:schemeClr>
+          </a:lnRef>
+          <a:fillRef idx="1">
+            <a:schemeClr val="accent1"/>
+          </a:fillRef>
+          <a:effectRef idx="0">
+            <a:schemeClr val="accent1"/>
+          </a:effectRef>
+          <a:fontRef idx="minor">
+            <a:schemeClr val="lt1"/>
+          </a:fontRef>
+        </p:style>
+        <p:txBody>
+          <a:bodyPr rtlCol="0" anchor="ctr"/>
+          <a:lstStyle/>
+          <a:p>
+            <a:pPr algn="ctr"/>
+            <a:endParaRPr kumimoji="1" lang="ja-JP" altLang="en-US"/>
+          </a:p>
+        </p:txBody>
+      </p:sp>
+      <p:sp>
+        <p:nvSpPr>
+          <p:cNvPr id="134" name="正方形/長方形 133">
+            <a:extLst>
+              <a:ext uri="{FF2B5EF4-FFF2-40B4-BE49-F238E27FC236}">
+                <a16:creationId xmlns:a16="http://schemas.microsoft.com/office/drawing/2014/main" id="{963A7C05-B878-7641-9B30-F7345833E573}"/>
+              </a:ext>
+            </a:extLst>
+          </p:cNvPr>
+          <p:cNvSpPr/>
+          <p:nvPr/>
+        </p:nvSpPr>
+        <p:spPr>
+          <a:xfrm>
+            <a:off x="16848835" y="26613466"/>
+            <a:ext cx="1036192" cy="1865171"/>
+          </a:xfrm>
+          <a:prstGeom prst="rect">
+            <a:avLst/>
+          </a:prstGeom>
+          <a:solidFill>
+            <a:schemeClr val="bg1"/>
+          </a:solidFill>
+          <a:ln>
+            <a:solidFill>
+              <a:schemeClr val="bg2">
+                <a:lumMod val="75000"/>
+              </a:schemeClr>
+            </a:solidFill>
+          </a:ln>
+        </p:spPr>
+        <p:style>
+          <a:lnRef idx="2">
+            <a:schemeClr val="accent1">
+              <a:shade val="50000"/>
+            </a:schemeClr>
+          </a:lnRef>
+          <a:fillRef idx="1">
+            <a:schemeClr val="accent1"/>
+          </a:fillRef>
+          <a:effectRef idx="0">
+            <a:schemeClr val="accent1"/>
+          </a:effectRef>
+          <a:fontRef idx="minor">
+            <a:schemeClr val="lt1"/>
+          </a:fontRef>
+        </p:style>
+        <p:txBody>
+          <a:bodyPr rtlCol="0" anchor="ctr"/>
+          <a:lstStyle/>
+          <a:p>
+            <a:pPr algn="ctr"/>
+            <a:endParaRPr kumimoji="1" lang="ja-JP" altLang="en-US"/>
+          </a:p>
+        </p:txBody>
+      </p:sp>
+      <p:sp>
+        <p:nvSpPr>
+          <p:cNvPr id="136" name="正方形/長方形 135">
+            <a:extLst>
+              <a:ext uri="{FF2B5EF4-FFF2-40B4-BE49-F238E27FC236}">
+                <a16:creationId xmlns:a16="http://schemas.microsoft.com/office/drawing/2014/main" id="{986F6CB6-B3E0-3142-A728-9B160C04DCEC}"/>
+              </a:ext>
+            </a:extLst>
+          </p:cNvPr>
+          <p:cNvSpPr/>
+          <p:nvPr/>
+        </p:nvSpPr>
+        <p:spPr>
+          <a:xfrm>
+            <a:off x="17001235" y="26765866"/>
+            <a:ext cx="1036192" cy="1865171"/>
+          </a:xfrm>
+          <a:prstGeom prst="rect">
+            <a:avLst/>
+          </a:prstGeom>
+          <a:solidFill>
+            <a:schemeClr val="bg1"/>
+          </a:solidFill>
+          <a:ln>
+            <a:solidFill>
+              <a:schemeClr val="bg2">
+                <a:lumMod val="75000"/>
+              </a:schemeClr>
+            </a:solidFill>
+          </a:ln>
+        </p:spPr>
+        <p:style>
+          <a:lnRef idx="2">
+            <a:schemeClr val="accent1">
+              <a:shade val="50000"/>
+            </a:schemeClr>
+          </a:lnRef>
+          <a:fillRef idx="1">
+            <a:schemeClr val="accent1"/>
+          </a:fillRef>
+          <a:effectRef idx="0">
+            <a:schemeClr val="accent1"/>
+          </a:effectRef>
+          <a:fontRef idx="minor">
+            <a:schemeClr val="lt1"/>
+          </a:fontRef>
+        </p:style>
+        <p:txBody>
+          <a:bodyPr rtlCol="0" anchor="ctr"/>
+          <a:lstStyle/>
+          <a:p>
+            <a:pPr algn="ctr"/>
+            <a:endParaRPr kumimoji="1" lang="ja-JP" altLang="en-US"/>
+          </a:p>
+        </p:txBody>
+      </p:sp>
+      <p:sp>
+        <p:nvSpPr>
+          <p:cNvPr id="37" name="テキスト ボックス 36">
+            <a:extLst>
+              <a:ext uri="{FF2B5EF4-FFF2-40B4-BE49-F238E27FC236}">
+                <a16:creationId xmlns:a16="http://schemas.microsoft.com/office/drawing/2014/main" id="{996BAA8B-4537-9A44-BFC9-9C8EFBE9108C}"/>
+              </a:ext>
+            </a:extLst>
+          </p:cNvPr>
+          <p:cNvSpPr txBox="1"/>
+          <p:nvPr/>
+        </p:nvSpPr>
+        <p:spPr>
+          <a:xfrm>
+            <a:off x="15631634" y="29014809"/>
+            <a:ext cx="3775393" cy="1323439"/>
+          </a:xfrm>
+          <a:prstGeom prst="rect">
+            <a:avLst/>
+          </a:prstGeom>
+          <a:noFill/>
+        </p:spPr>
+        <p:txBody>
+          <a:bodyPr wrap="none" rtlCol="0">
+            <a:spAutoFit/>
+          </a:bodyPr>
+          <a:lstStyle/>
+          <a:p>
+            <a:pPr algn="ctr"/>
+            <a:r>
+              <a:rPr kumimoji="1" lang="ja-JP" altLang="en-US" sz="4000">
+                <a:latin typeface="Hiragino Sans W4" panose="020B0400000000000000" pitchFamily="34" charset="-128"/>
+                <a:ea typeface="Hiragino Sans W4" panose="020B0400000000000000" pitchFamily="34" charset="-128"/>
+              </a:rPr>
+              <a:t>全スポットの</a:t>
+            </a:r>
+            <a:endParaRPr kumimoji="1" lang="en-US" altLang="ja-JP" sz="4000" dirty="0">
+              <a:latin typeface="Hiragino Sans W4" panose="020B0400000000000000" pitchFamily="34" charset="-128"/>
+              <a:ea typeface="Hiragino Sans W4" panose="020B0400000000000000" pitchFamily="34" charset="-128"/>
+            </a:endParaRPr>
+          </a:p>
+          <a:p>
+            <a:pPr algn="ctr"/>
+            <a:r>
+              <a:rPr kumimoji="1" lang="ja-JP" altLang="en-US" sz="4000">
+                <a:latin typeface="Hiragino Sans W4" panose="020B0400000000000000" pitchFamily="34" charset="-128"/>
+                <a:ea typeface="Hiragino Sans W4" panose="020B0400000000000000" pitchFamily="34" charset="-128"/>
+              </a:rPr>
+              <a:t>レビュー文書群</a:t>
+            </a:r>
+          </a:p>
+        </p:txBody>
+      </p:sp>
+      <p:sp>
+        <p:nvSpPr>
+          <p:cNvPr id="147" name="右矢印 146">
+            <a:extLst>
+              <a:ext uri="{FF2B5EF4-FFF2-40B4-BE49-F238E27FC236}">
+                <a16:creationId xmlns:a16="http://schemas.microsoft.com/office/drawing/2014/main" id="{16C5FAC7-4811-D948-837C-6DCFE8BD24B2}"/>
+              </a:ext>
+            </a:extLst>
+          </p:cNvPr>
+          <p:cNvSpPr/>
+          <p:nvPr/>
+        </p:nvSpPr>
+        <p:spPr>
+          <a:xfrm>
+            <a:off x="19113275" y="27358447"/>
+            <a:ext cx="3006810" cy="936000"/>
+          </a:xfrm>
+          <a:prstGeom prst="rightArrow">
+            <a:avLst/>
+          </a:prstGeom>
+          <a:solidFill>
+            <a:schemeClr val="accent6">
+              <a:lumMod val="75000"/>
+            </a:schemeClr>
+          </a:solidFill>
+          <a:ln>
+            <a:solidFill>
+              <a:schemeClr val="accent6">
+                <a:lumMod val="75000"/>
+              </a:schemeClr>
+            </a:solidFill>
+          </a:ln>
+        </p:spPr>
+        <p:style>
+          <a:lnRef idx="2">
+            <a:schemeClr val="accent1">
+              <a:shade val="50000"/>
+            </a:schemeClr>
+          </a:lnRef>
+          <a:fillRef idx="1">
+            <a:schemeClr val="accent1"/>
+          </a:fillRef>
+          <a:effectRef idx="0">
+            <a:schemeClr val="accent1"/>
+          </a:effectRef>
+          <a:fontRef idx="minor">
+            <a:schemeClr val="lt1"/>
+          </a:fontRef>
+        </p:style>
+        <p:txBody>
+          <a:bodyPr rtlCol="0" anchor="ctr"/>
+          <a:lstStyle/>
+          <a:p>
+            <a:pPr algn="ctr"/>
+            <a:endParaRPr kumimoji="1" lang="ja-JP" altLang="en-US">
+              <a:latin typeface="Hiragino Sans W4" panose="020B0400000000000000" pitchFamily="34" charset="-128"/>
+              <a:ea typeface="Hiragino Sans W4" panose="020B0400000000000000" pitchFamily="34" charset="-128"/>
+            </a:endParaRPr>
+          </a:p>
+        </p:txBody>
+      </p:sp>
+      <p:sp>
+        <p:nvSpPr>
+          <p:cNvPr id="39" name="テキスト ボックス 38">
+            <a:extLst>
+              <a:ext uri="{FF2B5EF4-FFF2-40B4-BE49-F238E27FC236}">
+                <a16:creationId xmlns:a16="http://schemas.microsoft.com/office/drawing/2014/main" id="{EACB70D1-5317-AD47-B8D4-862941FFFB69}"/>
+              </a:ext>
+            </a:extLst>
+          </p:cNvPr>
+          <p:cNvSpPr txBox="1"/>
+          <p:nvPr/>
+        </p:nvSpPr>
+        <p:spPr>
+          <a:xfrm>
+            <a:off x="18263131" y="26688353"/>
+            <a:ext cx="5414706" cy="646331"/>
+          </a:xfrm>
+          <a:prstGeom prst="rect">
+            <a:avLst/>
+          </a:prstGeom>
+          <a:noFill/>
+        </p:spPr>
+        <p:txBody>
+          <a:bodyPr wrap="square" rtlCol="0">
+            <a:spAutoFit/>
+          </a:bodyPr>
+          <a:lstStyle/>
+          <a:p>
+            <a:r>
+              <a:rPr kumimoji="1" lang="ja-JP" altLang="en-US" sz="3600">
+                <a:latin typeface="Hiragino Sans W4" panose="020B0400000000000000" pitchFamily="34" charset="-128"/>
+                <a:ea typeface="Hiragino Sans W4" panose="020B0400000000000000" pitchFamily="34" charset="-128"/>
+              </a:rPr>
+              <a:t>トピック</a:t>
+            </a:r>
+            <a:r>
+              <a:rPr kumimoji="1" lang="en-US" altLang="ja-JP" sz="3600" dirty="0">
+                <a:latin typeface="Hiragino Sans W4" panose="020B0400000000000000" pitchFamily="34" charset="-128"/>
+                <a:ea typeface="Hiragino Sans W4" panose="020B0400000000000000" pitchFamily="34" charset="-128"/>
+              </a:rPr>
+              <a:t>(</a:t>
+            </a:r>
+            <a:r>
+              <a:rPr kumimoji="1" lang="ja-JP" altLang="en-US" sz="3600">
+                <a:latin typeface="Hiragino Sans W4" panose="020B0400000000000000" pitchFamily="34" charset="-128"/>
+                <a:ea typeface="Hiragino Sans W4" panose="020B0400000000000000" pitchFamily="34" charset="-128"/>
+              </a:rPr>
+              <a:t>話題</a:t>
+            </a:r>
+            <a:r>
+              <a:rPr kumimoji="1" lang="en-US" altLang="ja-JP" sz="3600" dirty="0">
+                <a:latin typeface="Hiragino Sans W4" panose="020B0400000000000000" pitchFamily="34" charset="-128"/>
+                <a:ea typeface="Hiragino Sans W4" panose="020B0400000000000000" pitchFamily="34" charset="-128"/>
+              </a:rPr>
+              <a:t>)</a:t>
+            </a:r>
+            <a:r>
+              <a:rPr kumimoji="1" lang="ja-JP" altLang="en-US" sz="3600">
+                <a:latin typeface="Hiragino Sans W4" panose="020B0400000000000000" pitchFamily="34" charset="-128"/>
+                <a:ea typeface="Hiragino Sans W4" panose="020B0400000000000000" pitchFamily="34" charset="-128"/>
+              </a:rPr>
+              <a:t>を抽出</a:t>
+            </a:r>
           </a:p>
         </p:txBody>
       </p:sp>

</xml_diff>

<commit_message>
for interrim presentation docs
</commit_message>
<xml_diff>
--- a/notebooks/interrim_presentattion_poster.pptx
+++ b/notebooks/interrim_presentattion_poster.pptx
@@ -1087,19 +1087,21 @@
             </a:r>
           </a:p>
           <a:p>
-            <a:r>
-              <a:rPr kumimoji="1" lang="en-US" altLang="ja-JP" dirty="0"/>
-              <a:t>- </a:t>
-            </a:r>
+            <a:pPr marL="171450" indent="-171450">
+              <a:buFontTx/>
+              <a:buChar char="-"/>
+            </a:pPr>
             <a:r>
               <a:rPr kumimoji="1" lang="ja-JP" altLang="en-US"/>
-              <a:t>これらの問題点としては、コンテンツベースのレコメンドに関しては、レコメンドの結果に多様性が生まれないということが挙げられ、協調フィルタリングに関しては、履歴を元にしているので人気のないスポットがレコメンドされにくいということが挙げられます</a:t>
-            </a:r>
-          </a:p>
-          <a:p>
-            <a:endParaRPr kumimoji="1" lang="ja-JP" altLang="en-US"/>
-          </a:p>
-          <a:p>
+              <a:t>これらの問題点としては、コンテンツベースのレコメンドに関しては、レコメンドの結果に多様性が生まれないということが挙げられ、協調フィルタリングに関しては、レコメンドの結果に対して理由づけがなされないのでなぜこの商品、観光スポットがレコメンドされているかということがわかりづらかったり、結局履歴を元にしている関係でコンテンツベースのレコメンドと近くなったりします</a:t>
+            </a:r>
+            <a:endParaRPr kumimoji="1" lang="en-US" altLang="ja-JP" dirty="0"/>
+          </a:p>
+          <a:p>
+            <a:pPr marL="171450" indent="-171450">
+              <a:buFontTx/>
+              <a:buChar char="-"/>
+            </a:pPr>
             <a:r>
               <a:rPr kumimoji="1" lang="en-US" altLang="ja-JP" dirty="0"/>
               <a:t>#### </a:t>
@@ -4555,7 +4557,7 @@
         </p:blipFill>
         <p:spPr>
           <a:xfrm>
-            <a:off x="24340938" y="19941475"/>
+            <a:off x="24340938" y="19575715"/>
             <a:ext cx="3149898" cy="3244964"/>
           </a:xfrm>
           <a:prstGeom prst="rect">
@@ -4577,7 +4579,7 @@
         </p:nvSpPr>
         <p:spPr>
           <a:xfrm>
-            <a:off x="12120183" y="19699931"/>
+            <a:off x="12120183" y="19334171"/>
             <a:ext cx="6175502" cy="3666029"/>
           </a:xfrm>
           <a:prstGeom prst="roundRect">
@@ -5695,8 +5697,8 @@
         </p:nvSpPr>
         <p:spPr>
           <a:xfrm>
-            <a:off x="1386425" y="826482"/>
-            <a:ext cx="27643015" cy="3821118"/>
+            <a:off x="1219847" y="826482"/>
+            <a:ext cx="27808498" cy="3821118"/>
           </a:xfrm>
           <a:prstGeom prst="rect">
             <a:avLst/>
@@ -5894,8 +5896,8 @@
         </p:nvSpPr>
         <p:spPr>
           <a:xfrm>
-            <a:off x="1261958" y="6038622"/>
-            <a:ext cx="27766388" cy="1398979"/>
+            <a:off x="1240176" y="6038622"/>
+            <a:ext cx="27788169" cy="1398979"/>
           </a:xfrm>
           <a:prstGeom prst="rect">
             <a:avLst/>
@@ -6556,7 +6558,7 @@
                 <a:latin typeface="Hiragino Sans W4" panose="020B0400000000000000" pitchFamily="34" charset="-128"/>
                 <a:ea typeface="Hiragino Sans W4" panose="020B0400000000000000" pitchFamily="34" charset="-128"/>
               </a:rPr>
-              <a:t>レコメンドの結果に対して理由づけがなされない</a:t>
+              <a:t>レコメンドの結果に対して理由付けがなされない</a:t>
             </a:r>
             <a:r>
               <a:rPr lang="ja-JP" altLang="en-US" sz="4400">
@@ -7191,8 +7193,8 @@
         </p:nvSpPr>
         <p:spPr>
           <a:xfrm>
-            <a:off x="2044800" y="17331144"/>
-            <a:ext cx="21432470" cy="1155060"/>
+            <a:off x="2041497" y="17102146"/>
+            <a:ext cx="18643245" cy="1015663"/>
           </a:xfrm>
           <a:prstGeom prst="rect">
             <a:avLst/>
@@ -7206,20 +7208,20 @@
           <a:lstStyle/>
           <a:p>
             <a:r>
-              <a:rPr kumimoji="1" lang="ja-JP" altLang="en-US">
+              <a:rPr kumimoji="1" lang="ja-JP" altLang="en-US" sz="6000">
                 <a:latin typeface="Hiragino Sans W4" panose="020B0400000000000000" pitchFamily="34" charset="-128"/>
                 <a:ea typeface="Hiragino Sans W4" panose="020B0400000000000000" pitchFamily="34" charset="-128"/>
               </a:rPr>
               <a:t>構築環境：</a:t>
             </a:r>
             <a:r>
-              <a:rPr lang="en-US" altLang="ja-JP" dirty="0">
+              <a:rPr lang="en-US" altLang="ja-JP" sz="6000" dirty="0">
                 <a:latin typeface="Hiragino Sans W4" panose="020B0400000000000000" pitchFamily="34" charset="-128"/>
                 <a:ea typeface="Hiragino Sans W4" panose="020B0400000000000000" pitchFamily="34" charset="-128"/>
               </a:rPr>
               <a:t>HTML / JavaScript / Python / MySQL</a:t>
             </a:r>
-            <a:endParaRPr kumimoji="1" lang="ja-JP" altLang="en-US">
+            <a:endParaRPr kumimoji="1" lang="ja-JP" altLang="en-US" sz="6000">
               <a:latin typeface="Hiragino Sans W4" panose="020B0400000000000000" pitchFamily="34" charset="-128"/>
               <a:ea typeface="Hiragino Sans W4" panose="020B0400000000000000" pitchFamily="34" charset="-128"/>
             </a:endParaRPr>
@@ -7248,7 +7250,7 @@
         </p:blipFill>
         <p:spPr>
           <a:xfrm>
-            <a:off x="3080038" y="21762784"/>
+            <a:off x="3080038" y="21397024"/>
             <a:ext cx="1861284" cy="1603176"/>
           </a:xfrm>
           <a:prstGeom prst="rect">
@@ -7278,7 +7280,7 @@
         </p:blipFill>
         <p:spPr>
           <a:xfrm>
-            <a:off x="12766504" y="21168631"/>
+            <a:off x="12768696" y="20668453"/>
             <a:ext cx="1545138" cy="1958195"/>
           </a:xfrm>
           <a:prstGeom prst="rect">
@@ -7300,7 +7302,7 @@
         </p:nvSpPr>
         <p:spPr>
           <a:xfrm>
-            <a:off x="6627879" y="21493853"/>
+            <a:off x="6627879" y="21128093"/>
             <a:ext cx="5076000" cy="936000"/>
           </a:xfrm>
           <a:prstGeom prst="rightArrow">
@@ -7361,7 +7363,7 @@
         </p:nvSpPr>
         <p:spPr>
           <a:xfrm>
-            <a:off x="14758995" y="21391140"/>
+            <a:off x="14758995" y="21025380"/>
             <a:ext cx="1080000" cy="975164"/>
           </a:xfrm>
           <a:prstGeom prst="rightArrow">
@@ -7418,7 +7420,7 @@
         </p:nvSpPr>
         <p:spPr>
           <a:xfrm>
-            <a:off x="2079000" y="18918514"/>
+            <a:off x="2079000" y="18552754"/>
             <a:ext cx="5840060" cy="830997"/>
           </a:xfrm>
           <a:prstGeom prst="rect">
@@ -7456,7 +7458,7 @@
         </p:nvSpPr>
         <p:spPr>
           <a:xfrm>
-            <a:off x="12631344" y="20428949"/>
+            <a:off x="12506366" y="19908109"/>
             <a:ext cx="2069797" cy="646331"/>
           </a:xfrm>
           <a:prstGeom prst="rect">
@@ -7494,7 +7496,7 @@
         </p:nvSpPr>
         <p:spPr>
           <a:xfrm>
-            <a:off x="15528345" y="20415462"/>
+            <a:off x="15542170" y="19908109"/>
             <a:ext cx="2541080" cy="646331"/>
           </a:xfrm>
           <a:prstGeom prst="rect">
@@ -7539,7 +7541,7 @@
         </p:nvSpPr>
         <p:spPr>
           <a:xfrm>
-            <a:off x="24223082" y="19005636"/>
+            <a:off x="24106231" y="18460135"/>
             <a:ext cx="3514104" cy="830997"/>
           </a:xfrm>
           <a:prstGeom prst="rect">
@@ -7584,7 +7586,7 @@
         </p:nvSpPr>
         <p:spPr>
           <a:xfrm>
-            <a:off x="6431436" y="20380229"/>
+            <a:off x="6431436" y="20014469"/>
             <a:ext cx="5724644" cy="1200329"/>
           </a:xfrm>
           <a:prstGeom prst="rect">
@@ -8341,7 +8343,7 @@
         </p:nvSpPr>
         <p:spPr>
           <a:xfrm>
-            <a:off x="4879780" y="7605054"/>
+            <a:off x="4922795" y="7629276"/>
             <a:ext cx="21211100" cy="1155060"/>
           </a:xfrm>
           <a:prstGeom prst="rect">
@@ -8360,7 +8362,7 @@
                 <a:latin typeface="Hiragino Sans W4" panose="020B0400000000000000" pitchFamily="34" charset="-128"/>
                 <a:ea typeface="Hiragino Sans W4" panose="020B0400000000000000" pitchFamily="34" charset="-128"/>
               </a:rPr>
-              <a:t>目的：ユーザの入力とレビューを元に高好感度な観光地をレコメンドする</a:t>
+              <a:t>目的　ユーザの入力とレビューを元に高好感度な観光地をレコメンドする</a:t>
             </a:r>
             <a:r>
               <a:rPr kumimoji="1" lang="ja-JP" altLang="en-US">
@@ -8441,8 +8443,8 @@
         </p:nvSpPr>
         <p:spPr>
           <a:xfrm>
-            <a:off x="4380636" y="7755421"/>
-            <a:ext cx="2160000" cy="1020820"/>
+            <a:off x="4380635" y="7755421"/>
+            <a:ext cx="2247243" cy="1020820"/>
           </a:xfrm>
           <a:prstGeom prst="rect">
             <a:avLst/>
@@ -9880,7 +9882,7 @@
         </p:blipFill>
         <p:spPr>
           <a:xfrm>
-            <a:off x="16197987" y="21158368"/>
+            <a:off x="16038404" y="20724039"/>
             <a:ext cx="1545138" cy="1958195"/>
           </a:xfrm>
           <a:prstGeom prst="rect">
@@ -9902,7 +9904,7 @@
         </p:nvSpPr>
         <p:spPr>
           <a:xfrm>
-            <a:off x="18808376" y="21518439"/>
+            <a:off x="18808376" y="21152679"/>
             <a:ext cx="5076000" cy="936000"/>
           </a:xfrm>
           <a:prstGeom prst="rightArrow">
@@ -9971,7 +9973,7 @@
         </p:blipFill>
         <p:spPr>
           <a:xfrm>
-            <a:off x="4331502" y="20122292"/>
+            <a:off x="4331502" y="19756532"/>
             <a:ext cx="1861284" cy="1603176"/>
           </a:xfrm>
           <a:prstGeom prst="rect">
@@ -9993,7 +9995,7 @@
         </p:nvSpPr>
         <p:spPr>
           <a:xfrm>
-            <a:off x="13666035" y="18921052"/>
+            <a:off x="13484421" y="18552754"/>
             <a:ext cx="3326552" cy="830997"/>
           </a:xfrm>
           <a:prstGeom prst="rect">
@@ -10478,8 +10480,8 @@
         </p:nvSpPr>
         <p:spPr>
           <a:xfrm rot="10800000">
-            <a:off x="1846082" y="22518923"/>
-            <a:ext cx="26423736" cy="13447476"/>
+            <a:off x="1846082" y="22544322"/>
+            <a:ext cx="26423736" cy="13422077"/>
           </a:xfrm>
           <a:custGeom>
             <a:avLst/>
@@ -11130,6 +11132,176 @@
               <a:gd name="connsiteY15" fmla="*/ 3778446 h 7190428"/>
               <a:gd name="connsiteX16" fmla="*/ 0 w 26576764"/>
               <a:gd name="connsiteY16" fmla="*/ 0 h 7190428"/>
+              <a:gd name="connsiteX0" fmla="*/ 0 w 26576764"/>
+              <a:gd name="connsiteY0" fmla="*/ 0 h 7176847"/>
+              <a:gd name="connsiteX1" fmla="*/ 15503112 w 26576764"/>
+              <a:gd name="connsiteY1" fmla="*/ 0 h 7176847"/>
+              <a:gd name="connsiteX2" fmla="*/ 15503112 w 26576764"/>
+              <a:gd name="connsiteY2" fmla="*/ 0 h 7176847"/>
+              <a:gd name="connsiteX3" fmla="*/ 22147303 w 26576764"/>
+              <a:gd name="connsiteY3" fmla="*/ 0 h 7176847"/>
+              <a:gd name="connsiteX4" fmla="*/ 26576764 w 26576764"/>
+              <a:gd name="connsiteY4" fmla="*/ 0 h 7176847"/>
+              <a:gd name="connsiteX5" fmla="*/ 26576764 w 26576764"/>
+              <a:gd name="connsiteY5" fmla="*/ 3778446 h 7176847"/>
+              <a:gd name="connsiteX6" fmla="*/ 26576764 w 26576764"/>
+              <a:gd name="connsiteY6" fmla="*/ 3778446 h 7176847"/>
+              <a:gd name="connsiteX7" fmla="*/ 26576764 w 26576764"/>
+              <a:gd name="connsiteY7" fmla="*/ 5397780 h 7176847"/>
+              <a:gd name="connsiteX8" fmla="*/ 26576764 w 26576764"/>
+              <a:gd name="connsiteY8" fmla="*/ 6477336 h 7176847"/>
+              <a:gd name="connsiteX9" fmla="*/ 13553955 w 26576764"/>
+              <a:gd name="connsiteY9" fmla="*/ 6487720 h 7176847"/>
+              <a:gd name="connsiteX10" fmla="*/ 13227000 w 26576764"/>
+              <a:gd name="connsiteY10" fmla="*/ 7176847 h 7176847"/>
+              <a:gd name="connsiteX11" fmla="*/ 12588138 w 26576764"/>
+              <a:gd name="connsiteY11" fmla="*/ 6485065 h 7176847"/>
+              <a:gd name="connsiteX12" fmla="*/ 0 w 26576764"/>
+              <a:gd name="connsiteY12" fmla="*/ 6477336 h 7176847"/>
+              <a:gd name="connsiteX13" fmla="*/ 0 w 26576764"/>
+              <a:gd name="connsiteY13" fmla="*/ 5397780 h 7176847"/>
+              <a:gd name="connsiteX14" fmla="*/ 0 w 26576764"/>
+              <a:gd name="connsiteY14" fmla="*/ 3778446 h 7176847"/>
+              <a:gd name="connsiteX15" fmla="*/ 0 w 26576764"/>
+              <a:gd name="connsiteY15" fmla="*/ 3778446 h 7176847"/>
+              <a:gd name="connsiteX16" fmla="*/ 0 w 26576764"/>
+              <a:gd name="connsiteY16" fmla="*/ 0 h 7176847"/>
+              <a:gd name="connsiteX0" fmla="*/ 0 w 26576764"/>
+              <a:gd name="connsiteY0" fmla="*/ 0 h 7176847"/>
+              <a:gd name="connsiteX1" fmla="*/ 15503112 w 26576764"/>
+              <a:gd name="connsiteY1" fmla="*/ 0 h 7176847"/>
+              <a:gd name="connsiteX2" fmla="*/ 15503112 w 26576764"/>
+              <a:gd name="connsiteY2" fmla="*/ 0 h 7176847"/>
+              <a:gd name="connsiteX3" fmla="*/ 22147303 w 26576764"/>
+              <a:gd name="connsiteY3" fmla="*/ 0 h 7176847"/>
+              <a:gd name="connsiteX4" fmla="*/ 26576764 w 26576764"/>
+              <a:gd name="connsiteY4" fmla="*/ 0 h 7176847"/>
+              <a:gd name="connsiteX5" fmla="*/ 26576764 w 26576764"/>
+              <a:gd name="connsiteY5" fmla="*/ 3778446 h 7176847"/>
+              <a:gd name="connsiteX6" fmla="*/ 26576764 w 26576764"/>
+              <a:gd name="connsiteY6" fmla="*/ 3778446 h 7176847"/>
+              <a:gd name="connsiteX7" fmla="*/ 26576764 w 26576764"/>
+              <a:gd name="connsiteY7" fmla="*/ 5397780 h 7176847"/>
+              <a:gd name="connsiteX8" fmla="*/ 26576764 w 26576764"/>
+              <a:gd name="connsiteY8" fmla="*/ 6477336 h 7176847"/>
+              <a:gd name="connsiteX9" fmla="*/ 13553955 w 26576764"/>
+              <a:gd name="connsiteY9" fmla="*/ 6487720 h 7176847"/>
+              <a:gd name="connsiteX10" fmla="*/ 13150358 w 26576764"/>
+              <a:gd name="connsiteY10" fmla="*/ 7176847 h 7176847"/>
+              <a:gd name="connsiteX11" fmla="*/ 12588138 w 26576764"/>
+              <a:gd name="connsiteY11" fmla="*/ 6485065 h 7176847"/>
+              <a:gd name="connsiteX12" fmla="*/ 0 w 26576764"/>
+              <a:gd name="connsiteY12" fmla="*/ 6477336 h 7176847"/>
+              <a:gd name="connsiteX13" fmla="*/ 0 w 26576764"/>
+              <a:gd name="connsiteY13" fmla="*/ 5397780 h 7176847"/>
+              <a:gd name="connsiteX14" fmla="*/ 0 w 26576764"/>
+              <a:gd name="connsiteY14" fmla="*/ 3778446 h 7176847"/>
+              <a:gd name="connsiteX15" fmla="*/ 0 w 26576764"/>
+              <a:gd name="connsiteY15" fmla="*/ 3778446 h 7176847"/>
+              <a:gd name="connsiteX16" fmla="*/ 0 w 26576764"/>
+              <a:gd name="connsiteY16" fmla="*/ 0 h 7176847"/>
+              <a:gd name="connsiteX0" fmla="*/ 0 w 26576764"/>
+              <a:gd name="connsiteY0" fmla="*/ 0 h 7176847"/>
+              <a:gd name="connsiteX1" fmla="*/ 15503112 w 26576764"/>
+              <a:gd name="connsiteY1" fmla="*/ 0 h 7176847"/>
+              <a:gd name="connsiteX2" fmla="*/ 15503112 w 26576764"/>
+              <a:gd name="connsiteY2" fmla="*/ 0 h 7176847"/>
+              <a:gd name="connsiteX3" fmla="*/ 22147303 w 26576764"/>
+              <a:gd name="connsiteY3" fmla="*/ 0 h 7176847"/>
+              <a:gd name="connsiteX4" fmla="*/ 26576764 w 26576764"/>
+              <a:gd name="connsiteY4" fmla="*/ 0 h 7176847"/>
+              <a:gd name="connsiteX5" fmla="*/ 26576764 w 26576764"/>
+              <a:gd name="connsiteY5" fmla="*/ 3778446 h 7176847"/>
+              <a:gd name="connsiteX6" fmla="*/ 26576764 w 26576764"/>
+              <a:gd name="connsiteY6" fmla="*/ 3778446 h 7176847"/>
+              <a:gd name="connsiteX7" fmla="*/ 26576764 w 26576764"/>
+              <a:gd name="connsiteY7" fmla="*/ 5397780 h 7176847"/>
+              <a:gd name="connsiteX8" fmla="*/ 26576764 w 26576764"/>
+              <a:gd name="connsiteY8" fmla="*/ 6477336 h 7176847"/>
+              <a:gd name="connsiteX9" fmla="*/ 13553955 w 26576764"/>
+              <a:gd name="connsiteY9" fmla="*/ 6487720 h 7176847"/>
+              <a:gd name="connsiteX10" fmla="*/ 13201452 w 26576764"/>
+              <a:gd name="connsiteY10" fmla="*/ 7176847 h 7176847"/>
+              <a:gd name="connsiteX11" fmla="*/ 12588138 w 26576764"/>
+              <a:gd name="connsiteY11" fmla="*/ 6485065 h 7176847"/>
+              <a:gd name="connsiteX12" fmla="*/ 0 w 26576764"/>
+              <a:gd name="connsiteY12" fmla="*/ 6477336 h 7176847"/>
+              <a:gd name="connsiteX13" fmla="*/ 0 w 26576764"/>
+              <a:gd name="connsiteY13" fmla="*/ 5397780 h 7176847"/>
+              <a:gd name="connsiteX14" fmla="*/ 0 w 26576764"/>
+              <a:gd name="connsiteY14" fmla="*/ 3778446 h 7176847"/>
+              <a:gd name="connsiteX15" fmla="*/ 0 w 26576764"/>
+              <a:gd name="connsiteY15" fmla="*/ 3778446 h 7176847"/>
+              <a:gd name="connsiteX16" fmla="*/ 0 w 26576764"/>
+              <a:gd name="connsiteY16" fmla="*/ 0 h 7176847"/>
+              <a:gd name="connsiteX0" fmla="*/ 0 w 26576764"/>
+              <a:gd name="connsiteY0" fmla="*/ 0 h 7176847"/>
+              <a:gd name="connsiteX1" fmla="*/ 15503112 w 26576764"/>
+              <a:gd name="connsiteY1" fmla="*/ 0 h 7176847"/>
+              <a:gd name="connsiteX2" fmla="*/ 15503112 w 26576764"/>
+              <a:gd name="connsiteY2" fmla="*/ 0 h 7176847"/>
+              <a:gd name="connsiteX3" fmla="*/ 22147303 w 26576764"/>
+              <a:gd name="connsiteY3" fmla="*/ 0 h 7176847"/>
+              <a:gd name="connsiteX4" fmla="*/ 26576764 w 26576764"/>
+              <a:gd name="connsiteY4" fmla="*/ 0 h 7176847"/>
+              <a:gd name="connsiteX5" fmla="*/ 26576764 w 26576764"/>
+              <a:gd name="connsiteY5" fmla="*/ 3778446 h 7176847"/>
+              <a:gd name="connsiteX6" fmla="*/ 26576764 w 26576764"/>
+              <a:gd name="connsiteY6" fmla="*/ 3778446 h 7176847"/>
+              <a:gd name="connsiteX7" fmla="*/ 26576764 w 26576764"/>
+              <a:gd name="connsiteY7" fmla="*/ 5397780 h 7176847"/>
+              <a:gd name="connsiteX8" fmla="*/ 26576764 w 26576764"/>
+              <a:gd name="connsiteY8" fmla="*/ 6477336 h 7176847"/>
+              <a:gd name="connsiteX9" fmla="*/ 13681691 w 26576764"/>
+              <a:gd name="connsiteY9" fmla="*/ 6474139 h 7176847"/>
+              <a:gd name="connsiteX10" fmla="*/ 13201452 w 26576764"/>
+              <a:gd name="connsiteY10" fmla="*/ 7176847 h 7176847"/>
+              <a:gd name="connsiteX11" fmla="*/ 12588138 w 26576764"/>
+              <a:gd name="connsiteY11" fmla="*/ 6485065 h 7176847"/>
+              <a:gd name="connsiteX12" fmla="*/ 0 w 26576764"/>
+              <a:gd name="connsiteY12" fmla="*/ 6477336 h 7176847"/>
+              <a:gd name="connsiteX13" fmla="*/ 0 w 26576764"/>
+              <a:gd name="connsiteY13" fmla="*/ 5397780 h 7176847"/>
+              <a:gd name="connsiteX14" fmla="*/ 0 w 26576764"/>
+              <a:gd name="connsiteY14" fmla="*/ 3778446 h 7176847"/>
+              <a:gd name="connsiteX15" fmla="*/ 0 w 26576764"/>
+              <a:gd name="connsiteY15" fmla="*/ 3778446 h 7176847"/>
+              <a:gd name="connsiteX16" fmla="*/ 0 w 26576764"/>
+              <a:gd name="connsiteY16" fmla="*/ 0 h 7176847"/>
+              <a:gd name="connsiteX0" fmla="*/ 0 w 26576764"/>
+              <a:gd name="connsiteY0" fmla="*/ 0 h 7176847"/>
+              <a:gd name="connsiteX1" fmla="*/ 15503112 w 26576764"/>
+              <a:gd name="connsiteY1" fmla="*/ 0 h 7176847"/>
+              <a:gd name="connsiteX2" fmla="*/ 15503112 w 26576764"/>
+              <a:gd name="connsiteY2" fmla="*/ 0 h 7176847"/>
+              <a:gd name="connsiteX3" fmla="*/ 22147303 w 26576764"/>
+              <a:gd name="connsiteY3" fmla="*/ 0 h 7176847"/>
+              <a:gd name="connsiteX4" fmla="*/ 26576764 w 26576764"/>
+              <a:gd name="connsiteY4" fmla="*/ 0 h 7176847"/>
+              <a:gd name="connsiteX5" fmla="*/ 26576764 w 26576764"/>
+              <a:gd name="connsiteY5" fmla="*/ 3778446 h 7176847"/>
+              <a:gd name="connsiteX6" fmla="*/ 26576764 w 26576764"/>
+              <a:gd name="connsiteY6" fmla="*/ 3778446 h 7176847"/>
+              <a:gd name="connsiteX7" fmla="*/ 26576764 w 26576764"/>
+              <a:gd name="connsiteY7" fmla="*/ 5397780 h 7176847"/>
+              <a:gd name="connsiteX8" fmla="*/ 26576764 w 26576764"/>
+              <a:gd name="connsiteY8" fmla="*/ 6477336 h 7176847"/>
+              <a:gd name="connsiteX9" fmla="*/ 13758332 w 26576764"/>
+              <a:gd name="connsiteY9" fmla="*/ 6474139 h 7176847"/>
+              <a:gd name="connsiteX10" fmla="*/ 13201452 w 26576764"/>
+              <a:gd name="connsiteY10" fmla="*/ 7176847 h 7176847"/>
+              <a:gd name="connsiteX11" fmla="*/ 12588138 w 26576764"/>
+              <a:gd name="connsiteY11" fmla="*/ 6485065 h 7176847"/>
+              <a:gd name="connsiteX12" fmla="*/ 0 w 26576764"/>
+              <a:gd name="connsiteY12" fmla="*/ 6477336 h 7176847"/>
+              <a:gd name="connsiteX13" fmla="*/ 0 w 26576764"/>
+              <a:gd name="connsiteY13" fmla="*/ 5397780 h 7176847"/>
+              <a:gd name="connsiteX14" fmla="*/ 0 w 26576764"/>
+              <a:gd name="connsiteY14" fmla="*/ 3778446 h 7176847"/>
+              <a:gd name="connsiteX15" fmla="*/ 0 w 26576764"/>
+              <a:gd name="connsiteY15" fmla="*/ 3778446 h 7176847"/>
+              <a:gd name="connsiteX16" fmla="*/ 0 w 26576764"/>
+              <a:gd name="connsiteY16" fmla="*/ 0 h 7176847"/>
             </a:gdLst>
             <a:ahLst/>
             <a:cxnLst>
@@ -11187,7 +11359,7 @@
             </a:cxnLst>
             <a:rect l="l" t="t" r="r" b="b"/>
             <a:pathLst>
-              <a:path w="26576764" h="7190428">
+              <a:path w="26576764" h="7176847">
                 <a:moveTo>
                   <a:pt x="0" y="0"/>
                 </a:moveTo>
@@ -11216,10 +11388,10 @@
                   <a:pt x="26576764" y="6477336"/>
                 </a:lnTo>
                 <a:lnTo>
-                  <a:pt x="13553955" y="6487720"/>
+                  <a:pt x="13758332" y="6474139"/>
                 </a:lnTo>
                 <a:lnTo>
-                  <a:pt x="13124811" y="7190428"/>
+                  <a:pt x="13201452" y="7176847"/>
                 </a:lnTo>
                 <a:lnTo>
                   <a:pt x="12588138" y="6485065"/>
@@ -11249,7 +11421,7 @@
               <a:lumOff val="80000"/>
             </a:schemeClr>
           </a:solidFill>
-          <a:ln w="12700">
+          <a:ln w="44450">
             <a:solidFill>
               <a:schemeClr val="accent6">
                 <a:lumMod val="75000"/>
@@ -11296,7 +11468,7 @@
         </p:nvSpPr>
         <p:spPr>
           <a:xfrm>
-            <a:off x="2185161" y="25101905"/>
+            <a:off x="2173833" y="25020529"/>
             <a:ext cx="12600000" cy="1021127"/>
           </a:xfrm>
           <a:prstGeom prst="rect">
@@ -11384,7 +11556,7 @@
         </p:nvSpPr>
         <p:spPr>
           <a:xfrm>
-            <a:off x="2185161" y="26114639"/>
+            <a:off x="2173833" y="26033263"/>
             <a:ext cx="12600000" cy="1152000"/>
           </a:xfrm>
           <a:prstGeom prst="rect">
@@ -11443,7 +11615,7 @@
         </p:nvSpPr>
         <p:spPr>
           <a:xfrm>
-            <a:off x="4238055" y="26390210"/>
+            <a:off x="4226727" y="26308834"/>
             <a:ext cx="8781106" cy="734059"/>
           </a:xfrm>
           <a:prstGeom prst="rect">
@@ -11492,7 +11664,7 @@
         </p:nvSpPr>
         <p:spPr>
           <a:xfrm rot="5400000">
-            <a:off x="4709611" y="30695194"/>
+            <a:off x="4698283" y="30613818"/>
             <a:ext cx="1014154" cy="965694"/>
           </a:xfrm>
           <a:prstGeom prst="rightArrow">
@@ -11553,7 +11725,7 @@
         </p:nvSpPr>
         <p:spPr>
           <a:xfrm>
-            <a:off x="2185161" y="27636977"/>
+            <a:off x="2173833" y="27555601"/>
             <a:ext cx="12600000" cy="1021127"/>
           </a:xfrm>
           <a:prstGeom prst="rect">
@@ -11651,7 +11823,7 @@
         </p:nvSpPr>
         <p:spPr>
           <a:xfrm>
-            <a:off x="2185161" y="28654660"/>
+            <a:off x="2173833" y="28573284"/>
             <a:ext cx="12600000" cy="4448192"/>
           </a:xfrm>
           <a:prstGeom prst="rect">
@@ -11710,7 +11882,7 @@
         </p:nvSpPr>
         <p:spPr>
           <a:xfrm>
-            <a:off x="2788525" y="28955438"/>
+            <a:off x="2777197" y="28874062"/>
             <a:ext cx="11577033" cy="3785652"/>
           </a:xfrm>
           <a:prstGeom prst="rect">
@@ -12012,7 +12184,7 @@
         </p:nvSpPr>
         <p:spPr>
           <a:xfrm rot="5400000">
-            <a:off x="8158485" y="31247567"/>
+            <a:off x="8147156" y="30946356"/>
             <a:ext cx="940246" cy="843133"/>
           </a:xfrm>
           <a:prstGeom prst="rightArrow">
@@ -12485,7 +12657,7 @@
         </p:nvSpPr>
         <p:spPr>
           <a:xfrm>
-            <a:off x="2185161" y="33514125"/>
+            <a:off x="2173833" y="33432749"/>
             <a:ext cx="12600000" cy="1021127"/>
           </a:xfrm>
           <a:prstGeom prst="rect">
@@ -12564,7 +12736,7 @@
         </p:nvSpPr>
         <p:spPr>
           <a:xfrm>
-            <a:off x="2185161" y="34535607"/>
+            <a:off x="2173833" y="34454231"/>
             <a:ext cx="12600000" cy="1152000"/>
           </a:xfrm>
           <a:prstGeom prst="rect">
@@ -12623,7 +12795,7 @@
         </p:nvSpPr>
         <p:spPr>
           <a:xfrm>
-            <a:off x="3208789" y="34852124"/>
+            <a:off x="3197461" y="34770748"/>
             <a:ext cx="10660221" cy="707886"/>
           </a:xfrm>
           <a:prstGeom prst="rect">
@@ -14735,8 +14907,8 @@
         </p:nvSpPr>
         <p:spPr>
           <a:xfrm>
-            <a:off x="1846082" y="23870008"/>
-            <a:ext cx="26423736" cy="953082"/>
+            <a:off x="1846081" y="23639636"/>
+            <a:ext cx="26423737" cy="900000"/>
           </a:xfrm>
           <a:prstGeom prst="rect">
             <a:avLst/>
@@ -14775,7 +14947,7 @@
           <a:lstStyle/>
           <a:p>
             <a:r>
-              <a:rPr kumimoji="1" lang="en-US" altLang="ja-JP" sz="6600" b="1" dirty="0">
+              <a:rPr kumimoji="1" lang="en-US" altLang="ja-JP" sz="5400" b="1" dirty="0">
                 <a:latin typeface="Hiragino Sans W4" panose="020B0400000000000000" pitchFamily="34" charset="-128"/>
                 <a:ea typeface="Hiragino Sans W4" panose="020B0400000000000000" pitchFamily="34" charset="-128"/>
               </a:rPr>
@@ -14788,7 +14960,7 @@
               </a:rPr>
               <a:t>類似度算出</a:t>
             </a:r>
-            <a:endParaRPr kumimoji="1" lang="ja-JP" altLang="en-US" sz="6600" b="1">
+            <a:endParaRPr kumimoji="1" lang="ja-JP" altLang="en-US" sz="4800" b="1">
               <a:latin typeface="Hiragino Sans W4" panose="020B0400000000000000" pitchFamily="34" charset="-128"/>
               <a:ea typeface="Hiragino Sans W4" panose="020B0400000000000000" pitchFamily="34" charset="-128"/>
             </a:endParaRPr>
@@ -14809,8 +14981,8 @@
         </p:nvSpPr>
         <p:spPr>
           <a:xfrm>
-            <a:off x="15478660" y="25283642"/>
-            <a:ext cx="2085007" cy="830997"/>
+            <a:off x="15287667" y="25087782"/>
+            <a:ext cx="7203373" cy="830997"/>
           </a:xfrm>
           <a:prstGeom prst="rect">
             <a:avLst/>
@@ -14824,7 +14996,17 @@
           <a:lstStyle/>
           <a:p>
             <a:r>
-              <a:rPr lang="en-US" altLang="ja-JP" sz="4800" b="1" dirty="0">
+              <a:rPr lang="ja-JP" altLang="en-US" sz="4800" b="1">
+                <a:solidFill>
+                  <a:srgbClr val="EF0023"/>
+                </a:solidFill>
+                <a:latin typeface="Hiragino Sans W4" panose="020B0400000000000000" pitchFamily="34" charset="-128"/>
+                <a:ea typeface="Hiragino Sans W4" panose="020B0400000000000000" pitchFamily="34" charset="-128"/>
+              </a:rPr>
+              <a:t>トピックモデル</a:t>
+            </a:r>
+            <a:r>
+              <a:rPr lang="ja-JP" altLang="en-US" sz="4800" b="1">
                 <a:solidFill>
                   <a:schemeClr val="accent6">
                     <a:lumMod val="75000"/>
@@ -14833,9 +15015,9 @@
                 <a:latin typeface="Hiragino Sans W4" panose="020B0400000000000000" pitchFamily="34" charset="-128"/>
                 <a:ea typeface="Hiragino Sans W4" panose="020B0400000000000000" pitchFamily="34" charset="-128"/>
               </a:rPr>
-              <a:t>②</a:t>
-            </a:r>
-            <a:endParaRPr kumimoji="1" lang="ja-JP" altLang="en-US" sz="4800" b="1">
+              <a:t>の構築</a:t>
+            </a:r>
+            <a:endParaRPr kumimoji="1" lang="ja-JP" altLang="en-US" sz="4800">
               <a:solidFill>
                 <a:schemeClr val="accent6">
                   <a:lumMod val="75000"/>
@@ -14856,13 +15038,15 @@
               </a:ext>
             </a:extLst>
           </p:cNvPr>
-          <p:cNvCxnSpPr/>
+          <p:cNvCxnSpPr>
+            <a:cxnSpLocks/>
+          </p:cNvCxnSpPr>
           <p:nvPr/>
         </p:nvCxnSpPr>
         <p:spPr>
           <a:xfrm>
-            <a:off x="15136813" y="24823090"/>
-            <a:ext cx="0" cy="11143309"/>
+            <a:off x="15136813" y="24475439"/>
+            <a:ext cx="0" cy="11484000"/>
           </a:xfrm>
           <a:prstGeom prst="line">
             <a:avLst/>
@@ -14892,174 +15076,6 @@
       </p:cxnSp>
       <p:sp>
         <p:nvSpPr>
-          <p:cNvPr id="32" name="正方形/長方形 31">
-            <a:extLst>
-              <a:ext uri="{FF2B5EF4-FFF2-40B4-BE49-F238E27FC236}">
-                <a16:creationId xmlns:a16="http://schemas.microsoft.com/office/drawing/2014/main" id="{DCD4D1F2-8961-9F42-AF53-D4C910651392}"/>
-              </a:ext>
-            </a:extLst>
-          </p:cNvPr>
-          <p:cNvSpPr/>
-          <p:nvPr/>
-        </p:nvSpPr>
-        <p:spPr>
-          <a:xfrm>
-            <a:off x="16696435" y="26461066"/>
-            <a:ext cx="1036192" cy="1865171"/>
-          </a:xfrm>
-          <a:prstGeom prst="rect">
-            <a:avLst/>
-          </a:prstGeom>
-          <a:solidFill>
-            <a:schemeClr val="bg1"/>
-          </a:solidFill>
-          <a:ln>
-            <a:solidFill>
-              <a:schemeClr val="bg2">
-                <a:lumMod val="75000"/>
-              </a:schemeClr>
-            </a:solidFill>
-          </a:ln>
-        </p:spPr>
-        <p:style>
-          <a:lnRef idx="2">
-            <a:schemeClr val="accent1">
-              <a:shade val="50000"/>
-            </a:schemeClr>
-          </a:lnRef>
-          <a:fillRef idx="1">
-            <a:schemeClr val="accent1"/>
-          </a:fillRef>
-          <a:effectRef idx="0">
-            <a:schemeClr val="accent1"/>
-          </a:effectRef>
-          <a:fontRef idx="minor">
-            <a:schemeClr val="lt1"/>
-          </a:fontRef>
-        </p:style>
-        <p:txBody>
-          <a:bodyPr rtlCol="0" anchor="ctr"/>
-          <a:lstStyle/>
-          <a:p>
-            <a:pPr algn="ctr"/>
-            <a:endParaRPr kumimoji="1" lang="ja-JP" altLang="en-US"/>
-          </a:p>
-        </p:txBody>
-      </p:sp>
-      <p:sp>
-        <p:nvSpPr>
-          <p:cNvPr id="134" name="正方形/長方形 133">
-            <a:extLst>
-              <a:ext uri="{FF2B5EF4-FFF2-40B4-BE49-F238E27FC236}">
-                <a16:creationId xmlns:a16="http://schemas.microsoft.com/office/drawing/2014/main" id="{963A7C05-B878-7641-9B30-F7345833E573}"/>
-              </a:ext>
-            </a:extLst>
-          </p:cNvPr>
-          <p:cNvSpPr/>
-          <p:nvPr/>
-        </p:nvSpPr>
-        <p:spPr>
-          <a:xfrm>
-            <a:off x="16848835" y="26613466"/>
-            <a:ext cx="1036192" cy="1865171"/>
-          </a:xfrm>
-          <a:prstGeom prst="rect">
-            <a:avLst/>
-          </a:prstGeom>
-          <a:solidFill>
-            <a:schemeClr val="bg1"/>
-          </a:solidFill>
-          <a:ln>
-            <a:solidFill>
-              <a:schemeClr val="bg2">
-                <a:lumMod val="75000"/>
-              </a:schemeClr>
-            </a:solidFill>
-          </a:ln>
-        </p:spPr>
-        <p:style>
-          <a:lnRef idx="2">
-            <a:schemeClr val="accent1">
-              <a:shade val="50000"/>
-            </a:schemeClr>
-          </a:lnRef>
-          <a:fillRef idx="1">
-            <a:schemeClr val="accent1"/>
-          </a:fillRef>
-          <a:effectRef idx="0">
-            <a:schemeClr val="accent1"/>
-          </a:effectRef>
-          <a:fontRef idx="minor">
-            <a:schemeClr val="lt1"/>
-          </a:fontRef>
-        </p:style>
-        <p:txBody>
-          <a:bodyPr rtlCol="0" anchor="ctr"/>
-          <a:lstStyle/>
-          <a:p>
-            <a:pPr algn="ctr"/>
-            <a:endParaRPr kumimoji="1" lang="ja-JP" altLang="en-US"/>
-          </a:p>
-        </p:txBody>
-      </p:sp>
-      <p:sp>
-        <p:nvSpPr>
-          <p:cNvPr id="136" name="正方形/長方形 135">
-            <a:extLst>
-              <a:ext uri="{FF2B5EF4-FFF2-40B4-BE49-F238E27FC236}">
-                <a16:creationId xmlns:a16="http://schemas.microsoft.com/office/drawing/2014/main" id="{986F6CB6-B3E0-3142-A728-9B160C04DCEC}"/>
-              </a:ext>
-            </a:extLst>
-          </p:cNvPr>
-          <p:cNvSpPr/>
-          <p:nvPr/>
-        </p:nvSpPr>
-        <p:spPr>
-          <a:xfrm>
-            <a:off x="17001235" y="26765866"/>
-            <a:ext cx="1036192" cy="1865171"/>
-          </a:xfrm>
-          <a:prstGeom prst="rect">
-            <a:avLst/>
-          </a:prstGeom>
-          <a:solidFill>
-            <a:schemeClr val="bg1"/>
-          </a:solidFill>
-          <a:ln>
-            <a:solidFill>
-              <a:schemeClr val="bg2">
-                <a:lumMod val="75000"/>
-              </a:schemeClr>
-            </a:solidFill>
-          </a:ln>
-        </p:spPr>
-        <p:style>
-          <a:lnRef idx="2">
-            <a:schemeClr val="accent1">
-              <a:shade val="50000"/>
-            </a:schemeClr>
-          </a:lnRef>
-          <a:fillRef idx="1">
-            <a:schemeClr val="accent1"/>
-          </a:fillRef>
-          <a:effectRef idx="0">
-            <a:schemeClr val="accent1"/>
-          </a:effectRef>
-          <a:fontRef idx="minor">
-            <a:schemeClr val="lt1"/>
-          </a:fontRef>
-        </p:style>
-        <p:txBody>
-          <a:bodyPr rtlCol="0" anchor="ctr"/>
-          <a:lstStyle/>
-          <a:p>
-            <a:pPr algn="ctr"/>
-            <a:endParaRPr kumimoji="1" lang="ja-JP" altLang="en-US"/>
-          </a:p>
-        </p:txBody>
-      </p:sp>
-      <p:sp>
-        <p:nvSpPr>
           <p:cNvPr id="37" name="テキスト ボックス 36">
             <a:extLst>
               <a:ext uri="{FF2B5EF4-FFF2-40B4-BE49-F238E27FC236}">
@@ -15072,8 +15088,8 @@
         </p:nvSpPr>
         <p:spPr>
           <a:xfrm>
-            <a:off x="15631634" y="29014809"/>
-            <a:ext cx="3775393" cy="1323439"/>
+            <a:off x="16170249" y="29031405"/>
+            <a:ext cx="3057247" cy="1077218"/>
           </a:xfrm>
           <a:prstGeom prst="rect">
             <a:avLst/>
@@ -15088,13 +15104,13 @@
           <a:p>
             <a:pPr algn="ctr"/>
             <a:r>
-              <a:rPr kumimoji="1" lang="ja-JP" altLang="en-US" sz="4000">
+              <a:rPr kumimoji="1" lang="ja-JP" altLang="en-US" sz="3200">
                 <a:latin typeface="Hiragino Sans W4" panose="020B0400000000000000" pitchFamily="34" charset="-128"/>
                 <a:ea typeface="Hiragino Sans W4" panose="020B0400000000000000" pitchFamily="34" charset="-128"/>
               </a:rPr>
               <a:t>全スポットの</a:t>
             </a:r>
-            <a:endParaRPr kumimoji="1" lang="en-US" altLang="ja-JP" sz="4000" dirty="0">
+            <a:endParaRPr kumimoji="1" lang="en-US" altLang="ja-JP" sz="3200" dirty="0">
               <a:latin typeface="Hiragino Sans W4" panose="020B0400000000000000" pitchFamily="34" charset="-128"/>
               <a:ea typeface="Hiragino Sans W4" panose="020B0400000000000000" pitchFamily="34" charset="-128"/>
             </a:endParaRPr>
@@ -15102,7 +15118,7 @@
           <a:p>
             <a:pPr algn="ctr"/>
             <a:r>
-              <a:rPr kumimoji="1" lang="ja-JP" altLang="en-US" sz="4000">
+              <a:rPr kumimoji="1" lang="ja-JP" altLang="en-US" sz="3200">
                 <a:latin typeface="Hiragino Sans W4" panose="020B0400000000000000" pitchFamily="34" charset="-128"/>
                 <a:ea typeface="Hiragino Sans W4" panose="020B0400000000000000" pitchFamily="34" charset="-128"/>
               </a:rPr>
@@ -15125,7 +15141,7 @@
         </p:nvSpPr>
         <p:spPr>
           <a:xfrm>
-            <a:off x="19113275" y="27358447"/>
+            <a:off x="19946542" y="27816293"/>
             <a:ext cx="3006810" cy="936000"/>
           </a:xfrm>
           <a:prstGeom prst="rightArrow">
@@ -15186,8 +15202,8 @@
         </p:nvSpPr>
         <p:spPr>
           <a:xfrm>
-            <a:off x="18263131" y="26688353"/>
-            <a:ext cx="5414706" cy="646331"/>
+            <a:off x="19334493" y="26646654"/>
+            <a:ext cx="4693336" cy="1077218"/>
           </a:xfrm>
           <a:prstGeom prst="rect">
             <a:avLst/>
@@ -15201,43 +15217,1867 @@
           <a:lstStyle/>
           <a:p>
             <a:r>
-              <a:rPr kumimoji="1" lang="ja-JP" altLang="en-US" sz="3600">
+              <a:rPr kumimoji="1" lang="ja-JP" altLang="en-US" sz="3200">
                 <a:latin typeface="Hiragino Sans W4" panose="020B0400000000000000" pitchFamily="34" charset="-128"/>
                 <a:ea typeface="Hiragino Sans W4" panose="020B0400000000000000" pitchFamily="34" charset="-128"/>
               </a:rPr>
               <a:t>トピック</a:t>
             </a:r>
             <a:r>
-              <a:rPr kumimoji="1" lang="en-US" altLang="ja-JP" sz="3600" dirty="0">
+              <a:rPr kumimoji="1" lang="en-US" altLang="ja-JP" sz="3200" dirty="0">
                 <a:latin typeface="Hiragino Sans W4" panose="020B0400000000000000" pitchFamily="34" charset="-128"/>
                 <a:ea typeface="Hiragino Sans W4" panose="020B0400000000000000" pitchFamily="34" charset="-128"/>
               </a:rPr>
               <a:t>(</a:t>
             </a:r>
             <a:r>
-              <a:rPr kumimoji="1" lang="ja-JP" altLang="en-US" sz="3600">
+              <a:rPr kumimoji="1" lang="ja-JP" altLang="en-US" sz="3200">
                 <a:latin typeface="Hiragino Sans W4" panose="020B0400000000000000" pitchFamily="34" charset="-128"/>
                 <a:ea typeface="Hiragino Sans W4" panose="020B0400000000000000" pitchFamily="34" charset="-128"/>
               </a:rPr>
               <a:t>話題</a:t>
             </a:r>
             <a:r>
-              <a:rPr kumimoji="1" lang="en-US" altLang="ja-JP" sz="3600" dirty="0">
+              <a:rPr kumimoji="1" lang="en-US" altLang="ja-JP" sz="3200" dirty="0">
                 <a:latin typeface="Hiragino Sans W4" panose="020B0400000000000000" pitchFamily="34" charset="-128"/>
                 <a:ea typeface="Hiragino Sans W4" panose="020B0400000000000000" pitchFamily="34" charset="-128"/>
               </a:rPr>
               <a:t>)</a:t>
             </a:r>
             <a:r>
-              <a:rPr kumimoji="1" lang="ja-JP" altLang="en-US" sz="3600">
+              <a:rPr kumimoji="1" lang="ja-JP" altLang="en-US" sz="3200">
                 <a:latin typeface="Hiragino Sans W4" panose="020B0400000000000000" pitchFamily="34" charset="-128"/>
                 <a:ea typeface="Hiragino Sans W4" panose="020B0400000000000000" pitchFamily="34" charset="-128"/>
               </a:rPr>
               <a:t>を抽出</a:t>
             </a:r>
-          </a:p>
-        </p:txBody>
-      </p:sp>
+            <a:endParaRPr kumimoji="1" lang="en-US" altLang="ja-JP" sz="3200" dirty="0">
+              <a:latin typeface="Hiragino Sans W4" panose="020B0400000000000000" pitchFamily="34" charset="-128"/>
+              <a:ea typeface="Hiragino Sans W4" panose="020B0400000000000000" pitchFamily="34" charset="-128"/>
+            </a:endParaRPr>
+          </a:p>
+          <a:p>
+            <a:pPr algn="ctr"/>
+            <a:r>
+              <a:rPr lang="en-US" altLang="ja-JP" sz="3200" dirty="0">
+                <a:latin typeface="Hiragino Sans W4" panose="020B0400000000000000" pitchFamily="34" charset="-128"/>
+                <a:ea typeface="Hiragino Sans W4" panose="020B0400000000000000" pitchFamily="34" charset="-128"/>
+              </a:rPr>
+              <a:t>(</a:t>
+            </a:r>
+            <a:r>
+              <a:rPr lang="ja-JP" altLang="en-US" sz="3200">
+                <a:latin typeface="Hiragino Sans W4" panose="020B0400000000000000" pitchFamily="34" charset="-128"/>
+                <a:ea typeface="Hiragino Sans W4" panose="020B0400000000000000" pitchFamily="34" charset="-128"/>
+              </a:rPr>
+              <a:t>トピック数</a:t>
+            </a:r>
+            <a:r>
+              <a:rPr lang="en-US" altLang="ja-JP" sz="3200" dirty="0">
+                <a:latin typeface="Hiragino Sans W4" panose="020B0400000000000000" pitchFamily="34" charset="-128"/>
+                <a:ea typeface="Hiragino Sans W4" panose="020B0400000000000000" pitchFamily="34" charset="-128"/>
+              </a:rPr>
+              <a:t>: 8)</a:t>
+            </a:r>
+            <a:endParaRPr kumimoji="1" lang="ja-JP" altLang="en-US" sz="3200">
+              <a:latin typeface="Hiragino Sans W4" panose="020B0400000000000000" pitchFamily="34" charset="-128"/>
+              <a:ea typeface="Hiragino Sans W4" panose="020B0400000000000000" pitchFamily="34" charset="-128"/>
+            </a:endParaRPr>
+          </a:p>
+        </p:txBody>
+      </p:sp>
+      <p:sp>
+        <p:nvSpPr>
+          <p:cNvPr id="41" name="テキスト ボックス 40">
+            <a:extLst>
+              <a:ext uri="{FF2B5EF4-FFF2-40B4-BE49-F238E27FC236}">
+                <a16:creationId xmlns:a16="http://schemas.microsoft.com/office/drawing/2014/main" id="{B085E81F-F4C7-D948-9132-A8098C150337}"/>
+              </a:ext>
+            </a:extLst>
+          </p:cNvPr>
+          <p:cNvSpPr txBox="1"/>
+          <p:nvPr/>
+        </p:nvSpPr>
+        <p:spPr>
+          <a:xfrm>
+            <a:off x="-13346058" y="28969158"/>
+            <a:ext cx="5314275" cy="3170099"/>
+          </a:xfrm>
+          <a:prstGeom prst="rect">
+            <a:avLst/>
+          </a:prstGeom>
+          <a:noFill/>
+        </p:spPr>
+        <p:txBody>
+          <a:bodyPr wrap="none" rtlCol="0">
+            <a:spAutoFit/>
+          </a:bodyPr>
+          <a:lstStyle/>
+          <a:p>
+            <a:r>
+              <a:rPr lang="ja-JP" altLang="en-US" sz="4000">
+                <a:latin typeface="Hiragino Sans W4" panose="020B0400000000000000" pitchFamily="34" charset="-128"/>
+                <a:ea typeface="Hiragino Sans W4" panose="020B0400000000000000" pitchFamily="34" charset="-128"/>
+              </a:rPr>
+              <a:t>・展示、美術館</a:t>
+            </a:r>
+            <a:endParaRPr lang="en-US" altLang="ja-JP" sz="4000" dirty="0">
+              <a:latin typeface="Hiragino Sans W4" panose="020B0400000000000000" pitchFamily="34" charset="-128"/>
+              <a:ea typeface="Hiragino Sans W4" panose="020B0400000000000000" pitchFamily="34" charset="-128"/>
+            </a:endParaRPr>
+          </a:p>
+          <a:p>
+            <a:r>
+              <a:rPr lang="ja-JP" altLang="en-US" sz="4000">
+                <a:latin typeface="Hiragino Sans W4" panose="020B0400000000000000" pitchFamily="34" charset="-128"/>
+                <a:ea typeface="Hiragino Sans W4" panose="020B0400000000000000" pitchFamily="34" charset="-128"/>
+              </a:rPr>
+              <a:t>・景色</a:t>
+            </a:r>
+            <a:endParaRPr lang="en-US" altLang="ja-JP" sz="4000" dirty="0">
+              <a:latin typeface="Hiragino Sans W4" panose="020B0400000000000000" pitchFamily="34" charset="-128"/>
+              <a:ea typeface="Hiragino Sans W4" panose="020B0400000000000000" pitchFamily="34" charset="-128"/>
+            </a:endParaRPr>
+          </a:p>
+          <a:p>
+            <a:r>
+              <a:rPr lang="ja-JP" altLang="en-US" sz="4000">
+                <a:latin typeface="Hiragino Sans W4" panose="020B0400000000000000" pitchFamily="34" charset="-128"/>
+                <a:ea typeface="Hiragino Sans W4" panose="020B0400000000000000" pitchFamily="34" charset="-128"/>
+              </a:rPr>
+              <a:t>・桜、紅葉</a:t>
+            </a:r>
+            <a:endParaRPr lang="en-US" altLang="ja-JP" sz="4000" dirty="0">
+              <a:latin typeface="Hiragino Sans W4" panose="020B0400000000000000" pitchFamily="34" charset="-128"/>
+              <a:ea typeface="Hiragino Sans W4" panose="020B0400000000000000" pitchFamily="34" charset="-128"/>
+            </a:endParaRPr>
+          </a:p>
+          <a:p>
+            <a:r>
+              <a:rPr lang="ja-JP" altLang="en-US" sz="4000">
+                <a:latin typeface="Hiragino Sans W4" panose="020B0400000000000000" pitchFamily="34" charset="-128"/>
+                <a:ea typeface="Hiragino Sans W4" panose="020B0400000000000000" pitchFamily="34" charset="-128"/>
+              </a:rPr>
+              <a:t>・レストラン、買い物</a:t>
+            </a:r>
+            <a:endParaRPr lang="en-US" altLang="ja-JP" sz="4000" dirty="0">
+              <a:latin typeface="Hiragino Sans W4" panose="020B0400000000000000" pitchFamily="34" charset="-128"/>
+              <a:ea typeface="Hiragino Sans W4" panose="020B0400000000000000" pitchFamily="34" charset="-128"/>
+            </a:endParaRPr>
+          </a:p>
+          <a:p>
+            <a:r>
+              <a:rPr lang="ja-JP" altLang="en-US" sz="4000">
+                <a:latin typeface="Hiragino Sans W4" panose="020B0400000000000000" pitchFamily="34" charset="-128"/>
+                <a:ea typeface="Hiragino Sans W4" panose="020B0400000000000000" pitchFamily="34" charset="-128"/>
+              </a:rPr>
+              <a:t>・お寺</a:t>
+            </a:r>
+            <a:endParaRPr lang="en-US" altLang="ja-JP" sz="4000" dirty="0">
+              <a:latin typeface="Hiragino Sans W4" panose="020B0400000000000000" pitchFamily="34" charset="-128"/>
+              <a:ea typeface="Hiragino Sans W4" panose="020B0400000000000000" pitchFamily="34" charset="-128"/>
+            </a:endParaRPr>
+          </a:p>
+        </p:txBody>
+      </p:sp>
+      <p:sp>
+        <p:nvSpPr>
+          <p:cNvPr id="43" name="テキスト ボックス 42">
+            <a:extLst>
+              <a:ext uri="{FF2B5EF4-FFF2-40B4-BE49-F238E27FC236}">
+                <a16:creationId xmlns:a16="http://schemas.microsoft.com/office/drawing/2014/main" id="{DE458B69-6EAF-8442-9FA3-26E3BCC9BB65}"/>
+              </a:ext>
+            </a:extLst>
+          </p:cNvPr>
+          <p:cNvSpPr txBox="1"/>
+          <p:nvPr/>
+        </p:nvSpPr>
+        <p:spPr>
+          <a:xfrm>
+            <a:off x="32239986" y="28776441"/>
+            <a:ext cx="4134465" cy="769441"/>
+          </a:xfrm>
+          <a:prstGeom prst="rect">
+            <a:avLst/>
+          </a:prstGeom>
+          <a:noFill/>
+        </p:spPr>
+        <p:txBody>
+          <a:bodyPr wrap="none" rtlCol="0">
+            <a:spAutoFit/>
+          </a:bodyPr>
+          <a:lstStyle/>
+          <a:p>
+            <a:r>
+              <a:rPr lang="ja-JP" altLang="en-US" sz="4400">
+                <a:latin typeface="Hiragino Sans W4" panose="020B0400000000000000" pitchFamily="34" charset="-128"/>
+                <a:ea typeface="Hiragino Sans W4" panose="020B0400000000000000" pitchFamily="34" charset="-128"/>
+              </a:rPr>
+              <a:t>トピック数：５</a:t>
+            </a:r>
+            <a:endParaRPr lang="en-US" altLang="ja-JP" sz="4400" dirty="0">
+              <a:latin typeface="Hiragino Sans W4" panose="020B0400000000000000" pitchFamily="34" charset="-128"/>
+              <a:ea typeface="Hiragino Sans W4" panose="020B0400000000000000" pitchFamily="34" charset="-128"/>
+            </a:endParaRPr>
+          </a:p>
+        </p:txBody>
+      </p:sp>
+      <p:graphicFrame>
+        <p:nvGraphicFramePr>
+          <p:cNvPr id="148" name="表 147">
+            <a:extLst>
+              <a:ext uri="{FF2B5EF4-FFF2-40B4-BE49-F238E27FC236}">
+                <a16:creationId xmlns:a16="http://schemas.microsoft.com/office/drawing/2014/main" id="{47ED07A1-8E20-4B4B-85BD-F048D485BE91}"/>
+              </a:ext>
+            </a:extLst>
+          </p:cNvPr>
+          <p:cNvGraphicFramePr>
+            <a:graphicFrameLocks noGrp="1"/>
+          </p:cNvGraphicFramePr>
+          <p:nvPr>
+            <p:extLst>
+              <p:ext uri="{D42A27DB-BD31-4B8C-83A1-F6EECF244321}">
+                <p14:modId xmlns:p14="http://schemas.microsoft.com/office/powerpoint/2010/main" val="1957645294"/>
+              </p:ext>
+            </p:extLst>
+          </p:nvPr>
+        </p:nvGraphicFramePr>
+        <p:xfrm>
+          <a:off x="24116711" y="25992014"/>
+          <a:ext cx="3507933" cy="4114800"/>
+        </p:xfrm>
+        <a:graphic>
+          <a:graphicData uri="http://schemas.openxmlformats.org/drawingml/2006/table">
+            <a:tbl>
+              <a:tblPr firstRow="1" bandRow="1">
+                <a:tableStyleId>{2A488322-F2BA-4B5B-9748-0D474271808F}</a:tableStyleId>
+              </a:tblPr>
+              <a:tblGrid>
+                <a:gridCol w="3507933">
+                  <a:extLst>
+                    <a:ext uri="{9D8B030D-6E8A-4147-A177-3AD203B41FA5}">
+                      <a16:colId xmlns:a16="http://schemas.microsoft.com/office/drawing/2014/main" val="476507974"/>
+                    </a:ext>
+                  </a:extLst>
+                </a:gridCol>
+              </a:tblGrid>
+              <a:tr h="417670">
+                <a:tc>
+                  <a:txBody>
+                    <a:bodyPr/>
+                    <a:lstStyle/>
+                    <a:p>
+                      <a:pPr algn="ctr"/>
+                      <a:r>
+                        <a:rPr kumimoji="1" lang="ja-JP" altLang="en-US" sz="2400">
+                          <a:latin typeface="Hiragino Sans W4" panose="020B0400000000000000" pitchFamily="34" charset="-128"/>
+                          <a:ea typeface="Hiragino Sans W4" panose="020B0400000000000000" pitchFamily="34" charset="-128"/>
+                        </a:rPr>
+                        <a:t>トピック</a:t>
+                      </a:r>
+                    </a:p>
+                  </a:txBody>
+                  <a:tcPr/>
+                </a:tc>
+                <a:extLst>
+                  <a:ext uri="{0D108BD9-81ED-4DB2-BD59-A6C34878D82A}">
+                    <a16:rowId xmlns:a16="http://schemas.microsoft.com/office/drawing/2014/main" val="523836565"/>
+                  </a:ext>
+                </a:extLst>
+              </a:tr>
+              <a:tr h="417670">
+                <a:tc>
+                  <a:txBody>
+                    <a:bodyPr/>
+                    <a:lstStyle/>
+                    <a:p>
+                      <a:r>
+                        <a:rPr kumimoji="1" lang="ja-JP" altLang="en-US" sz="2400">
+                          <a:latin typeface="Hiragino Sans W4" panose="020B0400000000000000" pitchFamily="34" charset="-128"/>
+                          <a:ea typeface="Hiragino Sans W4" panose="020B0400000000000000" pitchFamily="34" charset="-128"/>
+                        </a:rPr>
+                        <a:t>買い物</a:t>
+                      </a:r>
+                    </a:p>
+                  </a:txBody>
+                  <a:tcPr/>
+                </a:tc>
+                <a:extLst>
+                  <a:ext uri="{0D108BD9-81ED-4DB2-BD59-A6C34878D82A}">
+                    <a16:rowId xmlns:a16="http://schemas.microsoft.com/office/drawing/2014/main" val="4074486588"/>
+                  </a:ext>
+                </a:extLst>
+              </a:tr>
+              <a:tr h="417670">
+                <a:tc>
+                  <a:txBody>
+                    <a:bodyPr/>
+                    <a:lstStyle/>
+                    <a:p>
+                      <a:r>
+                        <a:rPr kumimoji="1" lang="ja-JP" altLang="en-US" sz="2400">
+                          <a:latin typeface="Hiragino Sans W4" panose="020B0400000000000000" pitchFamily="34" charset="-128"/>
+                          <a:ea typeface="Hiragino Sans W4" panose="020B0400000000000000" pitchFamily="34" charset="-128"/>
+                        </a:rPr>
+                        <a:t>お参り、参道</a:t>
+                      </a:r>
+                    </a:p>
+                  </a:txBody>
+                  <a:tcPr/>
+                </a:tc>
+                <a:extLst>
+                  <a:ext uri="{0D108BD9-81ED-4DB2-BD59-A6C34878D82A}">
+                    <a16:rowId xmlns:a16="http://schemas.microsoft.com/office/drawing/2014/main" val="29630606"/>
+                  </a:ext>
+                </a:extLst>
+              </a:tr>
+              <a:tr h="417670">
+                <a:tc>
+                  <a:txBody>
+                    <a:bodyPr/>
+                    <a:lstStyle/>
+                    <a:p>
+                      <a:r>
+                        <a:rPr lang="ja-JP" altLang="en-US" sz="2400">
+                          <a:latin typeface="Hiragino Sans W4" panose="020B0400000000000000" pitchFamily="34" charset="-128"/>
+                          <a:ea typeface="Hiragino Sans W4" panose="020B0400000000000000" pitchFamily="34" charset="-128"/>
+                        </a:rPr>
+                        <a:t>美術館、作品、博物館</a:t>
+                      </a:r>
+                      <a:endParaRPr kumimoji="1" lang="ja-JP" altLang="en-US" sz="2400">
+                        <a:latin typeface="Hiragino Sans W4" panose="020B0400000000000000" pitchFamily="34" charset="-128"/>
+                        <a:ea typeface="Hiragino Sans W4" panose="020B0400000000000000" pitchFamily="34" charset="-128"/>
+                      </a:endParaRPr>
+                    </a:p>
+                  </a:txBody>
+                  <a:tcPr/>
+                </a:tc>
+                <a:extLst>
+                  <a:ext uri="{0D108BD9-81ED-4DB2-BD59-A6C34878D82A}">
+                    <a16:rowId xmlns:a16="http://schemas.microsoft.com/office/drawing/2014/main" val="176714018"/>
+                  </a:ext>
+                </a:extLst>
+              </a:tr>
+              <a:tr h="417670">
+                <a:tc>
+                  <a:txBody>
+                    <a:bodyPr/>
+                    <a:lstStyle/>
+                    <a:p>
+                      <a:r>
+                        <a:rPr kumimoji="1" lang="ja-JP" altLang="en-US" sz="2400">
+                          <a:latin typeface="Hiragino Sans W4" panose="020B0400000000000000" pitchFamily="34" charset="-128"/>
+                          <a:ea typeface="Hiragino Sans W4" panose="020B0400000000000000" pitchFamily="34" charset="-128"/>
+                        </a:rPr>
+                        <a:t>芝生、遊具</a:t>
+                      </a:r>
+                    </a:p>
+                  </a:txBody>
+                  <a:tcPr/>
+                </a:tc>
+                <a:extLst>
+                  <a:ext uri="{0D108BD9-81ED-4DB2-BD59-A6C34878D82A}">
+                    <a16:rowId xmlns:a16="http://schemas.microsoft.com/office/drawing/2014/main" val="4162520137"/>
+                  </a:ext>
+                </a:extLst>
+              </a:tr>
+              <a:tr h="417670">
+                <a:tc>
+                  <a:txBody>
+                    <a:bodyPr/>
+                    <a:lstStyle/>
+                    <a:p>
+                      <a:r>
+                        <a:rPr kumimoji="1" lang="ja-JP" altLang="en-US" sz="2400">
+                          <a:latin typeface="Hiragino Sans W4" panose="020B0400000000000000" pitchFamily="34" charset="-128"/>
+                          <a:ea typeface="Hiragino Sans W4" panose="020B0400000000000000" pitchFamily="34" charset="-128"/>
+                        </a:rPr>
+                        <a:t>店舗、活気、モール</a:t>
+                      </a:r>
+                    </a:p>
+                  </a:txBody>
+                  <a:tcPr/>
+                </a:tc>
+                <a:extLst>
+                  <a:ext uri="{0D108BD9-81ED-4DB2-BD59-A6C34878D82A}">
+                    <a16:rowId xmlns:a16="http://schemas.microsoft.com/office/drawing/2014/main" val="600197875"/>
+                  </a:ext>
+                </a:extLst>
+              </a:tr>
+              <a:tr h="417670">
+                <a:tc>
+                  <a:txBody>
+                    <a:bodyPr/>
+                    <a:lstStyle/>
+                    <a:p>
+                      <a:r>
+                        <a:rPr kumimoji="1" lang="ja-JP" altLang="en-US" sz="2400">
+                          <a:latin typeface="Hiragino Sans W4" panose="020B0400000000000000" pitchFamily="34" charset="-128"/>
+                          <a:ea typeface="Hiragino Sans W4" panose="020B0400000000000000" pitchFamily="34" charset="-128"/>
+                        </a:rPr>
+                        <a:t>橋、海、眺め</a:t>
+                      </a:r>
+                    </a:p>
+                  </a:txBody>
+                  <a:tcPr/>
+                </a:tc>
+                <a:extLst>
+                  <a:ext uri="{0D108BD9-81ED-4DB2-BD59-A6C34878D82A}">
+                    <a16:rowId xmlns:a16="http://schemas.microsoft.com/office/drawing/2014/main" val="299920995"/>
+                  </a:ext>
+                </a:extLst>
+              </a:tr>
+              <a:tr h="417670">
+                <a:tc>
+                  <a:txBody>
+                    <a:bodyPr/>
+                    <a:lstStyle/>
+                    <a:p>
+                      <a:r>
+                        <a:rPr kumimoji="1" lang="ja-JP" altLang="en-US" sz="2400">
+                          <a:latin typeface="Hiragino Sans W4" panose="020B0400000000000000" pitchFamily="34" charset="-128"/>
+                          <a:ea typeface="Hiragino Sans W4" panose="020B0400000000000000" pitchFamily="34" charset="-128"/>
+                        </a:rPr>
+                        <a:t>観戦、球場</a:t>
+                      </a:r>
+                    </a:p>
+                  </a:txBody>
+                  <a:tcPr/>
+                </a:tc>
+                <a:extLst>
+                  <a:ext uri="{0D108BD9-81ED-4DB2-BD59-A6C34878D82A}">
+                    <a16:rowId xmlns:a16="http://schemas.microsoft.com/office/drawing/2014/main" val="4201362477"/>
+                  </a:ext>
+                </a:extLst>
+              </a:tr>
+              <a:tr h="417670">
+                <a:tc>
+                  <a:txBody>
+                    <a:bodyPr/>
+                    <a:lstStyle/>
+                    <a:p>
+                      <a:r>
+                        <a:rPr kumimoji="1" lang="ja-JP" altLang="en-US" sz="2400">
+                          <a:latin typeface="Hiragino Sans W4" panose="020B0400000000000000" pitchFamily="34" charset="-128"/>
+                          <a:ea typeface="Hiragino Sans W4" panose="020B0400000000000000" pitchFamily="34" charset="-128"/>
+                        </a:rPr>
+                        <a:t>お寺、庭園、花</a:t>
+                      </a:r>
+                    </a:p>
+                  </a:txBody>
+                  <a:tcPr/>
+                </a:tc>
+                <a:extLst>
+                  <a:ext uri="{0D108BD9-81ED-4DB2-BD59-A6C34878D82A}">
+                    <a16:rowId xmlns:a16="http://schemas.microsoft.com/office/drawing/2014/main" val="2811823831"/>
+                  </a:ext>
+                </a:extLst>
+              </a:tr>
+            </a:tbl>
+          </a:graphicData>
+        </a:graphic>
+      </p:graphicFrame>
+      <p:grpSp>
+        <p:nvGrpSpPr>
+          <p:cNvPr id="162" name="グループ化 161">
+            <a:extLst>
+              <a:ext uri="{FF2B5EF4-FFF2-40B4-BE49-F238E27FC236}">
+                <a16:creationId xmlns:a16="http://schemas.microsoft.com/office/drawing/2014/main" id="{8A489CFA-EBA8-A546-8123-CA183639526F}"/>
+              </a:ext>
+            </a:extLst>
+          </p:cNvPr>
+          <p:cNvGrpSpPr/>
+          <p:nvPr/>
+        </p:nvGrpSpPr>
+        <p:grpSpPr>
+          <a:xfrm>
+            <a:off x="17805780" y="26202597"/>
+            <a:ext cx="1340992" cy="2169971"/>
+            <a:chOff x="16696435" y="26461066"/>
+            <a:chExt cx="1340992" cy="2169971"/>
+          </a:xfrm>
+        </p:grpSpPr>
+        <p:sp>
+          <p:nvSpPr>
+            <p:cNvPr id="163" name="正方形/長方形 162">
+              <a:extLst>
+                <a:ext uri="{FF2B5EF4-FFF2-40B4-BE49-F238E27FC236}">
+                  <a16:creationId xmlns:a16="http://schemas.microsoft.com/office/drawing/2014/main" id="{DB9D3984-DBBE-5849-A7EE-560FD33E88D9}"/>
+                </a:ext>
+              </a:extLst>
+            </p:cNvPr>
+            <p:cNvSpPr/>
+            <p:nvPr/>
+          </p:nvSpPr>
+          <p:spPr>
+            <a:xfrm>
+              <a:off x="16696435" y="26461066"/>
+              <a:ext cx="1036192" cy="1865171"/>
+            </a:xfrm>
+            <a:prstGeom prst="rect">
+              <a:avLst/>
+            </a:prstGeom>
+            <a:solidFill>
+              <a:schemeClr val="bg1"/>
+            </a:solidFill>
+            <a:ln>
+              <a:solidFill>
+                <a:schemeClr val="bg2">
+                  <a:lumMod val="75000"/>
+                </a:schemeClr>
+              </a:solidFill>
+            </a:ln>
+          </p:spPr>
+          <p:style>
+            <a:lnRef idx="2">
+              <a:schemeClr val="accent1">
+                <a:shade val="50000"/>
+              </a:schemeClr>
+            </a:lnRef>
+            <a:fillRef idx="1">
+              <a:schemeClr val="accent1"/>
+            </a:fillRef>
+            <a:effectRef idx="0">
+              <a:schemeClr val="accent1"/>
+            </a:effectRef>
+            <a:fontRef idx="minor">
+              <a:schemeClr val="lt1"/>
+            </a:fontRef>
+          </p:style>
+          <p:txBody>
+            <a:bodyPr rtlCol="0" anchor="ctr"/>
+            <a:lstStyle/>
+            <a:p>
+              <a:pPr algn="ctr"/>
+              <a:endParaRPr kumimoji="1" lang="ja-JP" altLang="en-US"/>
+            </a:p>
+          </p:txBody>
+        </p:sp>
+        <p:sp>
+          <p:nvSpPr>
+            <p:cNvPr id="164" name="正方形/長方形 163">
+              <a:extLst>
+                <a:ext uri="{FF2B5EF4-FFF2-40B4-BE49-F238E27FC236}">
+                  <a16:creationId xmlns:a16="http://schemas.microsoft.com/office/drawing/2014/main" id="{13143686-60AB-E54F-B307-01680CB4D874}"/>
+                </a:ext>
+              </a:extLst>
+            </p:cNvPr>
+            <p:cNvSpPr/>
+            <p:nvPr/>
+          </p:nvSpPr>
+          <p:spPr>
+            <a:xfrm>
+              <a:off x="16848835" y="26613466"/>
+              <a:ext cx="1036192" cy="1865171"/>
+            </a:xfrm>
+            <a:prstGeom prst="rect">
+              <a:avLst/>
+            </a:prstGeom>
+            <a:solidFill>
+              <a:schemeClr val="bg1"/>
+            </a:solidFill>
+            <a:ln>
+              <a:solidFill>
+                <a:schemeClr val="bg2">
+                  <a:lumMod val="75000"/>
+                </a:schemeClr>
+              </a:solidFill>
+            </a:ln>
+          </p:spPr>
+          <p:style>
+            <a:lnRef idx="2">
+              <a:schemeClr val="accent1">
+                <a:shade val="50000"/>
+              </a:schemeClr>
+            </a:lnRef>
+            <a:fillRef idx="1">
+              <a:schemeClr val="accent1"/>
+            </a:fillRef>
+            <a:effectRef idx="0">
+              <a:schemeClr val="accent1"/>
+            </a:effectRef>
+            <a:fontRef idx="minor">
+              <a:schemeClr val="lt1"/>
+            </a:fontRef>
+          </p:style>
+          <p:txBody>
+            <a:bodyPr rtlCol="0" anchor="ctr"/>
+            <a:lstStyle/>
+            <a:p>
+              <a:pPr algn="ctr"/>
+              <a:endParaRPr kumimoji="1" lang="ja-JP" altLang="en-US"/>
+            </a:p>
+          </p:txBody>
+        </p:sp>
+        <p:sp>
+          <p:nvSpPr>
+            <p:cNvPr id="165" name="正方形/長方形 164">
+              <a:extLst>
+                <a:ext uri="{FF2B5EF4-FFF2-40B4-BE49-F238E27FC236}">
+                  <a16:creationId xmlns:a16="http://schemas.microsoft.com/office/drawing/2014/main" id="{6C9D0457-3733-2640-80EE-F705B03696E8}"/>
+                </a:ext>
+              </a:extLst>
+            </p:cNvPr>
+            <p:cNvSpPr/>
+            <p:nvPr/>
+          </p:nvSpPr>
+          <p:spPr>
+            <a:xfrm>
+              <a:off x="17001235" y="26765866"/>
+              <a:ext cx="1036192" cy="1865171"/>
+            </a:xfrm>
+            <a:prstGeom prst="rect">
+              <a:avLst/>
+            </a:prstGeom>
+            <a:solidFill>
+              <a:schemeClr val="bg1"/>
+            </a:solidFill>
+            <a:ln>
+              <a:solidFill>
+                <a:schemeClr val="bg2">
+                  <a:lumMod val="75000"/>
+                </a:schemeClr>
+              </a:solidFill>
+            </a:ln>
+          </p:spPr>
+          <p:style>
+            <a:lnRef idx="2">
+              <a:schemeClr val="accent1">
+                <a:shade val="50000"/>
+              </a:schemeClr>
+            </a:lnRef>
+            <a:fillRef idx="1">
+              <a:schemeClr val="accent1"/>
+            </a:fillRef>
+            <a:effectRef idx="0">
+              <a:schemeClr val="accent1"/>
+            </a:effectRef>
+            <a:fontRef idx="minor">
+              <a:schemeClr val="lt1"/>
+            </a:fontRef>
+          </p:style>
+          <p:txBody>
+            <a:bodyPr rtlCol="0" anchor="ctr"/>
+            <a:lstStyle/>
+            <a:p>
+              <a:pPr algn="ctr"/>
+              <a:endParaRPr kumimoji="1" lang="ja-JP" altLang="en-US"/>
+            </a:p>
+          </p:txBody>
+        </p:sp>
+      </p:grpSp>
+      <p:grpSp>
+        <p:nvGrpSpPr>
+          <p:cNvPr id="166" name="グループ化 165">
+            <a:extLst>
+              <a:ext uri="{FF2B5EF4-FFF2-40B4-BE49-F238E27FC236}">
+                <a16:creationId xmlns:a16="http://schemas.microsoft.com/office/drawing/2014/main" id="{57A45CC3-DFC5-564F-AA7B-D9C110266E0D}"/>
+              </a:ext>
+            </a:extLst>
+          </p:cNvPr>
+          <p:cNvGrpSpPr/>
+          <p:nvPr/>
+        </p:nvGrpSpPr>
+        <p:grpSpPr>
+          <a:xfrm>
+            <a:off x="15967994" y="26201858"/>
+            <a:ext cx="1340992" cy="2169971"/>
+            <a:chOff x="16696435" y="26461066"/>
+            <a:chExt cx="1340992" cy="2169971"/>
+          </a:xfrm>
+        </p:grpSpPr>
+        <p:sp>
+          <p:nvSpPr>
+            <p:cNvPr id="167" name="正方形/長方形 166">
+              <a:extLst>
+                <a:ext uri="{FF2B5EF4-FFF2-40B4-BE49-F238E27FC236}">
+                  <a16:creationId xmlns:a16="http://schemas.microsoft.com/office/drawing/2014/main" id="{3534D4EC-7639-2F48-A965-1EC194CB0E9D}"/>
+                </a:ext>
+              </a:extLst>
+            </p:cNvPr>
+            <p:cNvSpPr/>
+            <p:nvPr/>
+          </p:nvSpPr>
+          <p:spPr>
+            <a:xfrm>
+              <a:off x="16696435" y="26461066"/>
+              <a:ext cx="1036192" cy="1865171"/>
+            </a:xfrm>
+            <a:prstGeom prst="rect">
+              <a:avLst/>
+            </a:prstGeom>
+            <a:solidFill>
+              <a:schemeClr val="bg1"/>
+            </a:solidFill>
+            <a:ln>
+              <a:solidFill>
+                <a:schemeClr val="bg2">
+                  <a:lumMod val="75000"/>
+                </a:schemeClr>
+              </a:solidFill>
+            </a:ln>
+          </p:spPr>
+          <p:style>
+            <a:lnRef idx="2">
+              <a:schemeClr val="accent1">
+                <a:shade val="50000"/>
+              </a:schemeClr>
+            </a:lnRef>
+            <a:fillRef idx="1">
+              <a:schemeClr val="accent1"/>
+            </a:fillRef>
+            <a:effectRef idx="0">
+              <a:schemeClr val="accent1"/>
+            </a:effectRef>
+            <a:fontRef idx="minor">
+              <a:schemeClr val="lt1"/>
+            </a:fontRef>
+          </p:style>
+          <p:txBody>
+            <a:bodyPr rtlCol="0" anchor="ctr"/>
+            <a:lstStyle/>
+            <a:p>
+              <a:pPr algn="ctr"/>
+              <a:endParaRPr kumimoji="1" lang="ja-JP" altLang="en-US"/>
+            </a:p>
+          </p:txBody>
+        </p:sp>
+        <p:sp>
+          <p:nvSpPr>
+            <p:cNvPr id="168" name="正方形/長方形 167">
+              <a:extLst>
+                <a:ext uri="{FF2B5EF4-FFF2-40B4-BE49-F238E27FC236}">
+                  <a16:creationId xmlns:a16="http://schemas.microsoft.com/office/drawing/2014/main" id="{56B3FF0C-4723-5346-98FE-B4E6BEBFD0D9}"/>
+                </a:ext>
+              </a:extLst>
+            </p:cNvPr>
+            <p:cNvSpPr/>
+            <p:nvPr/>
+          </p:nvSpPr>
+          <p:spPr>
+            <a:xfrm>
+              <a:off x="16848835" y="26613466"/>
+              <a:ext cx="1036192" cy="1865171"/>
+            </a:xfrm>
+            <a:prstGeom prst="rect">
+              <a:avLst/>
+            </a:prstGeom>
+            <a:solidFill>
+              <a:schemeClr val="bg1"/>
+            </a:solidFill>
+            <a:ln>
+              <a:solidFill>
+                <a:schemeClr val="bg2">
+                  <a:lumMod val="75000"/>
+                </a:schemeClr>
+              </a:solidFill>
+            </a:ln>
+          </p:spPr>
+          <p:style>
+            <a:lnRef idx="2">
+              <a:schemeClr val="accent1">
+                <a:shade val="50000"/>
+              </a:schemeClr>
+            </a:lnRef>
+            <a:fillRef idx="1">
+              <a:schemeClr val="accent1"/>
+            </a:fillRef>
+            <a:effectRef idx="0">
+              <a:schemeClr val="accent1"/>
+            </a:effectRef>
+            <a:fontRef idx="minor">
+              <a:schemeClr val="lt1"/>
+            </a:fontRef>
+          </p:style>
+          <p:txBody>
+            <a:bodyPr rtlCol="0" anchor="ctr"/>
+            <a:lstStyle/>
+            <a:p>
+              <a:pPr algn="ctr"/>
+              <a:endParaRPr kumimoji="1" lang="ja-JP" altLang="en-US"/>
+            </a:p>
+          </p:txBody>
+        </p:sp>
+        <p:sp>
+          <p:nvSpPr>
+            <p:cNvPr id="169" name="正方形/長方形 168">
+              <a:extLst>
+                <a:ext uri="{FF2B5EF4-FFF2-40B4-BE49-F238E27FC236}">
+                  <a16:creationId xmlns:a16="http://schemas.microsoft.com/office/drawing/2014/main" id="{F908807B-0EC0-D042-A5B9-66012CB0D0D8}"/>
+                </a:ext>
+              </a:extLst>
+            </p:cNvPr>
+            <p:cNvSpPr/>
+            <p:nvPr/>
+          </p:nvSpPr>
+          <p:spPr>
+            <a:xfrm>
+              <a:off x="17001235" y="26765866"/>
+              <a:ext cx="1036192" cy="1865171"/>
+            </a:xfrm>
+            <a:prstGeom prst="rect">
+              <a:avLst/>
+            </a:prstGeom>
+            <a:solidFill>
+              <a:schemeClr val="bg1"/>
+            </a:solidFill>
+            <a:ln>
+              <a:solidFill>
+                <a:schemeClr val="bg2">
+                  <a:lumMod val="75000"/>
+                </a:schemeClr>
+              </a:solidFill>
+            </a:ln>
+          </p:spPr>
+          <p:style>
+            <a:lnRef idx="2">
+              <a:schemeClr val="accent1">
+                <a:shade val="50000"/>
+              </a:schemeClr>
+            </a:lnRef>
+            <a:fillRef idx="1">
+              <a:schemeClr val="accent1"/>
+            </a:fillRef>
+            <a:effectRef idx="0">
+              <a:schemeClr val="accent1"/>
+            </a:effectRef>
+            <a:fontRef idx="minor">
+              <a:schemeClr val="lt1"/>
+            </a:fontRef>
+          </p:style>
+          <p:txBody>
+            <a:bodyPr rtlCol="0" anchor="ctr"/>
+            <a:lstStyle/>
+            <a:p>
+              <a:pPr algn="ctr"/>
+              <a:endParaRPr kumimoji="1" lang="ja-JP" altLang="en-US"/>
+            </a:p>
+          </p:txBody>
+        </p:sp>
+      </p:grpSp>
+      <p:grpSp>
+        <p:nvGrpSpPr>
+          <p:cNvPr id="170" name="グループ化 169">
+            <a:extLst>
+              <a:ext uri="{FF2B5EF4-FFF2-40B4-BE49-F238E27FC236}">
+                <a16:creationId xmlns:a16="http://schemas.microsoft.com/office/drawing/2014/main" id="{0ED5F144-98F0-C742-8281-8C34A81E4D1C}"/>
+              </a:ext>
+            </a:extLst>
+          </p:cNvPr>
+          <p:cNvGrpSpPr/>
+          <p:nvPr/>
+        </p:nvGrpSpPr>
+        <p:grpSpPr>
+          <a:xfrm>
+            <a:off x="16950771" y="26781156"/>
+            <a:ext cx="1340992" cy="2169971"/>
+            <a:chOff x="16696435" y="26461066"/>
+            <a:chExt cx="1340992" cy="2169971"/>
+          </a:xfrm>
+        </p:grpSpPr>
+        <p:sp>
+          <p:nvSpPr>
+            <p:cNvPr id="171" name="正方形/長方形 170">
+              <a:extLst>
+                <a:ext uri="{FF2B5EF4-FFF2-40B4-BE49-F238E27FC236}">
+                  <a16:creationId xmlns:a16="http://schemas.microsoft.com/office/drawing/2014/main" id="{D6FAA0FB-1AA4-9C41-974B-B5D36376EE65}"/>
+                </a:ext>
+              </a:extLst>
+            </p:cNvPr>
+            <p:cNvSpPr/>
+            <p:nvPr/>
+          </p:nvSpPr>
+          <p:spPr>
+            <a:xfrm>
+              <a:off x="16696435" y="26461066"/>
+              <a:ext cx="1036192" cy="1865171"/>
+            </a:xfrm>
+            <a:prstGeom prst="rect">
+              <a:avLst/>
+            </a:prstGeom>
+            <a:solidFill>
+              <a:schemeClr val="bg1"/>
+            </a:solidFill>
+            <a:ln>
+              <a:solidFill>
+                <a:schemeClr val="bg2">
+                  <a:lumMod val="75000"/>
+                </a:schemeClr>
+              </a:solidFill>
+            </a:ln>
+          </p:spPr>
+          <p:style>
+            <a:lnRef idx="2">
+              <a:schemeClr val="accent1">
+                <a:shade val="50000"/>
+              </a:schemeClr>
+            </a:lnRef>
+            <a:fillRef idx="1">
+              <a:schemeClr val="accent1"/>
+            </a:fillRef>
+            <a:effectRef idx="0">
+              <a:schemeClr val="accent1"/>
+            </a:effectRef>
+            <a:fontRef idx="minor">
+              <a:schemeClr val="lt1"/>
+            </a:fontRef>
+          </p:style>
+          <p:txBody>
+            <a:bodyPr rtlCol="0" anchor="ctr"/>
+            <a:lstStyle/>
+            <a:p>
+              <a:pPr algn="ctr"/>
+              <a:endParaRPr kumimoji="1" lang="ja-JP" altLang="en-US"/>
+            </a:p>
+          </p:txBody>
+        </p:sp>
+        <p:sp>
+          <p:nvSpPr>
+            <p:cNvPr id="172" name="正方形/長方形 171">
+              <a:extLst>
+                <a:ext uri="{FF2B5EF4-FFF2-40B4-BE49-F238E27FC236}">
+                  <a16:creationId xmlns:a16="http://schemas.microsoft.com/office/drawing/2014/main" id="{DE5DCCD1-5636-E44C-82E8-659CCD6723F8}"/>
+                </a:ext>
+              </a:extLst>
+            </p:cNvPr>
+            <p:cNvSpPr/>
+            <p:nvPr/>
+          </p:nvSpPr>
+          <p:spPr>
+            <a:xfrm>
+              <a:off x="16848835" y="26613466"/>
+              <a:ext cx="1036192" cy="1865171"/>
+            </a:xfrm>
+            <a:prstGeom prst="rect">
+              <a:avLst/>
+            </a:prstGeom>
+            <a:solidFill>
+              <a:schemeClr val="bg1"/>
+            </a:solidFill>
+            <a:ln>
+              <a:solidFill>
+                <a:schemeClr val="bg2">
+                  <a:lumMod val="75000"/>
+                </a:schemeClr>
+              </a:solidFill>
+            </a:ln>
+          </p:spPr>
+          <p:style>
+            <a:lnRef idx="2">
+              <a:schemeClr val="accent1">
+                <a:shade val="50000"/>
+              </a:schemeClr>
+            </a:lnRef>
+            <a:fillRef idx="1">
+              <a:schemeClr val="accent1"/>
+            </a:fillRef>
+            <a:effectRef idx="0">
+              <a:schemeClr val="accent1"/>
+            </a:effectRef>
+            <a:fontRef idx="minor">
+              <a:schemeClr val="lt1"/>
+            </a:fontRef>
+          </p:style>
+          <p:txBody>
+            <a:bodyPr rtlCol="0" anchor="ctr"/>
+            <a:lstStyle/>
+            <a:p>
+              <a:pPr algn="ctr"/>
+              <a:endParaRPr kumimoji="1" lang="ja-JP" altLang="en-US"/>
+            </a:p>
+          </p:txBody>
+        </p:sp>
+        <p:sp>
+          <p:nvSpPr>
+            <p:cNvPr id="173" name="正方形/長方形 172">
+              <a:extLst>
+                <a:ext uri="{FF2B5EF4-FFF2-40B4-BE49-F238E27FC236}">
+                  <a16:creationId xmlns:a16="http://schemas.microsoft.com/office/drawing/2014/main" id="{55AF7048-9332-A24F-8FD2-159DC64D571B}"/>
+                </a:ext>
+              </a:extLst>
+            </p:cNvPr>
+            <p:cNvSpPr/>
+            <p:nvPr/>
+          </p:nvSpPr>
+          <p:spPr>
+            <a:xfrm>
+              <a:off x="17001235" y="26765866"/>
+              <a:ext cx="1036192" cy="1865171"/>
+            </a:xfrm>
+            <a:prstGeom prst="rect">
+              <a:avLst/>
+            </a:prstGeom>
+            <a:solidFill>
+              <a:schemeClr val="bg1"/>
+            </a:solidFill>
+            <a:ln>
+              <a:solidFill>
+                <a:schemeClr val="bg2">
+                  <a:lumMod val="75000"/>
+                </a:schemeClr>
+              </a:solidFill>
+            </a:ln>
+          </p:spPr>
+          <p:style>
+            <a:lnRef idx="2">
+              <a:schemeClr val="accent1">
+                <a:shade val="50000"/>
+              </a:schemeClr>
+            </a:lnRef>
+            <a:fillRef idx="1">
+              <a:schemeClr val="accent1"/>
+            </a:fillRef>
+            <a:effectRef idx="0">
+              <a:schemeClr val="accent1"/>
+            </a:effectRef>
+            <a:fontRef idx="minor">
+              <a:schemeClr val="lt1"/>
+            </a:fontRef>
+          </p:style>
+          <p:txBody>
+            <a:bodyPr rtlCol="0" anchor="ctr"/>
+            <a:lstStyle/>
+            <a:p>
+              <a:pPr algn="ctr"/>
+              <a:endParaRPr kumimoji="1" lang="ja-JP" altLang="en-US"/>
+            </a:p>
+          </p:txBody>
+        </p:sp>
+      </p:grpSp>
+      <p:sp>
+        <p:nvSpPr>
+          <p:cNvPr id="178" name="テキスト ボックス 177">
+            <a:extLst>
+              <a:ext uri="{FF2B5EF4-FFF2-40B4-BE49-F238E27FC236}">
+                <a16:creationId xmlns:a16="http://schemas.microsoft.com/office/drawing/2014/main" id="{454F0711-E66B-EA4B-AD97-A94FD4AC0E9D}"/>
+              </a:ext>
+            </a:extLst>
+          </p:cNvPr>
+          <p:cNvSpPr txBox="1"/>
+          <p:nvPr/>
+        </p:nvSpPr>
+        <p:spPr>
+          <a:xfrm>
+            <a:off x="22167239" y="30508899"/>
+            <a:ext cx="3877985" cy="1077218"/>
+          </a:xfrm>
+          <a:prstGeom prst="rect">
+            <a:avLst/>
+          </a:prstGeom>
+          <a:noFill/>
+        </p:spPr>
+        <p:txBody>
+          <a:bodyPr wrap="none" rtlCol="0">
+            <a:spAutoFit/>
+          </a:bodyPr>
+          <a:lstStyle/>
+          <a:p>
+            <a:pPr algn="ctr"/>
+            <a:r>
+              <a:rPr kumimoji="1" lang="ja-JP" altLang="en-US" sz="3200">
+                <a:latin typeface="Hiragino Sans W4" panose="020B0400000000000000" pitchFamily="34" charset="-128"/>
+                <a:ea typeface="Hiragino Sans W4" panose="020B0400000000000000" pitchFamily="34" charset="-128"/>
+              </a:rPr>
+              <a:t>各スポットの</a:t>
+            </a:r>
+            <a:endParaRPr kumimoji="1" lang="en-US" altLang="ja-JP" sz="3200" dirty="0">
+              <a:latin typeface="Hiragino Sans W4" panose="020B0400000000000000" pitchFamily="34" charset="-128"/>
+              <a:ea typeface="Hiragino Sans W4" panose="020B0400000000000000" pitchFamily="34" charset="-128"/>
+            </a:endParaRPr>
+          </a:p>
+          <a:p>
+            <a:pPr algn="ctr"/>
+            <a:r>
+              <a:rPr kumimoji="1" lang="ja-JP" altLang="en-US" sz="3200">
+                <a:latin typeface="Hiragino Sans W4" panose="020B0400000000000000" pitchFamily="34" charset="-128"/>
+                <a:ea typeface="Hiragino Sans W4" panose="020B0400000000000000" pitchFamily="34" charset="-128"/>
+              </a:rPr>
+              <a:t>レビュー文書を分析</a:t>
+            </a:r>
+          </a:p>
+        </p:txBody>
+      </p:sp>
+      <p:sp>
+        <p:nvSpPr>
+          <p:cNvPr id="180" name="テキスト ボックス 179">
+            <a:extLst>
+              <a:ext uri="{FF2B5EF4-FFF2-40B4-BE49-F238E27FC236}">
+                <a16:creationId xmlns:a16="http://schemas.microsoft.com/office/drawing/2014/main" id="{7BDE535B-D8FB-9A42-A277-FE7113264219}"/>
+              </a:ext>
+            </a:extLst>
+          </p:cNvPr>
+          <p:cNvSpPr txBox="1"/>
+          <p:nvPr/>
+        </p:nvSpPr>
+        <p:spPr>
+          <a:xfrm>
+            <a:off x="21879591" y="32075267"/>
+            <a:ext cx="5109091" cy="584775"/>
+          </a:xfrm>
+          <a:prstGeom prst="rect">
+            <a:avLst/>
+          </a:prstGeom>
+          <a:noFill/>
+        </p:spPr>
+        <p:txBody>
+          <a:bodyPr wrap="none" rtlCol="0">
+            <a:spAutoFit/>
+          </a:bodyPr>
+          <a:lstStyle/>
+          <a:p>
+            <a:r>
+              <a:rPr lang="en-US" altLang="ja-JP" sz="3200" dirty="0">
+                <a:latin typeface="Hiragino Sans W4" panose="020B0400000000000000" pitchFamily="34" charset="-128"/>
+                <a:ea typeface="Hiragino Sans W4" panose="020B0400000000000000" pitchFamily="34" charset="-128"/>
+              </a:rPr>
+              <a:t>『</a:t>
+            </a:r>
+            <a:r>
+              <a:rPr lang="ja-JP" altLang="en-US" sz="3200">
+                <a:latin typeface="Hiragino Sans W4" panose="020B0400000000000000" pitchFamily="34" charset="-128"/>
+                <a:ea typeface="Hiragino Sans W4" panose="020B0400000000000000" pitchFamily="34" charset="-128"/>
+              </a:rPr>
+              <a:t>仲見世通り</a:t>
+            </a:r>
+            <a:r>
+              <a:rPr lang="en-US" altLang="ja-JP" sz="3200" dirty="0">
+                <a:latin typeface="Hiragino Sans W4" panose="020B0400000000000000" pitchFamily="34" charset="-128"/>
+                <a:ea typeface="Hiragino Sans W4" panose="020B0400000000000000" pitchFamily="34" charset="-128"/>
+              </a:rPr>
+              <a:t>』</a:t>
+            </a:r>
+            <a:r>
+              <a:rPr lang="ja-JP" altLang="en-US" sz="3200">
+                <a:latin typeface="Hiragino Sans W4" panose="020B0400000000000000" pitchFamily="34" charset="-128"/>
+                <a:ea typeface="Hiragino Sans W4" panose="020B0400000000000000" pitchFamily="34" charset="-128"/>
+              </a:rPr>
+              <a:t>のトピック</a:t>
+            </a:r>
+          </a:p>
+        </p:txBody>
+      </p:sp>
+      <p:graphicFrame>
+        <p:nvGraphicFramePr>
+          <p:cNvPr id="181" name="表 180">
+            <a:extLst>
+              <a:ext uri="{FF2B5EF4-FFF2-40B4-BE49-F238E27FC236}">
+                <a16:creationId xmlns:a16="http://schemas.microsoft.com/office/drawing/2014/main" id="{B03E48B8-C047-9240-A916-572F59A4151D}"/>
+              </a:ext>
+            </a:extLst>
+          </p:cNvPr>
+          <p:cNvGraphicFramePr>
+            <a:graphicFrameLocks noGrp="1"/>
+          </p:cNvGraphicFramePr>
+          <p:nvPr>
+            <p:extLst>
+              <p:ext uri="{D42A27DB-BD31-4B8C-83A1-F6EECF244321}">
+                <p14:modId xmlns:p14="http://schemas.microsoft.com/office/powerpoint/2010/main" val="1237724846"/>
+              </p:ext>
+            </p:extLst>
+          </p:nvPr>
+        </p:nvGraphicFramePr>
+        <p:xfrm>
+          <a:off x="22085388" y="32803564"/>
+          <a:ext cx="4821202" cy="2816700"/>
+        </p:xfrm>
+        <a:graphic>
+          <a:graphicData uri="http://schemas.openxmlformats.org/drawingml/2006/table">
+            <a:tbl>
+              <a:tblPr firstRow="1" bandRow="1">
+                <a:tableStyleId>{2A488322-F2BA-4B5B-9748-0D474271808F}</a:tableStyleId>
+              </a:tblPr>
+              <a:tblGrid>
+                <a:gridCol w="2332653">
+                  <a:extLst>
+                    <a:ext uri="{9D8B030D-6E8A-4147-A177-3AD203B41FA5}">
+                      <a16:colId xmlns:a16="http://schemas.microsoft.com/office/drawing/2014/main" val="476507974"/>
+                    </a:ext>
+                  </a:extLst>
+                </a:gridCol>
+                <a:gridCol w="2488549">
+                  <a:extLst>
+                    <a:ext uri="{9D8B030D-6E8A-4147-A177-3AD203B41FA5}">
+                      <a16:colId xmlns:a16="http://schemas.microsoft.com/office/drawing/2014/main" val="1990266496"/>
+                    </a:ext>
+                  </a:extLst>
+                </a:gridCol>
+              </a:tblGrid>
+              <a:tr h="483884">
+                <a:tc>
+                  <a:txBody>
+                    <a:bodyPr/>
+                    <a:lstStyle/>
+                    <a:p>
+                      <a:pPr algn="ctr"/>
+                      <a:r>
+                        <a:rPr kumimoji="1" lang="ja-JP" altLang="en-US" sz="2800">
+                          <a:latin typeface="Hiragino Sans W4" panose="020B0400000000000000" pitchFamily="34" charset="-128"/>
+                          <a:ea typeface="Hiragino Sans W4" panose="020B0400000000000000" pitchFamily="34" charset="-128"/>
+                        </a:rPr>
+                        <a:t>トピック</a:t>
+                      </a:r>
+                    </a:p>
+                  </a:txBody>
+                  <a:tcPr/>
+                </a:tc>
+                <a:tc>
+                  <a:txBody>
+                    <a:bodyPr/>
+                    <a:lstStyle/>
+                    <a:p>
+                      <a:pPr algn="ctr"/>
+                      <a:r>
+                        <a:rPr kumimoji="1" lang="ja-JP" altLang="en-US" sz="2800">
+                          <a:latin typeface="Hiragino Sans W4" panose="020B0400000000000000" pitchFamily="34" charset="-128"/>
+                          <a:ea typeface="Hiragino Sans W4" panose="020B0400000000000000" pitchFamily="34" charset="-128"/>
+                        </a:rPr>
+                        <a:t>確率</a:t>
+                      </a:r>
+                    </a:p>
+                  </a:txBody>
+                  <a:tcPr/>
+                </a:tc>
+                <a:extLst>
+                  <a:ext uri="{0D108BD9-81ED-4DB2-BD59-A6C34878D82A}">
+                    <a16:rowId xmlns:a16="http://schemas.microsoft.com/office/drawing/2014/main" val="523836565"/>
+                  </a:ext>
+                </a:extLst>
+              </a:tr>
+              <a:tr h="574635">
+                <a:tc>
+                  <a:txBody>
+                    <a:bodyPr/>
+                    <a:lstStyle/>
+                    <a:p>
+                      <a:pPr marL="0" marR="0" lvl="0" indent="0" algn="l" defTabSz="3027487" rtl="0" eaLnBrk="1" fontAlgn="auto" latinLnBrk="0" hangingPunct="1">
+                        <a:lnSpc>
+                          <a:spcPct val="100000"/>
+                        </a:lnSpc>
+                        <a:spcBef>
+                          <a:spcPts val="0"/>
+                        </a:spcBef>
+                        <a:spcAft>
+                          <a:spcPts val="0"/>
+                        </a:spcAft>
+                        <a:buClrTx/>
+                        <a:buSzTx/>
+                        <a:buFontTx/>
+                        <a:buNone/>
+                        <a:tabLst/>
+                        <a:defRPr/>
+                      </a:pPr>
+                      <a:r>
+                        <a:rPr kumimoji="1" lang="ja-JP" altLang="en-US" sz="2800">
+                          <a:latin typeface="Hiragino Sans W4" panose="020B0400000000000000" pitchFamily="34" charset="-128"/>
+                          <a:ea typeface="Hiragino Sans W4" panose="020B0400000000000000" pitchFamily="34" charset="-128"/>
+                        </a:rPr>
+                        <a:t>買い物</a:t>
+                      </a:r>
+                    </a:p>
+                  </a:txBody>
+                  <a:tcPr/>
+                </a:tc>
+                <a:tc>
+                  <a:txBody>
+                    <a:bodyPr/>
+                    <a:lstStyle/>
+                    <a:p>
+                      <a:r>
+                        <a:rPr lang="en-US" altLang="ja-JP" sz="2800" dirty="0">
+                          <a:latin typeface="Hiragino Sans W4" panose="020B0400000000000000" pitchFamily="34" charset="-128"/>
+                          <a:ea typeface="Hiragino Sans W4" panose="020B0400000000000000" pitchFamily="34" charset="-128"/>
+                        </a:rPr>
+                        <a:t>0.5105906</a:t>
+                      </a:r>
+                      <a:endParaRPr kumimoji="1" lang="ja-JP" altLang="en-US" sz="2800">
+                        <a:latin typeface="Hiragino Sans W4" panose="020B0400000000000000" pitchFamily="34" charset="-128"/>
+                        <a:ea typeface="Hiragino Sans W4" panose="020B0400000000000000" pitchFamily="34" charset="-128"/>
+                      </a:endParaRPr>
+                    </a:p>
+                  </a:txBody>
+                  <a:tcPr/>
+                </a:tc>
+                <a:extLst>
+                  <a:ext uri="{0D108BD9-81ED-4DB2-BD59-A6C34878D82A}">
+                    <a16:rowId xmlns:a16="http://schemas.microsoft.com/office/drawing/2014/main" val="4074486588"/>
+                  </a:ext>
+                </a:extLst>
+              </a:tr>
+              <a:tr h="574635">
+                <a:tc>
+                  <a:txBody>
+                    <a:bodyPr/>
+                    <a:lstStyle/>
+                    <a:p>
+                      <a:r>
+                        <a:rPr kumimoji="1" lang="ja-JP" altLang="en-US" sz="2800">
+                          <a:latin typeface="Hiragino Sans W4" panose="020B0400000000000000" pitchFamily="34" charset="-128"/>
+                          <a:ea typeface="Hiragino Sans W4" panose="020B0400000000000000" pitchFamily="34" charset="-128"/>
+                        </a:rPr>
+                        <a:t>お参り、参道</a:t>
+                      </a:r>
+                    </a:p>
+                  </a:txBody>
+                  <a:tcPr/>
+                </a:tc>
+                <a:tc>
+                  <a:txBody>
+                    <a:bodyPr/>
+                    <a:lstStyle/>
+                    <a:p>
+                      <a:r>
+                        <a:rPr lang="en-US" altLang="ja-JP" sz="2800" dirty="0">
+                          <a:latin typeface="Hiragino Sans W4" panose="020B0400000000000000" pitchFamily="34" charset="-128"/>
+                          <a:ea typeface="Hiragino Sans W4" panose="020B0400000000000000" pitchFamily="34" charset="-128"/>
+                        </a:rPr>
+                        <a:t>0.2520664</a:t>
+                      </a:r>
+                      <a:endParaRPr kumimoji="1" lang="ja-JP" altLang="en-US" sz="2800">
+                        <a:latin typeface="Hiragino Sans W4" panose="020B0400000000000000" pitchFamily="34" charset="-128"/>
+                        <a:ea typeface="Hiragino Sans W4" panose="020B0400000000000000" pitchFamily="34" charset="-128"/>
+                      </a:endParaRPr>
+                    </a:p>
+                  </a:txBody>
+                  <a:tcPr/>
+                </a:tc>
+                <a:extLst>
+                  <a:ext uri="{0D108BD9-81ED-4DB2-BD59-A6C34878D82A}">
+                    <a16:rowId xmlns:a16="http://schemas.microsoft.com/office/drawing/2014/main" val="29630606"/>
+                  </a:ext>
+                </a:extLst>
+              </a:tr>
+              <a:tr h="574635">
+                <a:tc>
+                  <a:txBody>
+                    <a:bodyPr/>
+                    <a:lstStyle/>
+                    <a:p>
+                      <a:r>
+                        <a:rPr kumimoji="1" lang="ja-JP" altLang="en-US" sz="2800">
+                          <a:latin typeface="Hiragino Sans W4" panose="020B0400000000000000" pitchFamily="34" charset="-128"/>
+                          <a:ea typeface="Hiragino Sans W4" panose="020B0400000000000000" pitchFamily="34" charset="-128"/>
+                        </a:rPr>
+                        <a:t>店舗、活気</a:t>
+                      </a:r>
+                    </a:p>
+                  </a:txBody>
+                  <a:tcPr/>
+                </a:tc>
+                <a:tc>
+                  <a:txBody>
+                    <a:bodyPr/>
+                    <a:lstStyle/>
+                    <a:p>
+                      <a:r>
+                        <a:rPr lang="en-US" altLang="ja-JP" sz="2800" dirty="0">
+                          <a:latin typeface="Hiragino Sans W4" panose="020B0400000000000000" pitchFamily="34" charset="-128"/>
+                          <a:ea typeface="Hiragino Sans W4" panose="020B0400000000000000" pitchFamily="34" charset="-128"/>
+                        </a:rPr>
+                        <a:t>0.2030718</a:t>
+                      </a:r>
+                    </a:p>
+                  </a:txBody>
+                  <a:tcPr/>
+                </a:tc>
+                <a:extLst>
+                  <a:ext uri="{0D108BD9-81ED-4DB2-BD59-A6C34878D82A}">
+                    <a16:rowId xmlns:a16="http://schemas.microsoft.com/office/drawing/2014/main" val="176714018"/>
+                  </a:ext>
+                </a:extLst>
+              </a:tr>
+              <a:tr h="574635">
+                <a:tc>
+                  <a:txBody>
+                    <a:bodyPr/>
+                    <a:lstStyle/>
+                    <a:p>
+                      <a:r>
+                        <a:rPr kumimoji="1" lang="ja-JP" altLang="en-US" sz="2800">
+                          <a:latin typeface="Hiragino Sans W4" panose="020B0400000000000000" pitchFamily="34" charset="-128"/>
+                          <a:ea typeface="Hiragino Sans W4" panose="020B0400000000000000" pitchFamily="34" charset="-128"/>
+                        </a:rPr>
+                        <a:t>お寺、庭園</a:t>
+                      </a:r>
+                    </a:p>
+                  </a:txBody>
+                  <a:tcPr/>
+                </a:tc>
+                <a:tc>
+                  <a:txBody>
+                    <a:bodyPr/>
+                    <a:lstStyle/>
+                    <a:p>
+                      <a:r>
+                        <a:rPr lang="en-US" altLang="ja-JP" sz="2800" dirty="0">
+                          <a:latin typeface="Hiragino Sans W4" panose="020B0400000000000000" pitchFamily="34" charset="-128"/>
+                          <a:ea typeface="Hiragino Sans W4" panose="020B0400000000000000" pitchFamily="34" charset="-128"/>
+                        </a:rPr>
+                        <a:t>0.0341793</a:t>
+                      </a:r>
+                    </a:p>
+                  </a:txBody>
+                  <a:tcPr/>
+                </a:tc>
+                <a:extLst>
+                  <a:ext uri="{0D108BD9-81ED-4DB2-BD59-A6C34878D82A}">
+                    <a16:rowId xmlns:a16="http://schemas.microsoft.com/office/drawing/2014/main" val="4162520137"/>
+                  </a:ext>
+                </a:extLst>
+              </a:tr>
+            </a:tbl>
+          </a:graphicData>
+        </a:graphic>
+      </p:graphicFrame>
+      <p:sp>
+        <p:nvSpPr>
+          <p:cNvPr id="50" name="三角形 49">
+            <a:extLst>
+              <a:ext uri="{FF2B5EF4-FFF2-40B4-BE49-F238E27FC236}">
+                <a16:creationId xmlns:a16="http://schemas.microsoft.com/office/drawing/2014/main" id="{E388EE62-D0EC-2849-B02C-AE4DEFFE3670}"/>
+              </a:ext>
+            </a:extLst>
+          </p:cNvPr>
+          <p:cNvSpPr/>
+          <p:nvPr/>
+        </p:nvSpPr>
+        <p:spPr>
+          <a:xfrm>
+            <a:off x="14511817" y="21975157"/>
+            <a:ext cx="1229608" cy="1906678"/>
+          </a:xfrm>
+          <a:prstGeom prst="triangle">
+            <a:avLst/>
+          </a:prstGeom>
+          <a:solidFill>
+            <a:schemeClr val="accent6">
+              <a:lumMod val="75000"/>
+            </a:schemeClr>
+          </a:solidFill>
+          <a:ln>
+            <a:solidFill>
+              <a:schemeClr val="accent6">
+                <a:lumMod val="75000"/>
+              </a:schemeClr>
+            </a:solidFill>
+          </a:ln>
+        </p:spPr>
+        <p:style>
+          <a:lnRef idx="2">
+            <a:schemeClr val="accent1">
+              <a:shade val="50000"/>
+            </a:schemeClr>
+          </a:lnRef>
+          <a:fillRef idx="1">
+            <a:schemeClr val="accent1"/>
+          </a:fillRef>
+          <a:effectRef idx="0">
+            <a:schemeClr val="accent1"/>
+          </a:effectRef>
+          <a:fontRef idx="minor">
+            <a:schemeClr val="lt1"/>
+          </a:fontRef>
+        </p:style>
+        <p:txBody>
+          <a:bodyPr rtlCol="0" anchor="ctr"/>
+          <a:lstStyle/>
+          <a:p>
+            <a:pPr algn="ctr"/>
+            <a:endParaRPr kumimoji="1" lang="ja-JP" altLang="en-US"/>
+          </a:p>
+        </p:txBody>
+      </p:sp>
+      <p:sp>
+        <p:nvSpPr>
+          <p:cNvPr id="182" name="右矢印 181">
+            <a:extLst>
+              <a:ext uri="{FF2B5EF4-FFF2-40B4-BE49-F238E27FC236}">
+                <a16:creationId xmlns:a16="http://schemas.microsoft.com/office/drawing/2014/main" id="{6581146B-D59D-7B49-B714-40BB0D66CBD4}"/>
+              </a:ext>
+            </a:extLst>
+          </p:cNvPr>
+          <p:cNvSpPr/>
+          <p:nvPr/>
+        </p:nvSpPr>
+        <p:spPr>
+          <a:xfrm rot="5400000">
+            <a:off x="20489198" y="30499612"/>
+            <a:ext cx="1702271" cy="936000"/>
+          </a:xfrm>
+          <a:prstGeom prst="rightArrow">
+            <a:avLst/>
+          </a:prstGeom>
+          <a:solidFill>
+            <a:schemeClr val="accent6">
+              <a:lumMod val="75000"/>
+            </a:schemeClr>
+          </a:solidFill>
+          <a:ln>
+            <a:solidFill>
+              <a:schemeClr val="accent6">
+                <a:lumMod val="75000"/>
+              </a:schemeClr>
+            </a:solidFill>
+          </a:ln>
+        </p:spPr>
+        <p:style>
+          <a:lnRef idx="2">
+            <a:schemeClr val="accent1">
+              <a:shade val="50000"/>
+            </a:schemeClr>
+          </a:lnRef>
+          <a:fillRef idx="1">
+            <a:schemeClr val="accent1"/>
+          </a:fillRef>
+          <a:effectRef idx="0">
+            <a:schemeClr val="accent1"/>
+          </a:effectRef>
+          <a:fontRef idx="minor">
+            <a:schemeClr val="lt1"/>
+          </a:fontRef>
+        </p:style>
+        <p:txBody>
+          <a:bodyPr rtlCol="0" anchor="ctr"/>
+          <a:lstStyle/>
+          <a:p>
+            <a:pPr algn="ctr"/>
+            <a:endParaRPr kumimoji="1" lang="ja-JP" altLang="en-US">
+              <a:latin typeface="Hiragino Sans W4" panose="020B0400000000000000" pitchFamily="34" charset="-128"/>
+              <a:ea typeface="Hiragino Sans W4" panose="020B0400000000000000" pitchFamily="34" charset="-128"/>
+            </a:endParaRPr>
+          </a:p>
+        </p:txBody>
+      </p:sp>
+      <p:sp>
+        <p:nvSpPr>
+          <p:cNvPr id="183" name="テキスト ボックス 182">
+            <a:extLst>
+              <a:ext uri="{FF2B5EF4-FFF2-40B4-BE49-F238E27FC236}">
+                <a16:creationId xmlns:a16="http://schemas.microsoft.com/office/drawing/2014/main" id="{63573667-8ED3-5F43-A3BF-9775A327C8A3}"/>
+              </a:ext>
+            </a:extLst>
+          </p:cNvPr>
+          <p:cNvSpPr txBox="1"/>
+          <p:nvPr/>
+        </p:nvSpPr>
+        <p:spPr>
+          <a:xfrm>
+            <a:off x="15839814" y="32045122"/>
+            <a:ext cx="4698722" cy="584775"/>
+          </a:xfrm>
+          <a:prstGeom prst="rect">
+            <a:avLst/>
+          </a:prstGeom>
+          <a:noFill/>
+        </p:spPr>
+        <p:txBody>
+          <a:bodyPr wrap="none" rtlCol="0">
+            <a:spAutoFit/>
+          </a:bodyPr>
+          <a:lstStyle/>
+          <a:p>
+            <a:r>
+              <a:rPr lang="en-US" altLang="ja-JP" sz="3200" dirty="0">
+                <a:latin typeface="Hiragino Sans W4" panose="020B0400000000000000" pitchFamily="34" charset="-128"/>
+                <a:ea typeface="Hiragino Sans W4" panose="020B0400000000000000" pitchFamily="34" charset="-128"/>
+              </a:rPr>
+              <a:t>『</a:t>
+            </a:r>
+            <a:r>
+              <a:rPr lang="ja-JP" altLang="en-US" sz="3200">
+                <a:latin typeface="Hiragino Sans W4" panose="020B0400000000000000" pitchFamily="34" charset="-128"/>
+                <a:ea typeface="Hiragino Sans W4" panose="020B0400000000000000" pitchFamily="34" charset="-128"/>
+              </a:rPr>
+              <a:t>小町通り</a:t>
+            </a:r>
+            <a:r>
+              <a:rPr lang="en-US" altLang="ja-JP" sz="3200" dirty="0">
+                <a:latin typeface="Hiragino Sans W4" panose="020B0400000000000000" pitchFamily="34" charset="-128"/>
+                <a:ea typeface="Hiragino Sans W4" panose="020B0400000000000000" pitchFamily="34" charset="-128"/>
+              </a:rPr>
+              <a:t>』</a:t>
+            </a:r>
+            <a:r>
+              <a:rPr lang="ja-JP" altLang="en-US" sz="3200">
+                <a:latin typeface="Hiragino Sans W4" panose="020B0400000000000000" pitchFamily="34" charset="-128"/>
+                <a:ea typeface="Hiragino Sans W4" panose="020B0400000000000000" pitchFamily="34" charset="-128"/>
+              </a:rPr>
+              <a:t>のトピック</a:t>
+            </a:r>
+          </a:p>
+        </p:txBody>
+      </p:sp>
+      <p:graphicFrame>
+        <p:nvGraphicFramePr>
+          <p:cNvPr id="184" name="表 183">
+            <a:extLst>
+              <a:ext uri="{FF2B5EF4-FFF2-40B4-BE49-F238E27FC236}">
+                <a16:creationId xmlns:a16="http://schemas.microsoft.com/office/drawing/2014/main" id="{968658AA-1057-E341-9481-F0B69140409F}"/>
+              </a:ext>
+            </a:extLst>
+          </p:cNvPr>
+          <p:cNvGraphicFramePr>
+            <a:graphicFrameLocks noGrp="1"/>
+          </p:cNvGraphicFramePr>
+          <p:nvPr>
+            <p:extLst>
+              <p:ext uri="{D42A27DB-BD31-4B8C-83A1-F6EECF244321}">
+                <p14:modId xmlns:p14="http://schemas.microsoft.com/office/powerpoint/2010/main" val="613694929"/>
+              </p:ext>
+            </p:extLst>
+          </p:nvPr>
+        </p:nvGraphicFramePr>
+        <p:xfrm>
+          <a:off x="15922974" y="32777440"/>
+          <a:ext cx="4821202" cy="2816700"/>
+        </p:xfrm>
+        <a:graphic>
+          <a:graphicData uri="http://schemas.openxmlformats.org/drawingml/2006/table">
+            <a:tbl>
+              <a:tblPr firstRow="1" bandRow="1">
+                <a:tableStyleId>{2A488322-F2BA-4B5B-9748-0D474271808F}</a:tableStyleId>
+              </a:tblPr>
+              <a:tblGrid>
+                <a:gridCol w="2332653">
+                  <a:extLst>
+                    <a:ext uri="{9D8B030D-6E8A-4147-A177-3AD203B41FA5}">
+                      <a16:colId xmlns:a16="http://schemas.microsoft.com/office/drawing/2014/main" val="476507974"/>
+                    </a:ext>
+                  </a:extLst>
+                </a:gridCol>
+                <a:gridCol w="2488549">
+                  <a:extLst>
+                    <a:ext uri="{9D8B030D-6E8A-4147-A177-3AD203B41FA5}">
+                      <a16:colId xmlns:a16="http://schemas.microsoft.com/office/drawing/2014/main" val="1990266496"/>
+                    </a:ext>
+                  </a:extLst>
+                </a:gridCol>
+              </a:tblGrid>
+              <a:tr h="483884">
+                <a:tc>
+                  <a:txBody>
+                    <a:bodyPr/>
+                    <a:lstStyle/>
+                    <a:p>
+                      <a:pPr algn="ctr"/>
+                      <a:r>
+                        <a:rPr kumimoji="1" lang="ja-JP" altLang="en-US" sz="2800">
+                          <a:latin typeface="Hiragino Sans W4" panose="020B0400000000000000" pitchFamily="34" charset="-128"/>
+                          <a:ea typeface="Hiragino Sans W4" panose="020B0400000000000000" pitchFamily="34" charset="-128"/>
+                        </a:rPr>
+                        <a:t>トピック</a:t>
+                      </a:r>
+                    </a:p>
+                  </a:txBody>
+                  <a:tcPr/>
+                </a:tc>
+                <a:tc>
+                  <a:txBody>
+                    <a:bodyPr/>
+                    <a:lstStyle/>
+                    <a:p>
+                      <a:pPr algn="ctr"/>
+                      <a:r>
+                        <a:rPr kumimoji="1" lang="ja-JP" altLang="en-US" sz="2800">
+                          <a:latin typeface="Hiragino Sans W4" panose="020B0400000000000000" pitchFamily="34" charset="-128"/>
+                          <a:ea typeface="Hiragino Sans W4" panose="020B0400000000000000" pitchFamily="34" charset="-128"/>
+                        </a:rPr>
+                        <a:t>確率</a:t>
+                      </a:r>
+                    </a:p>
+                  </a:txBody>
+                  <a:tcPr/>
+                </a:tc>
+                <a:extLst>
+                  <a:ext uri="{0D108BD9-81ED-4DB2-BD59-A6C34878D82A}">
+                    <a16:rowId xmlns:a16="http://schemas.microsoft.com/office/drawing/2014/main" val="523836565"/>
+                  </a:ext>
+                </a:extLst>
+              </a:tr>
+              <a:tr h="574635">
+                <a:tc>
+                  <a:txBody>
+                    <a:bodyPr/>
+                    <a:lstStyle/>
+                    <a:p>
+                      <a:pPr marL="0" marR="0" lvl="0" indent="0" algn="l" defTabSz="3027487" rtl="0" eaLnBrk="1" fontAlgn="auto" latinLnBrk="0" hangingPunct="1">
+                        <a:lnSpc>
+                          <a:spcPct val="100000"/>
+                        </a:lnSpc>
+                        <a:spcBef>
+                          <a:spcPts val="0"/>
+                        </a:spcBef>
+                        <a:spcAft>
+                          <a:spcPts val="0"/>
+                        </a:spcAft>
+                        <a:buClrTx/>
+                        <a:buSzTx/>
+                        <a:buFontTx/>
+                        <a:buNone/>
+                        <a:tabLst/>
+                        <a:defRPr/>
+                      </a:pPr>
+                      <a:r>
+                        <a:rPr kumimoji="1" lang="ja-JP" altLang="en-US" sz="2800">
+                          <a:latin typeface="Hiragino Sans W4" panose="020B0400000000000000" pitchFamily="34" charset="-128"/>
+                          <a:ea typeface="Hiragino Sans W4" panose="020B0400000000000000" pitchFamily="34" charset="-128"/>
+                        </a:rPr>
+                        <a:t>買い物</a:t>
+                      </a:r>
+                    </a:p>
+                  </a:txBody>
+                  <a:tcPr/>
+                </a:tc>
+                <a:tc>
+                  <a:txBody>
+                    <a:bodyPr/>
+                    <a:lstStyle/>
+                    <a:p>
+                      <a:r>
+                        <a:rPr lang="en-US" altLang="ja-JP" sz="2800" dirty="0">
+                          <a:latin typeface="Hiragino Sans W4" panose="020B0400000000000000" pitchFamily="34" charset="-128"/>
+                          <a:ea typeface="Hiragino Sans W4" panose="020B0400000000000000" pitchFamily="34" charset="-128"/>
+                        </a:rPr>
+                        <a:t>0.5426635</a:t>
+                      </a:r>
+                      <a:endParaRPr kumimoji="1" lang="ja-JP" altLang="en-US" sz="2800">
+                        <a:latin typeface="Hiragino Sans W4" panose="020B0400000000000000" pitchFamily="34" charset="-128"/>
+                        <a:ea typeface="Hiragino Sans W4" panose="020B0400000000000000" pitchFamily="34" charset="-128"/>
+                      </a:endParaRPr>
+                    </a:p>
+                  </a:txBody>
+                  <a:tcPr/>
+                </a:tc>
+                <a:extLst>
+                  <a:ext uri="{0D108BD9-81ED-4DB2-BD59-A6C34878D82A}">
+                    <a16:rowId xmlns:a16="http://schemas.microsoft.com/office/drawing/2014/main" val="4074486588"/>
+                  </a:ext>
+                </a:extLst>
+              </a:tr>
+              <a:tr h="574635">
+                <a:tc>
+                  <a:txBody>
+                    <a:bodyPr/>
+                    <a:lstStyle/>
+                    <a:p>
+                      <a:r>
+                        <a:rPr kumimoji="1" lang="ja-JP" altLang="en-US" sz="2800">
+                          <a:latin typeface="Hiragino Sans W4" panose="020B0400000000000000" pitchFamily="34" charset="-128"/>
+                          <a:ea typeface="Hiragino Sans W4" panose="020B0400000000000000" pitchFamily="34" charset="-128"/>
+                        </a:rPr>
+                        <a:t>店舗、活気</a:t>
+                      </a:r>
+                    </a:p>
+                  </a:txBody>
+                  <a:tcPr/>
+                </a:tc>
+                <a:tc>
+                  <a:txBody>
+                    <a:bodyPr/>
+                    <a:lstStyle/>
+                    <a:p>
+                      <a:r>
+                        <a:rPr lang="en-US" altLang="ja-JP" sz="2800" dirty="0">
+                          <a:latin typeface="Hiragino Sans W4" panose="020B0400000000000000" pitchFamily="34" charset="-128"/>
+                          <a:ea typeface="Hiragino Sans W4" panose="020B0400000000000000" pitchFamily="34" charset="-128"/>
+                        </a:rPr>
+                        <a:t>0.3144154</a:t>
+                      </a:r>
+                      <a:endParaRPr kumimoji="1" lang="ja-JP" altLang="en-US" sz="2800">
+                        <a:latin typeface="Hiragino Sans W4" panose="020B0400000000000000" pitchFamily="34" charset="-128"/>
+                        <a:ea typeface="Hiragino Sans W4" panose="020B0400000000000000" pitchFamily="34" charset="-128"/>
+                      </a:endParaRPr>
+                    </a:p>
+                  </a:txBody>
+                  <a:tcPr/>
+                </a:tc>
+                <a:extLst>
+                  <a:ext uri="{0D108BD9-81ED-4DB2-BD59-A6C34878D82A}">
+                    <a16:rowId xmlns:a16="http://schemas.microsoft.com/office/drawing/2014/main" val="29630606"/>
+                  </a:ext>
+                </a:extLst>
+              </a:tr>
+              <a:tr h="574635">
+                <a:tc>
+                  <a:txBody>
+                    <a:bodyPr/>
+                    <a:lstStyle/>
+                    <a:p>
+                      <a:r>
+                        <a:rPr kumimoji="1" lang="ja-JP" altLang="en-US" sz="2800">
+                          <a:latin typeface="Hiragino Sans W4" panose="020B0400000000000000" pitchFamily="34" charset="-128"/>
+                          <a:ea typeface="Hiragino Sans W4" panose="020B0400000000000000" pitchFamily="34" charset="-128"/>
+                        </a:rPr>
+                        <a:t>お参り、参道</a:t>
+                      </a:r>
+                    </a:p>
+                  </a:txBody>
+                  <a:tcPr/>
+                </a:tc>
+                <a:tc>
+                  <a:txBody>
+                    <a:bodyPr/>
+                    <a:lstStyle/>
+                    <a:p>
+                      <a:r>
+                        <a:rPr lang="en-US" altLang="ja-JP" sz="2800" dirty="0">
+                          <a:latin typeface="Hiragino Sans W4" panose="020B0400000000000000" pitchFamily="34" charset="-128"/>
+                          <a:ea typeface="Hiragino Sans W4" panose="020B0400000000000000" pitchFamily="34" charset="-128"/>
+                        </a:rPr>
+                        <a:t>0.0894214</a:t>
+                      </a:r>
+                    </a:p>
+                  </a:txBody>
+                  <a:tcPr/>
+                </a:tc>
+                <a:extLst>
+                  <a:ext uri="{0D108BD9-81ED-4DB2-BD59-A6C34878D82A}">
+                    <a16:rowId xmlns:a16="http://schemas.microsoft.com/office/drawing/2014/main" val="176714018"/>
+                  </a:ext>
+                </a:extLst>
+              </a:tr>
+              <a:tr h="574635">
+                <a:tc>
+                  <a:txBody>
+                    <a:bodyPr/>
+                    <a:lstStyle/>
+                    <a:p>
+                      <a:r>
+                        <a:rPr kumimoji="1" lang="ja-JP" altLang="en-US" sz="2800">
+                          <a:latin typeface="Hiragino Sans W4" panose="020B0400000000000000" pitchFamily="34" charset="-128"/>
+                          <a:ea typeface="Hiragino Sans W4" panose="020B0400000000000000" pitchFamily="34" charset="-128"/>
+                        </a:rPr>
+                        <a:t>お寺、庭園</a:t>
+                      </a:r>
+                    </a:p>
+                  </a:txBody>
+                  <a:tcPr/>
+                </a:tc>
+                <a:tc>
+                  <a:txBody>
+                    <a:bodyPr/>
+                    <a:lstStyle/>
+                    <a:p>
+                      <a:r>
+                        <a:rPr lang="en-US" altLang="ja-JP" sz="2800" dirty="0">
+                          <a:latin typeface="Hiragino Sans W4" panose="020B0400000000000000" pitchFamily="34" charset="-128"/>
+                          <a:ea typeface="Hiragino Sans W4" panose="020B0400000000000000" pitchFamily="34" charset="-128"/>
+                        </a:rPr>
+                        <a:t>0.0355152</a:t>
+                      </a:r>
+                    </a:p>
+                  </a:txBody>
+                  <a:tcPr/>
+                </a:tc>
+                <a:extLst>
+                  <a:ext uri="{0D108BD9-81ED-4DB2-BD59-A6C34878D82A}">
+                    <a16:rowId xmlns:a16="http://schemas.microsoft.com/office/drawing/2014/main" val="4162520137"/>
+                  </a:ext>
+                </a:extLst>
+              </a:tr>
+            </a:tbl>
+          </a:graphicData>
+        </a:graphic>
+      </p:graphicFrame>
     </p:spTree>
     <p:extLst>
       <p:ext uri="{BB962C8B-B14F-4D97-AF65-F5344CB8AC3E}">

</xml_diff>